<commit_message>
NormalFSharp: added pros and cons...
</commit_message>
<xml_diff>
--- a/NormalFSharp/NormalFSharp.pptx
+++ b/NormalFSharp/NormalFSharp.pptx
@@ -5,10 +5,12 @@
     <p:sldMasterId id="2147483648" r:id="rId1"/>
   </p:sldMasterIdLst>
   <p:notesMasterIdLst>
-    <p:notesMasterId r:id="rId3"/>
+    <p:notesMasterId r:id="rId5"/>
   </p:notesMasterIdLst>
   <p:sldIdLst>
     <p:sldId id="256" r:id="rId2"/>
+    <p:sldId id="258" r:id="rId3"/>
+    <p:sldId id="257" r:id="rId4"/>
   </p:sldIdLst>
   <p:sldSz cx="9144000" cy="6858000" type="screen4x3"/>
   <p:notesSz cx="6858000" cy="9144000"/>
@@ -192,7 +194,7 @@
           <a:p>
             <a:fld id="{0268F58F-3ED5-4D70-BB75-0EB08FA7ABD5}" type="datetimeFigureOut">
               <a:rPr lang="uk-UA" smtClean="0"/>
-              <a:t>06.04.2010</a:t>
+              <a:t>07.04.2010</a:t>
             </a:fld>
             <a:endParaRPr lang="uk-UA"/>
           </a:p>
@@ -527,13 +529,63 @@
             </a:r>
             <a:r>
               <a:rPr lang="ru-RU" baseline="0" dirty="0" smtClean="0"/>
-              <a:t> </a:t>
-            </a:r>
-            <a:r>
-              <a:rPr lang="ru-RU" baseline="0" smtClean="0"/>
-              <a:t>молчать!</a:t>
-            </a:r>
-            <a:endParaRPr lang="uk-UA" smtClean="0"/>
+              <a:t> молчать</a:t>
+            </a:r>
+            <a:r>
+              <a:rPr lang="ru-RU" baseline="0" dirty="0" smtClean="0"/>
+              <a:t>!</a:t>
+            </a:r>
+          </a:p>
+          <a:p>
+            <a:pPr marL="0" marR="0" indent="0" algn="l" defTabSz="914400" rtl="0" eaLnBrk="1" fontAlgn="auto" latinLnBrk="0" hangingPunct="1">
+              <a:lnSpc>
+                <a:spcPct val="100000"/>
+              </a:lnSpc>
+              <a:spcBef>
+                <a:spcPts val="0"/>
+              </a:spcBef>
+              <a:spcAft>
+                <a:spcPts val="0"/>
+              </a:spcAft>
+              <a:buClrTx/>
+              <a:buSzTx/>
+              <a:buFontTx/>
+              <a:buNone/>
+              <a:tabLst/>
+              <a:defRPr/>
+            </a:pPr>
+            <a:endParaRPr lang="ru-RU" baseline="0" dirty="0" smtClean="0"/>
+          </a:p>
+          <a:p>
+            <a:pPr marL="0" marR="0" indent="0" algn="l" defTabSz="914400" rtl="0" eaLnBrk="1" fontAlgn="auto" latinLnBrk="0" hangingPunct="1">
+              <a:lnSpc>
+                <a:spcPct val="100000"/>
+              </a:lnSpc>
+              <a:spcBef>
+                <a:spcPts val="0"/>
+              </a:spcBef>
+              <a:spcAft>
+                <a:spcPts val="0"/>
+              </a:spcAft>
+              <a:buClrTx/>
+              <a:buSzTx/>
+              <a:buFontTx/>
+              <a:buNone/>
+              <a:tabLst/>
+              <a:defRPr/>
+            </a:pPr>
+            <a:r>
+              <a:rPr lang="uk-UA" sz="1200" b="0" i="0" u="none" strike="noStrike" kern="1200" baseline="0" smtClean="0">
+                <a:solidFill>
+                  <a:schemeClr val="tx1"/>
+                </a:solidFill>
+                <a:latin typeface="+mn-lt"/>
+                <a:ea typeface="+mn-ea"/>
+                <a:cs typeface="+mn-cs"/>
+              </a:rPr>
+              <a:t>Функторы, каррирование, хвостовая рекурсия..</a:t>
+            </a:r>
+            <a:endParaRPr lang="uk-UA" dirty="0" smtClean="0"/>
           </a:p>
         </p:txBody>
       </p:sp>
@@ -564,6 +616,724 @@
     <p:extLst>
       <p:ext uri="{BB962C8B-B14F-4D97-AF65-F5344CB8AC3E}">
         <p14:creationId xmlns:p14="http://schemas.microsoft.com/office/powerpoint/2010/main" val="3355985474"/>
+      </p:ext>
+    </p:extLst>
+  </p:cSld>
+  <p:clrMapOvr>
+    <a:masterClrMapping/>
+  </p:clrMapOvr>
+</p:notes>
+</file>
+
+<file path=ppt/notesSlides/notesSlide2.xml><?xml version="1.0" encoding="utf-8"?>
+<p:notes xmlns:a="http://schemas.openxmlformats.org/drawingml/2006/main" xmlns:r="http://schemas.openxmlformats.org/officeDocument/2006/relationships" xmlns:p="http://schemas.openxmlformats.org/presentationml/2006/main">
+  <p:cSld>
+    <p:spTree>
+      <p:nvGrpSpPr>
+        <p:cNvPr id="1" name=""/>
+        <p:cNvGrpSpPr/>
+        <p:nvPr/>
+      </p:nvGrpSpPr>
+      <p:grpSpPr>
+        <a:xfrm>
+          <a:off x="0" y="0"/>
+          <a:ext cx="0" cy="0"/>
+          <a:chOff x="0" y="0"/>
+          <a:chExt cx="0" cy="0"/>
+        </a:xfrm>
+      </p:grpSpPr>
+      <p:sp>
+        <p:nvSpPr>
+          <p:cNvPr id="2" name="Slide Image Placeholder 1"/>
+          <p:cNvSpPr>
+            <a:spLocks noGrp="1" noRot="1" noChangeAspect="1"/>
+          </p:cNvSpPr>
+          <p:nvPr>
+            <p:ph type="sldImg"/>
+          </p:nvPr>
+        </p:nvSpPr>
+        <p:spPr/>
+      </p:sp>
+      <p:sp>
+        <p:nvSpPr>
+          <p:cNvPr id="3" name="Notes Placeholder 2"/>
+          <p:cNvSpPr>
+            <a:spLocks noGrp="1"/>
+          </p:cNvSpPr>
+          <p:nvPr>
+            <p:ph type="body" idx="1"/>
+          </p:nvPr>
+        </p:nvSpPr>
+        <p:spPr/>
+        <p:txBody>
+          <a:bodyPr/>
+          <a:lstStyle/>
+          <a:p>
+            <a:r>
+              <a:rPr lang="en-US" sz="1200" b="0" i="0" u="none" strike="noStrike" kern="1200" baseline="0" dirty="0" smtClean="0">
+                <a:solidFill>
+                  <a:schemeClr val="tx1"/>
+                </a:solidFill>
+                <a:latin typeface="+mn-lt"/>
+                <a:ea typeface="+mn-ea"/>
+                <a:cs typeface="+mn-cs"/>
+              </a:rPr>
+              <a:t>if </a:t>
+            </a:r>
+            <a:r>
+              <a:rPr lang="uk-UA" sz="1200" b="0" i="0" u="none" strike="noStrike" kern="1200" baseline="0" dirty="0" smtClean="0">
+                <a:solidFill>
+                  <a:schemeClr val="tx1"/>
+                </a:solidFill>
+                <a:latin typeface="+mn-lt"/>
+                <a:ea typeface="+mn-ea"/>
+                <a:cs typeface="+mn-cs"/>
+              </a:rPr>
+              <a:t>возвращает результат...</a:t>
+            </a:r>
+            <a:endParaRPr lang="en-US" sz="1200" b="0" i="0" u="none" strike="noStrike" kern="1200" baseline="0" dirty="0" smtClean="0">
+              <a:solidFill>
+                <a:schemeClr val="tx1"/>
+              </a:solidFill>
+              <a:latin typeface="+mn-lt"/>
+              <a:ea typeface="+mn-ea"/>
+              <a:cs typeface="+mn-cs"/>
+            </a:endParaRPr>
+          </a:p>
+          <a:p>
+            <a:r>
+              <a:rPr lang="en-US" sz="1200" b="0" i="0" u="none" strike="noStrike" kern="1200" baseline="0" dirty="0" smtClean="0">
+                <a:solidFill>
+                  <a:schemeClr val="tx1"/>
+                </a:solidFill>
+                <a:latin typeface="+mn-lt"/>
+                <a:ea typeface="+mn-ea"/>
+                <a:cs typeface="+mn-cs"/>
+              </a:rPr>
+              <a:t>let result =</a:t>
+            </a:r>
+          </a:p>
+          <a:p>
+            <a:r>
+              <a:rPr lang="en-US" sz="1200" b="0" i="0" u="none" strike="noStrike" kern="1200" baseline="0" dirty="0" smtClean="0">
+                <a:solidFill>
+                  <a:schemeClr val="tx1"/>
+                </a:solidFill>
+                <a:latin typeface="+mn-lt"/>
+                <a:ea typeface="+mn-ea"/>
+                <a:cs typeface="+mn-cs"/>
+              </a:rPr>
+              <a:t>     if x % 2 = 0 then</a:t>
+            </a:r>
+          </a:p>
+          <a:p>
+            <a:r>
+              <a:rPr lang="en-US" sz="1200" b="0" i="0" u="none" strike="noStrike" kern="1200" baseline="0" dirty="0" smtClean="0">
+                <a:solidFill>
+                  <a:schemeClr val="tx1"/>
+                </a:solidFill>
+                <a:latin typeface="+mn-lt"/>
+                <a:ea typeface="+mn-ea"/>
+                <a:cs typeface="+mn-cs"/>
+              </a:rPr>
+              <a:t>         "Yes it is"</a:t>
+            </a:r>
+          </a:p>
+          <a:p>
+            <a:r>
+              <a:rPr lang="en-US" sz="1200" b="0" i="0" u="none" strike="noStrike" kern="1200" baseline="0" dirty="0" smtClean="0">
+                <a:solidFill>
+                  <a:schemeClr val="tx1"/>
+                </a:solidFill>
+                <a:latin typeface="+mn-lt"/>
+                <a:ea typeface="+mn-ea"/>
+                <a:cs typeface="+mn-cs"/>
+              </a:rPr>
+              <a:t>     else</a:t>
+            </a:r>
+          </a:p>
+          <a:p>
+            <a:r>
+              <a:rPr lang="en-US" sz="1200" b="0" i="0" u="none" strike="noStrike" kern="1200" baseline="0" dirty="0" smtClean="0">
+                <a:solidFill>
+                  <a:schemeClr val="tx1"/>
+                </a:solidFill>
+                <a:latin typeface="+mn-lt"/>
+                <a:ea typeface="+mn-ea"/>
+                <a:cs typeface="+mn-cs"/>
+              </a:rPr>
+              <a:t>         "No it is not“</a:t>
+            </a:r>
+          </a:p>
+          <a:p>
+            <a:endParaRPr lang="en-US" sz="1200" b="0" i="0" u="none" strike="noStrike" kern="1200" baseline="0" dirty="0" smtClean="0">
+              <a:solidFill>
+                <a:schemeClr val="tx1"/>
+              </a:solidFill>
+              <a:latin typeface="+mn-lt"/>
+              <a:ea typeface="+mn-ea"/>
+              <a:cs typeface="+mn-cs"/>
+            </a:endParaRPr>
+          </a:p>
+          <a:p>
+            <a:r>
+              <a:rPr lang="uk-UA" sz="1200" b="0" i="0" u="none" strike="noStrike" kern="1200" baseline="0" dirty="0" smtClean="0">
+                <a:solidFill>
+                  <a:schemeClr val="tx1"/>
+                </a:solidFill>
+                <a:latin typeface="+mn-lt"/>
+                <a:ea typeface="+mn-ea"/>
+                <a:cs typeface="+mn-cs"/>
+              </a:rPr>
+              <a:t>Можно юзать конструтор.</a:t>
+            </a:r>
+          </a:p>
+          <a:p>
+            <a:r>
+              <a:rPr lang="en-US" sz="1200" b="0" i="0" u="none" strike="noStrike" kern="1200" baseline="0" dirty="0" smtClean="0">
+                <a:solidFill>
+                  <a:schemeClr val="tx1"/>
+                </a:solidFill>
+                <a:latin typeface="+mn-lt"/>
+                <a:ea typeface="+mn-ea"/>
+                <a:cs typeface="+mn-cs"/>
+              </a:rPr>
+              <a:t>type </a:t>
+            </a:r>
+            <a:r>
+              <a:rPr lang="en-US" sz="1200" b="0" i="0" u="none" strike="noStrike" kern="1200" baseline="0" dirty="0" err="1" smtClean="0">
+                <a:solidFill>
+                  <a:schemeClr val="tx1"/>
+                </a:solidFill>
+                <a:latin typeface="+mn-lt"/>
+                <a:ea typeface="+mn-ea"/>
+                <a:cs typeface="+mn-cs"/>
+              </a:rPr>
+              <a:t>SuperService</a:t>
+            </a:r>
+            <a:r>
+              <a:rPr lang="en-US" sz="1200" b="0" i="0" u="none" strike="noStrike" kern="1200" baseline="0" dirty="0" smtClean="0">
+                <a:solidFill>
+                  <a:schemeClr val="tx1"/>
+                </a:solidFill>
+                <a:latin typeface="+mn-lt"/>
+                <a:ea typeface="+mn-ea"/>
+                <a:cs typeface="+mn-cs"/>
+              </a:rPr>
+              <a:t>(dep1: IDep1) =</a:t>
+            </a:r>
+          </a:p>
+          <a:p>
+            <a:r>
+              <a:rPr lang="en-US" sz="1200" b="0" i="0" u="none" strike="noStrike" kern="1200" baseline="0" dirty="0" smtClean="0">
+                <a:solidFill>
+                  <a:schemeClr val="tx1"/>
+                </a:solidFill>
+                <a:latin typeface="+mn-lt"/>
+                <a:ea typeface="+mn-ea"/>
+                <a:cs typeface="+mn-cs"/>
+              </a:rPr>
+              <a:t>    let </a:t>
+            </a:r>
+            <a:r>
+              <a:rPr lang="en-US" sz="1200" b="0" i="0" u="none" strike="noStrike" kern="1200" baseline="0" dirty="0" err="1" smtClean="0">
+                <a:solidFill>
+                  <a:schemeClr val="tx1"/>
+                </a:solidFill>
+                <a:latin typeface="+mn-lt"/>
+                <a:ea typeface="+mn-ea"/>
+                <a:cs typeface="+mn-cs"/>
+              </a:rPr>
+              <a:t>doSometing</a:t>
+            </a:r>
+            <a:r>
+              <a:rPr lang="en-US" sz="1200" b="0" i="0" u="none" strike="noStrike" kern="1200" baseline="0" dirty="0" smtClean="0">
+                <a:solidFill>
+                  <a:schemeClr val="tx1"/>
+                </a:solidFill>
+                <a:latin typeface="+mn-lt"/>
+                <a:ea typeface="+mn-ea"/>
+                <a:cs typeface="+mn-cs"/>
+              </a:rPr>
+              <a:t> = ()</a:t>
+            </a:r>
+            <a:r>
+              <a:rPr lang="en-US" dirty="0" smtClean="0"/>
+              <a:t>	</a:t>
+            </a:r>
+            <a:endParaRPr lang="ru-RU" dirty="0" smtClean="0"/>
+          </a:p>
+          <a:p>
+            <a:endParaRPr lang="ru-RU" dirty="0" smtClean="0"/>
+          </a:p>
+          <a:p>
+            <a:r>
+              <a:rPr lang="ru-RU" dirty="0" smtClean="0"/>
+              <a:t>Например </a:t>
+            </a:r>
+            <a:r>
+              <a:rPr lang="en-US" dirty="0" smtClean="0"/>
+              <a:t>record,</a:t>
+            </a:r>
+            <a:r>
+              <a:rPr lang="en-US" baseline="0" dirty="0" smtClean="0"/>
+              <a:t> </a:t>
+            </a:r>
+            <a:r>
+              <a:rPr lang="en-US" baseline="0" dirty="0" smtClean="0"/>
+              <a:t>option</a:t>
+            </a:r>
+            <a:r>
+              <a:rPr lang="ru-RU" baseline="0" dirty="0" smtClean="0"/>
+              <a:t>, </a:t>
+            </a:r>
+            <a:r>
+              <a:rPr lang="en-US" sz="1200" b="0" i="0" u="none" strike="noStrike" kern="1200" baseline="0" dirty="0" smtClean="0">
+                <a:solidFill>
+                  <a:schemeClr val="tx1"/>
+                </a:solidFill>
+                <a:latin typeface="+mn-lt"/>
+                <a:ea typeface="+mn-ea"/>
+                <a:cs typeface="+mn-cs"/>
+              </a:rPr>
+              <a:t>discriminated unions</a:t>
+            </a:r>
+            <a:endParaRPr lang="ru-RU" baseline="0" dirty="0" smtClean="0"/>
+          </a:p>
+          <a:p>
+            <a:endParaRPr lang="ru-RU" baseline="0" dirty="0" smtClean="0"/>
+          </a:p>
+          <a:p>
+            <a:r>
+              <a:rPr lang="en-US" baseline="0" dirty="0" smtClean="0"/>
+              <a:t>type Person =</a:t>
+            </a:r>
+          </a:p>
+          <a:p>
+            <a:r>
+              <a:rPr lang="en-US" baseline="0" dirty="0" smtClean="0"/>
+              <a:t>| Boy of string</a:t>
+            </a:r>
+          </a:p>
+          <a:p>
+            <a:r>
+              <a:rPr lang="en-US" baseline="0" dirty="0" smtClean="0"/>
+              <a:t>| Girl of string</a:t>
+            </a:r>
+          </a:p>
+          <a:p>
+            <a:r>
+              <a:rPr lang="en-US" baseline="0" dirty="0" smtClean="0"/>
+              <a:t>| Couple of Person * Person</a:t>
+            </a:r>
+          </a:p>
+          <a:p>
+            <a:r>
+              <a:rPr lang="en-US" baseline="0" dirty="0" smtClean="0"/>
+              <a:t>static member (+) (lhs, </a:t>
+            </a:r>
+            <a:r>
+              <a:rPr lang="en-US" baseline="0" dirty="0" err="1" smtClean="0"/>
+              <a:t>rhs</a:t>
+            </a:r>
+            <a:r>
+              <a:rPr lang="en-US" baseline="0" dirty="0" smtClean="0"/>
+              <a:t>) =</a:t>
+            </a:r>
+          </a:p>
+          <a:p>
+            <a:r>
+              <a:rPr lang="en-US" baseline="0" dirty="0" smtClean="0"/>
+              <a:t>	match lhs, </a:t>
+            </a:r>
+            <a:r>
+              <a:rPr lang="en-US" baseline="0" dirty="0" err="1" smtClean="0"/>
+              <a:t>rhs</a:t>
+            </a:r>
+            <a:r>
+              <a:rPr lang="en-US" baseline="0" dirty="0" smtClean="0"/>
+              <a:t> with</a:t>
+            </a:r>
+          </a:p>
+          <a:p>
+            <a:r>
+              <a:rPr lang="en-US" baseline="0" dirty="0" smtClean="0"/>
+              <a:t>	| Couple(_), _ </a:t>
+            </a:r>
+            <a:endParaRPr lang="ru-RU" baseline="0" dirty="0" smtClean="0"/>
+          </a:p>
+          <a:p>
+            <a:r>
+              <a:rPr lang="ru-RU" baseline="0" dirty="0" smtClean="0"/>
+              <a:t>                   </a:t>
+            </a:r>
+            <a:r>
+              <a:rPr lang="en-US" baseline="0" dirty="0" smtClean="0"/>
+              <a:t>| _, Couple(_) </a:t>
+            </a:r>
+            <a:endParaRPr lang="ru-RU" baseline="0" dirty="0" smtClean="0"/>
+          </a:p>
+          <a:p>
+            <a:r>
+              <a:rPr lang="ru-RU" baseline="0" dirty="0" smtClean="0"/>
+              <a:t>		</a:t>
+            </a:r>
+            <a:r>
+              <a:rPr lang="en-US" baseline="0" dirty="0" smtClean="0"/>
+              <a:t>-&gt; </a:t>
+            </a:r>
+            <a:r>
+              <a:rPr lang="en-US" baseline="0" dirty="0" err="1" smtClean="0"/>
+              <a:t>failwith</a:t>
+            </a:r>
+            <a:r>
+              <a:rPr lang="en-US" baseline="0" dirty="0" smtClean="0"/>
+              <a:t> "</a:t>
+            </a:r>
+            <a:r>
+              <a:rPr lang="ru-RU" baseline="0" dirty="0" smtClean="0"/>
+              <a:t>Гм... шведская семья детектед"</a:t>
+            </a:r>
+          </a:p>
+          <a:p>
+            <a:r>
+              <a:rPr lang="ru-RU" baseline="0" dirty="0" smtClean="0"/>
+              <a:t>	| _ -&gt; </a:t>
+            </a:r>
+            <a:r>
+              <a:rPr lang="en-US" baseline="0" dirty="0" smtClean="0"/>
+              <a:t>Couple(lhs, </a:t>
+            </a:r>
+            <a:r>
+              <a:rPr lang="en-US" baseline="0" dirty="0" err="1" smtClean="0"/>
+              <a:t>rhs</a:t>
+            </a:r>
+            <a:r>
+              <a:rPr lang="en-US" baseline="0" dirty="0" smtClean="0"/>
+              <a:t>)</a:t>
+            </a:r>
+            <a:endParaRPr lang="ru-RU" baseline="0" dirty="0" smtClean="0"/>
+          </a:p>
+          <a:p>
+            <a:endParaRPr lang="ru-RU" baseline="0" dirty="0" smtClean="0"/>
+          </a:p>
+          <a:p>
+            <a:pPr marL="0" marR="0" indent="0" algn="l" defTabSz="914400" rtl="0" eaLnBrk="1" fontAlgn="auto" latinLnBrk="0" hangingPunct="1">
+              <a:lnSpc>
+                <a:spcPct val="100000"/>
+              </a:lnSpc>
+              <a:spcBef>
+                <a:spcPts val="0"/>
+              </a:spcBef>
+              <a:spcAft>
+                <a:spcPts val="0"/>
+              </a:spcAft>
+              <a:buClrTx/>
+              <a:buSzTx/>
+              <a:buFontTx/>
+              <a:buNone/>
+              <a:tabLst/>
+              <a:defRPr/>
+            </a:pPr>
+            <a:r>
+              <a:rPr lang="uk-UA" baseline="0" dirty="0" smtClean="0"/>
+              <a:t>Асинхронно скачать, потом чето асинхронно скачать еще раз.</a:t>
+            </a:r>
+            <a:endParaRPr lang="en-US" dirty="0" smtClean="0"/>
+          </a:p>
+          <a:p>
+            <a:endParaRPr lang="en-US" baseline="0" dirty="0" smtClean="0"/>
+          </a:p>
+          <a:p>
+            <a:r>
+              <a:rPr lang="uk-UA" baseline="0" dirty="0" smtClean="0"/>
+              <a:t>Типизированность</a:t>
+            </a:r>
+          </a:p>
+          <a:p>
+            <a:endParaRPr lang="uk-UA" baseline="0" dirty="0" smtClean="0"/>
+          </a:p>
+          <a:p>
+            <a:r>
+              <a:rPr lang="en-US" sz="1200" b="0" i="0" u="none" strike="noStrike" kern="1200" baseline="0" dirty="0" smtClean="0">
+                <a:solidFill>
+                  <a:schemeClr val="tx1"/>
+                </a:solidFill>
+                <a:latin typeface="+mn-lt"/>
+                <a:ea typeface="+mn-ea"/>
+                <a:cs typeface="+mn-cs"/>
+              </a:rPr>
+              <a:t>Object Expressions</a:t>
+            </a:r>
+            <a:endParaRPr lang="uk-UA" baseline="0" dirty="0" smtClean="0"/>
+          </a:p>
+        </p:txBody>
+      </p:sp>
+      <p:sp>
+        <p:nvSpPr>
+          <p:cNvPr id="4" name="Slide Number Placeholder 3"/>
+          <p:cNvSpPr>
+            <a:spLocks noGrp="1"/>
+          </p:cNvSpPr>
+          <p:nvPr>
+            <p:ph type="sldNum" sz="quarter" idx="10"/>
+          </p:nvPr>
+        </p:nvSpPr>
+        <p:spPr/>
+        <p:txBody>
+          <a:bodyPr/>
+          <a:lstStyle/>
+          <a:p>
+            <a:fld id="{327B1D59-D02F-4C0C-9439-7B18C67FCD89}" type="slidenum">
+              <a:rPr lang="uk-UA" smtClean="0"/>
+              <a:t>2</a:t>
+            </a:fld>
+            <a:endParaRPr lang="uk-UA"/>
+          </a:p>
+        </p:txBody>
+      </p:sp>
+    </p:spTree>
+    <p:extLst>
+      <p:ext uri="{BB962C8B-B14F-4D97-AF65-F5344CB8AC3E}">
+        <p14:creationId xmlns:p14="http://schemas.microsoft.com/office/powerpoint/2010/main" val="289005074"/>
+      </p:ext>
+    </p:extLst>
+  </p:cSld>
+  <p:clrMapOvr>
+    <a:masterClrMapping/>
+  </p:clrMapOvr>
+</p:notes>
+</file>
+
+<file path=ppt/notesSlides/notesSlide3.xml><?xml version="1.0" encoding="utf-8"?>
+<p:notes xmlns:a="http://schemas.openxmlformats.org/drawingml/2006/main" xmlns:r="http://schemas.openxmlformats.org/officeDocument/2006/relationships" xmlns:p="http://schemas.openxmlformats.org/presentationml/2006/main">
+  <p:cSld>
+    <p:spTree>
+      <p:nvGrpSpPr>
+        <p:cNvPr id="1" name=""/>
+        <p:cNvGrpSpPr/>
+        <p:nvPr/>
+      </p:nvGrpSpPr>
+      <p:grpSpPr>
+        <a:xfrm>
+          <a:off x="0" y="0"/>
+          <a:ext cx="0" cy="0"/>
+          <a:chOff x="0" y="0"/>
+          <a:chExt cx="0" cy="0"/>
+        </a:xfrm>
+      </p:grpSpPr>
+      <p:sp>
+        <p:nvSpPr>
+          <p:cNvPr id="2" name="Slide Image Placeholder 1"/>
+          <p:cNvSpPr>
+            <a:spLocks noGrp="1" noRot="1" noChangeAspect="1"/>
+          </p:cNvSpPr>
+          <p:nvPr>
+            <p:ph type="sldImg"/>
+          </p:nvPr>
+        </p:nvSpPr>
+        <p:spPr/>
+      </p:sp>
+      <p:sp>
+        <p:nvSpPr>
+          <p:cNvPr id="3" name="Notes Placeholder 2"/>
+          <p:cNvSpPr>
+            <a:spLocks noGrp="1"/>
+          </p:cNvSpPr>
+          <p:nvPr>
+            <p:ph type="body" idx="1"/>
+          </p:nvPr>
+        </p:nvSpPr>
+        <p:spPr/>
+        <p:txBody>
+          <a:bodyPr/>
+          <a:lstStyle/>
+          <a:p>
+            <a:r>
+              <a:rPr lang="ru-RU" dirty="0" smtClean="0"/>
+              <a:t>В </a:t>
+            </a:r>
+            <a:r>
+              <a:rPr lang="en-US" dirty="0" smtClean="0"/>
+              <a:t>F#</a:t>
+            </a:r>
+            <a:r>
+              <a:rPr lang="en-US" baseline="0" dirty="0" smtClean="0"/>
+              <a:t> </a:t>
+            </a:r>
+            <a:r>
+              <a:rPr lang="uk-UA" baseline="0" dirty="0" smtClean="0"/>
+              <a:t>большое значние имеет положение файла в проекте. Они компилятся последовательно. Соотвевенно если клас дефайнится позже, его никто не найдет.</a:t>
+            </a:r>
+          </a:p>
+          <a:p>
+            <a:endParaRPr lang="uk-UA" baseline="0" dirty="0" smtClean="0"/>
+          </a:p>
+          <a:p>
+            <a:r>
+              <a:rPr lang="uk-UA" baseline="0" dirty="0" smtClean="0"/>
+              <a:t>Интеграция со студией так себе... Нема рефакторингов. Нема папок.</a:t>
+            </a:r>
+          </a:p>
+          <a:p>
+            <a:endParaRPr lang="uk-UA" baseline="0" dirty="0" smtClean="0"/>
+          </a:p>
+          <a:p>
+            <a:r>
+              <a:rPr lang="uk-UA" baseline="0" dirty="0" smtClean="0"/>
+              <a:t>Нема автоматического приведения типов. </a:t>
+            </a:r>
+            <a:r>
+              <a:rPr lang="en-US" baseline="0" dirty="0" smtClean="0"/>
+              <a:t>let s : </a:t>
+            </a:r>
+            <a:r>
+              <a:rPr lang="en-US" baseline="0" dirty="0" err="1" smtClean="0"/>
+              <a:t>int</a:t>
+            </a:r>
+            <a:r>
+              <a:rPr lang="en-US" baseline="0" dirty="0" smtClean="0"/>
+              <a:t> = 12.5m </a:t>
+            </a:r>
+            <a:r>
+              <a:rPr lang="uk-UA" baseline="0" dirty="0" smtClean="0"/>
+              <a:t>не будет работать.</a:t>
+            </a:r>
+            <a:endParaRPr lang="en-US" baseline="0" dirty="0" smtClean="0"/>
+          </a:p>
+          <a:p>
+            <a:endParaRPr lang="en-US" baseline="0" dirty="0" smtClean="0"/>
+          </a:p>
+          <a:p>
+            <a:r>
+              <a:rPr lang="uk-UA" baseline="0" dirty="0" smtClean="0"/>
+              <a:t>Два костыля. У в</a:t>
+            </a:r>
+            <a:r>
+              <a:rPr lang="ru-RU" baseline="0" dirty="0" smtClean="0"/>
+              <a:t>ывода типов есть маленькая проблемка, это рекурсия. Как можно вывести что-то, чего пока нет? Еще смешнее ситуация когда двойная рекурсия, метод1 вызывает метод2, который в свою очередь вызывает метод 1...</a:t>
+            </a:r>
+          </a:p>
+          <a:p>
+            <a:r>
+              <a:rPr lang="pt-BR" sz="1200" b="0" i="0" u="none" strike="noStrike" kern="1200" baseline="0" dirty="0" smtClean="0">
+                <a:solidFill>
+                  <a:schemeClr val="tx1"/>
+                </a:solidFill>
+                <a:latin typeface="+mn-lt"/>
+                <a:ea typeface="+mn-ea"/>
+                <a:cs typeface="+mn-cs"/>
+              </a:rPr>
+              <a:t>let </a:t>
+            </a:r>
+            <a:r>
+              <a:rPr lang="pt-BR" sz="1200" b="1" i="0" u="none" strike="noStrike" kern="1200" baseline="0" dirty="0" smtClean="0">
+                <a:solidFill>
+                  <a:schemeClr val="tx1"/>
+                </a:solidFill>
+                <a:latin typeface="+mn-lt"/>
+                <a:ea typeface="+mn-ea"/>
+                <a:cs typeface="+mn-cs"/>
+              </a:rPr>
+              <a:t>rec </a:t>
+            </a:r>
+            <a:r>
+              <a:rPr lang="pt-BR" sz="1200" b="0" i="0" u="none" strike="noStrike" kern="1200" baseline="0" dirty="0" smtClean="0">
+                <a:solidFill>
+                  <a:schemeClr val="tx1"/>
+                </a:solidFill>
+                <a:latin typeface="+mn-lt"/>
+                <a:ea typeface="+mn-ea"/>
+                <a:cs typeface="+mn-cs"/>
+              </a:rPr>
+              <a:t>isOdd n = (n = 1) || isEven (n - 1)</a:t>
+            </a:r>
+          </a:p>
+          <a:p>
+            <a:r>
+              <a:rPr lang="pt-BR" sz="1200" b="1" i="0" u="none" strike="noStrike" kern="1200" baseline="0" dirty="0" smtClean="0">
+                <a:solidFill>
+                  <a:schemeClr val="tx1"/>
+                </a:solidFill>
+                <a:latin typeface="+mn-lt"/>
+                <a:ea typeface="+mn-ea"/>
+                <a:cs typeface="+mn-cs"/>
+              </a:rPr>
+              <a:t>and </a:t>
+            </a:r>
+            <a:r>
+              <a:rPr lang="pt-BR" sz="1200" b="0" i="0" u="none" strike="noStrike" kern="1200" baseline="0" dirty="0" smtClean="0">
+                <a:solidFill>
+                  <a:schemeClr val="tx1"/>
+                </a:solidFill>
+                <a:latin typeface="+mn-lt"/>
+                <a:ea typeface="+mn-ea"/>
+                <a:cs typeface="+mn-cs"/>
+              </a:rPr>
+              <a:t>isEven n = (n = 0) || isOdd (n - 1)</a:t>
+            </a:r>
+            <a:endParaRPr lang="ru-RU" sz="1200" b="0" i="0" u="none" strike="noStrike" kern="1200" baseline="0" dirty="0" smtClean="0">
+              <a:solidFill>
+                <a:schemeClr val="tx1"/>
+              </a:solidFill>
+              <a:latin typeface="+mn-lt"/>
+              <a:ea typeface="+mn-ea"/>
+              <a:cs typeface="+mn-cs"/>
+            </a:endParaRPr>
+          </a:p>
+          <a:p>
+            <a:endParaRPr lang="ru-RU" sz="1200" b="0" i="0" u="none" strike="noStrike" kern="1200" baseline="0" dirty="0" smtClean="0">
+              <a:solidFill>
+                <a:schemeClr val="tx1"/>
+              </a:solidFill>
+              <a:latin typeface="+mn-lt"/>
+              <a:ea typeface="+mn-ea"/>
+              <a:cs typeface="+mn-cs"/>
+            </a:endParaRPr>
+          </a:p>
+          <a:p>
+            <a:r>
+              <a:rPr lang="ru-RU" sz="1200" b="0" i="0" u="none" strike="noStrike" kern="1200" baseline="0" smtClean="0">
+                <a:solidFill>
+                  <a:schemeClr val="tx1"/>
+                </a:solidFill>
+                <a:latin typeface="+mn-lt"/>
+                <a:ea typeface="+mn-ea"/>
+                <a:cs typeface="+mn-cs"/>
+              </a:rPr>
+              <a:t>Непонятно где писать с маленькой буквы, где с большой.</a:t>
+            </a:r>
+            <a:endParaRPr lang="uk-UA" dirty="0"/>
+          </a:p>
+        </p:txBody>
+      </p:sp>
+      <p:sp>
+        <p:nvSpPr>
+          <p:cNvPr id="4" name="Slide Number Placeholder 3"/>
+          <p:cNvSpPr>
+            <a:spLocks noGrp="1"/>
+          </p:cNvSpPr>
+          <p:nvPr>
+            <p:ph type="sldNum" sz="quarter" idx="10"/>
+          </p:nvPr>
+        </p:nvSpPr>
+        <p:spPr/>
+        <p:txBody>
+          <a:bodyPr/>
+          <a:lstStyle/>
+          <a:p>
+            <a:fld id="{327B1D59-D02F-4C0C-9439-7B18C67FCD89}" type="slidenum">
+              <a:rPr lang="uk-UA" smtClean="0"/>
+              <a:t>3</a:t>
+            </a:fld>
+            <a:endParaRPr lang="uk-UA"/>
+          </a:p>
+        </p:txBody>
+      </p:sp>
+    </p:spTree>
+    <p:extLst>
+      <p:ext uri="{BB962C8B-B14F-4D97-AF65-F5344CB8AC3E}">
+        <p14:creationId xmlns:p14="http://schemas.microsoft.com/office/powerpoint/2010/main" val="3345246252"/>
       </p:ext>
     </p:extLst>
   </p:cSld>
@@ -754,7 +1524,7 @@
           <a:p>
             <a:fld id="{43464AA6-21A2-40D5-B28A-0E3FA2708A01}" type="datetimeFigureOut">
               <a:rPr lang="uk-UA" smtClean="0"/>
-              <a:t>06.04.2010</a:t>
+              <a:t>07.04.2010</a:t>
             </a:fld>
             <a:endParaRPr lang="uk-UA"/>
           </a:p>
@@ -924,7 +1694,7 @@
           <a:p>
             <a:fld id="{43464AA6-21A2-40D5-B28A-0E3FA2708A01}" type="datetimeFigureOut">
               <a:rPr lang="uk-UA" smtClean="0"/>
-              <a:t>06.04.2010</a:t>
+              <a:t>07.04.2010</a:t>
             </a:fld>
             <a:endParaRPr lang="uk-UA"/>
           </a:p>
@@ -1104,7 +1874,7 @@
           <a:p>
             <a:fld id="{43464AA6-21A2-40D5-B28A-0E3FA2708A01}" type="datetimeFigureOut">
               <a:rPr lang="uk-UA" smtClean="0"/>
-              <a:t>06.04.2010</a:t>
+              <a:t>07.04.2010</a:t>
             </a:fld>
             <a:endParaRPr lang="uk-UA"/>
           </a:p>
@@ -1274,7 +2044,7 @@
           <a:p>
             <a:fld id="{43464AA6-21A2-40D5-B28A-0E3FA2708A01}" type="datetimeFigureOut">
               <a:rPr lang="uk-UA" smtClean="0"/>
-              <a:t>06.04.2010</a:t>
+              <a:t>07.04.2010</a:t>
             </a:fld>
             <a:endParaRPr lang="uk-UA"/>
           </a:p>
@@ -1520,7 +2290,7 @@
           <a:p>
             <a:fld id="{43464AA6-21A2-40D5-B28A-0E3FA2708A01}" type="datetimeFigureOut">
               <a:rPr lang="uk-UA" smtClean="0"/>
-              <a:t>06.04.2010</a:t>
+              <a:t>07.04.2010</a:t>
             </a:fld>
             <a:endParaRPr lang="uk-UA"/>
           </a:p>
@@ -1808,7 +2578,7 @@
           <a:p>
             <a:fld id="{43464AA6-21A2-40D5-B28A-0E3FA2708A01}" type="datetimeFigureOut">
               <a:rPr lang="uk-UA" smtClean="0"/>
-              <a:t>06.04.2010</a:t>
+              <a:t>07.04.2010</a:t>
             </a:fld>
             <a:endParaRPr lang="uk-UA"/>
           </a:p>
@@ -2230,7 +3000,7 @@
           <a:p>
             <a:fld id="{43464AA6-21A2-40D5-B28A-0E3FA2708A01}" type="datetimeFigureOut">
               <a:rPr lang="uk-UA" smtClean="0"/>
-              <a:t>06.04.2010</a:t>
+              <a:t>07.04.2010</a:t>
             </a:fld>
             <a:endParaRPr lang="uk-UA"/>
           </a:p>
@@ -2348,7 +3118,7 @@
           <a:p>
             <a:fld id="{43464AA6-21A2-40D5-B28A-0E3FA2708A01}" type="datetimeFigureOut">
               <a:rPr lang="uk-UA" smtClean="0"/>
-              <a:t>06.04.2010</a:t>
+              <a:t>07.04.2010</a:t>
             </a:fld>
             <a:endParaRPr lang="uk-UA"/>
           </a:p>
@@ -2443,7 +3213,7 @@
           <a:p>
             <a:fld id="{43464AA6-21A2-40D5-B28A-0E3FA2708A01}" type="datetimeFigureOut">
               <a:rPr lang="uk-UA" smtClean="0"/>
-              <a:t>06.04.2010</a:t>
+              <a:t>07.04.2010</a:t>
             </a:fld>
             <a:endParaRPr lang="uk-UA"/>
           </a:p>
@@ -2720,7 +3490,7 @@
           <a:p>
             <a:fld id="{43464AA6-21A2-40D5-B28A-0E3FA2708A01}" type="datetimeFigureOut">
               <a:rPr lang="uk-UA" smtClean="0"/>
-              <a:t>06.04.2010</a:t>
+              <a:t>07.04.2010</a:t>
             </a:fld>
             <a:endParaRPr lang="uk-UA"/>
           </a:p>
@@ -2973,7 +3743,7 @@
           <a:p>
             <a:fld id="{43464AA6-21A2-40D5-B28A-0E3FA2708A01}" type="datetimeFigureOut">
               <a:rPr lang="uk-UA" smtClean="0"/>
-              <a:t>06.04.2010</a:t>
+              <a:t>07.04.2010</a:t>
             </a:fld>
             <a:endParaRPr lang="uk-UA"/>
           </a:p>
@@ -3186,7 +3956,7 @@
           <a:p>
             <a:fld id="{43464AA6-21A2-40D5-B28A-0E3FA2708A01}" type="datetimeFigureOut">
               <a:rPr lang="uk-UA" smtClean="0"/>
-              <a:t>06.04.2010</a:t>
+              <a:t>07.04.2010</a:t>
             </a:fld>
             <a:endParaRPr lang="uk-UA"/>
           </a:p>
@@ -3642,13 +4412,7 @@
               <a:rPr lang="en-US" dirty="0" smtClean="0">
                 <a:hlinkClick r:id="rId3"/>
               </a:rPr>
-              <a:t>http://</a:t>
-            </a:r>
-            <a:r>
-              <a:rPr lang="en-US" dirty="0" smtClean="0">
-                <a:hlinkClick r:id="rId3"/>
-              </a:rPr>
-              <a:t>chaliy.name</a:t>
+              <a:t>http://chaliy.name</a:t>
             </a:r>
             <a:endParaRPr lang="ru-RU" dirty="0" smtClean="0"/>
           </a:p>
@@ -3663,7 +4427,6 @@
               <a:rPr lang="en-US" dirty="0" smtClean="0"/>
               <a:t> </a:t>
             </a:r>
-            <a:endParaRPr lang="en-US" dirty="0" smtClean="0"/>
           </a:p>
         </p:txBody>
       </p:sp>
@@ -3671,6 +4434,283 @@
     <p:extLst>
       <p:ext uri="{BB962C8B-B14F-4D97-AF65-F5344CB8AC3E}">
         <p14:creationId xmlns:p14="http://schemas.microsoft.com/office/powerpoint/2010/main" val="1526876947"/>
+      </p:ext>
+    </p:extLst>
+  </p:cSld>
+  <p:clrMapOvr>
+    <a:masterClrMapping/>
+  </p:clrMapOvr>
+</p:sld>
+</file>
+
+<file path=ppt/slides/slide2.xml><?xml version="1.0" encoding="utf-8"?>
+<p:sld xmlns:a="http://schemas.openxmlformats.org/drawingml/2006/main" xmlns:r="http://schemas.openxmlformats.org/officeDocument/2006/relationships" xmlns:p="http://schemas.openxmlformats.org/presentationml/2006/main">
+  <p:cSld>
+    <p:spTree>
+      <p:nvGrpSpPr>
+        <p:cNvPr id="1" name=""/>
+        <p:cNvGrpSpPr/>
+        <p:nvPr/>
+      </p:nvGrpSpPr>
+      <p:grpSpPr>
+        <a:xfrm>
+          <a:off x="0" y="0"/>
+          <a:ext cx="0" cy="0"/>
+          <a:chOff x="0" y="0"/>
+          <a:chExt cx="0" cy="0"/>
+        </a:xfrm>
+      </p:grpSpPr>
+      <p:sp>
+        <p:nvSpPr>
+          <p:cNvPr id="2" name="Title 1"/>
+          <p:cNvSpPr>
+            <a:spLocks noGrp="1"/>
+          </p:cNvSpPr>
+          <p:nvPr>
+            <p:ph type="title"/>
+          </p:nvPr>
+        </p:nvSpPr>
+        <p:spPr/>
+        <p:txBody>
+          <a:bodyPr/>
+          <a:lstStyle/>
+          <a:p>
+            <a:r>
+              <a:rPr lang="ru-RU" dirty="0" smtClean="0"/>
+              <a:t>Мелкие класные фишки</a:t>
+            </a:r>
+            <a:endParaRPr lang="en-US" dirty="0"/>
+          </a:p>
+        </p:txBody>
+      </p:sp>
+      <p:sp>
+        <p:nvSpPr>
+          <p:cNvPr id="3" name="Content Placeholder 2"/>
+          <p:cNvSpPr>
+            <a:spLocks noGrp="1"/>
+          </p:cNvSpPr>
+          <p:nvPr>
+            <p:ph idx="1"/>
+          </p:nvPr>
+        </p:nvSpPr>
+        <p:spPr/>
+        <p:txBody>
+          <a:bodyPr/>
+          <a:lstStyle/>
+          <a:p>
+            <a:r>
+              <a:rPr lang="en-US" dirty="0" smtClean="0"/>
+              <a:t>if</a:t>
+            </a:r>
+            <a:r>
+              <a:rPr lang="uk-UA" dirty="0" smtClean="0"/>
+              <a:t> возвращает результат</a:t>
+            </a:r>
+          </a:p>
+          <a:p>
+            <a:r>
+              <a:rPr lang="en-US" dirty="0" smtClean="0"/>
+              <a:t>DI </a:t>
+            </a:r>
+            <a:r>
+              <a:rPr lang="uk-UA" dirty="0" smtClean="0"/>
+              <a:t>средствами </a:t>
+            </a:r>
+            <a:r>
+              <a:rPr lang="en-US" dirty="0" smtClean="0"/>
+              <a:t>F#</a:t>
+            </a:r>
+          </a:p>
+          <a:p>
+            <a:r>
+              <a:rPr lang="uk-UA" dirty="0" smtClean="0"/>
+              <a:t>Куча разн</a:t>
+            </a:r>
+            <a:r>
+              <a:rPr lang="ru-RU" dirty="0" smtClean="0"/>
+              <a:t>ых встроенных типов</a:t>
+            </a:r>
+            <a:endParaRPr lang="en-US" dirty="0" smtClean="0"/>
+          </a:p>
+          <a:p>
+            <a:r>
+              <a:rPr lang="en-US" dirty="0" err="1"/>
+              <a:t>a</a:t>
+            </a:r>
+            <a:r>
+              <a:rPr lang="en-US" dirty="0" err="1" smtClean="0"/>
+              <a:t>sync</a:t>
+            </a:r>
+            <a:r>
+              <a:rPr lang="en-US" dirty="0" smtClean="0"/>
+              <a:t> </a:t>
+            </a:r>
+            <a:r>
+              <a:rPr lang="uk-UA" dirty="0" smtClean="0"/>
+              <a:t>воркфлоу...</a:t>
+            </a:r>
+          </a:p>
+          <a:p>
+            <a:r>
+              <a:rPr lang="en-US" dirty="0" err="1" smtClean="0"/>
+              <a:t>printfn</a:t>
+            </a:r>
+            <a:endParaRPr lang="ru-RU" dirty="0" smtClean="0"/>
+          </a:p>
+          <a:p>
+            <a:r>
+              <a:rPr lang="en-US" dirty="0" err="1" smtClean="0"/>
+              <a:t>Nullability</a:t>
+            </a:r>
+            <a:r>
+              <a:rPr lang="en-US" dirty="0" smtClean="0"/>
+              <a:t>…</a:t>
+            </a:r>
+            <a:endParaRPr lang="uk-UA" dirty="0" smtClean="0"/>
+          </a:p>
+          <a:p>
+            <a:r>
+              <a:rPr lang="uk-UA" dirty="0" smtClean="0"/>
+              <a:t>Анонимн</a:t>
+            </a:r>
+            <a:r>
+              <a:rPr lang="ru-RU" dirty="0" smtClean="0"/>
+              <a:t>ые реализации..</a:t>
+            </a:r>
+            <a:endParaRPr lang="en-US" dirty="0"/>
+          </a:p>
+        </p:txBody>
+      </p:sp>
+    </p:spTree>
+    <p:extLst>
+      <p:ext uri="{BB962C8B-B14F-4D97-AF65-F5344CB8AC3E}">
+        <p14:creationId xmlns:p14="http://schemas.microsoft.com/office/powerpoint/2010/main" val="248792973"/>
+      </p:ext>
+    </p:extLst>
+  </p:cSld>
+  <p:clrMapOvr>
+    <a:masterClrMapping/>
+  </p:clrMapOvr>
+</p:sld>
+</file>
+
+<file path=ppt/slides/slide3.xml><?xml version="1.0" encoding="utf-8"?>
+<p:sld xmlns:a="http://schemas.openxmlformats.org/drawingml/2006/main" xmlns:r="http://schemas.openxmlformats.org/officeDocument/2006/relationships" xmlns:p="http://schemas.openxmlformats.org/presentationml/2006/main">
+  <p:cSld>
+    <p:spTree>
+      <p:nvGrpSpPr>
+        <p:cNvPr id="1" name=""/>
+        <p:cNvGrpSpPr/>
+        <p:nvPr/>
+      </p:nvGrpSpPr>
+      <p:grpSpPr>
+        <a:xfrm>
+          <a:off x="0" y="0"/>
+          <a:ext cx="0" cy="0"/>
+          <a:chOff x="0" y="0"/>
+          <a:chExt cx="0" cy="0"/>
+        </a:xfrm>
+      </p:grpSpPr>
+      <p:sp>
+        <p:nvSpPr>
+          <p:cNvPr id="2" name="Title 1"/>
+          <p:cNvSpPr>
+            <a:spLocks noGrp="1"/>
+          </p:cNvSpPr>
+          <p:nvPr>
+            <p:ph type="title"/>
+          </p:nvPr>
+        </p:nvSpPr>
+        <p:spPr/>
+        <p:txBody>
+          <a:bodyPr/>
+          <a:lstStyle/>
+          <a:p>
+            <a:r>
+              <a:rPr lang="uk-UA" dirty="0" smtClean="0"/>
+              <a:t>Проблем</a:t>
+            </a:r>
+            <a:r>
+              <a:rPr lang="ru-RU" dirty="0" smtClean="0"/>
+              <a:t>ы</a:t>
+            </a:r>
+            <a:endParaRPr lang="uk-UA" dirty="0"/>
+          </a:p>
+        </p:txBody>
+      </p:sp>
+      <p:sp>
+        <p:nvSpPr>
+          <p:cNvPr id="3" name="Content Placeholder 2"/>
+          <p:cNvSpPr>
+            <a:spLocks noGrp="1"/>
+          </p:cNvSpPr>
+          <p:nvPr>
+            <p:ph idx="1"/>
+          </p:nvPr>
+        </p:nvSpPr>
+        <p:spPr/>
+        <p:txBody>
+          <a:bodyPr/>
+          <a:lstStyle/>
+          <a:p>
+            <a:r>
+              <a:rPr lang="ru-RU" dirty="0" smtClean="0"/>
+              <a:t>Положение в проекте исходного файла</a:t>
+            </a:r>
+          </a:p>
+          <a:p>
+            <a:r>
+              <a:rPr lang="ru-RU" dirty="0" smtClean="0"/>
+              <a:t>Интеграция в студию</a:t>
+            </a:r>
+            <a:endParaRPr lang="en-US" dirty="0" smtClean="0"/>
+          </a:p>
+          <a:p>
+            <a:r>
+              <a:rPr lang="uk-UA" dirty="0" smtClean="0"/>
+              <a:t>Автоматическое приведение типов</a:t>
+            </a:r>
+            <a:endParaRPr lang="en-US" dirty="0" smtClean="0"/>
+          </a:p>
+          <a:p>
+            <a:r>
+              <a:rPr lang="en-US" dirty="0" smtClean="0"/>
+              <a:t>rec </a:t>
+            </a:r>
+            <a:r>
+              <a:rPr lang="uk-UA" dirty="0" smtClean="0"/>
+              <a:t>и </a:t>
+            </a:r>
+            <a:r>
+              <a:rPr lang="en-US" dirty="0" smtClean="0"/>
+              <a:t>and</a:t>
+            </a:r>
+            <a:endParaRPr lang="uk-UA" dirty="0" smtClean="0"/>
+          </a:p>
+          <a:p>
+            <a:r>
+              <a:rPr lang="uk-UA" dirty="0" smtClean="0"/>
+              <a:t>Код конвеншен</a:t>
+            </a:r>
+            <a:r>
+              <a:rPr lang="ru-RU" dirty="0" smtClean="0"/>
+              <a:t>ы</a:t>
+            </a:r>
+            <a:endParaRPr lang="en-US" dirty="0" smtClean="0"/>
+          </a:p>
+          <a:p>
+            <a:r>
+              <a:rPr lang="uk-UA" dirty="0" smtClean="0"/>
+              <a:t>Приведение типов</a:t>
+            </a:r>
+            <a:endParaRPr lang="uk-UA" dirty="0"/>
+          </a:p>
+        </p:txBody>
+      </p:sp>
+    </p:spTree>
+    <p:extLst>
+      <p:ext uri="{BB962C8B-B14F-4D97-AF65-F5344CB8AC3E}">
+        <p14:creationId xmlns:p14="http://schemas.microsoft.com/office/powerpoint/2010/main" val="4195982294"/>
       </p:ext>
     </p:extLst>
   </p:cSld>

</xml_diff>

<commit_message>
NormalFSharp: added free of GMO
</commit_message>
<xml_diff>
--- a/NormalFSharp/NormalFSharp.pptx
+++ b/NormalFSharp/NormalFSharp.pptx
@@ -1393,7 +1393,7 @@
               <a:t>раздел </a:t>
             </a:r>
             <a:r>
-              <a:rPr lang="en-US" baseline="0" smtClean="0"/>
+              <a:rPr lang="en-US" baseline="0" dirty="0" smtClean="0"/>
               <a:t>F#.</a:t>
             </a:r>
             <a:endParaRPr lang="uk-UA" baseline="0" dirty="0" smtClean="0"/>
@@ -4636,6 +4636,47 @@
           </a:p>
         </p:txBody>
       </p:sp>
+      <p:pic>
+        <p:nvPicPr>
+          <p:cNvPr id="1026" name="Picture 2" descr="C:\Users\M\Temp\free_GMO.jpg"/>
+          <p:cNvPicPr>
+            <a:picLocks noChangeAspect="1" noChangeArrowheads="1"/>
+          </p:cNvPicPr>
+          <p:nvPr/>
+        </p:nvPicPr>
+        <p:blipFill>
+          <a:blip r:embed="rId5">
+            <a:extLst>
+              <a:ext uri="{28A0092B-C50C-407E-A947-70E740481C1C}">
+                <a14:useLocalDpi xmlns:a14="http://schemas.microsoft.com/office/drawing/2010/main" val="0"/>
+              </a:ext>
+            </a:extLst>
+          </a:blip>
+          <a:srcRect/>
+          <a:stretch>
+            <a:fillRect/>
+          </a:stretch>
+        </p:blipFill>
+        <p:spPr bwMode="auto">
+          <a:xfrm rot="2222823">
+            <a:off x="6724563" y="579891"/>
+            <a:ext cx="2143125" cy="1409700"/>
+          </a:xfrm>
+          <a:prstGeom prst="rect">
+            <a:avLst/>
+          </a:prstGeom>
+          <a:noFill/>
+          <a:extLst>
+            <a:ext uri="{909E8E84-426E-40DD-AFC4-6F175D3DCCD1}">
+              <a14:hiddenFill xmlns:a14="http://schemas.microsoft.com/office/drawing/2010/main">
+                <a:solidFill>
+                  <a:srgbClr xmlns:mc="http://schemas.openxmlformats.org/markup-compatibility/2006" val="FFFFFF" mc:Ignorable=""/>
+                </a:solidFill>
+              </a14:hiddenFill>
+            </a:ext>
+          </a:extLst>
+        </p:spPr>
+      </p:pic>
     </p:spTree>
     <p:extLst>
       <p:ext uri="{BB962C8B-B14F-4D97-AF65-F5344CB8AC3E}">

</xml_diff>

<commit_message>
NormalFSharp: added goals and introdcution
</commit_message>
<xml_diff>
--- a/NormalFSharp/NormalFSharp.pptx
+++ b/NormalFSharp/NormalFSharp.pptx
@@ -5,13 +5,14 @@
     <p:sldMasterId id="2147483648" r:id="rId1"/>
   </p:sldMasterIdLst>
   <p:notesMasterIdLst>
-    <p:notesMasterId r:id="rId6"/>
+    <p:notesMasterId r:id="rId7"/>
   </p:notesMasterIdLst>
   <p:sldIdLst>
     <p:sldId id="256" r:id="rId2"/>
-    <p:sldId id="258" r:id="rId3"/>
-    <p:sldId id="257" r:id="rId4"/>
-    <p:sldId id="259" r:id="rId5"/>
+    <p:sldId id="260" r:id="rId3"/>
+    <p:sldId id="258" r:id="rId4"/>
+    <p:sldId id="257" r:id="rId5"/>
+    <p:sldId id="259" r:id="rId6"/>
   </p:sldIdLst>
   <p:sldSz cx="9144000" cy="6858000" type="screen4x3"/>
   <p:notesSz cx="6858000" cy="9144000"/>
@@ -525,12 +526,16 @@
               <a:defRPr/>
             </a:pPr>
             <a:r>
-              <a:rPr lang="ru-RU" dirty="0" smtClean="0"/>
+              <a:rPr lang="ru-RU" strike="sngStrike" dirty="0" smtClean="0"/>
               <a:t>Тут надо</a:t>
             </a:r>
             <a:r>
-              <a:rPr lang="ru-RU" baseline="0" dirty="0" smtClean="0"/>
-              <a:t> молчать!</a:t>
+              <a:rPr lang="ru-RU" strike="sngStrike" baseline="0" dirty="0" smtClean="0"/>
+              <a:t> молчать</a:t>
+            </a:r>
+            <a:r>
+              <a:rPr lang="ru-RU" strike="sngStrike" baseline="0" dirty="0" smtClean="0"/>
+              <a:t>!</a:t>
             </a:r>
           </a:p>
           <a:p>
@@ -551,7 +556,7 @@
               <a:tabLst/>
               <a:defRPr/>
             </a:pPr>
-            <a:endParaRPr lang="ru-RU" baseline="0" dirty="0" smtClean="0"/>
+            <a:endParaRPr lang="ru-RU" strike="sngStrike" baseline="0" dirty="0" smtClean="0"/>
           </a:p>
           <a:p>
             <a:pPr marL="0" marR="0" indent="0" algn="l" defTabSz="914400" rtl="0" eaLnBrk="1" fontAlgn="auto" latinLnBrk="0" hangingPunct="1">
@@ -572,7 +577,177 @@
               <a:defRPr/>
             </a:pPr>
             <a:r>
-              <a:rPr lang="uk-UA" sz="1200" b="0" i="0" u="none" strike="noStrike" kern="1200" baseline="0" smtClean="0">
+              <a:rPr lang="ru-RU" strike="noStrike" baseline="0" dirty="0" smtClean="0"/>
+              <a:t>Как вы заметили уже в названии есть некторые глупости... Вопервых непонятно почему это компьютерный язык для людей, это же не Украина... А во вторых чего для нормальных...</a:t>
+            </a:r>
+          </a:p>
+          <a:p>
+            <a:pPr marL="0" marR="0" indent="0" algn="l" defTabSz="914400" rtl="0" eaLnBrk="1" fontAlgn="auto" latinLnBrk="0" hangingPunct="1">
+              <a:lnSpc>
+                <a:spcPct val="100000"/>
+              </a:lnSpc>
+              <a:spcBef>
+                <a:spcPts val="0"/>
+              </a:spcBef>
+              <a:spcAft>
+                <a:spcPts val="0"/>
+              </a:spcAft>
+              <a:buClrTx/>
+              <a:buSzTx/>
+              <a:buFontTx/>
+              <a:buNone/>
+              <a:tabLst/>
+              <a:defRPr/>
+            </a:pPr>
+            <a:endParaRPr lang="ru-RU" strike="noStrike" baseline="0" dirty="0" smtClean="0"/>
+          </a:p>
+          <a:p>
+            <a:pPr marL="0" marR="0" indent="0" algn="l" defTabSz="914400" rtl="0" eaLnBrk="1" fontAlgn="auto" latinLnBrk="0" hangingPunct="1">
+              <a:lnSpc>
+                <a:spcPct val="100000"/>
+              </a:lnSpc>
+              <a:spcBef>
+                <a:spcPts val="0"/>
+              </a:spcBef>
+              <a:spcAft>
+                <a:spcPts val="0"/>
+              </a:spcAft>
+              <a:buClrTx/>
+              <a:buSzTx/>
+              <a:buFontTx/>
+              <a:buNone/>
+              <a:tabLst/>
+              <a:defRPr/>
+            </a:pPr>
+            <a:r>
+              <a:rPr lang="ru-RU" strike="noStrike" baseline="0" dirty="0" smtClean="0"/>
+              <a:t>Сначала первое. </a:t>
+            </a:r>
+            <a:r>
+              <a:rPr lang="uk-UA" strike="noStrike" baseline="0" dirty="0" smtClean="0"/>
+              <a:t>Когда сл</a:t>
+            </a:r>
+            <a:r>
+              <a:rPr lang="ru-RU" strike="noStrike" baseline="0" dirty="0" smtClean="0"/>
+              <a:t>ышиш </a:t>
+            </a:r>
+            <a:r>
+              <a:rPr lang="en-US" strike="noStrike" baseline="0" dirty="0" smtClean="0"/>
+              <a:t>F# </a:t>
+            </a:r>
+            <a:r>
+              <a:rPr lang="uk-UA" strike="noStrike" baseline="0" dirty="0" smtClean="0"/>
+              <a:t>сразу же в подсознании в</a:t>
+            </a:r>
+            <a:r>
+              <a:rPr lang="ru-RU" strike="noStrike" baseline="0" dirty="0" smtClean="0"/>
+              <a:t>ыплывает образ функционального языка. У кого как конешно.. Собно это правда. Отчасти правда. На самом то деле </a:t>
+            </a:r>
+            <a:r>
+              <a:rPr lang="en-US" strike="noStrike" baseline="0" dirty="0" smtClean="0"/>
+              <a:t>F#</a:t>
+            </a:r>
+            <a:r>
+              <a:rPr lang="ru-RU" strike="noStrike" baseline="0" dirty="0" smtClean="0"/>
+              <a:t> это мультипарадигменный язык. В нем превуалирует функциональные черты. Тем не мение он вопервых не полностью функциональный, а во вторых он очень или даже слишком хорошо поддерижвает обьектно-ориентированное программирование. В последнем ничего странного нема, всетаки платформа </a:t>
+            </a:r>
+            <a:r>
+              <a:rPr lang="en-US" strike="noStrike" baseline="0" dirty="0" smtClean="0"/>
+              <a:t>.NET </a:t>
+            </a:r>
+            <a:r>
+              <a:rPr lang="uk-UA" strike="noStrike" baseline="0" dirty="0" smtClean="0"/>
+              <a:t>обьектна... Но какраз </a:t>
+            </a:r>
+            <a:r>
+              <a:rPr lang="ru-RU" strike="noStrike" baseline="0" dirty="0" smtClean="0"/>
+              <a:t>это и не отвечает на вопрос почему для людей. На этот вопрос отвечает создатель </a:t>
+            </a:r>
+            <a:r>
+              <a:rPr lang="en-US" strike="noStrike" baseline="0" dirty="0" smtClean="0"/>
+              <a:t>F# dr. Don </a:t>
+            </a:r>
+            <a:r>
+              <a:rPr lang="en-US" strike="noStrike" baseline="0" dirty="0" err="1" smtClean="0"/>
+              <a:t>Syme</a:t>
+            </a:r>
+            <a:r>
+              <a:rPr lang="en-US" strike="noStrike" baseline="0" dirty="0" smtClean="0"/>
+              <a:t>. </a:t>
+            </a:r>
+            <a:r>
+              <a:rPr lang="uk-UA" strike="noStrike" baseline="0" dirty="0" smtClean="0"/>
+              <a:t>Он расшифров</a:t>
+            </a:r>
+            <a:r>
+              <a:rPr lang="ru-RU" strike="noStrike" baseline="0" dirty="0" smtClean="0"/>
+              <a:t>ывает </a:t>
+            </a:r>
+            <a:r>
+              <a:rPr lang="en-US" strike="noStrike" baseline="0" dirty="0" smtClean="0"/>
+              <a:t>F </a:t>
+            </a:r>
+            <a:r>
+              <a:rPr lang="uk-UA" strike="noStrike" baseline="0" dirty="0" smtClean="0"/>
+              <a:t>как </a:t>
+            </a:r>
+            <a:r>
+              <a:rPr lang="en-US" strike="noStrike" baseline="0" dirty="0" smtClean="0"/>
+              <a:t>FUN</a:t>
+            </a:r>
+            <a:r>
+              <a:rPr lang="uk-UA" strike="noStrike" baseline="0" dirty="0" smtClean="0"/>
+              <a:t>, не б</a:t>
+            </a:r>
+            <a:r>
+              <a:rPr lang="ru-RU" strike="noStrike" baseline="0" dirty="0" smtClean="0"/>
+              <a:t>ольше и не меньше. Это конешно слегка субьективно. Но тем не мение реальность такова, что после определенного момента использования начинаеш понимать что он значительно лучше ложится на реальность. В нем проще чем в обьектно ориентированном языке смоделировать то что хочется. Собсно я надеюсь что через минут сорок у вы начнете мне верить ;).</a:t>
+            </a:r>
+          </a:p>
+          <a:p>
+            <a:pPr marL="0" marR="0" indent="0" algn="l" defTabSz="914400" rtl="0" eaLnBrk="1" fontAlgn="auto" latinLnBrk="0" hangingPunct="1">
+              <a:lnSpc>
+                <a:spcPct val="100000"/>
+              </a:lnSpc>
+              <a:spcBef>
+                <a:spcPts val="0"/>
+              </a:spcBef>
+              <a:spcAft>
+                <a:spcPts val="0"/>
+              </a:spcAft>
+              <a:buClrTx/>
+              <a:buSzTx/>
+              <a:buFontTx/>
+              <a:buNone/>
+              <a:tabLst/>
+              <a:defRPr/>
+            </a:pPr>
+            <a:endParaRPr lang="ru-RU" strike="noStrike" baseline="0" dirty="0" smtClean="0"/>
+          </a:p>
+          <a:p>
+            <a:pPr marL="0" marR="0" indent="0" algn="l" defTabSz="914400" rtl="0" eaLnBrk="1" fontAlgn="auto" latinLnBrk="0" hangingPunct="1">
+              <a:lnSpc>
+                <a:spcPct val="100000"/>
+              </a:lnSpc>
+              <a:spcBef>
+                <a:spcPts val="0"/>
+              </a:spcBef>
+              <a:spcAft>
+                <a:spcPts val="0"/>
+              </a:spcAft>
+              <a:buClrTx/>
+              <a:buSzTx/>
+              <a:buFontTx/>
+              <a:buNone/>
+              <a:tabLst/>
+              <a:defRPr/>
+            </a:pPr>
+            <a:r>
+              <a:rPr lang="ru-RU" strike="noStrike" baseline="0" dirty="0" smtClean="0"/>
+              <a:t>Теперь про нормальных...  Тут сложнее... Надо никого не обидеть ;). Вы наверное знаете чем занимаются 95% программистов? Всякие там сайты, автоматизция бизнеса, десктопный приложухи.. ну и остальной ширнепотреб... Вот собсно это и есть те нормальные люди. Нам мало что говорят слова типа </a:t>
+            </a:r>
+            <a:r>
+              <a:rPr lang="uk-UA" sz="1200" b="1" i="0" u="none" strike="noStrike" kern="1200" baseline="0" dirty="0" smtClean="0">
                 <a:solidFill>
                   <a:schemeClr val="tx1"/>
                 </a:solidFill>
@@ -580,9 +755,120 @@
                 <a:ea typeface="+mn-ea"/>
                 <a:cs typeface="+mn-cs"/>
               </a:rPr>
-              <a:t>Функторы, каррирование, хвостовая рекурсия..</a:t>
-            </a:r>
-            <a:endParaRPr lang="uk-UA" dirty="0" smtClean="0"/>
+              <a:t>функторы</a:t>
+            </a:r>
+            <a:r>
+              <a:rPr lang="uk-UA" sz="1200" b="1" i="0" u="none" strike="noStrike" kern="1200" baseline="0" dirty="0" smtClean="0">
+                <a:solidFill>
+                  <a:schemeClr val="tx1"/>
+                </a:solidFill>
+                <a:latin typeface="+mn-lt"/>
+                <a:ea typeface="+mn-ea"/>
+                <a:cs typeface="+mn-cs"/>
+              </a:rPr>
+              <a:t>, </a:t>
+            </a:r>
+            <a:r>
+              <a:rPr lang="uk-UA" sz="1200" b="1" i="0" u="none" strike="noStrike" kern="1200" baseline="0" dirty="0" smtClean="0">
+                <a:solidFill>
+                  <a:schemeClr val="tx1"/>
+                </a:solidFill>
+                <a:latin typeface="+mn-lt"/>
+                <a:ea typeface="+mn-ea"/>
+                <a:cs typeface="+mn-cs"/>
+              </a:rPr>
+              <a:t>каррирование, свертка</a:t>
+            </a:r>
+            <a:r>
+              <a:rPr lang="uk-UA" sz="1200" b="0" i="0" u="none" strike="noStrike" kern="1200" baseline="0" dirty="0" smtClean="0">
+                <a:solidFill>
+                  <a:schemeClr val="tx1"/>
+                </a:solidFill>
+                <a:latin typeface="+mn-lt"/>
+                <a:ea typeface="+mn-ea"/>
+                <a:cs typeface="+mn-cs"/>
+              </a:rPr>
+              <a:t>... А может быть и говорят, но они никогда не видели такого в своей работе. Собсно не мог же я себя так сразу же назвать не нормальным?</a:t>
+            </a:r>
+          </a:p>
+          <a:p>
+            <a:pPr marL="0" marR="0" indent="0" algn="l" defTabSz="914400" rtl="0" eaLnBrk="1" fontAlgn="auto" latinLnBrk="0" hangingPunct="1">
+              <a:lnSpc>
+                <a:spcPct val="100000"/>
+              </a:lnSpc>
+              <a:spcBef>
+                <a:spcPts val="0"/>
+              </a:spcBef>
+              <a:spcAft>
+                <a:spcPts val="0"/>
+              </a:spcAft>
+              <a:buClrTx/>
+              <a:buSzTx/>
+              <a:buFontTx/>
+              <a:buNone/>
+              <a:tabLst/>
+              <a:defRPr/>
+            </a:pPr>
+            <a:endParaRPr lang="uk-UA" sz="1200" b="0" i="0" u="none" strike="noStrike" kern="1200" baseline="0" dirty="0" smtClean="0">
+              <a:solidFill>
+                <a:schemeClr val="tx1"/>
+              </a:solidFill>
+              <a:latin typeface="+mn-lt"/>
+              <a:ea typeface="+mn-ea"/>
+              <a:cs typeface="+mn-cs"/>
+            </a:endParaRPr>
+          </a:p>
+          <a:p>
+            <a:pPr marL="0" marR="0" indent="0" algn="l" defTabSz="914400" rtl="0" eaLnBrk="1" fontAlgn="auto" latinLnBrk="0" hangingPunct="1">
+              <a:lnSpc>
+                <a:spcPct val="100000"/>
+              </a:lnSpc>
+              <a:spcBef>
+                <a:spcPts val="0"/>
+              </a:spcBef>
+              <a:spcAft>
+                <a:spcPts val="0"/>
+              </a:spcAft>
+              <a:buClrTx/>
+              <a:buSzTx/>
+              <a:buFontTx/>
+              <a:buNone/>
+              <a:tabLst/>
+              <a:defRPr/>
+            </a:pPr>
+            <a:r>
+              <a:rPr lang="uk-UA" sz="1200" b="0" i="0" u="none" strike="noStrike" kern="1200" baseline="0" dirty="0" smtClean="0">
+                <a:solidFill>
+                  <a:schemeClr val="tx1"/>
+                </a:solidFill>
+                <a:latin typeface="+mn-lt"/>
+                <a:ea typeface="+mn-ea"/>
+                <a:cs typeface="+mn-cs"/>
+              </a:rPr>
+              <a:t>Именно потому поэтому я и не буду показывать зубодробительный код типа этого (ченить из компилятора </a:t>
+            </a:r>
+            <a:r>
+              <a:rPr lang="en-US" sz="1200" b="0" i="0" u="none" strike="noStrike" kern="1200" baseline="0" dirty="0" smtClean="0">
+                <a:solidFill>
+                  <a:schemeClr val="tx1"/>
+                </a:solidFill>
+                <a:latin typeface="+mn-lt"/>
+                <a:ea typeface="+mn-ea"/>
+                <a:cs typeface="+mn-cs"/>
+              </a:rPr>
+              <a:t>F#)… </a:t>
+            </a:r>
+            <a:r>
+              <a:rPr lang="uk-UA" sz="1200" b="0" i="0" u="none" strike="noStrike" kern="1200" baseline="0" dirty="0" smtClean="0">
+                <a:solidFill>
+                  <a:schemeClr val="tx1"/>
+                </a:solidFill>
+                <a:latin typeface="+mn-lt"/>
+                <a:ea typeface="+mn-ea"/>
+                <a:cs typeface="+mn-cs"/>
+              </a:rPr>
+              <a:t>Итак цели.</a:t>
+            </a:r>
           </a:p>
         </p:txBody>
       </p:sp>
@@ -667,345 +953,25 @@
           <a:lstStyle/>
           <a:p>
             <a:r>
-              <a:rPr lang="en-US" sz="1200" b="0" i="0" u="none" strike="noStrike" kern="1200" baseline="0" dirty="0" smtClean="0">
-                <a:solidFill>
-                  <a:schemeClr val="tx1"/>
-                </a:solidFill>
-                <a:latin typeface="+mn-lt"/>
-                <a:ea typeface="+mn-ea"/>
-                <a:cs typeface="+mn-cs"/>
-              </a:rPr>
-              <a:t>if </a:t>
-            </a:r>
-            <a:r>
-              <a:rPr lang="uk-UA" sz="1200" b="0" i="0" u="none" strike="noStrike" kern="1200" baseline="0" dirty="0" smtClean="0">
-                <a:solidFill>
-                  <a:schemeClr val="tx1"/>
-                </a:solidFill>
-                <a:latin typeface="+mn-lt"/>
-                <a:ea typeface="+mn-ea"/>
-                <a:cs typeface="+mn-cs"/>
-              </a:rPr>
-              <a:t>возвращает результат...</a:t>
-            </a:r>
-            <a:endParaRPr lang="en-US" sz="1200" b="0" i="0" u="none" strike="noStrike" kern="1200" baseline="0" dirty="0" smtClean="0">
-              <a:solidFill>
-                <a:schemeClr val="tx1"/>
-              </a:solidFill>
-              <a:latin typeface="+mn-lt"/>
-              <a:ea typeface="+mn-ea"/>
-              <a:cs typeface="+mn-cs"/>
-            </a:endParaRPr>
-          </a:p>
-          <a:p>
-            <a:r>
-              <a:rPr lang="en-US" sz="1200" b="0" i="0" u="none" strike="noStrike" kern="1200" baseline="0" dirty="0" smtClean="0">
-                <a:solidFill>
-                  <a:schemeClr val="tx1"/>
-                </a:solidFill>
-                <a:latin typeface="+mn-lt"/>
-                <a:ea typeface="+mn-ea"/>
-                <a:cs typeface="+mn-cs"/>
-              </a:rPr>
-              <a:t>let result =</a:t>
-            </a:r>
-          </a:p>
-          <a:p>
-            <a:r>
-              <a:rPr lang="en-US" sz="1200" b="0" i="0" u="none" strike="noStrike" kern="1200" baseline="0" dirty="0" smtClean="0">
-                <a:solidFill>
-                  <a:schemeClr val="tx1"/>
-                </a:solidFill>
-                <a:latin typeface="+mn-lt"/>
-                <a:ea typeface="+mn-ea"/>
-                <a:cs typeface="+mn-cs"/>
-              </a:rPr>
-              <a:t>     if x % 2 = 0 then</a:t>
-            </a:r>
-          </a:p>
-          <a:p>
-            <a:r>
-              <a:rPr lang="en-US" sz="1200" b="0" i="0" u="none" strike="noStrike" kern="1200" baseline="0" dirty="0" smtClean="0">
-                <a:solidFill>
-                  <a:schemeClr val="tx1"/>
-                </a:solidFill>
-                <a:latin typeface="+mn-lt"/>
-                <a:ea typeface="+mn-ea"/>
-                <a:cs typeface="+mn-cs"/>
-              </a:rPr>
-              <a:t>         "Yes it is"</a:t>
-            </a:r>
-          </a:p>
-          <a:p>
-            <a:r>
-              <a:rPr lang="en-US" sz="1200" b="0" i="0" u="none" strike="noStrike" kern="1200" baseline="0" dirty="0" smtClean="0">
-                <a:solidFill>
-                  <a:schemeClr val="tx1"/>
-                </a:solidFill>
-                <a:latin typeface="+mn-lt"/>
-                <a:ea typeface="+mn-ea"/>
-                <a:cs typeface="+mn-cs"/>
-              </a:rPr>
-              <a:t>     else</a:t>
-            </a:r>
-          </a:p>
-          <a:p>
-            <a:r>
-              <a:rPr lang="en-US" sz="1200" b="0" i="0" u="none" strike="noStrike" kern="1200" baseline="0" dirty="0" smtClean="0">
-                <a:solidFill>
-                  <a:schemeClr val="tx1"/>
-                </a:solidFill>
-                <a:latin typeface="+mn-lt"/>
-                <a:ea typeface="+mn-ea"/>
-                <a:cs typeface="+mn-cs"/>
-              </a:rPr>
-              <a:t>         "No it is not“</a:t>
-            </a:r>
-          </a:p>
-          <a:p>
-            <a:endParaRPr lang="en-US" sz="1200" b="0" i="0" u="none" strike="noStrike" kern="1200" baseline="0" dirty="0" smtClean="0">
-              <a:solidFill>
-                <a:schemeClr val="tx1"/>
-              </a:solidFill>
-              <a:latin typeface="+mn-lt"/>
-              <a:ea typeface="+mn-ea"/>
-              <a:cs typeface="+mn-cs"/>
-            </a:endParaRPr>
-          </a:p>
-          <a:p>
-            <a:r>
-              <a:rPr lang="uk-UA" sz="1200" b="0" i="0" u="none" strike="noStrike" kern="1200" baseline="0" dirty="0" smtClean="0">
-                <a:solidFill>
-                  <a:schemeClr val="tx1"/>
-                </a:solidFill>
-                <a:latin typeface="+mn-lt"/>
-                <a:ea typeface="+mn-ea"/>
-                <a:cs typeface="+mn-cs"/>
-              </a:rPr>
-              <a:t>Можно юзать конструтор.</a:t>
-            </a:r>
-          </a:p>
-          <a:p>
-            <a:r>
-              <a:rPr lang="en-US" sz="1200" b="0" i="0" u="none" strike="noStrike" kern="1200" baseline="0" dirty="0" smtClean="0">
-                <a:solidFill>
-                  <a:schemeClr val="tx1"/>
-                </a:solidFill>
-                <a:latin typeface="+mn-lt"/>
-                <a:ea typeface="+mn-ea"/>
-                <a:cs typeface="+mn-cs"/>
-              </a:rPr>
-              <a:t>type </a:t>
-            </a:r>
-            <a:r>
-              <a:rPr lang="en-US" sz="1200" b="0" i="0" u="none" strike="noStrike" kern="1200" baseline="0" dirty="0" err="1" smtClean="0">
-                <a:solidFill>
-                  <a:schemeClr val="tx1"/>
-                </a:solidFill>
-                <a:latin typeface="+mn-lt"/>
-                <a:ea typeface="+mn-ea"/>
-                <a:cs typeface="+mn-cs"/>
-              </a:rPr>
-              <a:t>SuperService</a:t>
-            </a:r>
-            <a:r>
-              <a:rPr lang="en-US" sz="1200" b="0" i="0" u="none" strike="noStrike" kern="1200" baseline="0" dirty="0" smtClean="0">
-                <a:solidFill>
-                  <a:schemeClr val="tx1"/>
-                </a:solidFill>
-                <a:latin typeface="+mn-lt"/>
-                <a:ea typeface="+mn-ea"/>
-                <a:cs typeface="+mn-cs"/>
-              </a:rPr>
-              <a:t>(dep1: IDep1) =</a:t>
-            </a:r>
-          </a:p>
-          <a:p>
-            <a:r>
-              <a:rPr lang="en-US" sz="1200" b="0" i="0" u="none" strike="noStrike" kern="1200" baseline="0" dirty="0" smtClean="0">
-                <a:solidFill>
-                  <a:schemeClr val="tx1"/>
-                </a:solidFill>
-                <a:latin typeface="+mn-lt"/>
-                <a:ea typeface="+mn-ea"/>
-                <a:cs typeface="+mn-cs"/>
-              </a:rPr>
-              <a:t>    let </a:t>
-            </a:r>
-            <a:r>
-              <a:rPr lang="en-US" sz="1200" b="0" i="0" u="none" strike="noStrike" kern="1200" baseline="0" dirty="0" err="1" smtClean="0">
-                <a:solidFill>
-                  <a:schemeClr val="tx1"/>
-                </a:solidFill>
-                <a:latin typeface="+mn-lt"/>
-                <a:ea typeface="+mn-ea"/>
-                <a:cs typeface="+mn-cs"/>
-              </a:rPr>
-              <a:t>doSometing</a:t>
-            </a:r>
-            <a:r>
-              <a:rPr lang="en-US" sz="1200" b="0" i="0" u="none" strike="noStrike" kern="1200" baseline="0" dirty="0" smtClean="0">
-                <a:solidFill>
-                  <a:schemeClr val="tx1"/>
-                </a:solidFill>
-                <a:latin typeface="+mn-lt"/>
-                <a:ea typeface="+mn-ea"/>
-                <a:cs typeface="+mn-cs"/>
-              </a:rPr>
-              <a:t> = ()</a:t>
-            </a:r>
-            <a:r>
-              <a:rPr lang="en-US" dirty="0" smtClean="0"/>
-              <a:t>	</a:t>
-            </a:r>
-            <a:endParaRPr lang="ru-RU" dirty="0" smtClean="0"/>
-          </a:p>
-          <a:p>
-            <a:endParaRPr lang="ru-RU" dirty="0" smtClean="0"/>
-          </a:p>
-          <a:p>
-            <a:r>
-              <a:rPr lang="ru-RU" dirty="0" smtClean="0"/>
-              <a:t>Например </a:t>
-            </a:r>
-            <a:r>
-              <a:rPr lang="en-US" dirty="0" smtClean="0"/>
-              <a:t>record,</a:t>
-            </a:r>
-            <a:r>
-              <a:rPr lang="en-US" baseline="0" dirty="0" smtClean="0"/>
-              <a:t> option</a:t>
+              <a:rPr lang="uk-UA" dirty="0" smtClean="0"/>
+              <a:t>Основаная</a:t>
+            </a:r>
+            <a:r>
+              <a:rPr lang="uk-UA" baseline="0" dirty="0" smtClean="0"/>
+              <a:t> цель </a:t>
+            </a:r>
+            <a:r>
+              <a:rPr lang="uk-UA" b="1" baseline="0" dirty="0" smtClean="0"/>
+              <a:t>заинтересовать</a:t>
+            </a:r>
+            <a:r>
+              <a:rPr lang="uk-UA" baseline="0" dirty="0" smtClean="0"/>
+              <a:t>. Фишка в том что я тока учу </a:t>
             </a:r>
             <a:r>
               <a:rPr lang="ru-RU" baseline="0" dirty="0" smtClean="0"/>
-              <a:t>, </a:t>
-            </a:r>
-            <a:r>
-              <a:rPr lang="en-US" sz="1200" b="0" i="0" u="none" strike="noStrike" kern="1200" baseline="0" dirty="0" smtClean="0">
-                <a:solidFill>
-                  <a:schemeClr val="tx1"/>
-                </a:solidFill>
-                <a:latin typeface="+mn-lt"/>
-                <a:ea typeface="+mn-ea"/>
-                <a:cs typeface="+mn-cs"/>
-              </a:rPr>
-              <a:t>discriminated unions</a:t>
-            </a:r>
-            <a:endParaRPr lang="ru-RU" baseline="0" dirty="0" smtClean="0"/>
-          </a:p>
-          <a:p>
-            <a:endParaRPr lang="ru-RU" baseline="0" dirty="0" smtClean="0"/>
-          </a:p>
-          <a:p>
-            <a:r>
-              <a:rPr lang="en-US" baseline="0" dirty="0" smtClean="0"/>
-              <a:t>type Person =</a:t>
-            </a:r>
-          </a:p>
-          <a:p>
-            <a:r>
-              <a:rPr lang="en-US" baseline="0" dirty="0" smtClean="0"/>
-              <a:t>| Boy of string</a:t>
-            </a:r>
-          </a:p>
-          <a:p>
-            <a:r>
-              <a:rPr lang="en-US" baseline="0" dirty="0" smtClean="0"/>
-              <a:t>| Girl of string</a:t>
-            </a:r>
-          </a:p>
-          <a:p>
-            <a:r>
-              <a:rPr lang="en-US" baseline="0" dirty="0" smtClean="0"/>
-              <a:t>| Couple of Person * Person</a:t>
-            </a:r>
-          </a:p>
-          <a:p>
-            <a:r>
-              <a:rPr lang="en-US" baseline="0" dirty="0" smtClean="0"/>
-              <a:t>static member (+) (lhs, </a:t>
-            </a:r>
-            <a:r>
-              <a:rPr lang="en-US" baseline="0" dirty="0" err="1" smtClean="0"/>
-              <a:t>rhs</a:t>
-            </a:r>
-            <a:r>
-              <a:rPr lang="en-US" baseline="0" dirty="0" smtClean="0"/>
-              <a:t>) =</a:t>
-            </a:r>
-          </a:p>
-          <a:p>
-            <a:r>
-              <a:rPr lang="en-US" baseline="0" dirty="0" smtClean="0"/>
-              <a:t>	match lhs, </a:t>
-            </a:r>
-            <a:r>
-              <a:rPr lang="en-US" baseline="0" dirty="0" err="1" smtClean="0"/>
-              <a:t>rhs</a:t>
-            </a:r>
-            <a:r>
-              <a:rPr lang="en-US" baseline="0" dirty="0" smtClean="0"/>
-              <a:t> with</a:t>
-            </a:r>
-          </a:p>
-          <a:p>
-            <a:r>
-              <a:rPr lang="en-US" baseline="0" dirty="0" smtClean="0"/>
-              <a:t>	| Couple(_), _ </a:t>
-            </a:r>
-            <a:endParaRPr lang="ru-RU" baseline="0" dirty="0" smtClean="0"/>
-          </a:p>
-          <a:p>
-            <a:r>
-              <a:rPr lang="ru-RU" baseline="0" dirty="0" smtClean="0"/>
-              <a:t>                   </a:t>
-            </a:r>
-            <a:r>
-              <a:rPr lang="en-US" baseline="0" dirty="0" smtClean="0"/>
-              <a:t>| _, Couple(_) </a:t>
-            </a:r>
-            <a:endParaRPr lang="ru-RU" baseline="0" dirty="0" smtClean="0"/>
-          </a:p>
-          <a:p>
-            <a:r>
-              <a:rPr lang="ru-RU" baseline="0" dirty="0" smtClean="0"/>
-              <a:t>		</a:t>
-            </a:r>
-            <a:r>
-              <a:rPr lang="en-US" baseline="0" dirty="0" smtClean="0"/>
-              <a:t>-&gt; </a:t>
-            </a:r>
-            <a:r>
-              <a:rPr lang="en-US" baseline="0" dirty="0" err="1" smtClean="0"/>
-              <a:t>failwith</a:t>
-            </a:r>
-            <a:r>
-              <a:rPr lang="en-US" baseline="0" dirty="0" smtClean="0"/>
-              <a:t> "</a:t>
-            </a:r>
-            <a:r>
-              <a:rPr lang="ru-RU" baseline="0" dirty="0" smtClean="0"/>
-              <a:t>Гм... шведская семья детектед"</a:t>
-            </a:r>
-          </a:p>
-          <a:p>
-            <a:r>
-              <a:rPr lang="ru-RU" baseline="0" dirty="0" smtClean="0"/>
-              <a:t>	| _ -&gt; </a:t>
-            </a:r>
-            <a:r>
-              <a:rPr lang="en-US" baseline="0" dirty="0" smtClean="0"/>
-              <a:t>Couple(lhs, </a:t>
-            </a:r>
-            <a:r>
-              <a:rPr lang="en-US" baseline="0" dirty="0" err="1" smtClean="0"/>
-              <a:t>rhs</a:t>
-            </a:r>
-            <a:r>
-              <a:rPr lang="en-US" baseline="0" dirty="0" smtClean="0"/>
-              <a:t>)</a:t>
-            </a:r>
-            <a:endParaRPr lang="ru-RU" baseline="0" dirty="0" smtClean="0"/>
+              <a:t>этот язык. И врядли смогу расказать про все. Фактически я раскажу про то что меня заинтрисовало. И так как я себя отношу к нормальным людям, то быстрее всего это заинтресует и вас ;).</a:t>
+            </a:r>
           </a:p>
           <a:p>
             <a:endParaRPr lang="ru-RU" baseline="0" dirty="0" smtClean="0"/>
@@ -1029,26 +995,63 @@
               <a:defRPr/>
             </a:pPr>
             <a:r>
+              <a:rPr lang="ru-RU" baseline="0" dirty="0" smtClean="0"/>
+              <a:t>Про учу, надо остановится поподробней. У </a:t>
+            </a:r>
+            <a:r>
+              <a:rPr lang="en-US" baseline="0" dirty="0" smtClean="0"/>
+              <a:t>F#</a:t>
+            </a:r>
+            <a:r>
               <a:rPr lang="uk-UA" baseline="0" dirty="0" smtClean="0"/>
-              <a:t>Асинхронно скачать, потом чето асинхронно скачать еще раз.</a:t>
-            </a:r>
-            <a:endParaRPr lang="en-US" dirty="0" smtClean="0"/>
-          </a:p>
-          <a:p>
-            <a:endParaRPr lang="en-US" baseline="0" dirty="0" smtClean="0"/>
-          </a:p>
-          <a:p>
+              <a:t>, в отличии от </a:t>
+            </a:r>
+            <a:r>
+              <a:rPr lang="en-US" baseline="0" dirty="0" smtClean="0"/>
+              <a:t>C# </a:t>
+            </a:r>
             <a:r>
               <a:rPr lang="uk-UA" baseline="0" dirty="0" smtClean="0"/>
-              <a:t>Типизированность</a:t>
-            </a:r>
-          </a:p>
-          <a:p>
-            <a:endParaRPr lang="uk-UA" baseline="0" dirty="0" smtClean="0"/>
-          </a:p>
-          <a:p>
-            <a:r>
-              <a:rPr lang="en-US" sz="1200" b="0" i="0" u="none" strike="noStrike" kern="1200" baseline="0" dirty="0" smtClean="0">
+              <a:t>или </a:t>
+            </a:r>
+            <a:r>
+              <a:rPr lang="en-US" baseline="0" dirty="0" smtClean="0"/>
+              <a:t>java</a:t>
+            </a:r>
+            <a:r>
+              <a:rPr lang="uk-UA" baseline="0" dirty="0" smtClean="0"/>
+              <a:t>, кривая обучения реально кривая. </a:t>
+            </a:r>
+            <a:r>
+              <a:rPr lang="ru-RU" baseline="0" dirty="0" smtClean="0"/>
+              <a:t>Я для продакшен кода </a:t>
+            </a:r>
+            <a:r>
+              <a:rPr lang="en-US" baseline="0" dirty="0" smtClean="0"/>
+              <a:t>F# </a:t>
+            </a:r>
+            <a:r>
+              <a:rPr lang="uk-UA" baseline="0" dirty="0" smtClean="0"/>
+              <a:t>использую уже где-то три месяца. И кажд</a:t>
+            </a:r>
+            <a:r>
+              <a:rPr lang="ru-RU" baseline="0" dirty="0" smtClean="0"/>
+              <a:t>ый божий день находится хренюшка, про которую раньше не знал. Кроме того за счет богатсва языка, успеваеш забыть что уже знал. Например когда ри</a:t>
+            </a:r>
+            <a:r>
+              <a:rPr lang="en-US" baseline="0" dirty="0" smtClean="0"/>
+              <a:t>c</a:t>
+            </a:r>
+            <a:r>
+              <a:rPr lang="ru-RU" baseline="0" dirty="0" smtClean="0"/>
+              <a:t>овал этот слайд пытался вспонить упрощенный синтаксис для создание ексепшенов. Фиг там. А там все просто</a:t>
+            </a:r>
+            <a:r>
+              <a:rPr lang="en-US" baseline="0" dirty="0" smtClean="0"/>
+              <a:t> – “</a:t>
+            </a:r>
+            <a:r>
+              <a:rPr lang="en-US" sz="1200" kern="1200" dirty="0" smtClean="0">
                 <a:solidFill>
                   <a:schemeClr val="tx1"/>
                 </a:solidFill>
@@ -1056,9 +1059,292 @@
                 <a:ea typeface="+mn-ea"/>
                 <a:cs typeface="+mn-cs"/>
               </a:rPr>
-              <a:t>Object Expressions</a:t>
-            </a:r>
-            <a:endParaRPr lang="uk-UA" baseline="0" dirty="0" smtClean="0"/>
+              <a:t>exception</a:t>
+            </a:r>
+            <a:r>
+              <a:rPr lang="en-US" sz="1200" b="1" kern="1200" dirty="0" smtClean="0">
+                <a:solidFill>
+                  <a:schemeClr val="tx1"/>
+                </a:solidFill>
+                <a:latin typeface="+mn-lt"/>
+                <a:ea typeface="+mn-ea"/>
+                <a:cs typeface="+mn-cs"/>
+              </a:rPr>
+              <a:t> </a:t>
+            </a:r>
+            <a:r>
+              <a:rPr lang="en-US" sz="1200" b="0" kern="1200" dirty="0" err="1" smtClean="0">
+                <a:solidFill>
+                  <a:schemeClr val="tx1"/>
+                </a:solidFill>
+                <a:latin typeface="+mn-lt"/>
+                <a:ea typeface="+mn-ea"/>
+                <a:cs typeface="+mn-cs"/>
+              </a:rPr>
+              <a:t>MyError</a:t>
+            </a:r>
+            <a:r>
+              <a:rPr lang="en-US" sz="1200" b="1" kern="1200" dirty="0" smtClean="0">
+                <a:solidFill>
+                  <a:schemeClr val="tx1"/>
+                </a:solidFill>
+                <a:latin typeface="+mn-lt"/>
+                <a:ea typeface="+mn-ea"/>
+                <a:cs typeface="+mn-cs"/>
+              </a:rPr>
+              <a:t> </a:t>
+            </a:r>
+            <a:r>
+              <a:rPr lang="en-US" sz="1200" b="0" kern="1200" dirty="0" smtClean="0">
+                <a:solidFill>
+                  <a:schemeClr val="tx1"/>
+                </a:solidFill>
+                <a:latin typeface="+mn-lt"/>
+                <a:ea typeface="+mn-ea"/>
+                <a:cs typeface="+mn-cs"/>
+              </a:rPr>
+              <a:t>of</a:t>
+            </a:r>
+            <a:r>
+              <a:rPr lang="en-US" sz="1200" b="1" kern="1200" dirty="0" smtClean="0">
+                <a:solidFill>
+                  <a:schemeClr val="tx1"/>
+                </a:solidFill>
+                <a:latin typeface="+mn-lt"/>
+                <a:ea typeface="+mn-ea"/>
+                <a:cs typeface="+mn-cs"/>
+              </a:rPr>
+              <a:t> </a:t>
+            </a:r>
+            <a:r>
+              <a:rPr lang="en-US" sz="1200" b="0" kern="1200" dirty="0" smtClean="0">
+                <a:solidFill>
+                  <a:schemeClr val="tx1"/>
+                </a:solidFill>
+                <a:latin typeface="+mn-lt"/>
+                <a:ea typeface="+mn-ea"/>
+                <a:cs typeface="+mn-cs"/>
+              </a:rPr>
+              <a:t>string”</a:t>
+            </a:r>
+          </a:p>
+          <a:p>
+            <a:pPr marL="0" marR="0" indent="0" algn="l" defTabSz="914400" rtl="0" eaLnBrk="1" fontAlgn="auto" latinLnBrk="0" hangingPunct="1">
+              <a:lnSpc>
+                <a:spcPct val="100000"/>
+              </a:lnSpc>
+              <a:spcBef>
+                <a:spcPts val="0"/>
+              </a:spcBef>
+              <a:spcAft>
+                <a:spcPts val="0"/>
+              </a:spcAft>
+              <a:buClrTx/>
+              <a:buSzTx/>
+              <a:buFontTx/>
+              <a:buNone/>
+              <a:tabLst/>
+              <a:defRPr/>
+            </a:pPr>
+            <a:endParaRPr lang="en-US" sz="1200" b="0" kern="1200" baseline="0" dirty="0" smtClean="0">
+              <a:solidFill>
+                <a:schemeClr val="tx1"/>
+              </a:solidFill>
+              <a:latin typeface="+mn-lt"/>
+              <a:ea typeface="+mn-ea"/>
+              <a:cs typeface="+mn-cs"/>
+            </a:endParaRPr>
+          </a:p>
+          <a:p>
+            <a:pPr marL="0" marR="0" indent="0" algn="l" defTabSz="914400" rtl="0" eaLnBrk="1" fontAlgn="auto" latinLnBrk="0" hangingPunct="1">
+              <a:lnSpc>
+                <a:spcPct val="100000"/>
+              </a:lnSpc>
+              <a:spcBef>
+                <a:spcPts val="0"/>
+              </a:spcBef>
+              <a:spcAft>
+                <a:spcPts val="0"/>
+              </a:spcAft>
+              <a:buClrTx/>
+              <a:buSzTx/>
+              <a:buFontTx/>
+              <a:buNone/>
+              <a:tabLst/>
+              <a:defRPr/>
+            </a:pPr>
+            <a:r>
+              <a:rPr lang="ru-RU" sz="1200" b="0" kern="1200" baseline="0" dirty="0" smtClean="0">
+                <a:solidFill>
+                  <a:schemeClr val="tx1"/>
+                </a:solidFill>
+                <a:latin typeface="+mn-lt"/>
+                <a:ea typeface="+mn-ea"/>
+                <a:cs typeface="+mn-cs"/>
+              </a:rPr>
+              <a:t>В этом всем есть приятная особенность. В </a:t>
+            </a:r>
+            <a:r>
+              <a:rPr lang="en-US" baseline="0" dirty="0" smtClean="0"/>
+              <a:t>F#</a:t>
+            </a:r>
+            <a:r>
+              <a:rPr lang="ru-RU" baseline="0" dirty="0" smtClean="0"/>
+              <a:t> если не знаеш как написать на </a:t>
+            </a:r>
+            <a:r>
+              <a:rPr lang="en-US" baseline="0" dirty="0" smtClean="0"/>
+              <a:t>F#</a:t>
+            </a:r>
+            <a:r>
+              <a:rPr lang="uk-UA" baseline="0" dirty="0" smtClean="0"/>
+              <a:t>, можна написать на </a:t>
+            </a:r>
+            <a:r>
+              <a:rPr lang="en-US" baseline="0" dirty="0" smtClean="0"/>
+              <a:t>C#... </a:t>
+            </a:r>
+            <a:r>
+              <a:rPr lang="ru-RU" baseline="0" dirty="0" smtClean="0"/>
+              <a:t>Это проще проиллюстировать.</a:t>
+            </a:r>
+          </a:p>
+          <a:p>
+            <a:pPr marL="0" marR="0" indent="0" algn="l" defTabSz="914400" rtl="0" eaLnBrk="1" fontAlgn="auto" latinLnBrk="0" hangingPunct="1">
+              <a:lnSpc>
+                <a:spcPct val="100000"/>
+              </a:lnSpc>
+              <a:spcBef>
+                <a:spcPts val="0"/>
+              </a:spcBef>
+              <a:spcAft>
+                <a:spcPts val="0"/>
+              </a:spcAft>
+              <a:buClrTx/>
+              <a:buSzTx/>
+              <a:buFontTx/>
+              <a:buNone/>
+              <a:tabLst/>
+              <a:defRPr/>
+            </a:pPr>
+            <a:endParaRPr lang="ru-RU" baseline="0" dirty="0" smtClean="0"/>
+          </a:p>
+          <a:p>
+            <a:pPr marL="0" marR="0" indent="0" algn="l" defTabSz="914400" rtl="0" eaLnBrk="1" fontAlgn="auto" latinLnBrk="0" hangingPunct="1">
+              <a:lnSpc>
+                <a:spcPct val="100000"/>
+              </a:lnSpc>
+              <a:spcBef>
+                <a:spcPts val="0"/>
+              </a:spcBef>
+              <a:spcAft>
+                <a:spcPts val="0"/>
+              </a:spcAft>
+              <a:buClrTx/>
+              <a:buSzTx/>
+              <a:buFontTx/>
+              <a:buNone/>
+              <a:tabLst/>
+              <a:defRPr/>
+            </a:pPr>
+            <a:r>
+              <a:rPr lang="ru-RU" baseline="0" dirty="0" smtClean="0"/>
+              <a:t>(пример с ексепшеном)</a:t>
+            </a:r>
+          </a:p>
+          <a:p>
+            <a:pPr marL="0" marR="0" indent="0" algn="l" defTabSz="914400" rtl="0" eaLnBrk="1" fontAlgn="auto" latinLnBrk="0" hangingPunct="1">
+              <a:lnSpc>
+                <a:spcPct val="100000"/>
+              </a:lnSpc>
+              <a:spcBef>
+                <a:spcPts val="0"/>
+              </a:spcBef>
+              <a:spcAft>
+                <a:spcPts val="0"/>
+              </a:spcAft>
+              <a:buClrTx/>
+              <a:buSzTx/>
+              <a:buFontTx/>
+              <a:buNone/>
+              <a:tabLst/>
+              <a:defRPr/>
+            </a:pPr>
+            <a:r>
+              <a:rPr lang="ru-RU" baseline="0" dirty="0" smtClean="0"/>
+              <a:t>(пример с принтф)</a:t>
+            </a:r>
+          </a:p>
+          <a:p>
+            <a:pPr marL="0" marR="0" indent="0" algn="l" defTabSz="914400" rtl="0" eaLnBrk="1" fontAlgn="auto" latinLnBrk="0" hangingPunct="1">
+              <a:lnSpc>
+                <a:spcPct val="100000"/>
+              </a:lnSpc>
+              <a:spcBef>
+                <a:spcPts val="0"/>
+              </a:spcBef>
+              <a:spcAft>
+                <a:spcPts val="0"/>
+              </a:spcAft>
+              <a:buClrTx/>
+              <a:buSzTx/>
+              <a:buFontTx/>
+              <a:buNone/>
+              <a:tabLst/>
+              <a:defRPr/>
+            </a:pPr>
+            <a:endParaRPr lang="ru-RU" baseline="0" dirty="0" smtClean="0"/>
+          </a:p>
+          <a:p>
+            <a:pPr marL="0" marR="0" indent="0" algn="l" defTabSz="914400" rtl="0" eaLnBrk="1" fontAlgn="auto" latinLnBrk="0" hangingPunct="1">
+              <a:lnSpc>
+                <a:spcPct val="100000"/>
+              </a:lnSpc>
+              <a:spcBef>
+                <a:spcPts val="0"/>
+              </a:spcBef>
+              <a:spcAft>
+                <a:spcPts val="0"/>
+              </a:spcAft>
+              <a:buClrTx/>
+              <a:buSzTx/>
+              <a:buFontTx/>
+              <a:buNone/>
+              <a:tabLst/>
+              <a:defRPr/>
+            </a:pPr>
+            <a:r>
+              <a:rPr lang="ru-RU" baseline="0" dirty="0" smtClean="0"/>
+              <a:t>В сухом остатке получается что необходимо выучить небольшой набор конструкций языка... А все остальное можно учить по мере использования. Мне это нравится.</a:t>
+            </a:r>
+            <a:endParaRPr lang="ru-RU" baseline="0" dirty="0" smtClean="0"/>
+          </a:p>
+          <a:p>
+            <a:endParaRPr lang="ru-RU" baseline="0" dirty="0" smtClean="0"/>
+          </a:p>
+          <a:p>
+            <a:r>
+              <a:rPr lang="ru-RU" baseline="0" dirty="0" smtClean="0"/>
+              <a:t>Как всегда, я коснусь проблем. Куда уж без этого ;).</a:t>
+            </a:r>
+          </a:p>
+          <a:p>
+            <a:endParaRPr lang="ru-RU" baseline="0" dirty="0" smtClean="0"/>
+          </a:p>
+          <a:p>
+            <a:r>
+              <a:rPr lang="ru-RU" baseline="0" dirty="0" smtClean="0"/>
+              <a:t>Ну и конешно же обсудить. Тут уж как карта ляжет. Я попробую ответить на вопросы. Может быть приведу примеры того что я писал на </a:t>
+            </a:r>
+            <a:r>
+              <a:rPr lang="en-US" baseline="0" dirty="0" smtClean="0"/>
+              <a:t>F#. </a:t>
+            </a:r>
+            <a:r>
+              <a:rPr lang="uk-UA" baseline="0" dirty="0" smtClean="0"/>
+              <a:t>Хз короче.</a:t>
+            </a:r>
+            <a:endParaRPr lang="en-US" dirty="0"/>
           </a:p>
         </p:txBody>
       </p:sp>
@@ -1088,7 +1374,7 @@
     </p:spTree>
     <p:extLst>
       <p:ext uri="{BB962C8B-B14F-4D97-AF65-F5344CB8AC3E}">
-        <p14:creationId xmlns:p14="http://schemas.microsoft.com/office/powerpoint/2010/main" val="289005074"/>
+        <p14:creationId xmlns:p14="http://schemas.microsoft.com/office/powerpoint/2010/main" val="3302559253"/>
       </p:ext>
     </p:extLst>
   </p:cSld>
@@ -1143,73 +1429,7 @@
           <a:lstStyle/>
           <a:p>
             <a:r>
-              <a:rPr lang="ru-RU" dirty="0" smtClean="0"/>
-              <a:t>В </a:t>
-            </a:r>
-            <a:r>
-              <a:rPr lang="en-US" dirty="0" smtClean="0"/>
-              <a:t>F#</a:t>
-            </a:r>
-            <a:r>
-              <a:rPr lang="en-US" baseline="0" dirty="0" smtClean="0"/>
-              <a:t> </a:t>
-            </a:r>
-            <a:r>
-              <a:rPr lang="uk-UA" baseline="0" dirty="0" smtClean="0"/>
-              <a:t>большое значние имеет положение файла в проекте. Они компилятся последовательно. Соотвевенно если клас дефайнится позже, его никто не найдет.</a:t>
-            </a:r>
-          </a:p>
-          <a:p>
-            <a:endParaRPr lang="uk-UA" baseline="0" dirty="0" smtClean="0"/>
-          </a:p>
-          <a:p>
-            <a:r>
-              <a:rPr lang="uk-UA" baseline="0" dirty="0" smtClean="0"/>
-              <a:t>Интеграция со студией так себе... Нема рефакторингов. Нема папок.</a:t>
-            </a:r>
-          </a:p>
-          <a:p>
-            <a:endParaRPr lang="uk-UA" baseline="0" dirty="0" smtClean="0"/>
-          </a:p>
-          <a:p>
-            <a:r>
-              <a:rPr lang="uk-UA" baseline="0" dirty="0" smtClean="0"/>
-              <a:t>Нема автоматического приведения типов. </a:t>
-            </a:r>
-            <a:r>
-              <a:rPr lang="en-US" baseline="0" dirty="0" smtClean="0"/>
-              <a:t>let s : </a:t>
-            </a:r>
-            <a:r>
-              <a:rPr lang="en-US" baseline="0" dirty="0" err="1" smtClean="0"/>
-              <a:t>int</a:t>
-            </a:r>
-            <a:r>
-              <a:rPr lang="en-US" baseline="0" dirty="0" smtClean="0"/>
-              <a:t> = 12.5m </a:t>
-            </a:r>
-            <a:r>
-              <a:rPr lang="uk-UA" baseline="0" dirty="0" smtClean="0"/>
-              <a:t>не будет работать.</a:t>
-            </a:r>
-            <a:endParaRPr lang="en-US" baseline="0" dirty="0" smtClean="0"/>
-          </a:p>
-          <a:p>
-            <a:endParaRPr lang="en-US" baseline="0" dirty="0" smtClean="0"/>
-          </a:p>
-          <a:p>
-            <a:r>
-              <a:rPr lang="uk-UA" baseline="0" dirty="0" smtClean="0"/>
-              <a:t>Два костыля. У в</a:t>
-            </a:r>
-            <a:r>
-              <a:rPr lang="ru-RU" baseline="0" dirty="0" smtClean="0"/>
-              <a:t>ывода типов есть маленькая проблемка, это рекурсия. Как можно вывести что-то, чего пока нет? Еще смешнее ситуация когда двойная рекурсия, метод1 вызывает метод2, который в свою очередь вызывает метод 1...</a:t>
-            </a:r>
-          </a:p>
-          <a:p>
-            <a:r>
-              <a:rPr lang="pt-BR" sz="1200" b="0" i="0" u="none" strike="noStrike" kern="1200" baseline="0" dirty="0" smtClean="0">
+              <a:rPr lang="en-US" sz="1200" b="0" i="0" u="none" strike="noStrike" kern="1200" baseline="0" dirty="0" smtClean="0">
                 <a:solidFill>
                   <a:schemeClr val="tx1"/>
                 </a:solidFill>
@@ -1217,10 +1437,10 @@
                 <a:ea typeface="+mn-ea"/>
                 <a:cs typeface="+mn-cs"/>
               </a:rPr>
-              <a:t>let </a:t>
-            </a:r>
-            <a:r>
-              <a:rPr lang="pt-BR" sz="1200" b="1" i="0" u="none" strike="noStrike" kern="1200" baseline="0" dirty="0" smtClean="0">
+              <a:t>if </a:t>
+            </a:r>
+            <a:r>
+              <a:rPr lang="uk-UA" sz="1200" b="0" i="0" u="none" strike="noStrike" kern="1200" baseline="0" dirty="0" smtClean="0">
                 <a:solidFill>
                   <a:schemeClr val="tx1"/>
                 </a:solidFill>
@@ -1228,10 +1448,20 @@
                 <a:ea typeface="+mn-ea"/>
                 <a:cs typeface="+mn-cs"/>
               </a:rPr>
-              <a:t>rec </a:t>
-            </a:r>
-            <a:r>
-              <a:rPr lang="pt-BR" sz="1200" b="0" i="0" u="none" strike="noStrike" kern="1200" baseline="0" dirty="0" smtClean="0">
+              <a:t>возвращает результат...</a:t>
+            </a:r>
+            <a:endParaRPr lang="en-US" sz="1200" b="0" i="0" u="none" strike="noStrike" kern="1200" baseline="0" dirty="0" smtClean="0">
+              <a:solidFill>
+                <a:schemeClr val="tx1"/>
+              </a:solidFill>
+              <a:latin typeface="+mn-lt"/>
+              <a:ea typeface="+mn-ea"/>
+              <a:cs typeface="+mn-cs"/>
+            </a:endParaRPr>
+          </a:p>
+          <a:p>
+            <a:r>
+              <a:rPr lang="en-US" sz="1200" b="0" i="0" u="none" strike="noStrike" kern="1200" baseline="0" dirty="0" smtClean="0">
                 <a:solidFill>
                   <a:schemeClr val="tx1"/>
                 </a:solidFill>
@@ -1239,12 +1469,12 @@
                 <a:ea typeface="+mn-ea"/>
                 <a:cs typeface="+mn-cs"/>
               </a:rPr>
-              <a:t>isOdd n = (n = 1) || isEven (n - 1)</a:t>
-            </a:r>
-          </a:p>
-          <a:p>
-            <a:r>
-              <a:rPr lang="pt-BR" sz="1200" b="1" i="0" u="none" strike="noStrike" kern="1200" baseline="0" dirty="0" smtClean="0">
+              <a:t>let result =</a:t>
+            </a:r>
+          </a:p>
+          <a:p>
+            <a:r>
+              <a:rPr lang="en-US" sz="1200" b="0" i="0" u="none" strike="noStrike" kern="1200" baseline="0" dirty="0" smtClean="0">
                 <a:solidFill>
                   <a:schemeClr val="tx1"/>
                 </a:solidFill>
@@ -1252,10 +1482,12 @@
                 <a:ea typeface="+mn-ea"/>
                 <a:cs typeface="+mn-cs"/>
               </a:rPr>
-              <a:t>and </a:t>
-            </a:r>
-            <a:r>
-              <a:rPr lang="pt-BR" sz="1200" b="0" i="0" u="none" strike="noStrike" kern="1200" baseline="0" dirty="0" smtClean="0">
+              <a:t>     if x % 2 = 0 then</a:t>
+            </a:r>
+          </a:p>
+          <a:p>
+            <a:r>
+              <a:rPr lang="en-US" sz="1200" b="0" i="0" u="none" strike="noStrike" kern="1200" baseline="0" dirty="0" smtClean="0">
                 <a:solidFill>
                   <a:schemeClr val="tx1"/>
                 </a:solidFill>
@@ -1263,9 +1495,37 @@
                 <a:ea typeface="+mn-ea"/>
                 <a:cs typeface="+mn-cs"/>
               </a:rPr>
-              <a:t>isEven n = (n = 0) || isOdd (n - 1)</a:t>
-            </a:r>
-            <a:endParaRPr lang="ru-RU" sz="1200" b="0" i="0" u="none" strike="noStrike" kern="1200" baseline="0" dirty="0" smtClean="0">
+              <a:t>         "Yes it is"</a:t>
+            </a:r>
+          </a:p>
+          <a:p>
+            <a:r>
+              <a:rPr lang="en-US" sz="1200" b="0" i="0" u="none" strike="noStrike" kern="1200" baseline="0" dirty="0" smtClean="0">
+                <a:solidFill>
+                  <a:schemeClr val="tx1"/>
+                </a:solidFill>
+                <a:latin typeface="+mn-lt"/>
+                <a:ea typeface="+mn-ea"/>
+                <a:cs typeface="+mn-cs"/>
+              </a:rPr>
+              <a:t>     else</a:t>
+            </a:r>
+          </a:p>
+          <a:p>
+            <a:r>
+              <a:rPr lang="en-US" sz="1200" b="0" i="0" u="none" strike="noStrike" kern="1200" baseline="0" dirty="0" smtClean="0">
+                <a:solidFill>
+                  <a:schemeClr val="tx1"/>
+                </a:solidFill>
+                <a:latin typeface="+mn-lt"/>
+                <a:ea typeface="+mn-ea"/>
+                <a:cs typeface="+mn-cs"/>
+              </a:rPr>
+              <a:t>         "No it is not“</a:t>
+            </a:r>
+          </a:p>
+          <a:p>
+            <a:endParaRPr lang="en-US" sz="1200" b="0" i="0" u="none" strike="noStrike" kern="1200" baseline="0" dirty="0" smtClean="0">
               <a:solidFill>
                 <a:schemeClr val="tx1"/>
               </a:solidFill>
@@ -1275,18 +1535,8 @@
             </a:endParaRPr>
           </a:p>
           <a:p>
-            <a:endParaRPr lang="ru-RU" sz="1200" b="0" i="0" u="none" strike="noStrike" kern="1200" baseline="0" dirty="0" smtClean="0">
-              <a:solidFill>
-                <a:schemeClr val="tx1"/>
-              </a:solidFill>
-              <a:latin typeface="+mn-lt"/>
-              <a:ea typeface="+mn-ea"/>
-              <a:cs typeface="+mn-cs"/>
-            </a:endParaRPr>
-          </a:p>
-          <a:p>
-            <a:r>
-              <a:rPr lang="ru-RU" sz="1200" b="0" i="0" u="none" strike="noStrike" kern="1200" baseline="0" smtClean="0">
+            <a:r>
+              <a:rPr lang="uk-UA" sz="1200" b="0" i="0" u="none" strike="noStrike" kern="1200" baseline="0" dirty="0" smtClean="0">
                 <a:solidFill>
                   <a:schemeClr val="tx1"/>
                 </a:solidFill>
@@ -1294,9 +1544,283 @@
                 <a:ea typeface="+mn-ea"/>
                 <a:cs typeface="+mn-cs"/>
               </a:rPr>
-              <a:t>Непонятно где писать с маленькой буквы, где с большой.</a:t>
-            </a:r>
-            <a:endParaRPr lang="uk-UA" dirty="0"/>
+              <a:t>Можно юзать конструтор.</a:t>
+            </a:r>
+          </a:p>
+          <a:p>
+            <a:r>
+              <a:rPr lang="en-US" sz="1200" b="0" i="0" u="none" strike="noStrike" kern="1200" baseline="0" dirty="0" smtClean="0">
+                <a:solidFill>
+                  <a:schemeClr val="tx1"/>
+                </a:solidFill>
+                <a:latin typeface="+mn-lt"/>
+                <a:ea typeface="+mn-ea"/>
+                <a:cs typeface="+mn-cs"/>
+              </a:rPr>
+              <a:t>type </a:t>
+            </a:r>
+            <a:r>
+              <a:rPr lang="en-US" sz="1200" b="0" i="0" u="none" strike="noStrike" kern="1200" baseline="0" dirty="0" err="1" smtClean="0">
+                <a:solidFill>
+                  <a:schemeClr val="tx1"/>
+                </a:solidFill>
+                <a:latin typeface="+mn-lt"/>
+                <a:ea typeface="+mn-ea"/>
+                <a:cs typeface="+mn-cs"/>
+              </a:rPr>
+              <a:t>SuperService</a:t>
+            </a:r>
+            <a:r>
+              <a:rPr lang="en-US" sz="1200" b="0" i="0" u="none" strike="noStrike" kern="1200" baseline="0" dirty="0" smtClean="0">
+                <a:solidFill>
+                  <a:schemeClr val="tx1"/>
+                </a:solidFill>
+                <a:latin typeface="+mn-lt"/>
+                <a:ea typeface="+mn-ea"/>
+                <a:cs typeface="+mn-cs"/>
+              </a:rPr>
+              <a:t>(dep1: IDep1) =</a:t>
+            </a:r>
+          </a:p>
+          <a:p>
+            <a:r>
+              <a:rPr lang="en-US" sz="1200" b="0" i="0" u="none" strike="noStrike" kern="1200" baseline="0" dirty="0" smtClean="0">
+                <a:solidFill>
+                  <a:schemeClr val="tx1"/>
+                </a:solidFill>
+                <a:latin typeface="+mn-lt"/>
+                <a:ea typeface="+mn-ea"/>
+                <a:cs typeface="+mn-cs"/>
+              </a:rPr>
+              <a:t>    let </a:t>
+            </a:r>
+            <a:r>
+              <a:rPr lang="en-US" sz="1200" b="0" i="0" u="none" strike="noStrike" kern="1200" baseline="0" dirty="0" err="1" smtClean="0">
+                <a:solidFill>
+                  <a:schemeClr val="tx1"/>
+                </a:solidFill>
+                <a:latin typeface="+mn-lt"/>
+                <a:ea typeface="+mn-ea"/>
+                <a:cs typeface="+mn-cs"/>
+              </a:rPr>
+              <a:t>doSometing</a:t>
+            </a:r>
+            <a:r>
+              <a:rPr lang="en-US" sz="1200" b="0" i="0" u="none" strike="noStrike" kern="1200" baseline="0" dirty="0" smtClean="0">
+                <a:solidFill>
+                  <a:schemeClr val="tx1"/>
+                </a:solidFill>
+                <a:latin typeface="+mn-lt"/>
+                <a:ea typeface="+mn-ea"/>
+                <a:cs typeface="+mn-cs"/>
+              </a:rPr>
+              <a:t> = ()</a:t>
+            </a:r>
+            <a:r>
+              <a:rPr lang="en-US" dirty="0" smtClean="0"/>
+              <a:t>	</a:t>
+            </a:r>
+            <a:endParaRPr lang="ru-RU" dirty="0" smtClean="0"/>
+          </a:p>
+          <a:p>
+            <a:endParaRPr lang="ru-RU" dirty="0" smtClean="0"/>
+          </a:p>
+          <a:p>
+            <a:r>
+              <a:rPr lang="ru-RU" dirty="0" smtClean="0"/>
+              <a:t>Например </a:t>
+            </a:r>
+            <a:r>
+              <a:rPr lang="en-US" dirty="0" smtClean="0"/>
+              <a:t>record,</a:t>
+            </a:r>
+            <a:r>
+              <a:rPr lang="en-US" baseline="0" dirty="0" smtClean="0"/>
+              <a:t> option</a:t>
+            </a:r>
+            <a:r>
+              <a:rPr lang="ru-RU" baseline="0" dirty="0" smtClean="0"/>
+              <a:t>, </a:t>
+            </a:r>
+            <a:r>
+              <a:rPr lang="en-US" sz="1200" b="0" i="0" u="none" strike="noStrike" kern="1200" baseline="0" dirty="0" smtClean="0">
+                <a:solidFill>
+                  <a:schemeClr val="tx1"/>
+                </a:solidFill>
+                <a:latin typeface="+mn-lt"/>
+                <a:ea typeface="+mn-ea"/>
+                <a:cs typeface="+mn-cs"/>
+              </a:rPr>
+              <a:t>discriminated unions</a:t>
+            </a:r>
+            <a:endParaRPr lang="ru-RU" baseline="0" dirty="0" smtClean="0"/>
+          </a:p>
+          <a:p>
+            <a:endParaRPr lang="ru-RU" baseline="0" dirty="0" smtClean="0"/>
+          </a:p>
+          <a:p>
+            <a:r>
+              <a:rPr lang="en-US" baseline="0" dirty="0" smtClean="0"/>
+              <a:t>type Person =</a:t>
+            </a:r>
+          </a:p>
+          <a:p>
+            <a:r>
+              <a:rPr lang="en-US" baseline="0" dirty="0" smtClean="0"/>
+              <a:t>| Boy of string</a:t>
+            </a:r>
+          </a:p>
+          <a:p>
+            <a:r>
+              <a:rPr lang="en-US" baseline="0" dirty="0" smtClean="0"/>
+              <a:t>| Girl of string</a:t>
+            </a:r>
+          </a:p>
+          <a:p>
+            <a:r>
+              <a:rPr lang="en-US" baseline="0" dirty="0" smtClean="0"/>
+              <a:t>| Couple of Person * Person</a:t>
+            </a:r>
+          </a:p>
+          <a:p>
+            <a:r>
+              <a:rPr lang="en-US" baseline="0" dirty="0" smtClean="0"/>
+              <a:t>static member (+) (lhs, </a:t>
+            </a:r>
+            <a:r>
+              <a:rPr lang="en-US" baseline="0" dirty="0" err="1" smtClean="0"/>
+              <a:t>rhs</a:t>
+            </a:r>
+            <a:r>
+              <a:rPr lang="en-US" baseline="0" dirty="0" smtClean="0"/>
+              <a:t>) =</a:t>
+            </a:r>
+          </a:p>
+          <a:p>
+            <a:r>
+              <a:rPr lang="en-US" baseline="0" dirty="0" smtClean="0"/>
+              <a:t>	match lhs, </a:t>
+            </a:r>
+            <a:r>
+              <a:rPr lang="en-US" baseline="0" dirty="0" err="1" smtClean="0"/>
+              <a:t>rhs</a:t>
+            </a:r>
+            <a:r>
+              <a:rPr lang="en-US" baseline="0" dirty="0" smtClean="0"/>
+              <a:t> with</a:t>
+            </a:r>
+          </a:p>
+          <a:p>
+            <a:r>
+              <a:rPr lang="en-US" baseline="0" dirty="0" smtClean="0"/>
+              <a:t>	| Couple(_), _ </a:t>
+            </a:r>
+            <a:endParaRPr lang="ru-RU" baseline="0" dirty="0" smtClean="0"/>
+          </a:p>
+          <a:p>
+            <a:r>
+              <a:rPr lang="ru-RU" baseline="0" dirty="0" smtClean="0"/>
+              <a:t>                   </a:t>
+            </a:r>
+            <a:r>
+              <a:rPr lang="en-US" baseline="0" dirty="0" smtClean="0"/>
+              <a:t>| _, Couple(_) </a:t>
+            </a:r>
+            <a:endParaRPr lang="ru-RU" baseline="0" dirty="0" smtClean="0"/>
+          </a:p>
+          <a:p>
+            <a:r>
+              <a:rPr lang="ru-RU" baseline="0" dirty="0" smtClean="0"/>
+              <a:t>		</a:t>
+            </a:r>
+            <a:r>
+              <a:rPr lang="en-US" baseline="0" dirty="0" smtClean="0"/>
+              <a:t>-&gt; </a:t>
+            </a:r>
+            <a:r>
+              <a:rPr lang="en-US" baseline="0" dirty="0" err="1" smtClean="0"/>
+              <a:t>failwith</a:t>
+            </a:r>
+            <a:r>
+              <a:rPr lang="en-US" baseline="0" dirty="0" smtClean="0"/>
+              <a:t> "</a:t>
+            </a:r>
+            <a:r>
+              <a:rPr lang="ru-RU" baseline="0" dirty="0" smtClean="0"/>
+              <a:t>Гм... шведская семья детектед"</a:t>
+            </a:r>
+          </a:p>
+          <a:p>
+            <a:r>
+              <a:rPr lang="ru-RU" baseline="0" dirty="0" smtClean="0"/>
+              <a:t>	| _ -&gt; </a:t>
+            </a:r>
+            <a:r>
+              <a:rPr lang="en-US" baseline="0" dirty="0" smtClean="0"/>
+              <a:t>Couple(lhs, </a:t>
+            </a:r>
+            <a:r>
+              <a:rPr lang="en-US" baseline="0" dirty="0" err="1" smtClean="0"/>
+              <a:t>rhs</a:t>
+            </a:r>
+            <a:r>
+              <a:rPr lang="en-US" baseline="0" dirty="0" smtClean="0"/>
+              <a:t>)</a:t>
+            </a:r>
+            <a:endParaRPr lang="ru-RU" baseline="0" dirty="0" smtClean="0"/>
+          </a:p>
+          <a:p>
+            <a:endParaRPr lang="ru-RU" baseline="0" dirty="0" smtClean="0"/>
+          </a:p>
+          <a:p>
+            <a:pPr marL="0" marR="0" indent="0" algn="l" defTabSz="914400" rtl="0" eaLnBrk="1" fontAlgn="auto" latinLnBrk="0" hangingPunct="1">
+              <a:lnSpc>
+                <a:spcPct val="100000"/>
+              </a:lnSpc>
+              <a:spcBef>
+                <a:spcPts val="0"/>
+              </a:spcBef>
+              <a:spcAft>
+                <a:spcPts val="0"/>
+              </a:spcAft>
+              <a:buClrTx/>
+              <a:buSzTx/>
+              <a:buFontTx/>
+              <a:buNone/>
+              <a:tabLst/>
+              <a:defRPr/>
+            </a:pPr>
+            <a:r>
+              <a:rPr lang="uk-UA" baseline="0" dirty="0" smtClean="0"/>
+              <a:t>Асинхронно скачать, потом чето асинхронно скачать еще раз.</a:t>
+            </a:r>
+            <a:endParaRPr lang="en-US" dirty="0" smtClean="0"/>
+          </a:p>
+          <a:p>
+            <a:endParaRPr lang="en-US" baseline="0" dirty="0" smtClean="0"/>
+          </a:p>
+          <a:p>
+            <a:r>
+              <a:rPr lang="uk-UA" baseline="0" dirty="0" smtClean="0"/>
+              <a:t>Типизированность</a:t>
+            </a:r>
+          </a:p>
+          <a:p>
+            <a:endParaRPr lang="uk-UA" baseline="0" dirty="0" smtClean="0"/>
+          </a:p>
+          <a:p>
+            <a:r>
+              <a:rPr lang="en-US" sz="1200" b="0" i="0" u="none" strike="noStrike" kern="1200" baseline="0" dirty="0" smtClean="0">
+                <a:solidFill>
+                  <a:schemeClr val="tx1"/>
+                </a:solidFill>
+                <a:latin typeface="+mn-lt"/>
+                <a:ea typeface="+mn-ea"/>
+                <a:cs typeface="+mn-cs"/>
+              </a:rPr>
+              <a:t>Object Expressions</a:t>
+            </a:r>
+            <a:endParaRPr lang="uk-UA" baseline="0" dirty="0" smtClean="0"/>
           </a:p>
         </p:txBody>
       </p:sp>
@@ -1326,7 +1850,7 @@
     </p:spTree>
     <p:extLst>
       <p:ext uri="{BB962C8B-B14F-4D97-AF65-F5344CB8AC3E}">
-        <p14:creationId xmlns:p14="http://schemas.microsoft.com/office/powerpoint/2010/main" val="3345246252"/>
+        <p14:creationId xmlns:p14="http://schemas.microsoft.com/office/powerpoint/2010/main" val="289005074"/>
       </p:ext>
     </p:extLst>
   </p:cSld>
@@ -1381,135 +1905,160 @@
           <a:lstStyle/>
           <a:p>
             <a:r>
+              <a:rPr lang="ru-RU" dirty="0" smtClean="0"/>
+              <a:t>В </a:t>
+            </a:r>
+            <a:r>
+              <a:rPr lang="en-US" dirty="0" smtClean="0"/>
+              <a:t>F#</a:t>
+            </a:r>
+            <a:r>
+              <a:rPr lang="en-US" baseline="0" dirty="0" smtClean="0"/>
+              <a:t> </a:t>
+            </a:r>
+            <a:r>
               <a:rPr lang="uk-UA" baseline="0" dirty="0" smtClean="0"/>
-              <a:t>Офф, сайт. Ловить там правда нечего. А так это редирект на </a:t>
+              <a:t>большое значние имеет положение файла в проекте. Они компилятся последовательно. Соотвевенно если клас дефайнится позже, его никто не найдет.</a:t>
+            </a:r>
+          </a:p>
+          <a:p>
+            <a:endParaRPr lang="uk-UA" baseline="0" dirty="0" smtClean="0"/>
+          </a:p>
+          <a:p>
+            <a:r>
+              <a:rPr lang="uk-UA" baseline="0" dirty="0" smtClean="0"/>
+              <a:t>Интеграция со студией так себе... Нема рефакторингов. Нема папок.</a:t>
+            </a:r>
+          </a:p>
+          <a:p>
+            <a:endParaRPr lang="uk-UA" baseline="0" dirty="0" smtClean="0"/>
+          </a:p>
+          <a:p>
+            <a:r>
+              <a:rPr lang="uk-UA" baseline="0" dirty="0" smtClean="0"/>
+              <a:t>Нема автоматического приведения типов. </a:t>
             </a:r>
             <a:r>
               <a:rPr lang="en-US" baseline="0" dirty="0" smtClean="0"/>
-              <a:t>MSDN </a:t>
+              <a:t>let s : </a:t>
+            </a:r>
+            <a:r>
+              <a:rPr lang="en-US" baseline="0" dirty="0" err="1" smtClean="0"/>
+              <a:t>int</a:t>
+            </a:r>
+            <a:r>
+              <a:rPr lang="en-US" baseline="0" dirty="0" smtClean="0"/>
+              <a:t> = 12.5m </a:t>
             </a:r>
             <a:r>
               <a:rPr lang="uk-UA" baseline="0" dirty="0" smtClean="0"/>
-              <a:t>раздел </a:t>
-            </a:r>
-            <a:r>
-              <a:rPr lang="en-US" baseline="0" dirty="0" smtClean="0"/>
-              <a:t>F#.</a:t>
-            </a:r>
-            <a:endParaRPr lang="uk-UA" baseline="0" dirty="0" smtClean="0"/>
-          </a:p>
-          <a:p>
-            <a:endParaRPr lang="uk-UA" baseline="0" dirty="0" smtClean="0"/>
+              <a:t>не будет работать.</a:t>
+            </a:r>
+            <a:endParaRPr lang="en-US" baseline="0" dirty="0" smtClean="0"/>
+          </a:p>
+          <a:p>
+            <a:endParaRPr lang="en-US" baseline="0" dirty="0" smtClean="0"/>
           </a:p>
           <a:p>
             <a:r>
               <a:rPr lang="uk-UA" baseline="0" dirty="0" smtClean="0"/>
-              <a:t>Я б</a:t>
+              <a:t>Два костыля. У в</a:t>
             </a:r>
             <a:r>
               <a:rPr lang="ru-RU" baseline="0" dirty="0" smtClean="0"/>
-              <a:t>ы</a:t>
-            </a:r>
-            <a:r>
-              <a:rPr lang="uk-UA" baseline="0" dirty="0" smtClean="0"/>
-              <a:t> начал </a:t>
-            </a:r>
-            <a:r>
-              <a:rPr lang="en-US" baseline="0" dirty="0" err="1" smtClean="0"/>
-              <a:t>hubfs</a:t>
-            </a:r>
-            <a:r>
-              <a:rPr lang="en-US" baseline="0" dirty="0" smtClean="0"/>
-              <a:t>.. </a:t>
-            </a:r>
-            <a:r>
-              <a:rPr lang="uk-UA" baseline="0" dirty="0" smtClean="0"/>
-              <a:t>Кумутити подавала надежд</a:t>
-            </a:r>
-            <a:r>
-              <a:rPr lang="ru-RU" baseline="0" dirty="0" smtClean="0"/>
-              <a:t>ы. К сожалению щас сдохла... По этому </a:t>
-            </a:r>
-            <a:r>
-              <a:rPr lang="en-US" baseline="0" dirty="0" smtClean="0"/>
-              <a:t>stackoverflow.com. </a:t>
-            </a:r>
-            <a:r>
-              <a:rPr lang="uk-UA" baseline="0" dirty="0" smtClean="0"/>
-              <a:t>Многие из тех что могут ответить мониторят оба ресурса.</a:t>
-            </a:r>
-          </a:p>
-          <a:p>
-            <a:endParaRPr lang="uk-UA" baseline="0" dirty="0" smtClean="0"/>
-          </a:p>
-          <a:p>
-            <a:r>
-              <a:rPr lang="uk-UA" baseline="0" dirty="0" smtClean="0"/>
-              <a:t>Более или мение официальн</a:t>
-            </a:r>
-            <a:r>
-              <a:rPr lang="ru-RU" baseline="0" dirty="0" smtClean="0"/>
-              <a:t>ый хештаг...</a:t>
-            </a:r>
-          </a:p>
-          <a:p>
-            <a:endParaRPr lang="ru-RU" baseline="0" dirty="0" smtClean="0"/>
-          </a:p>
-          <a:p>
-            <a:r>
-              <a:rPr lang="ru-RU" baseline="0" dirty="0" smtClean="0"/>
-              <a:t>Книга которую я прочел на этой неделе. Супер. Главное что понравилось, это метафоричное описание. Тоесть например читая про активные паттерны, понимаеш о чем думал разработчик... Главное что не понравилось, это то что написано не тока для </a:t>
-            </a:r>
-            <a:r>
-              <a:rPr lang="en-US" baseline="0" dirty="0" smtClean="0"/>
-              <a:t>.NET</a:t>
-            </a:r>
-            <a:r>
-              <a:rPr lang="uk-UA" baseline="0" dirty="0" smtClean="0"/>
-              <a:t>чиков. Реально много про то что кажд</a:t>
-            </a:r>
-            <a:r>
-              <a:rPr lang="ru-RU" baseline="0" dirty="0" smtClean="0"/>
-              <a:t>ый </a:t>
-            </a:r>
-            <a:r>
-              <a:rPr lang="en-US" baseline="0" dirty="0" smtClean="0"/>
-              <a:t>.Ne</a:t>
-            </a:r>
-            <a:r>
-              <a:rPr lang="uk-UA" baseline="0" dirty="0" smtClean="0"/>
-              <a:t>чик знает.</a:t>
-            </a:r>
-          </a:p>
-          <a:p>
-            <a:endParaRPr lang="uk-UA" baseline="0" dirty="0" smtClean="0"/>
-          </a:p>
-          <a:p>
-            <a:r>
-              <a:rPr lang="uk-UA" baseline="0" dirty="0" smtClean="0"/>
-              <a:t>Три лекции от самого </a:t>
-            </a:r>
-            <a:r>
-              <a:rPr lang="en-US" baseline="0" dirty="0" smtClean="0"/>
-              <a:t>Don </a:t>
-            </a:r>
-            <a:r>
-              <a:rPr lang="en-US" baseline="0" dirty="0" err="1" smtClean="0"/>
-              <a:t>Syme</a:t>
-            </a:r>
-            <a:r>
-              <a:rPr lang="en-US" baseline="0" dirty="0" smtClean="0"/>
-              <a:t>… </a:t>
-            </a:r>
-            <a:r>
-              <a:rPr lang="uk-UA" baseline="0" dirty="0" smtClean="0"/>
-              <a:t>По отз</a:t>
-            </a:r>
-            <a:r>
-              <a:rPr lang="ru-RU" baseline="0" dirty="0" smtClean="0"/>
-              <a:t>ывам скушновато, я же нашел их очень интересными. Короче советую.</a:t>
-            </a:r>
-            <a:endParaRPr lang="en-US" dirty="0"/>
+              <a:t>ывода типов есть маленькая проблемка, это рекурсия. Как можно вывести что-то, чего пока нет? Еще смешнее ситуация когда двойная рекурсия, метод1 вызывает метод2, который в свою очередь вызывает метод 1...</a:t>
+            </a:r>
+          </a:p>
+          <a:p>
+            <a:r>
+              <a:rPr lang="pt-BR" sz="1200" b="0" i="0" u="none" strike="noStrike" kern="1200" baseline="0" dirty="0" smtClean="0">
+                <a:solidFill>
+                  <a:schemeClr val="tx1"/>
+                </a:solidFill>
+                <a:latin typeface="+mn-lt"/>
+                <a:ea typeface="+mn-ea"/>
+                <a:cs typeface="+mn-cs"/>
+              </a:rPr>
+              <a:t>let </a:t>
+            </a:r>
+            <a:r>
+              <a:rPr lang="pt-BR" sz="1200" b="1" i="0" u="none" strike="noStrike" kern="1200" baseline="0" dirty="0" smtClean="0">
+                <a:solidFill>
+                  <a:schemeClr val="tx1"/>
+                </a:solidFill>
+                <a:latin typeface="+mn-lt"/>
+                <a:ea typeface="+mn-ea"/>
+                <a:cs typeface="+mn-cs"/>
+              </a:rPr>
+              <a:t>rec </a:t>
+            </a:r>
+            <a:r>
+              <a:rPr lang="pt-BR" sz="1200" b="0" i="0" u="none" strike="noStrike" kern="1200" baseline="0" dirty="0" smtClean="0">
+                <a:solidFill>
+                  <a:schemeClr val="tx1"/>
+                </a:solidFill>
+                <a:latin typeface="+mn-lt"/>
+                <a:ea typeface="+mn-ea"/>
+                <a:cs typeface="+mn-cs"/>
+              </a:rPr>
+              <a:t>isOdd n = (n = 1) || isEven (n - 1)</a:t>
+            </a:r>
+          </a:p>
+          <a:p>
+            <a:r>
+              <a:rPr lang="pt-BR" sz="1200" b="1" i="0" u="none" strike="noStrike" kern="1200" baseline="0" dirty="0" smtClean="0">
+                <a:solidFill>
+                  <a:schemeClr val="tx1"/>
+                </a:solidFill>
+                <a:latin typeface="+mn-lt"/>
+                <a:ea typeface="+mn-ea"/>
+                <a:cs typeface="+mn-cs"/>
+              </a:rPr>
+              <a:t>and </a:t>
+            </a:r>
+            <a:r>
+              <a:rPr lang="pt-BR" sz="1200" b="0" i="0" u="none" strike="noStrike" kern="1200" baseline="0" dirty="0" smtClean="0">
+                <a:solidFill>
+                  <a:schemeClr val="tx1"/>
+                </a:solidFill>
+                <a:latin typeface="+mn-lt"/>
+                <a:ea typeface="+mn-ea"/>
+                <a:cs typeface="+mn-cs"/>
+              </a:rPr>
+              <a:t>isEven n = (n = 0) || isOdd (n - 1)</a:t>
+            </a:r>
+            <a:endParaRPr lang="ru-RU" sz="1200" b="0" i="0" u="none" strike="noStrike" kern="1200" baseline="0" dirty="0" smtClean="0">
+              <a:solidFill>
+                <a:schemeClr val="tx1"/>
+              </a:solidFill>
+              <a:latin typeface="+mn-lt"/>
+              <a:ea typeface="+mn-ea"/>
+              <a:cs typeface="+mn-cs"/>
+            </a:endParaRPr>
+          </a:p>
+          <a:p>
+            <a:endParaRPr lang="ru-RU" sz="1200" b="0" i="0" u="none" strike="noStrike" kern="1200" baseline="0" dirty="0" smtClean="0">
+              <a:solidFill>
+                <a:schemeClr val="tx1"/>
+              </a:solidFill>
+              <a:latin typeface="+mn-lt"/>
+              <a:ea typeface="+mn-ea"/>
+              <a:cs typeface="+mn-cs"/>
+            </a:endParaRPr>
+          </a:p>
+          <a:p>
+            <a:r>
+              <a:rPr lang="ru-RU" sz="1200" b="0" i="0" u="none" strike="noStrike" kern="1200" baseline="0" smtClean="0">
+                <a:solidFill>
+                  <a:schemeClr val="tx1"/>
+                </a:solidFill>
+                <a:latin typeface="+mn-lt"/>
+                <a:ea typeface="+mn-ea"/>
+                <a:cs typeface="+mn-cs"/>
+              </a:rPr>
+              <a:t>Непонятно где писать с маленькой буквы, где с большой.</a:t>
+            </a:r>
+            <a:endParaRPr lang="uk-UA" dirty="0"/>
           </a:p>
         </p:txBody>
       </p:sp>
@@ -1531,6 +2080,219 @@
             <a:fld id="{327B1D59-D02F-4C0C-9439-7B18C67FCD89}" type="slidenum">
               <a:rPr lang="uk-UA" smtClean="0"/>
               <a:t>4</a:t>
+            </a:fld>
+            <a:endParaRPr lang="uk-UA"/>
+          </a:p>
+        </p:txBody>
+      </p:sp>
+    </p:spTree>
+    <p:extLst>
+      <p:ext uri="{BB962C8B-B14F-4D97-AF65-F5344CB8AC3E}">
+        <p14:creationId xmlns:p14="http://schemas.microsoft.com/office/powerpoint/2010/main" val="3345246252"/>
+      </p:ext>
+    </p:extLst>
+  </p:cSld>
+  <p:clrMapOvr>
+    <a:masterClrMapping/>
+  </p:clrMapOvr>
+</p:notes>
+</file>
+
+<file path=ppt/notesSlides/notesSlide5.xml><?xml version="1.0" encoding="utf-8"?>
+<p:notes xmlns:a="http://schemas.openxmlformats.org/drawingml/2006/main" xmlns:r="http://schemas.openxmlformats.org/officeDocument/2006/relationships" xmlns:p="http://schemas.openxmlformats.org/presentationml/2006/main">
+  <p:cSld>
+    <p:spTree>
+      <p:nvGrpSpPr>
+        <p:cNvPr id="1" name=""/>
+        <p:cNvGrpSpPr/>
+        <p:nvPr/>
+      </p:nvGrpSpPr>
+      <p:grpSpPr>
+        <a:xfrm>
+          <a:off x="0" y="0"/>
+          <a:ext cx="0" cy="0"/>
+          <a:chOff x="0" y="0"/>
+          <a:chExt cx="0" cy="0"/>
+        </a:xfrm>
+      </p:grpSpPr>
+      <p:sp>
+        <p:nvSpPr>
+          <p:cNvPr id="2" name="Slide Image Placeholder 1"/>
+          <p:cNvSpPr>
+            <a:spLocks noGrp="1" noRot="1" noChangeAspect="1"/>
+          </p:cNvSpPr>
+          <p:nvPr>
+            <p:ph type="sldImg"/>
+          </p:nvPr>
+        </p:nvSpPr>
+        <p:spPr/>
+      </p:sp>
+      <p:sp>
+        <p:nvSpPr>
+          <p:cNvPr id="3" name="Notes Placeholder 2"/>
+          <p:cNvSpPr>
+            <a:spLocks noGrp="1"/>
+          </p:cNvSpPr>
+          <p:nvPr>
+            <p:ph type="body" idx="1"/>
+          </p:nvPr>
+        </p:nvSpPr>
+        <p:spPr/>
+        <p:txBody>
+          <a:bodyPr/>
+          <a:lstStyle/>
+          <a:p>
+            <a:r>
+              <a:rPr lang="uk-UA" baseline="0" dirty="0" smtClean="0"/>
+              <a:t>Офф, сайт. Ловить там правда нечего. А так это редирект на </a:t>
+            </a:r>
+            <a:r>
+              <a:rPr lang="en-US" baseline="0" dirty="0" smtClean="0"/>
+              <a:t>MSDN </a:t>
+            </a:r>
+            <a:r>
+              <a:rPr lang="uk-UA" baseline="0" dirty="0" smtClean="0"/>
+              <a:t>раздел </a:t>
+            </a:r>
+            <a:r>
+              <a:rPr lang="en-US" baseline="0" dirty="0" smtClean="0"/>
+              <a:t>F#.</a:t>
+            </a:r>
+            <a:endParaRPr lang="uk-UA" baseline="0" dirty="0" smtClean="0"/>
+          </a:p>
+          <a:p>
+            <a:endParaRPr lang="uk-UA" baseline="0" dirty="0" smtClean="0"/>
+          </a:p>
+          <a:p>
+            <a:r>
+              <a:rPr lang="uk-UA" baseline="0" dirty="0" smtClean="0"/>
+              <a:t>Я б</a:t>
+            </a:r>
+            <a:r>
+              <a:rPr lang="ru-RU" baseline="0" dirty="0" smtClean="0"/>
+              <a:t>ы</a:t>
+            </a:r>
+            <a:r>
+              <a:rPr lang="uk-UA" baseline="0" dirty="0" smtClean="0"/>
+              <a:t> начал </a:t>
+            </a:r>
+            <a:r>
+              <a:rPr lang="en-US" baseline="0" dirty="0" err="1" smtClean="0"/>
+              <a:t>hubfs</a:t>
+            </a:r>
+            <a:r>
+              <a:rPr lang="en-US" baseline="0" dirty="0" smtClean="0"/>
+              <a:t>.. </a:t>
+            </a:r>
+            <a:r>
+              <a:rPr lang="uk-UA" baseline="0" dirty="0" smtClean="0"/>
+              <a:t>Кумутити подавала надежд</a:t>
+            </a:r>
+            <a:r>
+              <a:rPr lang="ru-RU" baseline="0" dirty="0" smtClean="0"/>
+              <a:t>ы. К сожалению щас сдохла... По этому </a:t>
+            </a:r>
+            <a:r>
+              <a:rPr lang="en-US" baseline="0" dirty="0" smtClean="0"/>
+              <a:t>stackoverflow.com. </a:t>
+            </a:r>
+            <a:r>
+              <a:rPr lang="uk-UA" baseline="0" dirty="0" smtClean="0"/>
+              <a:t>Многие из тех что могут ответить мониторят оба ресурса.</a:t>
+            </a:r>
+          </a:p>
+          <a:p>
+            <a:endParaRPr lang="uk-UA" baseline="0" dirty="0" smtClean="0"/>
+          </a:p>
+          <a:p>
+            <a:r>
+              <a:rPr lang="uk-UA" baseline="0" dirty="0" smtClean="0"/>
+              <a:t>Более или мение официальн</a:t>
+            </a:r>
+            <a:r>
+              <a:rPr lang="ru-RU" baseline="0" dirty="0" smtClean="0"/>
+              <a:t>ый хештаг...</a:t>
+            </a:r>
+          </a:p>
+          <a:p>
+            <a:endParaRPr lang="ru-RU" baseline="0" dirty="0" smtClean="0"/>
+          </a:p>
+          <a:p>
+            <a:r>
+              <a:rPr lang="ru-RU" baseline="0" dirty="0" smtClean="0"/>
+              <a:t>Книга которую я прочел на этой неделе. Супер. Главное что понравилось, это метафоричное описание. Тоесть например читая про активные паттерны, понимаеш о чем думал разработчик... Главное что не понравилось, это то что написано не тока для </a:t>
+            </a:r>
+            <a:r>
+              <a:rPr lang="en-US" baseline="0" dirty="0" smtClean="0"/>
+              <a:t>.NET</a:t>
+            </a:r>
+            <a:r>
+              <a:rPr lang="uk-UA" baseline="0" dirty="0" smtClean="0"/>
+              <a:t>чиков. Реально много про то что кажд</a:t>
+            </a:r>
+            <a:r>
+              <a:rPr lang="ru-RU" baseline="0" dirty="0" smtClean="0"/>
+              <a:t>ый </a:t>
+            </a:r>
+            <a:r>
+              <a:rPr lang="en-US" baseline="0" dirty="0" smtClean="0"/>
+              <a:t>.Ne</a:t>
+            </a:r>
+            <a:r>
+              <a:rPr lang="uk-UA" baseline="0" dirty="0" smtClean="0"/>
+              <a:t>чик знает.</a:t>
+            </a:r>
+          </a:p>
+          <a:p>
+            <a:endParaRPr lang="uk-UA" baseline="0" dirty="0" smtClean="0"/>
+          </a:p>
+          <a:p>
+            <a:r>
+              <a:rPr lang="uk-UA" baseline="0" dirty="0" smtClean="0"/>
+              <a:t>Три лекции от самого </a:t>
+            </a:r>
+            <a:r>
+              <a:rPr lang="en-US" baseline="0" dirty="0" smtClean="0"/>
+              <a:t>Don </a:t>
+            </a:r>
+            <a:r>
+              <a:rPr lang="en-US" baseline="0" dirty="0" err="1" smtClean="0"/>
+              <a:t>Syme</a:t>
+            </a:r>
+            <a:r>
+              <a:rPr lang="en-US" baseline="0" dirty="0" smtClean="0"/>
+              <a:t>… </a:t>
+            </a:r>
+            <a:r>
+              <a:rPr lang="uk-UA" baseline="0" dirty="0" smtClean="0"/>
+              <a:t>По отз</a:t>
+            </a:r>
+            <a:r>
+              <a:rPr lang="ru-RU" baseline="0" dirty="0" smtClean="0"/>
+              <a:t>ывам скушновато, я же нашел их очень интересными. Короче советую.</a:t>
+            </a:r>
+            <a:endParaRPr lang="en-US" dirty="0"/>
+          </a:p>
+        </p:txBody>
+      </p:sp>
+      <p:sp>
+        <p:nvSpPr>
+          <p:cNvPr id="4" name="Slide Number Placeholder 3"/>
+          <p:cNvSpPr>
+            <a:spLocks noGrp="1"/>
+          </p:cNvSpPr>
+          <p:nvPr>
+            <p:ph type="sldNum" sz="quarter" idx="10"/>
+          </p:nvPr>
+        </p:nvSpPr>
+        <p:spPr/>
+        <p:txBody>
+          <a:bodyPr/>
+          <a:lstStyle/>
+          <a:p>
+            <a:fld id="{327B1D59-D02F-4C0C-9439-7B18C67FCD89}" type="slidenum">
+              <a:rPr lang="uk-UA" smtClean="0"/>
+              <a:t>5</a:t>
             </a:fld>
             <a:endParaRPr lang="uk-UA"/>
           </a:p>
@@ -4723,8 +5485,8 @@
           <a:lstStyle/>
           <a:p>
             <a:r>
-              <a:rPr lang="ru-RU" dirty="0" smtClean="0"/>
-              <a:t>Мелкие класные фишки</a:t>
+              <a:rPr lang="uk-UA" dirty="0" smtClean="0"/>
+              <a:t>Цели</a:t>
             </a:r>
             <a:endParaRPr lang="en-US" dirty="0"/>
           </a:p>
@@ -4746,83 +5508,20 @@
           <a:lstStyle/>
           <a:p>
             <a:r>
-              <a:rPr lang="en-US" dirty="0" smtClean="0"/>
-              <a:t>if</a:t>
-            </a:r>
-            <a:r>
               <a:rPr lang="uk-UA" dirty="0" smtClean="0"/>
-              <a:t> возвращает результат</a:t>
-            </a:r>
-          </a:p>
-          <a:p>
-            <a:r>
-              <a:rPr lang="en-US" dirty="0" smtClean="0"/>
-              <a:t>DI </a:t>
-            </a:r>
+              <a:t>Заинтриговать</a:t>
+            </a:r>
+          </a:p>
+          <a:p>
             <a:r>
               <a:rPr lang="uk-UA" dirty="0" smtClean="0"/>
-              <a:t>средствами </a:t>
-            </a:r>
-            <a:r>
-              <a:rPr lang="en-US" dirty="0" smtClean="0"/>
-              <a:t>F#</a:t>
+              <a:t>Немного охладить пыл</a:t>
             </a:r>
           </a:p>
           <a:p>
             <a:r>
               <a:rPr lang="uk-UA" dirty="0" smtClean="0"/>
-              <a:t>Куча разн</a:t>
-            </a:r>
-            <a:r>
-              <a:rPr lang="ru-RU" dirty="0" smtClean="0"/>
-              <a:t>ых встроенных типов</a:t>
-            </a:r>
-            <a:endParaRPr lang="en-US" dirty="0" smtClean="0"/>
-          </a:p>
-          <a:p>
-            <a:r>
-              <a:rPr lang="en-US" dirty="0" err="1"/>
-              <a:t>a</a:t>
-            </a:r>
-            <a:r>
-              <a:rPr lang="en-US" dirty="0" err="1" smtClean="0"/>
-              <a:t>sync</a:t>
-            </a:r>
-            <a:r>
-              <a:rPr lang="en-US" dirty="0" smtClean="0"/>
-              <a:t> </a:t>
-            </a:r>
-            <a:r>
-              <a:rPr lang="uk-UA" dirty="0" smtClean="0"/>
-              <a:t>воркфлоу...</a:t>
-            </a:r>
-          </a:p>
-          <a:p>
-            <a:r>
-              <a:rPr lang="en-US" dirty="0" err="1" smtClean="0"/>
-              <a:t>printfn</a:t>
-            </a:r>
-            <a:endParaRPr lang="ru-RU" dirty="0" smtClean="0"/>
-          </a:p>
-          <a:p>
-            <a:r>
-              <a:rPr lang="en-US" dirty="0" err="1" smtClean="0"/>
-              <a:t>Nullability</a:t>
-            </a:r>
-            <a:r>
-              <a:rPr lang="en-US" dirty="0" smtClean="0"/>
-              <a:t>…</a:t>
-            </a:r>
-            <a:endParaRPr lang="uk-UA" dirty="0" smtClean="0"/>
-          </a:p>
-          <a:p>
-            <a:r>
-              <a:rPr lang="uk-UA" dirty="0" smtClean="0"/>
-              <a:t>Анонимн</a:t>
-            </a:r>
-            <a:r>
-              <a:rPr lang="ru-RU" dirty="0" smtClean="0"/>
-              <a:t>ые реализации..</a:t>
+              <a:t>Обсудить</a:t>
             </a:r>
             <a:endParaRPr lang="en-US" dirty="0"/>
           </a:p>
@@ -4831,7 +5530,7 @@
     </p:spTree>
     <p:extLst>
       <p:ext uri="{BB962C8B-B14F-4D97-AF65-F5344CB8AC3E}">
-        <p14:creationId xmlns:p14="http://schemas.microsoft.com/office/powerpoint/2010/main" val="248792973"/>
+        <p14:creationId xmlns:p14="http://schemas.microsoft.com/office/powerpoint/2010/main" val="539474638"/>
       </p:ext>
     </p:extLst>
   </p:cSld>
@@ -4874,90 +5573,115 @@
           <a:lstStyle/>
           <a:p>
             <a:r>
+              <a:rPr lang="ru-RU" dirty="0" smtClean="0"/>
+              <a:t>Мелкие класные фишки</a:t>
+            </a:r>
+            <a:endParaRPr lang="en-US" dirty="0"/>
+          </a:p>
+        </p:txBody>
+      </p:sp>
+      <p:sp>
+        <p:nvSpPr>
+          <p:cNvPr id="3" name="Content Placeholder 2"/>
+          <p:cNvSpPr>
+            <a:spLocks noGrp="1"/>
+          </p:cNvSpPr>
+          <p:nvPr>
+            <p:ph idx="1"/>
+          </p:nvPr>
+        </p:nvSpPr>
+        <p:spPr/>
+        <p:txBody>
+          <a:bodyPr/>
+          <a:lstStyle/>
+          <a:p>
+            <a:r>
+              <a:rPr lang="en-US" dirty="0" smtClean="0"/>
+              <a:t>if</a:t>
+            </a:r>
+            <a:r>
               <a:rPr lang="uk-UA" dirty="0" smtClean="0"/>
-              <a:t>Проблем</a:t>
+              <a:t> возвращает результат</a:t>
+            </a:r>
+          </a:p>
+          <a:p>
+            <a:r>
+              <a:rPr lang="en-US" dirty="0" smtClean="0"/>
+              <a:t>DI </a:t>
+            </a:r>
+            <a:r>
+              <a:rPr lang="uk-UA" dirty="0" smtClean="0"/>
+              <a:t>средствами </a:t>
+            </a:r>
+            <a:r>
+              <a:rPr lang="en-US" dirty="0" smtClean="0"/>
+              <a:t>F#</a:t>
+            </a:r>
+          </a:p>
+          <a:p>
+            <a:r>
+              <a:rPr lang="uk-UA" dirty="0" smtClean="0"/>
+              <a:t>Куча разн</a:t>
             </a:r>
             <a:r>
               <a:rPr lang="ru-RU" dirty="0" smtClean="0"/>
-              <a:t>ы</a:t>
-            </a:r>
-            <a:endParaRPr lang="uk-UA" dirty="0"/>
-          </a:p>
-        </p:txBody>
-      </p:sp>
-      <p:sp>
-        <p:nvSpPr>
-          <p:cNvPr id="3" name="Content Placeholder 2"/>
-          <p:cNvSpPr>
-            <a:spLocks noGrp="1"/>
-          </p:cNvSpPr>
-          <p:nvPr>
-            <p:ph idx="1"/>
-          </p:nvPr>
-        </p:nvSpPr>
-        <p:spPr/>
-        <p:txBody>
-          <a:bodyPr/>
-          <a:lstStyle/>
-          <a:p>
+              <a:t>ых встроенных типов</a:t>
+            </a:r>
+            <a:endParaRPr lang="en-US" dirty="0" smtClean="0"/>
+          </a:p>
+          <a:p>
+            <a:r>
+              <a:rPr lang="en-US" dirty="0" err="1"/>
+              <a:t>a</a:t>
+            </a:r>
+            <a:r>
+              <a:rPr lang="en-US" dirty="0" err="1" smtClean="0"/>
+              <a:t>sync</a:t>
+            </a:r>
+            <a:r>
+              <a:rPr lang="en-US" dirty="0" smtClean="0"/>
+              <a:t> </a:t>
+            </a:r>
+            <a:r>
+              <a:rPr lang="uk-UA" dirty="0" smtClean="0"/>
+              <a:t>воркфлоу...</a:t>
+            </a:r>
+          </a:p>
+          <a:p>
+            <a:r>
+              <a:rPr lang="en-US" dirty="0" err="1" smtClean="0"/>
+              <a:t>printfn</a:t>
+            </a:r>
+            <a:endParaRPr lang="ru-RU" dirty="0" smtClean="0"/>
+          </a:p>
+          <a:p>
+            <a:r>
+              <a:rPr lang="en-US" dirty="0" err="1" smtClean="0"/>
+              <a:t>Nullability</a:t>
+            </a:r>
+            <a:r>
+              <a:rPr lang="en-US" dirty="0" smtClean="0"/>
+              <a:t>…</a:t>
+            </a:r>
+            <a:endParaRPr lang="uk-UA" dirty="0" smtClean="0"/>
+          </a:p>
+          <a:p>
+            <a:r>
+              <a:rPr lang="uk-UA" dirty="0" smtClean="0"/>
+              <a:t>Анонимн</a:t>
+            </a:r>
             <a:r>
               <a:rPr lang="ru-RU" dirty="0" smtClean="0"/>
-              <a:t>Положение в проекте исходного файла</a:t>
-            </a:r>
-          </a:p>
-          <a:p>
-            <a:r>
-              <a:rPr lang="ru-RU" dirty="0" smtClean="0"/>
-              <a:t>Интеграция в студию</a:t>
-            </a:r>
-            <a:endParaRPr lang="en-US" dirty="0" smtClean="0"/>
-          </a:p>
-          <a:p>
-            <a:r>
-              <a:rPr lang="uk-UA" dirty="0" smtClean="0"/>
-              <a:t>Автоматическое приведение типов</a:t>
-            </a:r>
-            <a:endParaRPr lang="en-US" dirty="0" smtClean="0"/>
-          </a:p>
-          <a:p>
-            <a:r>
-              <a:rPr lang="en-US" dirty="0" smtClean="0"/>
-              <a:t>rec </a:t>
-            </a:r>
-            <a:r>
-              <a:rPr lang="uk-UA" dirty="0" smtClean="0"/>
-              <a:t>и </a:t>
-            </a:r>
-            <a:r>
-              <a:rPr lang="en-US" dirty="0" smtClean="0"/>
-              <a:t>and</a:t>
-            </a:r>
-            <a:endParaRPr lang="uk-UA" dirty="0" smtClean="0"/>
-          </a:p>
-          <a:p>
-            <a:r>
-              <a:rPr lang="uk-UA" dirty="0" smtClean="0"/>
-              <a:t>Код конвеншен</a:t>
-            </a:r>
-            <a:r>
-              <a:rPr lang="ru-RU" dirty="0" smtClean="0"/>
-              <a:t>ы</a:t>
-            </a:r>
-            <a:endParaRPr lang="en-US" dirty="0" smtClean="0"/>
-          </a:p>
-          <a:p>
-            <a:r>
-              <a:rPr lang="uk-UA" dirty="0" smtClean="0"/>
-              <a:t>Приведение типов</a:t>
-            </a:r>
-            <a:endParaRPr lang="uk-UA" dirty="0"/>
+              <a:t>ые реализации..</a:t>
+            </a:r>
+            <a:endParaRPr lang="en-US" dirty="0"/>
           </a:p>
         </p:txBody>
       </p:sp>
     </p:spTree>
     <p:extLst>
       <p:ext uri="{BB962C8B-B14F-4D97-AF65-F5344CB8AC3E}">
-        <p14:creationId xmlns:p14="http://schemas.microsoft.com/office/powerpoint/2010/main" val="4195982294"/>
+        <p14:creationId xmlns:p14="http://schemas.microsoft.com/office/powerpoint/2010/main" val="248792973"/>
       </p:ext>
     </p:extLst>
   </p:cSld>
@@ -5001,6 +5725,132 @@
           <a:p>
             <a:r>
               <a:rPr lang="uk-UA" dirty="0" smtClean="0"/>
+              <a:t>Проблем</a:t>
+            </a:r>
+            <a:r>
+              <a:rPr lang="ru-RU" dirty="0" smtClean="0"/>
+              <a:t>ы</a:t>
+            </a:r>
+            <a:endParaRPr lang="uk-UA" dirty="0"/>
+          </a:p>
+        </p:txBody>
+      </p:sp>
+      <p:sp>
+        <p:nvSpPr>
+          <p:cNvPr id="3" name="Content Placeholder 2"/>
+          <p:cNvSpPr>
+            <a:spLocks noGrp="1"/>
+          </p:cNvSpPr>
+          <p:nvPr>
+            <p:ph idx="1"/>
+          </p:nvPr>
+        </p:nvSpPr>
+        <p:spPr/>
+        <p:txBody>
+          <a:bodyPr/>
+          <a:lstStyle/>
+          <a:p>
+            <a:r>
+              <a:rPr lang="ru-RU" dirty="0" smtClean="0"/>
+              <a:t>Положение в проекте исходного файла</a:t>
+            </a:r>
+          </a:p>
+          <a:p>
+            <a:r>
+              <a:rPr lang="ru-RU" dirty="0" smtClean="0"/>
+              <a:t>Интеграция в студию</a:t>
+            </a:r>
+            <a:endParaRPr lang="en-US" dirty="0" smtClean="0"/>
+          </a:p>
+          <a:p>
+            <a:r>
+              <a:rPr lang="uk-UA" dirty="0" smtClean="0"/>
+              <a:t>Автоматическое приведение типов</a:t>
+            </a:r>
+            <a:endParaRPr lang="en-US" dirty="0" smtClean="0"/>
+          </a:p>
+          <a:p>
+            <a:r>
+              <a:rPr lang="en-US" dirty="0" smtClean="0"/>
+              <a:t>rec </a:t>
+            </a:r>
+            <a:r>
+              <a:rPr lang="uk-UA" dirty="0" smtClean="0"/>
+              <a:t>и </a:t>
+            </a:r>
+            <a:r>
+              <a:rPr lang="en-US" dirty="0" smtClean="0"/>
+              <a:t>and</a:t>
+            </a:r>
+            <a:endParaRPr lang="uk-UA" dirty="0" smtClean="0"/>
+          </a:p>
+          <a:p>
+            <a:r>
+              <a:rPr lang="uk-UA" dirty="0" smtClean="0"/>
+              <a:t>Код конвеншен</a:t>
+            </a:r>
+            <a:r>
+              <a:rPr lang="ru-RU" dirty="0" smtClean="0"/>
+              <a:t>ы</a:t>
+            </a:r>
+            <a:endParaRPr lang="en-US" dirty="0" smtClean="0"/>
+          </a:p>
+          <a:p>
+            <a:r>
+              <a:rPr lang="uk-UA" dirty="0" smtClean="0"/>
+              <a:t>Приведение типов</a:t>
+            </a:r>
+            <a:endParaRPr lang="uk-UA" dirty="0"/>
+          </a:p>
+        </p:txBody>
+      </p:sp>
+    </p:spTree>
+    <p:extLst>
+      <p:ext uri="{BB962C8B-B14F-4D97-AF65-F5344CB8AC3E}">
+        <p14:creationId xmlns:p14="http://schemas.microsoft.com/office/powerpoint/2010/main" val="4195982294"/>
+      </p:ext>
+    </p:extLst>
+  </p:cSld>
+  <p:clrMapOvr>
+    <a:masterClrMapping/>
+  </p:clrMapOvr>
+</p:sld>
+</file>
+
+<file path=ppt/slides/slide5.xml><?xml version="1.0" encoding="utf-8"?>
+<p:sld xmlns:a="http://schemas.openxmlformats.org/drawingml/2006/main" xmlns:r="http://schemas.openxmlformats.org/officeDocument/2006/relationships" xmlns:p="http://schemas.openxmlformats.org/presentationml/2006/main">
+  <p:cSld>
+    <p:spTree>
+      <p:nvGrpSpPr>
+        <p:cNvPr id="1" name=""/>
+        <p:cNvGrpSpPr/>
+        <p:nvPr/>
+      </p:nvGrpSpPr>
+      <p:grpSpPr>
+        <a:xfrm>
+          <a:off x="0" y="0"/>
+          <a:ext cx="0" cy="0"/>
+          <a:chOff x="0" y="0"/>
+          <a:chExt cx="0" cy="0"/>
+        </a:xfrm>
+      </p:grpSpPr>
+      <p:sp>
+        <p:nvSpPr>
+          <p:cNvPr id="2" name="Title 1"/>
+          <p:cNvSpPr>
+            <a:spLocks noGrp="1"/>
+          </p:cNvSpPr>
+          <p:nvPr>
+            <p:ph type="title"/>
+          </p:nvPr>
+        </p:nvSpPr>
+        <p:spPr/>
+        <p:txBody>
+          <a:bodyPr/>
+          <a:lstStyle/>
+          <a:p>
+            <a:r>
+              <a:rPr lang="uk-UA" dirty="0" smtClean="0"/>
               <a:t>Рес</a:t>
             </a:r>
             <a:r>
@@ -5088,6 +5938,13 @@
                 <a:hlinkClick r:id="rId3"/>
               </a:rPr>
               <a:t>#</a:t>
+            </a:r>
+            <a:endParaRPr lang="ru-RU" dirty="0" smtClean="0"/>
+          </a:p>
+          <a:p>
+            <a:r>
+              <a:rPr lang="en-US" dirty="0" smtClean="0"/>
+              <a:t>Spec</a:t>
             </a:r>
             <a:endParaRPr lang="en-US" dirty="0"/>
           </a:p>

</xml_diff>

<commit_message>
NormalFSharp: added first example
</commit_message>
<xml_diff>
--- a/NormalFSharp/NormalFSharp.pptx
+++ b/NormalFSharp/NormalFSharp.pptx
@@ -5,14 +5,15 @@
     <p:sldMasterId id="2147483648" r:id="rId1"/>
   </p:sldMasterIdLst>
   <p:notesMasterIdLst>
-    <p:notesMasterId r:id="rId7"/>
+    <p:notesMasterId r:id="rId8"/>
   </p:notesMasterIdLst>
   <p:sldIdLst>
     <p:sldId id="256" r:id="rId2"/>
     <p:sldId id="260" r:id="rId3"/>
-    <p:sldId id="258" r:id="rId4"/>
-    <p:sldId id="257" r:id="rId5"/>
-    <p:sldId id="259" r:id="rId6"/>
+    <p:sldId id="261" r:id="rId4"/>
+    <p:sldId id="258" r:id="rId5"/>
+    <p:sldId id="257" r:id="rId6"/>
+    <p:sldId id="259" r:id="rId7"/>
   </p:sldIdLst>
   <p:sldSz cx="9144000" cy="6858000" type="screen4x3"/>
   <p:notesSz cx="6858000" cy="9144000"/>
@@ -1429,348 +1430,29 @@
           <a:lstStyle/>
           <a:p>
             <a:r>
-              <a:rPr lang="en-US" sz="1200" b="0" i="0" u="none" strike="noStrike" kern="1200" baseline="0" dirty="0" smtClean="0">
-                <a:solidFill>
-                  <a:schemeClr val="tx1"/>
-                </a:solidFill>
-                <a:latin typeface="+mn-lt"/>
-                <a:ea typeface="+mn-ea"/>
-                <a:cs typeface="+mn-cs"/>
-              </a:rPr>
-              <a:t>if </a:t>
-            </a:r>
-            <a:r>
-              <a:rPr lang="uk-UA" sz="1200" b="0" i="0" u="none" strike="noStrike" kern="1200" baseline="0" dirty="0" smtClean="0">
-                <a:solidFill>
-                  <a:schemeClr val="tx1"/>
-                </a:solidFill>
-                <a:latin typeface="+mn-lt"/>
-                <a:ea typeface="+mn-ea"/>
-                <a:cs typeface="+mn-cs"/>
-              </a:rPr>
-              <a:t>возвращает результат...</a:t>
-            </a:r>
-            <a:endParaRPr lang="en-US" sz="1200" b="0" i="0" u="none" strike="noStrike" kern="1200" baseline="0" dirty="0" smtClean="0">
-              <a:solidFill>
-                <a:schemeClr val="tx1"/>
-              </a:solidFill>
-              <a:latin typeface="+mn-lt"/>
-              <a:ea typeface="+mn-ea"/>
-              <a:cs typeface="+mn-cs"/>
-            </a:endParaRPr>
-          </a:p>
-          <a:p>
-            <a:r>
-              <a:rPr lang="en-US" sz="1200" b="0" i="0" u="none" strike="noStrike" kern="1200" baseline="0" dirty="0" smtClean="0">
-                <a:solidFill>
-                  <a:schemeClr val="tx1"/>
-                </a:solidFill>
-                <a:latin typeface="+mn-lt"/>
-                <a:ea typeface="+mn-ea"/>
-                <a:cs typeface="+mn-cs"/>
-              </a:rPr>
-              <a:t>let result =</a:t>
-            </a:r>
-          </a:p>
-          <a:p>
-            <a:r>
-              <a:rPr lang="en-US" sz="1200" b="0" i="0" u="none" strike="noStrike" kern="1200" baseline="0" dirty="0" smtClean="0">
-                <a:solidFill>
-                  <a:schemeClr val="tx1"/>
-                </a:solidFill>
-                <a:latin typeface="+mn-lt"/>
-                <a:ea typeface="+mn-ea"/>
-                <a:cs typeface="+mn-cs"/>
-              </a:rPr>
-              <a:t>     if x % 2 = 0 then</a:t>
-            </a:r>
-          </a:p>
-          <a:p>
-            <a:r>
-              <a:rPr lang="en-US" sz="1200" b="0" i="0" u="none" strike="noStrike" kern="1200" baseline="0" dirty="0" smtClean="0">
-                <a:solidFill>
-                  <a:schemeClr val="tx1"/>
-                </a:solidFill>
-                <a:latin typeface="+mn-lt"/>
-                <a:ea typeface="+mn-ea"/>
-                <a:cs typeface="+mn-cs"/>
-              </a:rPr>
-              <a:t>         "Yes it is"</a:t>
-            </a:r>
-          </a:p>
-          <a:p>
-            <a:r>
-              <a:rPr lang="en-US" sz="1200" b="0" i="0" u="none" strike="noStrike" kern="1200" baseline="0" dirty="0" smtClean="0">
-                <a:solidFill>
-                  <a:schemeClr val="tx1"/>
-                </a:solidFill>
-                <a:latin typeface="+mn-lt"/>
-                <a:ea typeface="+mn-ea"/>
-                <a:cs typeface="+mn-cs"/>
-              </a:rPr>
-              <a:t>     else</a:t>
-            </a:r>
-          </a:p>
-          <a:p>
-            <a:r>
-              <a:rPr lang="en-US" sz="1200" b="0" i="0" u="none" strike="noStrike" kern="1200" baseline="0" dirty="0" smtClean="0">
-                <a:solidFill>
-                  <a:schemeClr val="tx1"/>
-                </a:solidFill>
-                <a:latin typeface="+mn-lt"/>
-                <a:ea typeface="+mn-ea"/>
-                <a:cs typeface="+mn-cs"/>
-              </a:rPr>
-              <a:t>         "No it is not“</a:t>
-            </a:r>
-          </a:p>
-          <a:p>
-            <a:endParaRPr lang="en-US" sz="1200" b="0" i="0" u="none" strike="noStrike" kern="1200" baseline="0" dirty="0" smtClean="0">
-              <a:solidFill>
-                <a:schemeClr val="tx1"/>
-              </a:solidFill>
-              <a:latin typeface="+mn-lt"/>
-              <a:ea typeface="+mn-ea"/>
-              <a:cs typeface="+mn-cs"/>
-            </a:endParaRPr>
-          </a:p>
-          <a:p>
-            <a:r>
-              <a:rPr lang="uk-UA" sz="1200" b="0" i="0" u="none" strike="noStrike" kern="1200" baseline="0" dirty="0" smtClean="0">
-                <a:solidFill>
-                  <a:schemeClr val="tx1"/>
-                </a:solidFill>
-                <a:latin typeface="+mn-lt"/>
-                <a:ea typeface="+mn-ea"/>
-                <a:cs typeface="+mn-cs"/>
-              </a:rPr>
-              <a:t>Можно юзать конструтор.</a:t>
-            </a:r>
-          </a:p>
-          <a:p>
-            <a:r>
-              <a:rPr lang="en-US" sz="1200" b="0" i="0" u="none" strike="noStrike" kern="1200" baseline="0" dirty="0" smtClean="0">
-                <a:solidFill>
-                  <a:schemeClr val="tx1"/>
-                </a:solidFill>
-                <a:latin typeface="+mn-lt"/>
-                <a:ea typeface="+mn-ea"/>
-                <a:cs typeface="+mn-cs"/>
-              </a:rPr>
-              <a:t>type </a:t>
-            </a:r>
-            <a:r>
-              <a:rPr lang="en-US" sz="1200" b="0" i="0" u="none" strike="noStrike" kern="1200" baseline="0" dirty="0" err="1" smtClean="0">
-                <a:solidFill>
-                  <a:schemeClr val="tx1"/>
-                </a:solidFill>
-                <a:latin typeface="+mn-lt"/>
-                <a:ea typeface="+mn-ea"/>
-                <a:cs typeface="+mn-cs"/>
-              </a:rPr>
-              <a:t>SuperService</a:t>
-            </a:r>
-            <a:r>
-              <a:rPr lang="en-US" sz="1200" b="0" i="0" u="none" strike="noStrike" kern="1200" baseline="0" dirty="0" smtClean="0">
-                <a:solidFill>
-                  <a:schemeClr val="tx1"/>
-                </a:solidFill>
-                <a:latin typeface="+mn-lt"/>
-                <a:ea typeface="+mn-ea"/>
-                <a:cs typeface="+mn-cs"/>
-              </a:rPr>
-              <a:t>(dep1: IDep1) =</a:t>
-            </a:r>
-          </a:p>
-          <a:p>
-            <a:r>
-              <a:rPr lang="en-US" sz="1200" b="0" i="0" u="none" strike="noStrike" kern="1200" baseline="0" dirty="0" smtClean="0">
-                <a:solidFill>
-                  <a:schemeClr val="tx1"/>
-                </a:solidFill>
-                <a:latin typeface="+mn-lt"/>
-                <a:ea typeface="+mn-ea"/>
-                <a:cs typeface="+mn-cs"/>
-              </a:rPr>
-              <a:t>    let </a:t>
-            </a:r>
-            <a:r>
-              <a:rPr lang="en-US" sz="1200" b="0" i="0" u="none" strike="noStrike" kern="1200" baseline="0" dirty="0" err="1" smtClean="0">
-                <a:solidFill>
-                  <a:schemeClr val="tx1"/>
-                </a:solidFill>
-                <a:latin typeface="+mn-lt"/>
-                <a:ea typeface="+mn-ea"/>
-                <a:cs typeface="+mn-cs"/>
-              </a:rPr>
-              <a:t>doSometing</a:t>
-            </a:r>
-            <a:r>
-              <a:rPr lang="en-US" sz="1200" b="0" i="0" u="none" strike="noStrike" kern="1200" baseline="0" dirty="0" smtClean="0">
-                <a:solidFill>
-                  <a:schemeClr val="tx1"/>
-                </a:solidFill>
-                <a:latin typeface="+mn-lt"/>
-                <a:ea typeface="+mn-ea"/>
-                <a:cs typeface="+mn-cs"/>
-              </a:rPr>
-              <a:t> = ()</a:t>
-            </a:r>
-            <a:r>
-              <a:rPr lang="en-US" dirty="0" smtClean="0"/>
-              <a:t>	</a:t>
-            </a:r>
-            <a:endParaRPr lang="ru-RU" dirty="0" smtClean="0"/>
-          </a:p>
-          <a:p>
-            <a:endParaRPr lang="ru-RU" dirty="0" smtClean="0"/>
-          </a:p>
-          <a:p>
-            <a:r>
               <a:rPr lang="ru-RU" dirty="0" smtClean="0"/>
-              <a:t>Например </a:t>
-            </a:r>
-            <a:r>
-              <a:rPr lang="en-US" dirty="0" smtClean="0"/>
-              <a:t>record,</a:t>
+              <a:t>Для</a:t>
+            </a:r>
+            <a:r>
+              <a:rPr lang="ru-RU" baseline="0" dirty="0" smtClean="0"/>
+              <a:t> начала я покажу примерчик обычного </a:t>
             </a:r>
             <a:r>
               <a:rPr lang="en-US" baseline="0" dirty="0" smtClean="0"/>
-              <a:t> option</a:t>
-            </a:r>
-            <a:r>
-              <a:rPr lang="ru-RU" baseline="0" dirty="0" smtClean="0"/>
-              <a:t>, </a:t>
-            </a:r>
-            <a:r>
-              <a:rPr lang="en-US" sz="1200" b="0" i="0" u="none" strike="noStrike" kern="1200" baseline="0" dirty="0" smtClean="0">
-                <a:solidFill>
-                  <a:schemeClr val="tx1"/>
-                </a:solidFill>
-                <a:latin typeface="+mn-lt"/>
-                <a:ea typeface="+mn-ea"/>
-                <a:cs typeface="+mn-cs"/>
-              </a:rPr>
-              <a:t>discriminated unions</a:t>
-            </a:r>
-            <a:endParaRPr lang="ru-RU" baseline="0" dirty="0" smtClean="0"/>
-          </a:p>
-          <a:p>
-            <a:endParaRPr lang="ru-RU" baseline="0" dirty="0" smtClean="0"/>
-          </a:p>
-          <a:p>
+              <a:t>C# </a:t>
+            </a:r>
+            <a:r>
+              <a:rPr lang="uk-UA" baseline="0" dirty="0" smtClean="0"/>
+              <a:t>кода, переложеного один в один на </a:t>
+            </a:r>
             <a:r>
               <a:rPr lang="en-US" baseline="0" dirty="0" smtClean="0"/>
-              <a:t>type Person =</a:t>
-            </a:r>
-          </a:p>
-          <a:p>
-            <a:r>
-              <a:rPr lang="en-US" baseline="0" dirty="0" smtClean="0"/>
-              <a:t>| Boy of string</a:t>
-            </a:r>
-          </a:p>
-          <a:p>
-            <a:r>
-              <a:rPr lang="en-US" baseline="0" dirty="0" smtClean="0"/>
-              <a:t>| Girl of string</a:t>
-            </a:r>
-          </a:p>
-          <a:p>
-            <a:r>
-              <a:rPr lang="en-US" baseline="0" dirty="0" smtClean="0"/>
-              <a:t>| Couple of Person * Person</a:t>
-            </a:r>
-          </a:p>
-          <a:p>
-            <a:r>
-              <a:rPr lang="en-US" baseline="0" dirty="0" smtClean="0"/>
-              <a:t>static member (+) (lhs, </a:t>
-            </a:r>
-            <a:r>
-              <a:rPr lang="en-US" baseline="0" dirty="0" err="1" smtClean="0"/>
-              <a:t>rhs</a:t>
-            </a:r>
-            <a:r>
-              <a:rPr lang="en-US" baseline="0" dirty="0" smtClean="0"/>
-              <a:t>) =</a:t>
-            </a:r>
-          </a:p>
-          <a:p>
-            <a:r>
-              <a:rPr lang="en-US" baseline="0" dirty="0" smtClean="0"/>
-              <a:t>	match lhs, </a:t>
-            </a:r>
-            <a:r>
-              <a:rPr lang="en-US" baseline="0" dirty="0" err="1" smtClean="0"/>
-              <a:t>rhs</a:t>
-            </a:r>
-            <a:r>
-              <a:rPr lang="en-US" baseline="0" dirty="0" smtClean="0"/>
-              <a:t> with</a:t>
-            </a:r>
-          </a:p>
-          <a:p>
-            <a:r>
-              <a:rPr lang="en-US" baseline="0" dirty="0" smtClean="0"/>
-              <a:t>	| Couple(_), _ </a:t>
-            </a:r>
-            <a:endParaRPr lang="ru-RU" baseline="0" dirty="0" smtClean="0"/>
-          </a:p>
-          <a:p>
-            <a:r>
-              <a:rPr lang="ru-RU" baseline="0" dirty="0" smtClean="0"/>
-              <a:t>                   </a:t>
-            </a:r>
-            <a:r>
-              <a:rPr lang="en-US" baseline="0" dirty="0" smtClean="0"/>
-              <a:t>| _, Couple(_) </a:t>
-            </a:r>
-            <a:endParaRPr lang="ru-RU" baseline="0" dirty="0" smtClean="0"/>
-          </a:p>
-          <a:p>
-            <a:r>
-              <a:rPr lang="ru-RU" baseline="0" dirty="0" smtClean="0"/>
-              <a:t>		</a:t>
-            </a:r>
-            <a:r>
-              <a:rPr lang="en-US" baseline="0" dirty="0" smtClean="0"/>
-              <a:t>-&gt; </a:t>
-            </a:r>
-            <a:r>
-              <a:rPr lang="en-US" baseline="0" dirty="0" err="1" smtClean="0"/>
-              <a:t>failwith</a:t>
-            </a:r>
-            <a:r>
-              <a:rPr lang="en-US" baseline="0" dirty="0" smtClean="0"/>
-              <a:t> "</a:t>
-            </a:r>
-            <a:r>
-              <a:rPr lang="ru-RU" baseline="0" dirty="0" smtClean="0"/>
-              <a:t>Гм... шведская семья детектед"</a:t>
-            </a:r>
-          </a:p>
-          <a:p>
-            <a:r>
-              <a:rPr lang="ru-RU" baseline="0" dirty="0" smtClean="0"/>
-              <a:t>	| _ -&gt; </a:t>
-            </a:r>
-            <a:r>
-              <a:rPr lang="en-US" baseline="0" dirty="0" smtClean="0"/>
-              <a:t>Couple(lhs, </a:t>
-            </a:r>
-            <a:r>
-              <a:rPr lang="en-US" baseline="0" dirty="0" err="1" smtClean="0"/>
-              <a:t>rhs</a:t>
-            </a:r>
-            <a:r>
-              <a:rPr lang="en-US" baseline="0" dirty="0" smtClean="0"/>
-              <a:t>)</a:t>
-            </a:r>
-            <a:endParaRPr lang="ru-RU" baseline="0" dirty="0" smtClean="0"/>
-          </a:p>
-          <a:p>
-            <a:endParaRPr lang="ru-RU" baseline="0" dirty="0" smtClean="0"/>
+              <a:t>F#.</a:t>
+            </a:r>
+            <a:endParaRPr lang="uk-UA" baseline="0" dirty="0" smtClean="0"/>
+          </a:p>
+          <a:p>
+            <a:endParaRPr lang="uk-UA" baseline="0" dirty="0" smtClean="0"/>
           </a:p>
           <a:p>
             <a:pPr marL="0" marR="0" indent="0" algn="l" defTabSz="914400" rtl="0" eaLnBrk="1" fontAlgn="auto" latinLnBrk="0" hangingPunct="1">
@@ -1792,25 +1474,10 @@
             </a:pPr>
             <a:r>
               <a:rPr lang="uk-UA" baseline="0" dirty="0" smtClean="0"/>
-              <a:t>Асинхронно скачать, потом чето асинхронно скачать еще раз.</a:t>
-            </a:r>
-            <a:endParaRPr lang="en-US" dirty="0" smtClean="0"/>
-          </a:p>
-          <a:p>
-            <a:endParaRPr lang="en-US" baseline="0" dirty="0" smtClean="0"/>
-          </a:p>
-          <a:p>
-            <a:r>
-              <a:rPr lang="uk-UA" baseline="0" dirty="0" smtClean="0"/>
-              <a:t>Типизированность</a:t>
-            </a:r>
-          </a:p>
-          <a:p>
-            <a:endParaRPr lang="uk-UA" baseline="0" dirty="0" smtClean="0"/>
-          </a:p>
-          <a:p>
-            <a:r>
-              <a:rPr lang="en-US" sz="1200" b="0" i="0" u="none" strike="noStrike" kern="1200" baseline="0" dirty="0" smtClean="0">
+              <a:t>(Пример с </a:t>
+            </a:r>
+            <a:r>
+              <a:rPr lang="en-US" sz="1200" kern="1200" dirty="0" err="1" smtClean="0">
                 <a:solidFill>
                   <a:schemeClr val="tx1"/>
                 </a:solidFill>
@@ -1818,9 +1485,65 @@
                 <a:ea typeface="+mn-ea"/>
                 <a:cs typeface="+mn-cs"/>
               </a:rPr>
-              <a:t>Object Expressions</a:t>
-            </a:r>
+              <a:t>TableCreator</a:t>
+            </a:r>
+            <a:r>
+              <a:rPr lang="uk-UA" sz="1200" kern="1200" baseline="0" dirty="0" smtClean="0">
+                <a:solidFill>
+                  <a:schemeClr val="tx1"/>
+                </a:solidFill>
+                <a:latin typeface="+mn-lt"/>
+                <a:ea typeface="+mn-ea"/>
+                <a:cs typeface="+mn-cs"/>
+              </a:rPr>
+              <a:t> на </a:t>
+            </a:r>
+            <a:r>
+              <a:rPr lang="en-US" sz="1200" kern="1200" baseline="0" dirty="0" smtClean="0">
+                <a:solidFill>
+                  <a:schemeClr val="tx1"/>
+                </a:solidFill>
+                <a:latin typeface="+mn-lt"/>
+                <a:ea typeface="+mn-ea"/>
+                <a:cs typeface="+mn-cs"/>
+              </a:rPr>
+              <a:t>SMO</a:t>
+            </a:r>
+            <a:r>
+              <a:rPr lang="uk-UA" baseline="0" dirty="0" smtClean="0"/>
+              <a:t>)</a:t>
+            </a:r>
+            <a:endParaRPr lang="en-US" baseline="0" dirty="0" smtClean="0"/>
+          </a:p>
+          <a:p>
             <a:endParaRPr lang="uk-UA" baseline="0" dirty="0" smtClean="0"/>
+          </a:p>
+          <a:p>
+            <a:r>
+              <a:rPr lang="uk-UA" baseline="0" dirty="0" smtClean="0"/>
+              <a:t>Изменения больше косметические... Это я к тому что начинать с </a:t>
+            </a:r>
+            <a:r>
+              <a:rPr lang="en-US" baseline="0" dirty="0" smtClean="0"/>
+              <a:t>F# </a:t>
+            </a:r>
+            <a:r>
+              <a:rPr lang="uk-UA" baseline="0" dirty="0" smtClean="0"/>
+              <a:t>достаточно легко.</a:t>
+            </a:r>
+            <a:r>
+              <a:rPr lang="en-US" baseline="0" dirty="0" smtClean="0"/>
+              <a:t> </a:t>
+            </a:r>
+            <a:r>
+              <a:rPr lang="ru-RU" baseline="0" dirty="0" smtClean="0"/>
+              <a:t>Особенно если используется знакомое </a:t>
+            </a:r>
+            <a:r>
+              <a:rPr lang="ru-RU" baseline="0" smtClean="0"/>
+              <a:t>АПИ.</a:t>
+            </a:r>
+            <a:endParaRPr lang="en-US" baseline="0" dirty="0" smtClean="0"/>
           </a:p>
         </p:txBody>
       </p:sp>
@@ -1850,7 +1573,7 @@
     </p:spTree>
     <p:extLst>
       <p:ext uri="{BB962C8B-B14F-4D97-AF65-F5344CB8AC3E}">
-        <p14:creationId xmlns:p14="http://schemas.microsoft.com/office/powerpoint/2010/main" val="289005074"/>
+        <p14:creationId xmlns:p14="http://schemas.microsoft.com/office/powerpoint/2010/main" val="1298918946"/>
       </p:ext>
     </p:extLst>
   </p:cSld>
@@ -1905,73 +1628,7 @@
           <a:lstStyle/>
           <a:p>
             <a:r>
-              <a:rPr lang="ru-RU" dirty="0" smtClean="0"/>
-              <a:t>В </a:t>
-            </a:r>
-            <a:r>
-              <a:rPr lang="en-US" dirty="0" smtClean="0"/>
-              <a:t>F#</a:t>
-            </a:r>
-            <a:r>
-              <a:rPr lang="en-US" baseline="0" dirty="0" smtClean="0"/>
-              <a:t> </a:t>
-            </a:r>
-            <a:r>
-              <a:rPr lang="uk-UA" baseline="0" dirty="0" smtClean="0"/>
-              <a:t>большое значние имеет положение файла в проекте. Они компилятся последовательно. Соотвевенно если клас дефайнится позже, его никто не найдет.</a:t>
-            </a:r>
-          </a:p>
-          <a:p>
-            <a:endParaRPr lang="uk-UA" baseline="0" dirty="0" smtClean="0"/>
-          </a:p>
-          <a:p>
-            <a:r>
-              <a:rPr lang="uk-UA" baseline="0" dirty="0" smtClean="0"/>
-              <a:t>Интеграция со студией так себе... Нема рефакторингов. Нема папок.</a:t>
-            </a:r>
-          </a:p>
-          <a:p>
-            <a:endParaRPr lang="uk-UA" baseline="0" dirty="0" smtClean="0"/>
-          </a:p>
-          <a:p>
-            <a:r>
-              <a:rPr lang="uk-UA" baseline="0" dirty="0" smtClean="0"/>
-              <a:t>Нема автоматического приведения типов. </a:t>
-            </a:r>
-            <a:r>
-              <a:rPr lang="en-US" baseline="0" dirty="0" smtClean="0"/>
-              <a:t>let s : </a:t>
-            </a:r>
-            <a:r>
-              <a:rPr lang="en-US" baseline="0" dirty="0" err="1" smtClean="0"/>
-              <a:t>int</a:t>
-            </a:r>
-            <a:r>
-              <a:rPr lang="en-US" baseline="0" dirty="0" smtClean="0"/>
-              <a:t> = 12.5m </a:t>
-            </a:r>
-            <a:r>
-              <a:rPr lang="uk-UA" baseline="0" dirty="0" smtClean="0"/>
-              <a:t>не будет работать.</a:t>
-            </a:r>
-            <a:endParaRPr lang="en-US" baseline="0" dirty="0" smtClean="0"/>
-          </a:p>
-          <a:p>
-            <a:endParaRPr lang="en-US" baseline="0" dirty="0" smtClean="0"/>
-          </a:p>
-          <a:p>
-            <a:r>
-              <a:rPr lang="uk-UA" baseline="0" dirty="0" smtClean="0"/>
-              <a:t>Два костыля. У в</a:t>
-            </a:r>
-            <a:r>
-              <a:rPr lang="ru-RU" baseline="0" dirty="0" smtClean="0"/>
-              <a:t>ывода типов есть маленькая проблемка, это рекурсия. Как можно вывести что-то, чего пока нет? Еще смешнее ситуация когда двойная рекурсия, метод1 вызывает метод2, который в свою очередь вызывает метод 1...</a:t>
-            </a:r>
-          </a:p>
-          <a:p>
-            <a:r>
-              <a:rPr lang="pt-BR" sz="1200" b="0" i="0" u="none" strike="noStrike" kern="1200" baseline="0" dirty="0" smtClean="0">
+              <a:rPr lang="en-US" sz="1200" b="0" i="0" u="none" strike="noStrike" kern="1200" baseline="0" dirty="0" smtClean="0">
                 <a:solidFill>
                   <a:schemeClr val="tx1"/>
                 </a:solidFill>
@@ -1979,10 +1636,10 @@
                 <a:ea typeface="+mn-ea"/>
                 <a:cs typeface="+mn-cs"/>
               </a:rPr>
-              <a:t>let </a:t>
-            </a:r>
-            <a:r>
-              <a:rPr lang="pt-BR" sz="1200" b="1" i="0" u="none" strike="noStrike" kern="1200" baseline="0" dirty="0" smtClean="0">
+              <a:t>if </a:t>
+            </a:r>
+            <a:r>
+              <a:rPr lang="uk-UA" sz="1200" b="0" i="0" u="none" strike="noStrike" kern="1200" baseline="0" dirty="0" smtClean="0">
                 <a:solidFill>
                   <a:schemeClr val="tx1"/>
                 </a:solidFill>
@@ -1990,10 +1647,20 @@
                 <a:ea typeface="+mn-ea"/>
                 <a:cs typeface="+mn-cs"/>
               </a:rPr>
-              <a:t>rec </a:t>
-            </a:r>
-            <a:r>
-              <a:rPr lang="pt-BR" sz="1200" b="0" i="0" u="none" strike="noStrike" kern="1200" baseline="0" dirty="0" smtClean="0">
+              <a:t>возвращает результат...</a:t>
+            </a:r>
+            <a:endParaRPr lang="en-US" sz="1200" b="0" i="0" u="none" strike="noStrike" kern="1200" baseline="0" dirty="0" smtClean="0">
+              <a:solidFill>
+                <a:schemeClr val="tx1"/>
+              </a:solidFill>
+              <a:latin typeface="+mn-lt"/>
+              <a:ea typeface="+mn-ea"/>
+              <a:cs typeface="+mn-cs"/>
+            </a:endParaRPr>
+          </a:p>
+          <a:p>
+            <a:r>
+              <a:rPr lang="en-US" sz="1200" b="0" i="0" u="none" strike="noStrike" kern="1200" baseline="0" dirty="0" smtClean="0">
                 <a:solidFill>
                   <a:schemeClr val="tx1"/>
                 </a:solidFill>
@@ -2001,12 +1668,12 @@
                 <a:ea typeface="+mn-ea"/>
                 <a:cs typeface="+mn-cs"/>
               </a:rPr>
-              <a:t>isOdd n = (n = 1) || isEven (n - 1)</a:t>
-            </a:r>
-          </a:p>
-          <a:p>
-            <a:r>
-              <a:rPr lang="pt-BR" sz="1200" b="1" i="0" u="none" strike="noStrike" kern="1200" baseline="0" dirty="0" smtClean="0">
+              <a:t>let result =</a:t>
+            </a:r>
+          </a:p>
+          <a:p>
+            <a:r>
+              <a:rPr lang="en-US" sz="1200" b="0" i="0" u="none" strike="noStrike" kern="1200" baseline="0" dirty="0" smtClean="0">
                 <a:solidFill>
                   <a:schemeClr val="tx1"/>
                 </a:solidFill>
@@ -2014,10 +1681,12 @@
                 <a:ea typeface="+mn-ea"/>
                 <a:cs typeface="+mn-cs"/>
               </a:rPr>
-              <a:t>and </a:t>
-            </a:r>
-            <a:r>
-              <a:rPr lang="pt-BR" sz="1200" b="0" i="0" u="none" strike="noStrike" kern="1200" baseline="0" dirty="0" smtClean="0">
+              <a:t>     if x % 2 = 0 then</a:t>
+            </a:r>
+          </a:p>
+          <a:p>
+            <a:r>
+              <a:rPr lang="en-US" sz="1200" b="0" i="0" u="none" strike="noStrike" kern="1200" baseline="0" dirty="0" smtClean="0">
                 <a:solidFill>
                   <a:schemeClr val="tx1"/>
                 </a:solidFill>
@@ -2025,9 +1694,37 @@
                 <a:ea typeface="+mn-ea"/>
                 <a:cs typeface="+mn-cs"/>
               </a:rPr>
-              <a:t>isEven n = (n = 0) || isOdd (n - 1)</a:t>
-            </a:r>
-            <a:endParaRPr lang="ru-RU" sz="1200" b="0" i="0" u="none" strike="noStrike" kern="1200" baseline="0" dirty="0" smtClean="0">
+              <a:t>         "Yes it is"</a:t>
+            </a:r>
+          </a:p>
+          <a:p>
+            <a:r>
+              <a:rPr lang="en-US" sz="1200" b="0" i="0" u="none" strike="noStrike" kern="1200" baseline="0" dirty="0" smtClean="0">
+                <a:solidFill>
+                  <a:schemeClr val="tx1"/>
+                </a:solidFill>
+                <a:latin typeface="+mn-lt"/>
+                <a:ea typeface="+mn-ea"/>
+                <a:cs typeface="+mn-cs"/>
+              </a:rPr>
+              <a:t>     else</a:t>
+            </a:r>
+          </a:p>
+          <a:p>
+            <a:r>
+              <a:rPr lang="en-US" sz="1200" b="0" i="0" u="none" strike="noStrike" kern="1200" baseline="0" dirty="0" smtClean="0">
+                <a:solidFill>
+                  <a:schemeClr val="tx1"/>
+                </a:solidFill>
+                <a:latin typeface="+mn-lt"/>
+                <a:ea typeface="+mn-ea"/>
+                <a:cs typeface="+mn-cs"/>
+              </a:rPr>
+              <a:t>         "No it is not“</a:t>
+            </a:r>
+          </a:p>
+          <a:p>
+            <a:endParaRPr lang="en-US" sz="1200" b="0" i="0" u="none" strike="noStrike" kern="1200" baseline="0" dirty="0" smtClean="0">
               <a:solidFill>
                 <a:schemeClr val="tx1"/>
               </a:solidFill>
@@ -2037,18 +1734,8 @@
             </a:endParaRPr>
           </a:p>
           <a:p>
-            <a:endParaRPr lang="ru-RU" sz="1200" b="0" i="0" u="none" strike="noStrike" kern="1200" baseline="0" dirty="0" smtClean="0">
-              <a:solidFill>
-                <a:schemeClr val="tx1"/>
-              </a:solidFill>
-              <a:latin typeface="+mn-lt"/>
-              <a:ea typeface="+mn-ea"/>
-              <a:cs typeface="+mn-cs"/>
-            </a:endParaRPr>
-          </a:p>
-          <a:p>
-            <a:r>
-              <a:rPr lang="ru-RU" sz="1200" b="0" i="0" u="none" strike="noStrike" kern="1200" baseline="0" smtClean="0">
+            <a:r>
+              <a:rPr lang="uk-UA" sz="1200" b="0" i="0" u="none" strike="noStrike" kern="1200" baseline="0" dirty="0" smtClean="0">
                 <a:solidFill>
                   <a:schemeClr val="tx1"/>
                 </a:solidFill>
@@ -2056,9 +1743,283 @@
                 <a:ea typeface="+mn-ea"/>
                 <a:cs typeface="+mn-cs"/>
               </a:rPr>
-              <a:t>Непонятно где писать с маленькой буквы, где с большой.</a:t>
-            </a:r>
-            <a:endParaRPr lang="uk-UA" dirty="0"/>
+              <a:t>Можно юзать конструтор.</a:t>
+            </a:r>
+          </a:p>
+          <a:p>
+            <a:r>
+              <a:rPr lang="en-US" sz="1200" b="0" i="0" u="none" strike="noStrike" kern="1200" baseline="0" dirty="0" smtClean="0">
+                <a:solidFill>
+                  <a:schemeClr val="tx1"/>
+                </a:solidFill>
+                <a:latin typeface="+mn-lt"/>
+                <a:ea typeface="+mn-ea"/>
+                <a:cs typeface="+mn-cs"/>
+              </a:rPr>
+              <a:t>type </a:t>
+            </a:r>
+            <a:r>
+              <a:rPr lang="en-US" sz="1200" b="0" i="0" u="none" strike="noStrike" kern="1200" baseline="0" dirty="0" err="1" smtClean="0">
+                <a:solidFill>
+                  <a:schemeClr val="tx1"/>
+                </a:solidFill>
+                <a:latin typeface="+mn-lt"/>
+                <a:ea typeface="+mn-ea"/>
+                <a:cs typeface="+mn-cs"/>
+              </a:rPr>
+              <a:t>SuperService</a:t>
+            </a:r>
+            <a:r>
+              <a:rPr lang="en-US" sz="1200" b="0" i="0" u="none" strike="noStrike" kern="1200" baseline="0" dirty="0" smtClean="0">
+                <a:solidFill>
+                  <a:schemeClr val="tx1"/>
+                </a:solidFill>
+                <a:latin typeface="+mn-lt"/>
+                <a:ea typeface="+mn-ea"/>
+                <a:cs typeface="+mn-cs"/>
+              </a:rPr>
+              <a:t>(dep1: IDep1) =</a:t>
+            </a:r>
+          </a:p>
+          <a:p>
+            <a:r>
+              <a:rPr lang="en-US" sz="1200" b="0" i="0" u="none" strike="noStrike" kern="1200" baseline="0" dirty="0" smtClean="0">
+                <a:solidFill>
+                  <a:schemeClr val="tx1"/>
+                </a:solidFill>
+                <a:latin typeface="+mn-lt"/>
+                <a:ea typeface="+mn-ea"/>
+                <a:cs typeface="+mn-cs"/>
+              </a:rPr>
+              <a:t>    let </a:t>
+            </a:r>
+            <a:r>
+              <a:rPr lang="en-US" sz="1200" b="0" i="0" u="none" strike="noStrike" kern="1200" baseline="0" dirty="0" err="1" smtClean="0">
+                <a:solidFill>
+                  <a:schemeClr val="tx1"/>
+                </a:solidFill>
+                <a:latin typeface="+mn-lt"/>
+                <a:ea typeface="+mn-ea"/>
+                <a:cs typeface="+mn-cs"/>
+              </a:rPr>
+              <a:t>doSometing</a:t>
+            </a:r>
+            <a:r>
+              <a:rPr lang="en-US" sz="1200" b="0" i="0" u="none" strike="noStrike" kern="1200" baseline="0" dirty="0" smtClean="0">
+                <a:solidFill>
+                  <a:schemeClr val="tx1"/>
+                </a:solidFill>
+                <a:latin typeface="+mn-lt"/>
+                <a:ea typeface="+mn-ea"/>
+                <a:cs typeface="+mn-cs"/>
+              </a:rPr>
+              <a:t> = ()</a:t>
+            </a:r>
+            <a:r>
+              <a:rPr lang="en-US" dirty="0" smtClean="0"/>
+              <a:t>	</a:t>
+            </a:r>
+            <a:endParaRPr lang="ru-RU" dirty="0" smtClean="0"/>
+          </a:p>
+          <a:p>
+            <a:endParaRPr lang="ru-RU" dirty="0" smtClean="0"/>
+          </a:p>
+          <a:p>
+            <a:r>
+              <a:rPr lang="ru-RU" dirty="0" smtClean="0"/>
+              <a:t>Например </a:t>
+            </a:r>
+            <a:r>
+              <a:rPr lang="en-US" dirty="0" smtClean="0"/>
+              <a:t>record,</a:t>
+            </a:r>
+            <a:r>
+              <a:rPr lang="en-US" baseline="0" dirty="0" smtClean="0"/>
+              <a:t> option</a:t>
+            </a:r>
+            <a:r>
+              <a:rPr lang="ru-RU" baseline="0" dirty="0" smtClean="0"/>
+              <a:t>, </a:t>
+            </a:r>
+            <a:r>
+              <a:rPr lang="en-US" sz="1200" b="0" i="0" u="none" strike="noStrike" kern="1200" baseline="0" dirty="0" smtClean="0">
+                <a:solidFill>
+                  <a:schemeClr val="tx1"/>
+                </a:solidFill>
+                <a:latin typeface="+mn-lt"/>
+                <a:ea typeface="+mn-ea"/>
+                <a:cs typeface="+mn-cs"/>
+              </a:rPr>
+              <a:t>discriminated unions</a:t>
+            </a:r>
+            <a:endParaRPr lang="ru-RU" baseline="0" dirty="0" smtClean="0"/>
+          </a:p>
+          <a:p>
+            <a:endParaRPr lang="ru-RU" baseline="0" dirty="0" smtClean="0"/>
+          </a:p>
+          <a:p>
+            <a:r>
+              <a:rPr lang="en-US" baseline="0" dirty="0" smtClean="0"/>
+              <a:t>type Person =</a:t>
+            </a:r>
+          </a:p>
+          <a:p>
+            <a:r>
+              <a:rPr lang="en-US" baseline="0" dirty="0" smtClean="0"/>
+              <a:t>| Boy of string</a:t>
+            </a:r>
+          </a:p>
+          <a:p>
+            <a:r>
+              <a:rPr lang="en-US" baseline="0" dirty="0" smtClean="0"/>
+              <a:t>| Girl of string</a:t>
+            </a:r>
+          </a:p>
+          <a:p>
+            <a:r>
+              <a:rPr lang="en-US" baseline="0" dirty="0" smtClean="0"/>
+              <a:t>| Couple of Person * Person</a:t>
+            </a:r>
+          </a:p>
+          <a:p>
+            <a:r>
+              <a:rPr lang="en-US" baseline="0" dirty="0" smtClean="0"/>
+              <a:t>static member (+) (lhs, </a:t>
+            </a:r>
+            <a:r>
+              <a:rPr lang="en-US" baseline="0" dirty="0" err="1" smtClean="0"/>
+              <a:t>rhs</a:t>
+            </a:r>
+            <a:r>
+              <a:rPr lang="en-US" baseline="0" dirty="0" smtClean="0"/>
+              <a:t>) =</a:t>
+            </a:r>
+          </a:p>
+          <a:p>
+            <a:r>
+              <a:rPr lang="en-US" baseline="0" dirty="0" smtClean="0"/>
+              <a:t>	match lhs, </a:t>
+            </a:r>
+            <a:r>
+              <a:rPr lang="en-US" baseline="0" dirty="0" err="1" smtClean="0"/>
+              <a:t>rhs</a:t>
+            </a:r>
+            <a:r>
+              <a:rPr lang="en-US" baseline="0" dirty="0" smtClean="0"/>
+              <a:t> with</a:t>
+            </a:r>
+          </a:p>
+          <a:p>
+            <a:r>
+              <a:rPr lang="en-US" baseline="0" dirty="0" smtClean="0"/>
+              <a:t>	| Couple(_), _ </a:t>
+            </a:r>
+            <a:endParaRPr lang="ru-RU" baseline="0" dirty="0" smtClean="0"/>
+          </a:p>
+          <a:p>
+            <a:r>
+              <a:rPr lang="ru-RU" baseline="0" dirty="0" smtClean="0"/>
+              <a:t>                   </a:t>
+            </a:r>
+            <a:r>
+              <a:rPr lang="en-US" baseline="0" dirty="0" smtClean="0"/>
+              <a:t>| _, Couple(_) </a:t>
+            </a:r>
+            <a:endParaRPr lang="ru-RU" baseline="0" dirty="0" smtClean="0"/>
+          </a:p>
+          <a:p>
+            <a:r>
+              <a:rPr lang="ru-RU" baseline="0" dirty="0" smtClean="0"/>
+              <a:t>		</a:t>
+            </a:r>
+            <a:r>
+              <a:rPr lang="en-US" baseline="0" dirty="0" smtClean="0"/>
+              <a:t>-&gt; </a:t>
+            </a:r>
+            <a:r>
+              <a:rPr lang="en-US" baseline="0" dirty="0" err="1" smtClean="0"/>
+              <a:t>failwith</a:t>
+            </a:r>
+            <a:r>
+              <a:rPr lang="en-US" baseline="0" dirty="0" smtClean="0"/>
+              <a:t> "</a:t>
+            </a:r>
+            <a:r>
+              <a:rPr lang="ru-RU" baseline="0" dirty="0" smtClean="0"/>
+              <a:t>Гм... шведская семья детектед"</a:t>
+            </a:r>
+          </a:p>
+          <a:p>
+            <a:r>
+              <a:rPr lang="ru-RU" baseline="0" dirty="0" smtClean="0"/>
+              <a:t>	| _ -&gt; </a:t>
+            </a:r>
+            <a:r>
+              <a:rPr lang="en-US" baseline="0" dirty="0" smtClean="0"/>
+              <a:t>Couple(lhs, </a:t>
+            </a:r>
+            <a:r>
+              <a:rPr lang="en-US" baseline="0" dirty="0" err="1" smtClean="0"/>
+              <a:t>rhs</a:t>
+            </a:r>
+            <a:r>
+              <a:rPr lang="en-US" baseline="0" dirty="0" smtClean="0"/>
+              <a:t>)</a:t>
+            </a:r>
+            <a:endParaRPr lang="ru-RU" baseline="0" dirty="0" smtClean="0"/>
+          </a:p>
+          <a:p>
+            <a:endParaRPr lang="ru-RU" baseline="0" dirty="0" smtClean="0"/>
+          </a:p>
+          <a:p>
+            <a:pPr marL="0" marR="0" indent="0" algn="l" defTabSz="914400" rtl="0" eaLnBrk="1" fontAlgn="auto" latinLnBrk="0" hangingPunct="1">
+              <a:lnSpc>
+                <a:spcPct val="100000"/>
+              </a:lnSpc>
+              <a:spcBef>
+                <a:spcPts val="0"/>
+              </a:spcBef>
+              <a:spcAft>
+                <a:spcPts val="0"/>
+              </a:spcAft>
+              <a:buClrTx/>
+              <a:buSzTx/>
+              <a:buFontTx/>
+              <a:buNone/>
+              <a:tabLst/>
+              <a:defRPr/>
+            </a:pPr>
+            <a:r>
+              <a:rPr lang="uk-UA" baseline="0" dirty="0" smtClean="0"/>
+              <a:t>Асинхронно скачать, потом чето асинхронно скачать еще раз.</a:t>
+            </a:r>
+            <a:endParaRPr lang="en-US" dirty="0" smtClean="0"/>
+          </a:p>
+          <a:p>
+            <a:endParaRPr lang="en-US" baseline="0" dirty="0" smtClean="0"/>
+          </a:p>
+          <a:p>
+            <a:r>
+              <a:rPr lang="uk-UA" baseline="0" dirty="0" smtClean="0"/>
+              <a:t>Типизированность</a:t>
+            </a:r>
+          </a:p>
+          <a:p>
+            <a:endParaRPr lang="uk-UA" baseline="0" dirty="0" smtClean="0"/>
+          </a:p>
+          <a:p>
+            <a:r>
+              <a:rPr lang="en-US" sz="1200" b="0" i="0" u="none" strike="noStrike" kern="1200" baseline="0" dirty="0" smtClean="0">
+                <a:solidFill>
+                  <a:schemeClr val="tx1"/>
+                </a:solidFill>
+                <a:latin typeface="+mn-lt"/>
+                <a:ea typeface="+mn-ea"/>
+                <a:cs typeface="+mn-cs"/>
+              </a:rPr>
+              <a:t>Object Expressions</a:t>
+            </a:r>
+            <a:endParaRPr lang="uk-UA" baseline="0" dirty="0" smtClean="0"/>
           </a:p>
         </p:txBody>
       </p:sp>
@@ -2088,7 +2049,7 @@
     </p:spTree>
     <p:extLst>
       <p:ext uri="{BB962C8B-B14F-4D97-AF65-F5344CB8AC3E}">
-        <p14:creationId xmlns:p14="http://schemas.microsoft.com/office/powerpoint/2010/main" val="3345246252"/>
+        <p14:creationId xmlns:p14="http://schemas.microsoft.com/office/powerpoint/2010/main" val="289005074"/>
       </p:ext>
     </p:extLst>
   </p:cSld>
@@ -2143,135 +2104,160 @@
           <a:lstStyle/>
           <a:p>
             <a:r>
+              <a:rPr lang="ru-RU" dirty="0" smtClean="0"/>
+              <a:t>В </a:t>
+            </a:r>
+            <a:r>
+              <a:rPr lang="en-US" dirty="0" smtClean="0"/>
+              <a:t>F#</a:t>
+            </a:r>
+            <a:r>
+              <a:rPr lang="en-US" baseline="0" dirty="0" smtClean="0"/>
+              <a:t> </a:t>
+            </a:r>
+            <a:r>
               <a:rPr lang="uk-UA" baseline="0" dirty="0" smtClean="0"/>
-              <a:t>Офф, сайт. Ловить там правда нечего. А так это редирект на </a:t>
+              <a:t>большое значние имеет положение файла в проекте. Они компилятся последовательно. Соотвевенно если клас дефайнится позже, его никто не найдет.</a:t>
+            </a:r>
+          </a:p>
+          <a:p>
+            <a:endParaRPr lang="uk-UA" baseline="0" dirty="0" smtClean="0"/>
+          </a:p>
+          <a:p>
+            <a:r>
+              <a:rPr lang="uk-UA" baseline="0" dirty="0" smtClean="0"/>
+              <a:t>Интеграция со студией так себе... Нема рефакторингов. Нема папок.</a:t>
+            </a:r>
+          </a:p>
+          <a:p>
+            <a:endParaRPr lang="uk-UA" baseline="0" dirty="0" smtClean="0"/>
+          </a:p>
+          <a:p>
+            <a:r>
+              <a:rPr lang="uk-UA" baseline="0" dirty="0" smtClean="0"/>
+              <a:t>Нема автоматического приведения типов. </a:t>
             </a:r>
             <a:r>
               <a:rPr lang="en-US" baseline="0" dirty="0" smtClean="0"/>
-              <a:t>MSDN </a:t>
+              <a:t>let s : </a:t>
+            </a:r>
+            <a:r>
+              <a:rPr lang="en-US" baseline="0" dirty="0" err="1" smtClean="0"/>
+              <a:t>int</a:t>
+            </a:r>
+            <a:r>
+              <a:rPr lang="en-US" baseline="0" dirty="0" smtClean="0"/>
+              <a:t> = 12.5m </a:t>
             </a:r>
             <a:r>
               <a:rPr lang="uk-UA" baseline="0" dirty="0" smtClean="0"/>
-              <a:t>раздел </a:t>
-            </a:r>
-            <a:r>
-              <a:rPr lang="en-US" baseline="0" dirty="0" smtClean="0"/>
-              <a:t>F#.</a:t>
-            </a:r>
-            <a:endParaRPr lang="uk-UA" baseline="0" dirty="0" smtClean="0"/>
-          </a:p>
-          <a:p>
-            <a:endParaRPr lang="uk-UA" baseline="0" dirty="0" smtClean="0"/>
+              <a:t>не будет работать.</a:t>
+            </a:r>
+            <a:endParaRPr lang="en-US" baseline="0" dirty="0" smtClean="0"/>
+          </a:p>
+          <a:p>
+            <a:endParaRPr lang="en-US" baseline="0" dirty="0" smtClean="0"/>
           </a:p>
           <a:p>
             <a:r>
               <a:rPr lang="uk-UA" baseline="0" dirty="0" smtClean="0"/>
-              <a:t>Я б</a:t>
+              <a:t>Два костыля. У в</a:t>
             </a:r>
             <a:r>
               <a:rPr lang="ru-RU" baseline="0" dirty="0" smtClean="0"/>
-              <a:t>ы</a:t>
-            </a:r>
-            <a:r>
-              <a:rPr lang="uk-UA" baseline="0" dirty="0" smtClean="0"/>
-              <a:t> начал </a:t>
-            </a:r>
-            <a:r>
-              <a:rPr lang="en-US" baseline="0" dirty="0" err="1" smtClean="0"/>
-              <a:t>hubfs</a:t>
-            </a:r>
-            <a:r>
-              <a:rPr lang="en-US" baseline="0" dirty="0" smtClean="0"/>
-              <a:t>.. </a:t>
-            </a:r>
-            <a:r>
-              <a:rPr lang="uk-UA" baseline="0" dirty="0" smtClean="0"/>
-              <a:t>Кумутити подавала надежд</a:t>
-            </a:r>
-            <a:r>
-              <a:rPr lang="ru-RU" baseline="0" dirty="0" smtClean="0"/>
-              <a:t>ы. К сожалению щас сдохла... По этому </a:t>
-            </a:r>
-            <a:r>
-              <a:rPr lang="en-US" baseline="0" dirty="0" smtClean="0"/>
-              <a:t>stackoverflow.com. </a:t>
-            </a:r>
-            <a:r>
-              <a:rPr lang="uk-UA" baseline="0" dirty="0" smtClean="0"/>
-              <a:t>Многие из тех что могут ответить мониторят оба ресурса.</a:t>
-            </a:r>
-          </a:p>
-          <a:p>
-            <a:endParaRPr lang="uk-UA" baseline="0" dirty="0" smtClean="0"/>
-          </a:p>
-          <a:p>
-            <a:r>
-              <a:rPr lang="uk-UA" baseline="0" dirty="0" smtClean="0"/>
-              <a:t>Более или мение официальн</a:t>
-            </a:r>
-            <a:r>
-              <a:rPr lang="ru-RU" baseline="0" dirty="0" smtClean="0"/>
-              <a:t>ый хештаг...</a:t>
-            </a:r>
-          </a:p>
-          <a:p>
-            <a:endParaRPr lang="ru-RU" baseline="0" dirty="0" smtClean="0"/>
-          </a:p>
-          <a:p>
-            <a:r>
-              <a:rPr lang="ru-RU" baseline="0" dirty="0" smtClean="0"/>
-              <a:t>Книга которую я прочел на этой неделе. Супер. Главное что понравилось, это метафоричное описание. Тоесть например читая про активные паттерны, понимаеш о чем думал разработчик... Главное что не понравилось, это то что написано не тока для </a:t>
-            </a:r>
-            <a:r>
-              <a:rPr lang="en-US" baseline="0" dirty="0" smtClean="0"/>
-              <a:t>.NET</a:t>
-            </a:r>
-            <a:r>
-              <a:rPr lang="uk-UA" baseline="0" dirty="0" smtClean="0"/>
-              <a:t>чиков. Реально много про то что кажд</a:t>
-            </a:r>
-            <a:r>
-              <a:rPr lang="ru-RU" baseline="0" dirty="0" smtClean="0"/>
-              <a:t>ый </a:t>
-            </a:r>
-            <a:r>
-              <a:rPr lang="en-US" baseline="0" dirty="0" smtClean="0"/>
-              <a:t>.Ne</a:t>
-            </a:r>
-            <a:r>
-              <a:rPr lang="uk-UA" baseline="0" dirty="0" smtClean="0"/>
-              <a:t>чик знает.</a:t>
-            </a:r>
-          </a:p>
-          <a:p>
-            <a:endParaRPr lang="uk-UA" baseline="0" dirty="0" smtClean="0"/>
-          </a:p>
-          <a:p>
-            <a:r>
-              <a:rPr lang="uk-UA" baseline="0" dirty="0" smtClean="0"/>
-              <a:t>Три лекции от самого </a:t>
-            </a:r>
-            <a:r>
-              <a:rPr lang="en-US" baseline="0" dirty="0" smtClean="0"/>
-              <a:t>Don </a:t>
-            </a:r>
-            <a:r>
-              <a:rPr lang="en-US" baseline="0" dirty="0" err="1" smtClean="0"/>
-              <a:t>Syme</a:t>
-            </a:r>
-            <a:r>
-              <a:rPr lang="en-US" baseline="0" dirty="0" smtClean="0"/>
-              <a:t>… </a:t>
-            </a:r>
-            <a:r>
-              <a:rPr lang="uk-UA" baseline="0" dirty="0" smtClean="0"/>
-              <a:t>По отз</a:t>
-            </a:r>
-            <a:r>
-              <a:rPr lang="ru-RU" baseline="0" dirty="0" smtClean="0"/>
-              <a:t>ывам скушновато, я же нашел их очень интересными. Короче советую.</a:t>
-            </a:r>
-            <a:endParaRPr lang="en-US" dirty="0"/>
+              <a:t>ывода типов есть маленькая проблемка, это рекурсия. Как можно вывести что-то, чего пока нет? Еще смешнее ситуация когда двойная рекурсия, метод1 вызывает метод2, который в свою очередь вызывает метод 1...</a:t>
+            </a:r>
+          </a:p>
+          <a:p>
+            <a:r>
+              <a:rPr lang="pt-BR" sz="1200" b="0" i="0" u="none" strike="noStrike" kern="1200" baseline="0" dirty="0" smtClean="0">
+                <a:solidFill>
+                  <a:schemeClr val="tx1"/>
+                </a:solidFill>
+                <a:latin typeface="+mn-lt"/>
+                <a:ea typeface="+mn-ea"/>
+                <a:cs typeface="+mn-cs"/>
+              </a:rPr>
+              <a:t>let </a:t>
+            </a:r>
+            <a:r>
+              <a:rPr lang="pt-BR" sz="1200" b="1" i="0" u="none" strike="noStrike" kern="1200" baseline="0" dirty="0" smtClean="0">
+                <a:solidFill>
+                  <a:schemeClr val="tx1"/>
+                </a:solidFill>
+                <a:latin typeface="+mn-lt"/>
+                <a:ea typeface="+mn-ea"/>
+                <a:cs typeface="+mn-cs"/>
+              </a:rPr>
+              <a:t>rec </a:t>
+            </a:r>
+            <a:r>
+              <a:rPr lang="pt-BR" sz="1200" b="0" i="0" u="none" strike="noStrike" kern="1200" baseline="0" dirty="0" smtClean="0">
+                <a:solidFill>
+                  <a:schemeClr val="tx1"/>
+                </a:solidFill>
+                <a:latin typeface="+mn-lt"/>
+                <a:ea typeface="+mn-ea"/>
+                <a:cs typeface="+mn-cs"/>
+              </a:rPr>
+              <a:t>isOdd n = (n = 1) || isEven (n - 1)</a:t>
+            </a:r>
+          </a:p>
+          <a:p>
+            <a:r>
+              <a:rPr lang="pt-BR" sz="1200" b="1" i="0" u="none" strike="noStrike" kern="1200" baseline="0" dirty="0" smtClean="0">
+                <a:solidFill>
+                  <a:schemeClr val="tx1"/>
+                </a:solidFill>
+                <a:latin typeface="+mn-lt"/>
+                <a:ea typeface="+mn-ea"/>
+                <a:cs typeface="+mn-cs"/>
+              </a:rPr>
+              <a:t>and </a:t>
+            </a:r>
+            <a:r>
+              <a:rPr lang="pt-BR" sz="1200" b="0" i="0" u="none" strike="noStrike" kern="1200" baseline="0" dirty="0" smtClean="0">
+                <a:solidFill>
+                  <a:schemeClr val="tx1"/>
+                </a:solidFill>
+                <a:latin typeface="+mn-lt"/>
+                <a:ea typeface="+mn-ea"/>
+                <a:cs typeface="+mn-cs"/>
+              </a:rPr>
+              <a:t>isEven n = (n = 0) || isOdd (n - 1)</a:t>
+            </a:r>
+            <a:endParaRPr lang="ru-RU" sz="1200" b="0" i="0" u="none" strike="noStrike" kern="1200" baseline="0" dirty="0" smtClean="0">
+              <a:solidFill>
+                <a:schemeClr val="tx1"/>
+              </a:solidFill>
+              <a:latin typeface="+mn-lt"/>
+              <a:ea typeface="+mn-ea"/>
+              <a:cs typeface="+mn-cs"/>
+            </a:endParaRPr>
+          </a:p>
+          <a:p>
+            <a:endParaRPr lang="ru-RU" sz="1200" b="0" i="0" u="none" strike="noStrike" kern="1200" baseline="0" dirty="0" smtClean="0">
+              <a:solidFill>
+                <a:schemeClr val="tx1"/>
+              </a:solidFill>
+              <a:latin typeface="+mn-lt"/>
+              <a:ea typeface="+mn-ea"/>
+              <a:cs typeface="+mn-cs"/>
+            </a:endParaRPr>
+          </a:p>
+          <a:p>
+            <a:r>
+              <a:rPr lang="ru-RU" sz="1200" b="0" i="0" u="none" strike="noStrike" kern="1200" baseline="0" smtClean="0">
+                <a:solidFill>
+                  <a:schemeClr val="tx1"/>
+                </a:solidFill>
+                <a:latin typeface="+mn-lt"/>
+                <a:ea typeface="+mn-ea"/>
+                <a:cs typeface="+mn-cs"/>
+              </a:rPr>
+              <a:t>Непонятно где писать с маленькой буквы, где с большой.</a:t>
+            </a:r>
+            <a:endParaRPr lang="uk-UA" dirty="0"/>
           </a:p>
         </p:txBody>
       </p:sp>
@@ -2293,6 +2279,219 @@
             <a:fld id="{327B1D59-D02F-4C0C-9439-7B18C67FCD89}" type="slidenum">
               <a:rPr lang="uk-UA" smtClean="0"/>
               <a:t>5</a:t>
+            </a:fld>
+            <a:endParaRPr lang="uk-UA"/>
+          </a:p>
+        </p:txBody>
+      </p:sp>
+    </p:spTree>
+    <p:extLst>
+      <p:ext uri="{BB962C8B-B14F-4D97-AF65-F5344CB8AC3E}">
+        <p14:creationId xmlns:p14="http://schemas.microsoft.com/office/powerpoint/2010/main" val="3345246252"/>
+      </p:ext>
+    </p:extLst>
+  </p:cSld>
+  <p:clrMapOvr>
+    <a:masterClrMapping/>
+  </p:clrMapOvr>
+</p:notes>
+</file>
+
+<file path=ppt/notesSlides/notesSlide6.xml><?xml version="1.0" encoding="utf-8"?>
+<p:notes xmlns:a="http://schemas.openxmlformats.org/drawingml/2006/main" xmlns:r="http://schemas.openxmlformats.org/officeDocument/2006/relationships" xmlns:p="http://schemas.openxmlformats.org/presentationml/2006/main">
+  <p:cSld>
+    <p:spTree>
+      <p:nvGrpSpPr>
+        <p:cNvPr id="1" name=""/>
+        <p:cNvGrpSpPr/>
+        <p:nvPr/>
+      </p:nvGrpSpPr>
+      <p:grpSpPr>
+        <a:xfrm>
+          <a:off x="0" y="0"/>
+          <a:ext cx="0" cy="0"/>
+          <a:chOff x="0" y="0"/>
+          <a:chExt cx="0" cy="0"/>
+        </a:xfrm>
+      </p:grpSpPr>
+      <p:sp>
+        <p:nvSpPr>
+          <p:cNvPr id="2" name="Slide Image Placeholder 1"/>
+          <p:cNvSpPr>
+            <a:spLocks noGrp="1" noRot="1" noChangeAspect="1"/>
+          </p:cNvSpPr>
+          <p:nvPr>
+            <p:ph type="sldImg"/>
+          </p:nvPr>
+        </p:nvSpPr>
+        <p:spPr/>
+      </p:sp>
+      <p:sp>
+        <p:nvSpPr>
+          <p:cNvPr id="3" name="Notes Placeholder 2"/>
+          <p:cNvSpPr>
+            <a:spLocks noGrp="1"/>
+          </p:cNvSpPr>
+          <p:nvPr>
+            <p:ph type="body" idx="1"/>
+          </p:nvPr>
+        </p:nvSpPr>
+        <p:spPr/>
+        <p:txBody>
+          <a:bodyPr/>
+          <a:lstStyle/>
+          <a:p>
+            <a:r>
+              <a:rPr lang="uk-UA" baseline="0" dirty="0" smtClean="0"/>
+              <a:t>Офф, сайт. Ловить там правда нечего. А так это редирект на </a:t>
+            </a:r>
+            <a:r>
+              <a:rPr lang="en-US" baseline="0" dirty="0" smtClean="0"/>
+              <a:t>MSDN </a:t>
+            </a:r>
+            <a:r>
+              <a:rPr lang="uk-UA" baseline="0" dirty="0" smtClean="0"/>
+              <a:t>раздел </a:t>
+            </a:r>
+            <a:r>
+              <a:rPr lang="en-US" baseline="0" dirty="0" smtClean="0"/>
+              <a:t>F#.</a:t>
+            </a:r>
+            <a:endParaRPr lang="uk-UA" baseline="0" dirty="0" smtClean="0"/>
+          </a:p>
+          <a:p>
+            <a:endParaRPr lang="uk-UA" baseline="0" dirty="0" smtClean="0"/>
+          </a:p>
+          <a:p>
+            <a:r>
+              <a:rPr lang="uk-UA" baseline="0" dirty="0" smtClean="0"/>
+              <a:t>Я б</a:t>
+            </a:r>
+            <a:r>
+              <a:rPr lang="ru-RU" baseline="0" dirty="0" smtClean="0"/>
+              <a:t>ы</a:t>
+            </a:r>
+            <a:r>
+              <a:rPr lang="uk-UA" baseline="0" dirty="0" smtClean="0"/>
+              <a:t> начал </a:t>
+            </a:r>
+            <a:r>
+              <a:rPr lang="en-US" baseline="0" dirty="0" err="1" smtClean="0"/>
+              <a:t>hubfs</a:t>
+            </a:r>
+            <a:r>
+              <a:rPr lang="en-US" baseline="0" dirty="0" smtClean="0"/>
+              <a:t>.. </a:t>
+            </a:r>
+            <a:r>
+              <a:rPr lang="uk-UA" baseline="0" dirty="0" smtClean="0"/>
+              <a:t>Кумутити подавала надежд</a:t>
+            </a:r>
+            <a:r>
+              <a:rPr lang="ru-RU" baseline="0" dirty="0" smtClean="0"/>
+              <a:t>ы. К сожалению щас сдохла... По этому </a:t>
+            </a:r>
+            <a:r>
+              <a:rPr lang="en-US" baseline="0" dirty="0" smtClean="0"/>
+              <a:t>stackoverflow.com. </a:t>
+            </a:r>
+            <a:r>
+              <a:rPr lang="uk-UA" baseline="0" dirty="0" smtClean="0"/>
+              <a:t>Многие из тех что могут ответить мониторят оба ресурса.</a:t>
+            </a:r>
+          </a:p>
+          <a:p>
+            <a:endParaRPr lang="uk-UA" baseline="0" dirty="0" smtClean="0"/>
+          </a:p>
+          <a:p>
+            <a:r>
+              <a:rPr lang="uk-UA" baseline="0" dirty="0" smtClean="0"/>
+              <a:t>Более или мение официальн</a:t>
+            </a:r>
+            <a:r>
+              <a:rPr lang="ru-RU" baseline="0" dirty="0" smtClean="0"/>
+              <a:t>ый хештаг...</a:t>
+            </a:r>
+          </a:p>
+          <a:p>
+            <a:endParaRPr lang="ru-RU" baseline="0" dirty="0" smtClean="0"/>
+          </a:p>
+          <a:p>
+            <a:r>
+              <a:rPr lang="ru-RU" baseline="0" dirty="0" smtClean="0"/>
+              <a:t>Книга которую я прочел на этой неделе. Супер. Главное что понравилось, это метафоричное описание. Тоесть например читая про активные паттерны, понимаеш о чем думал разработчик... Главное что не понравилось, это то что написано не тока для </a:t>
+            </a:r>
+            <a:r>
+              <a:rPr lang="en-US" baseline="0" dirty="0" smtClean="0"/>
+              <a:t>.NET</a:t>
+            </a:r>
+            <a:r>
+              <a:rPr lang="uk-UA" baseline="0" dirty="0" smtClean="0"/>
+              <a:t>чиков. Реально много про то что кажд</a:t>
+            </a:r>
+            <a:r>
+              <a:rPr lang="ru-RU" baseline="0" dirty="0" smtClean="0"/>
+              <a:t>ый </a:t>
+            </a:r>
+            <a:r>
+              <a:rPr lang="en-US" baseline="0" dirty="0" smtClean="0"/>
+              <a:t>.Ne</a:t>
+            </a:r>
+            <a:r>
+              <a:rPr lang="uk-UA" baseline="0" dirty="0" smtClean="0"/>
+              <a:t>чик знает.</a:t>
+            </a:r>
+          </a:p>
+          <a:p>
+            <a:endParaRPr lang="uk-UA" baseline="0" dirty="0" smtClean="0"/>
+          </a:p>
+          <a:p>
+            <a:r>
+              <a:rPr lang="uk-UA" baseline="0" dirty="0" smtClean="0"/>
+              <a:t>Три лекции от самого </a:t>
+            </a:r>
+            <a:r>
+              <a:rPr lang="en-US" baseline="0" dirty="0" smtClean="0"/>
+              <a:t>Don </a:t>
+            </a:r>
+            <a:r>
+              <a:rPr lang="en-US" baseline="0" dirty="0" err="1" smtClean="0"/>
+              <a:t>Syme</a:t>
+            </a:r>
+            <a:r>
+              <a:rPr lang="en-US" baseline="0" dirty="0" smtClean="0"/>
+              <a:t>… </a:t>
+            </a:r>
+            <a:r>
+              <a:rPr lang="uk-UA" baseline="0" dirty="0" smtClean="0"/>
+              <a:t>По отз</a:t>
+            </a:r>
+            <a:r>
+              <a:rPr lang="ru-RU" baseline="0" dirty="0" smtClean="0"/>
+              <a:t>ывам скушновато, я же нашел их очень интересными. Короче советую.</a:t>
+            </a:r>
+            <a:endParaRPr lang="en-US" dirty="0"/>
+          </a:p>
+        </p:txBody>
+      </p:sp>
+      <p:sp>
+        <p:nvSpPr>
+          <p:cNvPr id="4" name="Slide Number Placeholder 3"/>
+          <p:cNvSpPr>
+            <a:spLocks noGrp="1"/>
+          </p:cNvSpPr>
+          <p:nvPr>
+            <p:ph type="sldNum" sz="quarter" idx="10"/>
+          </p:nvPr>
+        </p:nvSpPr>
+        <p:spPr/>
+        <p:txBody>
+          <a:bodyPr/>
+          <a:lstStyle/>
+          <a:p>
+            <a:fld id="{327B1D59-D02F-4C0C-9439-7B18C67FCD89}" type="slidenum">
+              <a:rPr lang="uk-UA" smtClean="0"/>
+              <a:t>6</a:t>
             </a:fld>
             <a:endParaRPr lang="uk-UA"/>
           </a:p>
@@ -5574,7 +5773,7 @@
           <a:p>
             <a:r>
               <a:rPr lang="ru-RU" dirty="0" smtClean="0"/>
-              <a:t>Мелкие класные фишки</a:t>
+              <a:t>Первый пример</a:t>
             </a:r>
             <a:endParaRPr lang="en-US" dirty="0"/>
           </a:p>
@@ -5595,85 +5794,6 @@
           <a:bodyPr/>
           <a:lstStyle/>
           <a:p>
-            <a:r>
-              <a:rPr lang="en-US" dirty="0" smtClean="0"/>
-              <a:t>if</a:t>
-            </a:r>
-            <a:r>
-              <a:rPr lang="uk-UA" dirty="0" smtClean="0"/>
-              <a:t> возвращает результат</a:t>
-            </a:r>
-          </a:p>
-          <a:p>
-            <a:r>
-              <a:rPr lang="en-US" dirty="0" smtClean="0"/>
-              <a:t>DI </a:t>
-            </a:r>
-            <a:r>
-              <a:rPr lang="uk-UA" dirty="0" smtClean="0"/>
-              <a:t>средствами </a:t>
-            </a:r>
-            <a:r>
-              <a:rPr lang="en-US" dirty="0" smtClean="0"/>
-              <a:t>F#</a:t>
-            </a:r>
-          </a:p>
-          <a:p>
-            <a:r>
-              <a:rPr lang="uk-UA" dirty="0" smtClean="0"/>
-              <a:t>Куча разн</a:t>
-            </a:r>
-            <a:r>
-              <a:rPr lang="ru-RU" dirty="0" smtClean="0"/>
-              <a:t>ых встроенных типов</a:t>
-            </a:r>
-            <a:endParaRPr lang="en-US" dirty="0" smtClean="0"/>
-          </a:p>
-          <a:p>
-            <a:r>
-              <a:rPr lang="en-US" dirty="0" err="1"/>
-              <a:t>a</a:t>
-            </a:r>
-            <a:r>
-              <a:rPr lang="en-US" dirty="0" err="1" smtClean="0"/>
-              <a:t>sync</a:t>
-            </a:r>
-            <a:r>
-              <a:rPr lang="en-US" dirty="0" smtClean="0"/>
-              <a:t> </a:t>
-            </a:r>
-            <a:r>
-              <a:rPr lang="uk-UA" dirty="0" smtClean="0"/>
-              <a:t>воркфлоу...</a:t>
-            </a:r>
-          </a:p>
-          <a:p>
-            <a:r>
-              <a:rPr lang="en-US" dirty="0" err="1" smtClean="0"/>
-              <a:t>printfn</a:t>
-            </a:r>
-            <a:endParaRPr lang="ru-RU" dirty="0" smtClean="0"/>
-          </a:p>
-          <a:p>
-            <a:r>
-              <a:rPr lang="en-US" dirty="0" err="1" smtClean="0"/>
-              <a:t>Nullability</a:t>
-            </a:r>
-            <a:r>
-              <a:rPr lang="en-US" dirty="0" smtClean="0"/>
-              <a:t>…</a:t>
-            </a:r>
-            <a:endParaRPr lang="uk-UA" dirty="0" smtClean="0"/>
-          </a:p>
-          <a:p>
-            <a:r>
-              <a:rPr lang="uk-UA" dirty="0" smtClean="0"/>
-              <a:t>Анонимн</a:t>
-            </a:r>
-            <a:r>
-              <a:rPr lang="ru-RU" dirty="0" smtClean="0"/>
-              <a:t>ые реализации..</a:t>
-            </a:r>
             <a:endParaRPr lang="en-US" dirty="0"/>
           </a:p>
         </p:txBody>
@@ -5681,7 +5801,7 @@
     </p:spTree>
     <p:extLst>
       <p:ext uri="{BB962C8B-B14F-4D97-AF65-F5344CB8AC3E}">
-        <p14:creationId xmlns:p14="http://schemas.microsoft.com/office/powerpoint/2010/main" val="248792973"/>
+        <p14:creationId xmlns:p14="http://schemas.microsoft.com/office/powerpoint/2010/main" val="1780453645"/>
       </p:ext>
     </p:extLst>
   </p:cSld>
@@ -5724,6 +5844,157 @@
           <a:lstStyle/>
           <a:p>
             <a:r>
+              <a:rPr lang="ru-RU" dirty="0" smtClean="0"/>
+              <a:t>Мелкие класные фишки</a:t>
+            </a:r>
+            <a:endParaRPr lang="en-US" dirty="0"/>
+          </a:p>
+        </p:txBody>
+      </p:sp>
+      <p:sp>
+        <p:nvSpPr>
+          <p:cNvPr id="3" name="Content Placeholder 2"/>
+          <p:cNvSpPr>
+            <a:spLocks noGrp="1"/>
+          </p:cNvSpPr>
+          <p:nvPr>
+            <p:ph idx="1"/>
+          </p:nvPr>
+        </p:nvSpPr>
+        <p:spPr/>
+        <p:txBody>
+          <a:bodyPr/>
+          <a:lstStyle/>
+          <a:p>
+            <a:r>
+              <a:rPr lang="en-US" dirty="0" smtClean="0"/>
+              <a:t>if</a:t>
+            </a:r>
+            <a:r>
+              <a:rPr lang="uk-UA" dirty="0" smtClean="0"/>
+              <a:t> возвращает результат</a:t>
+            </a:r>
+          </a:p>
+          <a:p>
+            <a:r>
+              <a:rPr lang="en-US" dirty="0" smtClean="0"/>
+              <a:t>DI </a:t>
+            </a:r>
+            <a:r>
+              <a:rPr lang="uk-UA" dirty="0" smtClean="0"/>
+              <a:t>средствами </a:t>
+            </a:r>
+            <a:r>
+              <a:rPr lang="en-US" dirty="0" smtClean="0"/>
+              <a:t>F#</a:t>
+            </a:r>
+          </a:p>
+          <a:p>
+            <a:r>
+              <a:rPr lang="uk-UA" dirty="0" smtClean="0"/>
+              <a:t>Куча разн</a:t>
+            </a:r>
+            <a:r>
+              <a:rPr lang="ru-RU" dirty="0" smtClean="0"/>
+              <a:t>ых встроенных типов</a:t>
+            </a:r>
+            <a:endParaRPr lang="en-US" dirty="0" smtClean="0"/>
+          </a:p>
+          <a:p>
+            <a:r>
+              <a:rPr lang="en-US" dirty="0" err="1"/>
+              <a:t>a</a:t>
+            </a:r>
+            <a:r>
+              <a:rPr lang="en-US" dirty="0" err="1" smtClean="0"/>
+              <a:t>sync</a:t>
+            </a:r>
+            <a:r>
+              <a:rPr lang="en-US" dirty="0" smtClean="0"/>
+              <a:t> </a:t>
+            </a:r>
+            <a:r>
+              <a:rPr lang="uk-UA" dirty="0" smtClean="0"/>
+              <a:t>воркфлоу...</a:t>
+            </a:r>
+          </a:p>
+          <a:p>
+            <a:r>
+              <a:rPr lang="en-US" dirty="0" err="1" smtClean="0"/>
+              <a:t>printfn</a:t>
+            </a:r>
+            <a:endParaRPr lang="ru-RU" dirty="0" smtClean="0"/>
+          </a:p>
+          <a:p>
+            <a:r>
+              <a:rPr lang="en-US" dirty="0" err="1" smtClean="0"/>
+              <a:t>Nullability</a:t>
+            </a:r>
+            <a:r>
+              <a:rPr lang="en-US" dirty="0" smtClean="0"/>
+              <a:t>…</a:t>
+            </a:r>
+            <a:endParaRPr lang="uk-UA" dirty="0" smtClean="0"/>
+          </a:p>
+          <a:p>
+            <a:r>
+              <a:rPr lang="uk-UA" dirty="0" smtClean="0"/>
+              <a:t>Анонимн</a:t>
+            </a:r>
+            <a:r>
+              <a:rPr lang="ru-RU" dirty="0" smtClean="0"/>
+              <a:t>ые реализации..</a:t>
+            </a:r>
+            <a:endParaRPr lang="en-US" dirty="0"/>
+          </a:p>
+        </p:txBody>
+      </p:sp>
+    </p:spTree>
+    <p:extLst>
+      <p:ext uri="{BB962C8B-B14F-4D97-AF65-F5344CB8AC3E}">
+        <p14:creationId xmlns:p14="http://schemas.microsoft.com/office/powerpoint/2010/main" val="248792973"/>
+      </p:ext>
+    </p:extLst>
+  </p:cSld>
+  <p:clrMapOvr>
+    <a:masterClrMapping/>
+  </p:clrMapOvr>
+</p:sld>
+</file>
+
+<file path=ppt/slides/slide5.xml><?xml version="1.0" encoding="utf-8"?>
+<p:sld xmlns:a="http://schemas.openxmlformats.org/drawingml/2006/main" xmlns:r="http://schemas.openxmlformats.org/officeDocument/2006/relationships" xmlns:p="http://schemas.openxmlformats.org/presentationml/2006/main">
+  <p:cSld>
+    <p:spTree>
+      <p:nvGrpSpPr>
+        <p:cNvPr id="1" name=""/>
+        <p:cNvGrpSpPr/>
+        <p:nvPr/>
+      </p:nvGrpSpPr>
+      <p:grpSpPr>
+        <a:xfrm>
+          <a:off x="0" y="0"/>
+          <a:ext cx="0" cy="0"/>
+          <a:chOff x="0" y="0"/>
+          <a:chExt cx="0" cy="0"/>
+        </a:xfrm>
+      </p:grpSpPr>
+      <p:sp>
+        <p:nvSpPr>
+          <p:cNvPr id="2" name="Title 1"/>
+          <p:cNvSpPr>
+            <a:spLocks noGrp="1"/>
+          </p:cNvSpPr>
+          <p:nvPr>
+            <p:ph type="title"/>
+          </p:nvPr>
+        </p:nvSpPr>
+        <p:spPr/>
+        <p:txBody>
+          <a:bodyPr/>
+          <a:lstStyle/>
+          <a:p>
+            <a:r>
               <a:rPr lang="uk-UA" dirty="0" smtClean="0"/>
               <a:t>Проблем</a:t>
             </a:r>
@@ -5817,7 +6088,7 @@
 </p:sld>
 </file>
 
-<file path=ppt/slides/slide5.xml><?xml version="1.0" encoding="utf-8"?>
+<file path=ppt/slides/slide6.xml><?xml version="1.0" encoding="utf-8"?>
 <p:sld xmlns:a="http://schemas.openxmlformats.org/drawingml/2006/main" xmlns:r="http://schemas.openxmlformats.org/officeDocument/2006/relationships" xmlns:p="http://schemas.openxmlformats.org/presentationml/2006/main">
   <p:cSld>
     <p:spTree>

</xml_diff>

<commit_message>
NormalFSharp: added types and app structure
</commit_message>
<xml_diff>
--- a/NormalFSharp/NormalFSharp.pptx
+++ b/NormalFSharp/NormalFSharp.pptx
@@ -5,15 +5,17 @@
     <p:sldMasterId id="2147483648" r:id="rId1"/>
   </p:sldMasterIdLst>
   <p:notesMasterIdLst>
-    <p:notesMasterId r:id="rId8"/>
+    <p:notesMasterId r:id="rId10"/>
   </p:notesMasterIdLst>
   <p:sldIdLst>
     <p:sldId id="256" r:id="rId2"/>
     <p:sldId id="260" r:id="rId3"/>
     <p:sldId id="261" r:id="rId4"/>
-    <p:sldId id="258" r:id="rId5"/>
-    <p:sldId id="257" r:id="rId6"/>
-    <p:sldId id="259" r:id="rId7"/>
+    <p:sldId id="262" r:id="rId5"/>
+    <p:sldId id="263" r:id="rId6"/>
+    <p:sldId id="258" r:id="rId7"/>
+    <p:sldId id="257" r:id="rId8"/>
+    <p:sldId id="259" r:id="rId9"/>
   </p:sldIdLst>
   <p:sldSz cx="9144000" cy="6858000" type="screen4x3"/>
   <p:notesSz cx="6858000" cy="9144000"/>
@@ -532,11 +534,7 @@
             </a:r>
             <a:r>
               <a:rPr lang="ru-RU" strike="sngStrike" baseline="0" dirty="0" smtClean="0"/>
-              <a:t> молчать</a:t>
-            </a:r>
-            <a:r>
-              <a:rPr lang="ru-RU" strike="sngStrike" baseline="0" dirty="0" smtClean="0"/>
-              <a:t>!</a:t>
+              <a:t> молчать!</a:t>
             </a:r>
           </a:p>
           <a:p>
@@ -756,29 +754,7 @@
                 <a:ea typeface="+mn-ea"/>
                 <a:cs typeface="+mn-cs"/>
               </a:rPr>
-              <a:t>функторы</a:t>
-            </a:r>
-            <a:r>
-              <a:rPr lang="uk-UA" sz="1200" b="1" i="0" u="none" strike="noStrike" kern="1200" baseline="0" dirty="0" smtClean="0">
-                <a:solidFill>
-                  <a:schemeClr val="tx1"/>
-                </a:solidFill>
-                <a:latin typeface="+mn-lt"/>
-                <a:ea typeface="+mn-ea"/>
-                <a:cs typeface="+mn-cs"/>
-              </a:rPr>
-              <a:t>, </a:t>
-            </a:r>
-            <a:r>
-              <a:rPr lang="uk-UA" sz="1200" b="1" i="0" u="none" strike="noStrike" kern="1200" baseline="0" dirty="0" smtClean="0">
-                <a:solidFill>
-                  <a:schemeClr val="tx1"/>
-                </a:solidFill>
-                <a:latin typeface="+mn-lt"/>
-                <a:ea typeface="+mn-ea"/>
-                <a:cs typeface="+mn-cs"/>
-              </a:rPr>
-              <a:t>каррирование, свертка</a:t>
+              <a:t>функторы, каррирование, свертка</a:t>
             </a:r>
             <a:r>
               <a:rPr lang="uk-UA" sz="1200" b="0" i="0" u="none" strike="noStrike" kern="1200" baseline="0" dirty="0" smtClean="0">
@@ -1318,7 +1294,6 @@
               <a:rPr lang="ru-RU" baseline="0" dirty="0" smtClean="0"/>
               <a:t>В сухом остатке получается что необходимо выучить небольшой набор конструкций языка... А все остальное можно учить по мере использования. Мне это нравится.</a:t>
             </a:r>
-            <a:endParaRPr lang="ru-RU" baseline="0" dirty="0" smtClean="0"/>
           </a:p>
           <a:p>
             <a:endParaRPr lang="ru-RU" baseline="0" dirty="0" smtClean="0"/>
@@ -1628,348 +1603,48 @@
           <a:lstStyle/>
           <a:p>
             <a:r>
-              <a:rPr lang="en-US" sz="1200" b="0" i="0" u="none" strike="noStrike" kern="1200" baseline="0" dirty="0" smtClean="0">
-                <a:solidFill>
-                  <a:schemeClr val="tx1"/>
-                </a:solidFill>
-                <a:latin typeface="+mn-lt"/>
-                <a:ea typeface="+mn-ea"/>
-                <a:cs typeface="+mn-cs"/>
-              </a:rPr>
-              <a:t>if </a:t>
-            </a:r>
-            <a:r>
-              <a:rPr lang="uk-UA" sz="1200" b="0" i="0" u="none" strike="noStrike" kern="1200" baseline="0" dirty="0" smtClean="0">
-                <a:solidFill>
-                  <a:schemeClr val="tx1"/>
-                </a:solidFill>
-                <a:latin typeface="+mn-lt"/>
-                <a:ea typeface="+mn-ea"/>
-                <a:cs typeface="+mn-cs"/>
-              </a:rPr>
-              <a:t>возвращает результат...</a:t>
-            </a:r>
-            <a:endParaRPr lang="en-US" sz="1200" b="0" i="0" u="none" strike="noStrike" kern="1200" baseline="0" dirty="0" smtClean="0">
-              <a:solidFill>
-                <a:schemeClr val="tx1"/>
-              </a:solidFill>
-              <a:latin typeface="+mn-lt"/>
-              <a:ea typeface="+mn-ea"/>
-              <a:cs typeface="+mn-cs"/>
-            </a:endParaRPr>
-          </a:p>
-          <a:p>
-            <a:r>
-              <a:rPr lang="en-US" sz="1200" b="0" i="0" u="none" strike="noStrike" kern="1200" baseline="0" dirty="0" smtClean="0">
-                <a:solidFill>
-                  <a:schemeClr val="tx1"/>
-                </a:solidFill>
-                <a:latin typeface="+mn-lt"/>
-                <a:ea typeface="+mn-ea"/>
-                <a:cs typeface="+mn-cs"/>
-              </a:rPr>
-              <a:t>let result =</a:t>
-            </a:r>
-          </a:p>
-          <a:p>
-            <a:r>
-              <a:rPr lang="en-US" sz="1200" b="0" i="0" u="none" strike="noStrike" kern="1200" baseline="0" dirty="0" smtClean="0">
-                <a:solidFill>
-                  <a:schemeClr val="tx1"/>
-                </a:solidFill>
-                <a:latin typeface="+mn-lt"/>
-                <a:ea typeface="+mn-ea"/>
-                <a:cs typeface="+mn-cs"/>
-              </a:rPr>
-              <a:t>     if x % 2 = 0 then</a:t>
-            </a:r>
-          </a:p>
-          <a:p>
-            <a:r>
-              <a:rPr lang="en-US" sz="1200" b="0" i="0" u="none" strike="noStrike" kern="1200" baseline="0" dirty="0" smtClean="0">
-                <a:solidFill>
-                  <a:schemeClr val="tx1"/>
-                </a:solidFill>
-                <a:latin typeface="+mn-lt"/>
-                <a:ea typeface="+mn-ea"/>
-                <a:cs typeface="+mn-cs"/>
-              </a:rPr>
-              <a:t>         "Yes it is"</a:t>
-            </a:r>
-          </a:p>
-          <a:p>
-            <a:r>
-              <a:rPr lang="en-US" sz="1200" b="0" i="0" u="none" strike="noStrike" kern="1200" baseline="0" dirty="0" smtClean="0">
-                <a:solidFill>
-                  <a:schemeClr val="tx1"/>
-                </a:solidFill>
-                <a:latin typeface="+mn-lt"/>
-                <a:ea typeface="+mn-ea"/>
-                <a:cs typeface="+mn-cs"/>
-              </a:rPr>
-              <a:t>     else</a:t>
-            </a:r>
-          </a:p>
-          <a:p>
-            <a:r>
-              <a:rPr lang="en-US" sz="1200" b="0" i="0" u="none" strike="noStrike" kern="1200" baseline="0" dirty="0" smtClean="0">
-                <a:solidFill>
-                  <a:schemeClr val="tx1"/>
-                </a:solidFill>
-                <a:latin typeface="+mn-lt"/>
-                <a:ea typeface="+mn-ea"/>
-                <a:cs typeface="+mn-cs"/>
-              </a:rPr>
-              <a:t>         "No it is not“</a:t>
-            </a:r>
-          </a:p>
-          <a:p>
-            <a:endParaRPr lang="en-US" sz="1200" b="0" i="0" u="none" strike="noStrike" kern="1200" baseline="0" dirty="0" smtClean="0">
-              <a:solidFill>
-                <a:schemeClr val="tx1"/>
-              </a:solidFill>
-              <a:latin typeface="+mn-lt"/>
-              <a:ea typeface="+mn-ea"/>
-              <a:cs typeface="+mn-cs"/>
-            </a:endParaRPr>
-          </a:p>
-          <a:p>
-            <a:r>
-              <a:rPr lang="uk-UA" sz="1200" b="0" i="0" u="none" strike="noStrike" kern="1200" baseline="0" dirty="0" smtClean="0">
-                <a:solidFill>
-                  <a:schemeClr val="tx1"/>
-                </a:solidFill>
-                <a:latin typeface="+mn-lt"/>
-                <a:ea typeface="+mn-ea"/>
-                <a:cs typeface="+mn-cs"/>
-              </a:rPr>
-              <a:t>Можно юзать конструтор.</a:t>
-            </a:r>
-          </a:p>
-          <a:p>
-            <a:r>
-              <a:rPr lang="en-US" sz="1200" b="0" i="0" u="none" strike="noStrike" kern="1200" baseline="0" dirty="0" smtClean="0">
-                <a:solidFill>
-                  <a:schemeClr val="tx1"/>
-                </a:solidFill>
-                <a:latin typeface="+mn-lt"/>
-                <a:ea typeface="+mn-ea"/>
-                <a:cs typeface="+mn-cs"/>
-              </a:rPr>
-              <a:t>type </a:t>
-            </a:r>
-            <a:r>
-              <a:rPr lang="en-US" sz="1200" b="0" i="0" u="none" strike="noStrike" kern="1200" baseline="0" dirty="0" err="1" smtClean="0">
-                <a:solidFill>
-                  <a:schemeClr val="tx1"/>
-                </a:solidFill>
-                <a:latin typeface="+mn-lt"/>
-                <a:ea typeface="+mn-ea"/>
-                <a:cs typeface="+mn-cs"/>
-              </a:rPr>
-              <a:t>SuperService</a:t>
-            </a:r>
-            <a:r>
-              <a:rPr lang="en-US" sz="1200" b="0" i="0" u="none" strike="noStrike" kern="1200" baseline="0" dirty="0" smtClean="0">
-                <a:solidFill>
-                  <a:schemeClr val="tx1"/>
-                </a:solidFill>
-                <a:latin typeface="+mn-lt"/>
-                <a:ea typeface="+mn-ea"/>
-                <a:cs typeface="+mn-cs"/>
-              </a:rPr>
-              <a:t>(dep1: IDep1) =</a:t>
-            </a:r>
-          </a:p>
-          <a:p>
-            <a:r>
-              <a:rPr lang="en-US" sz="1200" b="0" i="0" u="none" strike="noStrike" kern="1200" baseline="0" dirty="0" smtClean="0">
-                <a:solidFill>
-                  <a:schemeClr val="tx1"/>
-                </a:solidFill>
-                <a:latin typeface="+mn-lt"/>
-                <a:ea typeface="+mn-ea"/>
-                <a:cs typeface="+mn-cs"/>
-              </a:rPr>
-              <a:t>    let </a:t>
-            </a:r>
-            <a:r>
-              <a:rPr lang="en-US" sz="1200" b="0" i="0" u="none" strike="noStrike" kern="1200" baseline="0" dirty="0" err="1" smtClean="0">
-                <a:solidFill>
-                  <a:schemeClr val="tx1"/>
-                </a:solidFill>
-                <a:latin typeface="+mn-lt"/>
-                <a:ea typeface="+mn-ea"/>
-                <a:cs typeface="+mn-cs"/>
-              </a:rPr>
-              <a:t>doSometing</a:t>
-            </a:r>
-            <a:r>
-              <a:rPr lang="en-US" sz="1200" b="0" i="0" u="none" strike="noStrike" kern="1200" baseline="0" dirty="0" smtClean="0">
-                <a:solidFill>
-                  <a:schemeClr val="tx1"/>
-                </a:solidFill>
-                <a:latin typeface="+mn-lt"/>
-                <a:ea typeface="+mn-ea"/>
-                <a:cs typeface="+mn-cs"/>
-              </a:rPr>
-              <a:t> = ()</a:t>
-            </a:r>
-            <a:r>
-              <a:rPr lang="en-US" dirty="0" smtClean="0"/>
-              <a:t>	</a:t>
-            </a:r>
-            <a:endParaRPr lang="ru-RU" dirty="0" smtClean="0"/>
-          </a:p>
-          <a:p>
-            <a:endParaRPr lang="ru-RU" dirty="0" smtClean="0"/>
-          </a:p>
-          <a:p>
-            <a:r>
-              <a:rPr lang="ru-RU" dirty="0" smtClean="0"/>
-              <a:t>Например </a:t>
-            </a:r>
-            <a:r>
-              <a:rPr lang="en-US" dirty="0" smtClean="0"/>
-              <a:t>record,</a:t>
+              <a:rPr lang="uk-UA" dirty="0" smtClean="0"/>
+              <a:t>У</a:t>
+            </a:r>
+            <a:r>
+              <a:rPr lang="uk-UA" baseline="0" dirty="0" smtClean="0"/>
+              <a:t> </a:t>
             </a:r>
             <a:r>
               <a:rPr lang="en-US" baseline="0" dirty="0" smtClean="0"/>
-              <a:t> option</a:t>
+              <a:t>F# </a:t>
+            </a:r>
+            <a:r>
+              <a:rPr lang="uk-UA" baseline="0" dirty="0" smtClean="0"/>
+              <a:t>как и любого другого, уважающего себя яз</a:t>
             </a:r>
             <a:r>
               <a:rPr lang="ru-RU" baseline="0" dirty="0" smtClean="0"/>
-              <a:t>, </a:t>
-            </a:r>
-            <a:r>
-              <a:rPr lang="en-US" sz="1200" b="0" i="0" u="none" strike="noStrike" kern="1200" baseline="0" dirty="0" smtClean="0">
-                <a:solidFill>
-                  <a:schemeClr val="tx1"/>
-                </a:solidFill>
-                <a:latin typeface="+mn-lt"/>
-                <a:ea typeface="+mn-ea"/>
-                <a:cs typeface="+mn-cs"/>
-              </a:rPr>
-              <a:t>discriminated unions</a:t>
-            </a:r>
-            <a:endParaRPr lang="ru-RU" baseline="0" dirty="0" smtClean="0"/>
-          </a:p>
-          <a:p>
-            <a:endParaRPr lang="ru-RU" baseline="0" dirty="0" smtClean="0"/>
-          </a:p>
-          <a:p>
-            <a:r>
-              <a:rPr lang="en-US" baseline="0" dirty="0" smtClean="0"/>
-              <a:t>type Person =</a:t>
-            </a:r>
-          </a:p>
-          <a:p>
-            <a:r>
-              <a:rPr lang="en-US" baseline="0" dirty="0" smtClean="0"/>
-              <a:t>| Boy of string</a:t>
-            </a:r>
-          </a:p>
-          <a:p>
-            <a:r>
-              <a:rPr lang="en-US" baseline="0" dirty="0" smtClean="0"/>
-              <a:t>| Girl of string</a:t>
-            </a:r>
-          </a:p>
-          <a:p>
-            <a:r>
-              <a:rPr lang="en-US" baseline="0" dirty="0" smtClean="0"/>
-              <a:t>| Couple of Person * Person</a:t>
-            </a:r>
-          </a:p>
-          <a:p>
-            <a:r>
-              <a:rPr lang="en-US" baseline="0" dirty="0" smtClean="0"/>
-              <a:t>static member (+) (lhs, </a:t>
-            </a:r>
-            <a:r>
-              <a:rPr lang="en-US" baseline="0" dirty="0" err="1" smtClean="0"/>
-              <a:t>rhs</a:t>
-            </a:r>
-            <a:r>
-              <a:rPr lang="en-US" baseline="0" dirty="0" smtClean="0"/>
-              <a:t>) =</a:t>
-            </a:r>
-          </a:p>
-          <a:p>
-            <a:r>
-              <a:rPr lang="en-US" baseline="0" dirty="0" smtClean="0"/>
-              <a:t>	match lhs, </a:t>
-            </a:r>
-            <a:r>
-              <a:rPr lang="en-US" baseline="0" dirty="0" err="1" smtClean="0"/>
-              <a:t>rhs</a:t>
-            </a:r>
-            <a:r>
-              <a:rPr lang="en-US" baseline="0" dirty="0" smtClean="0"/>
-              <a:t> with</a:t>
-            </a:r>
-          </a:p>
-          <a:p>
-            <a:r>
-              <a:rPr lang="en-US" baseline="0" dirty="0" smtClean="0"/>
-              <a:t>	| Couple(_), _ </a:t>
-            </a:r>
-            <a:endParaRPr lang="ru-RU" baseline="0" dirty="0" smtClean="0"/>
-          </a:p>
-          <a:p>
+              <a:t>ыка есть встроенные примитивные типы. Всякие там строки инты и тому подобное. Это даж не интерсно.</a:t>
+            </a:r>
+            <a:r>
+              <a:rPr lang="uk-UA" baseline="0" dirty="0" smtClean="0"/>
+              <a:t> А что интерсно это о</a:t>
+            </a:r>
+            <a:r>
+              <a:rPr lang="uk-UA" dirty="0" smtClean="0"/>
+              <a:t>дно</a:t>
+            </a:r>
+            <a:r>
+              <a:rPr lang="uk-UA" baseline="0" dirty="0" smtClean="0"/>
+              <a:t> из приятн</a:t>
+            </a:r>
             <a:r>
               <a:rPr lang="ru-RU" baseline="0" dirty="0" smtClean="0"/>
-              <a:t>                   </a:t>
-            </a:r>
-            <a:r>
-              <a:rPr lang="en-US" baseline="0" dirty="0" smtClean="0"/>
-              <a:t>| _, Couple(_) </a:t>
-            </a:r>
-            <a:endParaRPr lang="ru-RU" baseline="0" dirty="0" smtClean="0"/>
-          </a:p>
-          <a:p>
-            <a:r>
-              <a:rPr lang="ru-RU" baseline="0" dirty="0" smtClean="0"/>
-              <a:t>		</a:t>
-            </a:r>
-            <a:r>
-              <a:rPr lang="en-US" baseline="0" dirty="0" smtClean="0"/>
-              <a:t>-&gt; </a:t>
-            </a:r>
-            <a:r>
-              <a:rPr lang="en-US" baseline="0" dirty="0" err="1" smtClean="0"/>
-              <a:t>failwith</a:t>
-            </a:r>
-            <a:r>
-              <a:rPr lang="en-US" baseline="0" dirty="0" smtClean="0"/>
-              <a:t> "</a:t>
-            </a:r>
-            <a:r>
-              <a:rPr lang="ru-RU" baseline="0" dirty="0" smtClean="0"/>
-              <a:t>Гм... шведская семья детектед"</a:t>
-            </a:r>
-          </a:p>
-          <a:p>
-            <a:r>
-              <a:rPr lang="ru-RU" baseline="0" dirty="0" smtClean="0"/>
-              <a:t>	| _ -&gt; </a:t>
-            </a:r>
-            <a:r>
-              <a:rPr lang="en-US" baseline="0" dirty="0" smtClean="0"/>
-              <a:t>Couple(lhs, </a:t>
-            </a:r>
-            <a:r>
-              <a:rPr lang="en-US" baseline="0" dirty="0" err="1" smtClean="0"/>
-              <a:t>rhs</a:t>
-            </a:r>
-            <a:r>
-              <a:rPr lang="en-US" baseline="0" dirty="0" smtClean="0"/>
-              <a:t>)</a:t>
-            </a:r>
-            <a:endParaRPr lang="ru-RU" baseline="0" dirty="0" smtClean="0"/>
-          </a:p>
-          <a:p>
-            <a:endParaRPr lang="ru-RU" baseline="0" dirty="0" smtClean="0"/>
+              <a:t>ых</a:t>
+            </a:r>
+            <a:r>
+              <a:rPr lang="uk-UA" baseline="0" dirty="0" smtClean="0"/>
+              <a:t> отличий это богатая система типа. Разработчики ввели специальные типы для специальных задач.</a:t>
+            </a:r>
+          </a:p>
+          <a:p>
+            <a:endParaRPr lang="uk-UA" baseline="0" dirty="0" smtClean="0"/>
           </a:p>
           <a:p>
             <a:pPr marL="0" marR="0" indent="0" algn="l" defTabSz="914400" rtl="0" eaLnBrk="1" fontAlgn="auto" latinLnBrk="0" hangingPunct="1">
@@ -1991,25 +1666,10 @@
             </a:pPr>
             <a:r>
               <a:rPr lang="uk-UA" baseline="0" dirty="0" smtClean="0"/>
-              <a:t>Асинхронно скачать, потом чето асинхронно скачать еще раз.</a:t>
-            </a:r>
-            <a:endParaRPr lang="en-US" dirty="0" smtClean="0"/>
-          </a:p>
-          <a:p>
-            <a:endParaRPr lang="en-US" baseline="0" dirty="0" smtClean="0"/>
-          </a:p>
-          <a:p>
-            <a:r>
-              <a:rPr lang="uk-UA" baseline="0" dirty="0" smtClean="0"/>
-              <a:t>Типизированность</a:t>
-            </a:r>
-          </a:p>
-          <a:p>
-            <a:endParaRPr lang="uk-UA" baseline="0" dirty="0" smtClean="0"/>
-          </a:p>
-          <a:p>
-            <a:r>
-              <a:rPr lang="en-US" sz="1200" b="0" i="0" u="none" strike="noStrike" kern="1200" baseline="0" dirty="0" smtClean="0">
+              <a:t>Например очень часто нужны ДТОшки. Типизировання структурка, имя – значение. </a:t>
+            </a:r>
+            <a:r>
+              <a:rPr lang="ru-RU" sz="1200" kern="1200" dirty="0" smtClean="0">
                 <a:solidFill>
                   <a:schemeClr val="tx1"/>
                 </a:solidFill>
@@ -2017,9 +1677,308 @@
                 <a:ea typeface="+mn-ea"/>
                 <a:cs typeface="+mn-cs"/>
               </a:rPr>
-              <a:t>Object Expressions</a:t>
-            </a:r>
-            <a:endParaRPr lang="uk-UA" baseline="0" dirty="0" smtClean="0"/>
+              <a:t>В </a:t>
+            </a:r>
+            <a:r>
+              <a:rPr lang="en-US" sz="1200" kern="1200" dirty="0" smtClean="0">
+                <a:solidFill>
+                  <a:schemeClr val="tx1"/>
+                </a:solidFill>
+                <a:latin typeface="+mn-lt"/>
+                <a:ea typeface="+mn-ea"/>
+                <a:cs typeface="+mn-cs"/>
+              </a:rPr>
+              <a:t>F# </a:t>
+            </a:r>
+            <a:r>
+              <a:rPr lang="ru-RU" sz="1200" kern="1200" dirty="0" smtClean="0">
+                <a:solidFill>
+                  <a:schemeClr val="tx1"/>
+                </a:solidFill>
+                <a:latin typeface="+mn-lt"/>
+                <a:ea typeface="+mn-ea"/>
+                <a:cs typeface="+mn-cs"/>
+              </a:rPr>
+              <a:t>это</a:t>
+            </a:r>
+            <a:r>
+              <a:rPr lang="ru-RU" sz="1200" kern="1200" baseline="0" dirty="0" smtClean="0">
+                <a:solidFill>
+                  <a:schemeClr val="tx1"/>
+                </a:solidFill>
+                <a:latin typeface="+mn-lt"/>
+                <a:ea typeface="+mn-ea"/>
+                <a:cs typeface="+mn-cs"/>
+              </a:rPr>
+              <a:t> рекорды.  Если бы не скобочки, то запись была бы вообще минималистична. Реально же это вполне себе класс. С публичным доступом, неизменяемыми полями, конструктором, и переопределенными всякими </a:t>
+            </a:r>
+            <a:r>
+              <a:rPr lang="en-US" sz="1200" kern="1200" baseline="0" dirty="0" smtClean="0">
+                <a:solidFill>
+                  <a:schemeClr val="tx1"/>
+                </a:solidFill>
+                <a:latin typeface="+mn-lt"/>
+                <a:ea typeface="+mn-ea"/>
+                <a:cs typeface="+mn-cs"/>
+              </a:rPr>
+              <a:t>Equals </a:t>
+            </a:r>
+            <a:r>
+              <a:rPr lang="uk-UA" sz="1200" kern="1200" baseline="0" dirty="0" smtClean="0">
+                <a:solidFill>
+                  <a:schemeClr val="tx1"/>
+                </a:solidFill>
+                <a:latin typeface="+mn-lt"/>
+                <a:ea typeface="+mn-ea"/>
+                <a:cs typeface="+mn-cs"/>
+              </a:rPr>
+              <a:t>и </a:t>
+            </a:r>
+            <a:r>
+              <a:rPr lang="en-US" sz="1200" kern="1200" baseline="0" dirty="0" err="1" smtClean="0">
+                <a:solidFill>
+                  <a:schemeClr val="tx1"/>
+                </a:solidFill>
+                <a:latin typeface="+mn-lt"/>
+                <a:ea typeface="+mn-ea"/>
+                <a:cs typeface="+mn-cs"/>
+              </a:rPr>
+              <a:t>GetHashCode</a:t>
+            </a:r>
+            <a:r>
+              <a:rPr lang="en-US" sz="1200" kern="1200" baseline="0" dirty="0" smtClean="0">
+                <a:solidFill>
+                  <a:schemeClr val="tx1"/>
+                </a:solidFill>
+                <a:latin typeface="+mn-lt"/>
+                <a:ea typeface="+mn-ea"/>
+                <a:cs typeface="+mn-cs"/>
+              </a:rPr>
+              <a:t>.</a:t>
+            </a:r>
+            <a:r>
+              <a:rPr lang="ru-RU" sz="1200" kern="1200" baseline="0" dirty="0" smtClean="0">
+                <a:solidFill>
+                  <a:schemeClr val="tx1"/>
+                </a:solidFill>
+                <a:latin typeface="+mn-lt"/>
+                <a:ea typeface="+mn-ea"/>
+                <a:cs typeface="+mn-cs"/>
+              </a:rPr>
+              <a:t> Кроме того что их легко создавать, их еще и легко использовать. Через некторое время большая часть моделей уходит в такие рекорды. При большом желании у рекордов можно описывать и методы.</a:t>
+            </a:r>
+          </a:p>
+          <a:p>
+            <a:pPr marL="0" marR="0" indent="0" algn="l" defTabSz="914400" rtl="0" eaLnBrk="1" fontAlgn="auto" latinLnBrk="0" hangingPunct="1">
+              <a:lnSpc>
+                <a:spcPct val="100000"/>
+              </a:lnSpc>
+              <a:spcBef>
+                <a:spcPts val="0"/>
+              </a:spcBef>
+              <a:spcAft>
+                <a:spcPts val="0"/>
+              </a:spcAft>
+              <a:buClrTx/>
+              <a:buSzTx/>
+              <a:buFontTx/>
+              <a:buNone/>
+              <a:tabLst/>
+              <a:defRPr/>
+            </a:pPr>
+            <a:endParaRPr lang="ru-RU" sz="1200" b="0" kern="1200" baseline="0" dirty="0" smtClean="0">
+              <a:solidFill>
+                <a:schemeClr val="tx1"/>
+              </a:solidFill>
+              <a:latin typeface="+mn-lt"/>
+              <a:ea typeface="+mn-ea"/>
+              <a:cs typeface="+mn-cs"/>
+            </a:endParaRPr>
+          </a:p>
+          <a:p>
+            <a:pPr marL="0" marR="0" indent="0" algn="l" defTabSz="914400" rtl="0" eaLnBrk="1" fontAlgn="auto" latinLnBrk="0" hangingPunct="1">
+              <a:lnSpc>
+                <a:spcPct val="100000"/>
+              </a:lnSpc>
+              <a:spcBef>
+                <a:spcPts val="0"/>
+              </a:spcBef>
+              <a:spcAft>
+                <a:spcPts val="0"/>
+              </a:spcAft>
+              <a:buClrTx/>
+              <a:buSzTx/>
+              <a:buFontTx/>
+              <a:buNone/>
+              <a:tabLst/>
+              <a:defRPr/>
+            </a:pPr>
+            <a:r>
+              <a:rPr lang="ru-RU" sz="1200" b="0" kern="1200" baseline="0" dirty="0" smtClean="0">
+                <a:solidFill>
+                  <a:schemeClr val="tx1"/>
+                </a:solidFill>
+                <a:latin typeface="+mn-lt"/>
+                <a:ea typeface="+mn-ea"/>
+                <a:cs typeface="+mn-cs"/>
+              </a:rPr>
+              <a:t>Другой пример это Туплы (тупулы, кортежи), это для ситуация когда и названия полей не важны. Очень удобная штука когда надо протаскивать несколько значений за один раз. Ессно оно все типизированное по самое нехочу. И ессно язык поддерживает очень круто. Например декомпозиция на отдельные елементы. Позже я покажу синтаксис для матчинга туплов.</a:t>
+            </a:r>
+          </a:p>
+          <a:p>
+            <a:pPr marL="0" marR="0" indent="0" algn="l" defTabSz="914400" rtl="0" eaLnBrk="1" fontAlgn="auto" latinLnBrk="0" hangingPunct="1">
+              <a:lnSpc>
+                <a:spcPct val="100000"/>
+              </a:lnSpc>
+              <a:spcBef>
+                <a:spcPts val="0"/>
+              </a:spcBef>
+              <a:spcAft>
+                <a:spcPts val="0"/>
+              </a:spcAft>
+              <a:buClrTx/>
+              <a:buSzTx/>
+              <a:buFontTx/>
+              <a:buNone/>
+              <a:tabLst/>
+              <a:defRPr/>
+            </a:pPr>
+            <a:endParaRPr lang="ru-RU" sz="1200" b="0" kern="1200" baseline="0" dirty="0" smtClean="0">
+              <a:solidFill>
+                <a:schemeClr val="tx1"/>
+              </a:solidFill>
+              <a:latin typeface="+mn-lt"/>
+              <a:ea typeface="+mn-ea"/>
+              <a:cs typeface="+mn-cs"/>
+            </a:endParaRPr>
+          </a:p>
+          <a:p>
+            <a:pPr marL="0" marR="0" indent="0" algn="l" defTabSz="914400" rtl="0" eaLnBrk="1" fontAlgn="auto" latinLnBrk="0" hangingPunct="1">
+              <a:lnSpc>
+                <a:spcPct val="100000"/>
+              </a:lnSpc>
+              <a:spcBef>
+                <a:spcPts val="0"/>
+              </a:spcBef>
+              <a:spcAft>
+                <a:spcPts val="0"/>
+              </a:spcAft>
+              <a:buClrTx/>
+              <a:buSzTx/>
+              <a:buFontTx/>
+              <a:buNone/>
+              <a:tabLst/>
+              <a:defRPr/>
+            </a:pPr>
+            <a:r>
+              <a:rPr lang="ru-RU" sz="1200" b="0" kern="1200" baseline="0" dirty="0" smtClean="0">
+                <a:solidFill>
+                  <a:schemeClr val="tx1"/>
+                </a:solidFill>
+                <a:latin typeface="+mn-lt"/>
+                <a:ea typeface="+mn-ea"/>
+                <a:cs typeface="+mn-cs"/>
+              </a:rPr>
+              <a:t>Следующий пример, проще описать на на картах. (Пример карт). С точки зрения дотНета это можно рассматривать двояко. Вопервых как обычный енум (перечисление). А вот вторых как иерархию. В которой кард явлеяется асбтрактным классом, а все остальное это наслденики. Интересно что это закрытая иерархия. Точно так же как с рекордами можно писать дописывать методы.</a:t>
+            </a:r>
+          </a:p>
+          <a:p>
+            <a:pPr marL="0" marR="0" indent="0" algn="l" defTabSz="914400" rtl="0" eaLnBrk="1" fontAlgn="auto" latinLnBrk="0" hangingPunct="1">
+              <a:lnSpc>
+                <a:spcPct val="100000"/>
+              </a:lnSpc>
+              <a:spcBef>
+                <a:spcPts val="0"/>
+              </a:spcBef>
+              <a:spcAft>
+                <a:spcPts val="0"/>
+              </a:spcAft>
+              <a:buClrTx/>
+              <a:buSzTx/>
+              <a:buFontTx/>
+              <a:buNone/>
+              <a:tabLst/>
+              <a:defRPr/>
+            </a:pPr>
+            <a:endParaRPr lang="ru-RU" sz="1200" b="0" kern="1200" baseline="0" dirty="0" smtClean="0">
+              <a:solidFill>
+                <a:schemeClr val="tx1"/>
+              </a:solidFill>
+              <a:latin typeface="+mn-lt"/>
+              <a:ea typeface="+mn-ea"/>
+              <a:cs typeface="+mn-cs"/>
+            </a:endParaRPr>
+          </a:p>
+          <a:p>
+            <a:pPr marL="0" marR="0" indent="0" algn="l" defTabSz="914400" rtl="0" eaLnBrk="1" fontAlgn="auto" latinLnBrk="0" hangingPunct="1">
+              <a:lnSpc>
+                <a:spcPct val="100000"/>
+              </a:lnSpc>
+              <a:spcBef>
+                <a:spcPts val="0"/>
+              </a:spcBef>
+              <a:spcAft>
+                <a:spcPts val="0"/>
+              </a:spcAft>
+              <a:buClrTx/>
+              <a:buSzTx/>
+              <a:buFontTx/>
+              <a:buNone/>
+              <a:tabLst/>
+              <a:defRPr/>
+            </a:pPr>
+            <a:r>
+              <a:rPr lang="ru-RU" sz="1200" b="0" kern="1200" baseline="0" dirty="0" smtClean="0">
+                <a:solidFill>
+                  <a:schemeClr val="tx1"/>
+                </a:solidFill>
+                <a:latin typeface="+mn-lt"/>
+                <a:ea typeface="+mn-ea"/>
+                <a:cs typeface="+mn-cs"/>
+              </a:rPr>
+              <a:t>Ну и обычные .НЕТ классы и структуры... По опыту использования </a:t>
+            </a:r>
+            <a:r>
+              <a:rPr lang="en-US" sz="1200" b="0" kern="1200" baseline="0" dirty="0" smtClean="0">
+                <a:solidFill>
+                  <a:schemeClr val="tx1"/>
+                </a:solidFill>
+                <a:latin typeface="+mn-lt"/>
+                <a:ea typeface="+mn-ea"/>
+                <a:cs typeface="+mn-cs"/>
+              </a:rPr>
+              <a:t>F# </a:t>
+            </a:r>
+            <a:r>
+              <a:rPr lang="uk-UA" sz="1200" b="0" kern="1200" baseline="0" dirty="0" smtClean="0">
+                <a:solidFill>
+                  <a:schemeClr val="tx1"/>
+                </a:solidFill>
+                <a:latin typeface="+mn-lt"/>
+                <a:ea typeface="+mn-ea"/>
+                <a:cs typeface="+mn-cs"/>
+              </a:rPr>
+              <a:t>все данн</a:t>
+            </a:r>
+            <a:r>
+              <a:rPr lang="ru-RU" sz="1200" b="0" kern="1200" baseline="0" dirty="0" smtClean="0">
+                <a:solidFill>
+                  <a:schemeClr val="tx1"/>
+                </a:solidFill>
+                <a:latin typeface="+mn-lt"/>
+                <a:ea typeface="+mn-ea"/>
+                <a:cs typeface="+mn-cs"/>
+              </a:rPr>
+              <a:t>ые ухоядт в рекорды, туплы и дискриминейтед юнионс, а вот логика в классы и или модули.</a:t>
+            </a:r>
+            <a:endParaRPr lang="en-US" sz="1200" b="0" kern="1200" dirty="0" smtClean="0">
+              <a:solidFill>
+                <a:schemeClr val="tx1"/>
+              </a:solidFill>
+              <a:latin typeface="+mn-lt"/>
+              <a:ea typeface="+mn-ea"/>
+              <a:cs typeface="+mn-cs"/>
+            </a:endParaRPr>
           </a:p>
         </p:txBody>
       </p:sp>
@@ -2049,7 +2008,7 @@
     </p:spTree>
     <p:extLst>
       <p:ext uri="{BB962C8B-B14F-4D97-AF65-F5344CB8AC3E}">
-        <p14:creationId xmlns:p14="http://schemas.microsoft.com/office/powerpoint/2010/main" val="289005074"/>
+        <p14:creationId xmlns:p14="http://schemas.microsoft.com/office/powerpoint/2010/main" val="1852137566"/>
       </p:ext>
     </p:extLst>
   </p:cSld>
@@ -2104,73 +2063,7 @@
           <a:lstStyle/>
           <a:p>
             <a:r>
-              <a:rPr lang="ru-RU" dirty="0" smtClean="0"/>
-              <a:t>В </a:t>
-            </a:r>
-            <a:r>
-              <a:rPr lang="en-US" dirty="0" smtClean="0"/>
-              <a:t>F#</a:t>
-            </a:r>
-            <a:r>
-              <a:rPr lang="en-US" baseline="0" dirty="0" smtClean="0"/>
-              <a:t> </a:t>
-            </a:r>
-            <a:r>
-              <a:rPr lang="uk-UA" baseline="0" dirty="0" smtClean="0"/>
-              <a:t>большое значние имеет положение файла в проекте. Они компилятся последовательно. Соотвевенно если клас дефайнится позже, его никто не найдет.</a:t>
-            </a:r>
-          </a:p>
-          <a:p>
-            <a:endParaRPr lang="uk-UA" baseline="0" dirty="0" smtClean="0"/>
-          </a:p>
-          <a:p>
-            <a:r>
-              <a:rPr lang="uk-UA" baseline="0" dirty="0" smtClean="0"/>
-              <a:t>Интеграция со студией так себе... Нема рефакторингов. Нема папок.</a:t>
-            </a:r>
-          </a:p>
-          <a:p>
-            <a:endParaRPr lang="uk-UA" baseline="0" dirty="0" smtClean="0"/>
-          </a:p>
-          <a:p>
-            <a:r>
-              <a:rPr lang="uk-UA" baseline="0" dirty="0" smtClean="0"/>
-              <a:t>Нема автоматического приведения типов. </a:t>
-            </a:r>
-            <a:r>
-              <a:rPr lang="en-US" baseline="0" dirty="0" smtClean="0"/>
-              <a:t>let s : </a:t>
-            </a:r>
-            <a:r>
-              <a:rPr lang="en-US" baseline="0" dirty="0" err="1" smtClean="0"/>
-              <a:t>int</a:t>
-            </a:r>
-            <a:r>
-              <a:rPr lang="en-US" baseline="0" dirty="0" smtClean="0"/>
-              <a:t> = 12.5m </a:t>
-            </a:r>
-            <a:r>
-              <a:rPr lang="uk-UA" baseline="0" dirty="0" smtClean="0"/>
-              <a:t>не будет работать.</a:t>
-            </a:r>
-            <a:endParaRPr lang="en-US" baseline="0" dirty="0" smtClean="0"/>
-          </a:p>
-          <a:p>
-            <a:endParaRPr lang="en-US" baseline="0" dirty="0" smtClean="0"/>
-          </a:p>
-          <a:p>
-            <a:r>
-              <a:rPr lang="uk-UA" baseline="0" dirty="0" smtClean="0"/>
-              <a:t>Два костыля. У в</a:t>
-            </a:r>
-            <a:r>
-              <a:rPr lang="ru-RU" baseline="0" dirty="0" smtClean="0"/>
-              <a:t>ывода типов есть маленькая проблемка, это рекурсия. Как можно вывести что-то, чего пока нет? Еще смешнее ситуация когда двойная рекурсия, метод1 вызывает метод2, который в свою очередь вызывает метод 1...</a:t>
-            </a:r>
-          </a:p>
-          <a:p>
-            <a:r>
-              <a:rPr lang="pt-BR" sz="1200" b="0" i="0" u="none" strike="noStrike" kern="1200" baseline="0" dirty="0" smtClean="0">
+              <a:rPr lang="en-US" sz="1200" b="0" i="0" u="none" strike="noStrike" kern="1200" baseline="0" dirty="0" smtClean="0">
                 <a:solidFill>
                   <a:schemeClr val="tx1"/>
                 </a:solidFill>
@@ -2178,10 +2071,10 @@
                 <a:ea typeface="+mn-ea"/>
                 <a:cs typeface="+mn-cs"/>
               </a:rPr>
-              <a:t>let </a:t>
-            </a:r>
-            <a:r>
-              <a:rPr lang="pt-BR" sz="1200" b="1" i="0" u="none" strike="noStrike" kern="1200" baseline="0" dirty="0" smtClean="0">
+              <a:t>if </a:t>
+            </a:r>
+            <a:r>
+              <a:rPr lang="uk-UA" sz="1200" b="0" i="0" u="none" strike="noStrike" kern="1200" baseline="0" dirty="0" smtClean="0">
                 <a:solidFill>
                   <a:schemeClr val="tx1"/>
                 </a:solidFill>
@@ -2189,10 +2082,20 @@
                 <a:ea typeface="+mn-ea"/>
                 <a:cs typeface="+mn-cs"/>
               </a:rPr>
-              <a:t>rec </a:t>
-            </a:r>
-            <a:r>
-              <a:rPr lang="pt-BR" sz="1200" b="0" i="0" u="none" strike="noStrike" kern="1200" baseline="0" dirty="0" smtClean="0">
+              <a:t>возвращает результат...</a:t>
+            </a:r>
+            <a:endParaRPr lang="en-US" sz="1200" b="0" i="0" u="none" strike="noStrike" kern="1200" baseline="0" dirty="0" smtClean="0">
+              <a:solidFill>
+                <a:schemeClr val="tx1"/>
+              </a:solidFill>
+              <a:latin typeface="+mn-lt"/>
+              <a:ea typeface="+mn-ea"/>
+              <a:cs typeface="+mn-cs"/>
+            </a:endParaRPr>
+          </a:p>
+          <a:p>
+            <a:r>
+              <a:rPr lang="en-US" sz="1200" b="0" i="0" u="none" strike="noStrike" kern="1200" baseline="0" dirty="0" smtClean="0">
                 <a:solidFill>
                   <a:schemeClr val="tx1"/>
                 </a:solidFill>
@@ -2200,12 +2103,12 @@
                 <a:ea typeface="+mn-ea"/>
                 <a:cs typeface="+mn-cs"/>
               </a:rPr>
-              <a:t>isOdd n = (n = 1) || isEven (n - 1)</a:t>
-            </a:r>
-          </a:p>
-          <a:p>
-            <a:r>
-              <a:rPr lang="pt-BR" sz="1200" b="1" i="0" u="none" strike="noStrike" kern="1200" baseline="0" dirty="0" smtClean="0">
+              <a:t>let result =</a:t>
+            </a:r>
+          </a:p>
+          <a:p>
+            <a:r>
+              <a:rPr lang="en-US" sz="1200" b="0" i="0" u="none" strike="noStrike" kern="1200" baseline="0" dirty="0" smtClean="0">
                 <a:solidFill>
                   <a:schemeClr val="tx1"/>
                 </a:solidFill>
@@ -2213,10 +2116,12 @@
                 <a:ea typeface="+mn-ea"/>
                 <a:cs typeface="+mn-cs"/>
               </a:rPr>
-              <a:t>and </a:t>
-            </a:r>
-            <a:r>
-              <a:rPr lang="pt-BR" sz="1200" b="0" i="0" u="none" strike="noStrike" kern="1200" baseline="0" dirty="0" smtClean="0">
+              <a:t>     if x % 2 = 0 then</a:t>
+            </a:r>
+          </a:p>
+          <a:p>
+            <a:r>
+              <a:rPr lang="en-US" sz="1200" b="0" i="0" u="none" strike="noStrike" kern="1200" baseline="0" dirty="0" smtClean="0">
                 <a:solidFill>
                   <a:schemeClr val="tx1"/>
                 </a:solidFill>
@@ -2224,9 +2129,37 @@
                 <a:ea typeface="+mn-ea"/>
                 <a:cs typeface="+mn-cs"/>
               </a:rPr>
-              <a:t>isEven n = (n = 0) || isOdd (n - 1)</a:t>
-            </a:r>
-            <a:endParaRPr lang="ru-RU" sz="1200" b="0" i="0" u="none" strike="noStrike" kern="1200" baseline="0" dirty="0" smtClean="0">
+              <a:t>         "Yes it is"</a:t>
+            </a:r>
+          </a:p>
+          <a:p>
+            <a:r>
+              <a:rPr lang="en-US" sz="1200" b="0" i="0" u="none" strike="noStrike" kern="1200" baseline="0" dirty="0" smtClean="0">
+                <a:solidFill>
+                  <a:schemeClr val="tx1"/>
+                </a:solidFill>
+                <a:latin typeface="+mn-lt"/>
+                <a:ea typeface="+mn-ea"/>
+                <a:cs typeface="+mn-cs"/>
+              </a:rPr>
+              <a:t>     else</a:t>
+            </a:r>
+          </a:p>
+          <a:p>
+            <a:r>
+              <a:rPr lang="en-US" sz="1200" b="0" i="0" u="none" strike="noStrike" kern="1200" baseline="0" dirty="0" smtClean="0">
+                <a:solidFill>
+                  <a:schemeClr val="tx1"/>
+                </a:solidFill>
+                <a:latin typeface="+mn-lt"/>
+                <a:ea typeface="+mn-ea"/>
+                <a:cs typeface="+mn-cs"/>
+              </a:rPr>
+              <a:t>         "No it is not“</a:t>
+            </a:r>
+          </a:p>
+          <a:p>
+            <a:endParaRPr lang="en-US" sz="1200" b="0" i="0" u="none" strike="noStrike" kern="1200" baseline="0" dirty="0" smtClean="0">
               <a:solidFill>
                 <a:schemeClr val="tx1"/>
               </a:solidFill>
@@ -2236,18 +2169,8 @@
             </a:endParaRPr>
           </a:p>
           <a:p>
-            <a:endParaRPr lang="ru-RU" sz="1200" b="0" i="0" u="none" strike="noStrike" kern="1200" baseline="0" dirty="0" smtClean="0">
-              <a:solidFill>
-                <a:schemeClr val="tx1"/>
-              </a:solidFill>
-              <a:latin typeface="+mn-lt"/>
-              <a:ea typeface="+mn-ea"/>
-              <a:cs typeface="+mn-cs"/>
-            </a:endParaRPr>
-          </a:p>
-          <a:p>
-            <a:r>
-              <a:rPr lang="ru-RU" sz="1200" b="0" i="0" u="none" strike="noStrike" kern="1200" baseline="0" smtClean="0">
+            <a:r>
+              <a:rPr lang="uk-UA" sz="1200" b="0" i="0" u="none" strike="noStrike" kern="1200" baseline="0" dirty="0" smtClean="0">
                 <a:solidFill>
                   <a:schemeClr val="tx1"/>
                 </a:solidFill>
@@ -2255,9 +2178,283 @@
                 <a:ea typeface="+mn-ea"/>
                 <a:cs typeface="+mn-cs"/>
               </a:rPr>
-              <a:t>Непонятно где писать с маленькой буквы, где с большой.</a:t>
-            </a:r>
-            <a:endParaRPr lang="uk-UA" dirty="0"/>
+              <a:t>Можно юзать конструтор.</a:t>
+            </a:r>
+          </a:p>
+          <a:p>
+            <a:r>
+              <a:rPr lang="en-US" sz="1200" b="0" i="0" u="none" strike="noStrike" kern="1200" baseline="0" dirty="0" smtClean="0">
+                <a:solidFill>
+                  <a:schemeClr val="tx1"/>
+                </a:solidFill>
+                <a:latin typeface="+mn-lt"/>
+                <a:ea typeface="+mn-ea"/>
+                <a:cs typeface="+mn-cs"/>
+              </a:rPr>
+              <a:t>type </a:t>
+            </a:r>
+            <a:r>
+              <a:rPr lang="en-US" sz="1200" b="0" i="0" u="none" strike="noStrike" kern="1200" baseline="0" dirty="0" err="1" smtClean="0">
+                <a:solidFill>
+                  <a:schemeClr val="tx1"/>
+                </a:solidFill>
+                <a:latin typeface="+mn-lt"/>
+                <a:ea typeface="+mn-ea"/>
+                <a:cs typeface="+mn-cs"/>
+              </a:rPr>
+              <a:t>SuperService</a:t>
+            </a:r>
+            <a:r>
+              <a:rPr lang="en-US" sz="1200" b="0" i="0" u="none" strike="noStrike" kern="1200" baseline="0" dirty="0" smtClean="0">
+                <a:solidFill>
+                  <a:schemeClr val="tx1"/>
+                </a:solidFill>
+                <a:latin typeface="+mn-lt"/>
+                <a:ea typeface="+mn-ea"/>
+                <a:cs typeface="+mn-cs"/>
+              </a:rPr>
+              <a:t>(dep1: IDep1) =</a:t>
+            </a:r>
+          </a:p>
+          <a:p>
+            <a:r>
+              <a:rPr lang="en-US" sz="1200" b="0" i="0" u="none" strike="noStrike" kern="1200" baseline="0" dirty="0" smtClean="0">
+                <a:solidFill>
+                  <a:schemeClr val="tx1"/>
+                </a:solidFill>
+                <a:latin typeface="+mn-lt"/>
+                <a:ea typeface="+mn-ea"/>
+                <a:cs typeface="+mn-cs"/>
+              </a:rPr>
+              <a:t>    let </a:t>
+            </a:r>
+            <a:r>
+              <a:rPr lang="en-US" sz="1200" b="0" i="0" u="none" strike="noStrike" kern="1200" baseline="0" dirty="0" err="1" smtClean="0">
+                <a:solidFill>
+                  <a:schemeClr val="tx1"/>
+                </a:solidFill>
+                <a:latin typeface="+mn-lt"/>
+                <a:ea typeface="+mn-ea"/>
+                <a:cs typeface="+mn-cs"/>
+              </a:rPr>
+              <a:t>doSometing</a:t>
+            </a:r>
+            <a:r>
+              <a:rPr lang="en-US" sz="1200" b="0" i="0" u="none" strike="noStrike" kern="1200" baseline="0" dirty="0" smtClean="0">
+                <a:solidFill>
+                  <a:schemeClr val="tx1"/>
+                </a:solidFill>
+                <a:latin typeface="+mn-lt"/>
+                <a:ea typeface="+mn-ea"/>
+                <a:cs typeface="+mn-cs"/>
+              </a:rPr>
+              <a:t> = ()</a:t>
+            </a:r>
+            <a:r>
+              <a:rPr lang="en-US" dirty="0" smtClean="0"/>
+              <a:t>	</a:t>
+            </a:r>
+            <a:endParaRPr lang="ru-RU" dirty="0" smtClean="0"/>
+          </a:p>
+          <a:p>
+            <a:endParaRPr lang="ru-RU" dirty="0" smtClean="0"/>
+          </a:p>
+          <a:p>
+            <a:r>
+              <a:rPr lang="ru-RU" dirty="0" smtClean="0"/>
+              <a:t>Например </a:t>
+            </a:r>
+            <a:r>
+              <a:rPr lang="en-US" dirty="0" smtClean="0"/>
+              <a:t>record,</a:t>
+            </a:r>
+            <a:r>
+              <a:rPr lang="en-US" baseline="0" dirty="0" smtClean="0"/>
+              <a:t> option</a:t>
+            </a:r>
+            <a:r>
+              <a:rPr lang="ru-RU" baseline="0" dirty="0" smtClean="0"/>
+              <a:t>, </a:t>
+            </a:r>
+            <a:r>
+              <a:rPr lang="en-US" sz="1200" b="0" i="0" u="none" strike="noStrike" kern="1200" baseline="0" dirty="0" smtClean="0">
+                <a:solidFill>
+                  <a:schemeClr val="tx1"/>
+                </a:solidFill>
+                <a:latin typeface="+mn-lt"/>
+                <a:ea typeface="+mn-ea"/>
+                <a:cs typeface="+mn-cs"/>
+              </a:rPr>
+              <a:t>discriminated unions</a:t>
+            </a:r>
+            <a:endParaRPr lang="ru-RU" baseline="0" dirty="0" smtClean="0"/>
+          </a:p>
+          <a:p>
+            <a:endParaRPr lang="ru-RU" baseline="0" dirty="0" smtClean="0"/>
+          </a:p>
+          <a:p>
+            <a:r>
+              <a:rPr lang="en-US" baseline="0" dirty="0" smtClean="0"/>
+              <a:t>type Person =</a:t>
+            </a:r>
+          </a:p>
+          <a:p>
+            <a:r>
+              <a:rPr lang="en-US" baseline="0" dirty="0" smtClean="0"/>
+              <a:t>| Boy of string</a:t>
+            </a:r>
+          </a:p>
+          <a:p>
+            <a:r>
+              <a:rPr lang="en-US" baseline="0" dirty="0" smtClean="0"/>
+              <a:t>| Girl of string</a:t>
+            </a:r>
+          </a:p>
+          <a:p>
+            <a:r>
+              <a:rPr lang="en-US" baseline="0" dirty="0" smtClean="0"/>
+              <a:t>| Couple of Person * Person</a:t>
+            </a:r>
+          </a:p>
+          <a:p>
+            <a:r>
+              <a:rPr lang="en-US" baseline="0" dirty="0" smtClean="0"/>
+              <a:t>static member (+) (lhs, </a:t>
+            </a:r>
+            <a:r>
+              <a:rPr lang="en-US" baseline="0" dirty="0" err="1" smtClean="0"/>
+              <a:t>rhs</a:t>
+            </a:r>
+            <a:r>
+              <a:rPr lang="en-US" baseline="0" dirty="0" smtClean="0"/>
+              <a:t>) =</a:t>
+            </a:r>
+          </a:p>
+          <a:p>
+            <a:r>
+              <a:rPr lang="en-US" baseline="0" dirty="0" smtClean="0"/>
+              <a:t>	match lhs, </a:t>
+            </a:r>
+            <a:r>
+              <a:rPr lang="en-US" baseline="0" dirty="0" err="1" smtClean="0"/>
+              <a:t>rhs</a:t>
+            </a:r>
+            <a:r>
+              <a:rPr lang="en-US" baseline="0" dirty="0" smtClean="0"/>
+              <a:t> with</a:t>
+            </a:r>
+          </a:p>
+          <a:p>
+            <a:r>
+              <a:rPr lang="en-US" baseline="0" dirty="0" smtClean="0"/>
+              <a:t>	| Couple(_), _ </a:t>
+            </a:r>
+            <a:endParaRPr lang="ru-RU" baseline="0" dirty="0" smtClean="0"/>
+          </a:p>
+          <a:p>
+            <a:r>
+              <a:rPr lang="ru-RU" baseline="0" dirty="0" smtClean="0"/>
+              <a:t>                   </a:t>
+            </a:r>
+            <a:r>
+              <a:rPr lang="en-US" baseline="0" dirty="0" smtClean="0"/>
+              <a:t>| _, Couple(_) </a:t>
+            </a:r>
+            <a:endParaRPr lang="ru-RU" baseline="0" dirty="0" smtClean="0"/>
+          </a:p>
+          <a:p>
+            <a:r>
+              <a:rPr lang="ru-RU" baseline="0" dirty="0" smtClean="0"/>
+              <a:t>		</a:t>
+            </a:r>
+            <a:r>
+              <a:rPr lang="en-US" baseline="0" dirty="0" smtClean="0"/>
+              <a:t>-&gt; </a:t>
+            </a:r>
+            <a:r>
+              <a:rPr lang="en-US" baseline="0" dirty="0" err="1" smtClean="0"/>
+              <a:t>failwith</a:t>
+            </a:r>
+            <a:r>
+              <a:rPr lang="en-US" baseline="0" dirty="0" smtClean="0"/>
+              <a:t> "</a:t>
+            </a:r>
+            <a:r>
+              <a:rPr lang="ru-RU" baseline="0" dirty="0" smtClean="0"/>
+              <a:t>Гм... шведская семья детектед"</a:t>
+            </a:r>
+          </a:p>
+          <a:p>
+            <a:r>
+              <a:rPr lang="ru-RU" baseline="0" dirty="0" smtClean="0"/>
+              <a:t>	| _ -&gt; </a:t>
+            </a:r>
+            <a:r>
+              <a:rPr lang="en-US" baseline="0" dirty="0" smtClean="0"/>
+              <a:t>Couple(lhs, </a:t>
+            </a:r>
+            <a:r>
+              <a:rPr lang="en-US" baseline="0" dirty="0" err="1" smtClean="0"/>
+              <a:t>rhs</a:t>
+            </a:r>
+            <a:r>
+              <a:rPr lang="en-US" baseline="0" dirty="0" smtClean="0"/>
+              <a:t>)</a:t>
+            </a:r>
+            <a:endParaRPr lang="ru-RU" baseline="0" dirty="0" smtClean="0"/>
+          </a:p>
+          <a:p>
+            <a:endParaRPr lang="ru-RU" baseline="0" dirty="0" smtClean="0"/>
+          </a:p>
+          <a:p>
+            <a:pPr marL="0" marR="0" indent="0" algn="l" defTabSz="914400" rtl="0" eaLnBrk="1" fontAlgn="auto" latinLnBrk="0" hangingPunct="1">
+              <a:lnSpc>
+                <a:spcPct val="100000"/>
+              </a:lnSpc>
+              <a:spcBef>
+                <a:spcPts val="0"/>
+              </a:spcBef>
+              <a:spcAft>
+                <a:spcPts val="0"/>
+              </a:spcAft>
+              <a:buClrTx/>
+              <a:buSzTx/>
+              <a:buFontTx/>
+              <a:buNone/>
+              <a:tabLst/>
+              <a:defRPr/>
+            </a:pPr>
+            <a:r>
+              <a:rPr lang="uk-UA" baseline="0" dirty="0" smtClean="0"/>
+              <a:t>Асинхронно скачать, потом чето асинхронно скачать еще раз.</a:t>
+            </a:r>
+            <a:endParaRPr lang="en-US" dirty="0" smtClean="0"/>
+          </a:p>
+          <a:p>
+            <a:endParaRPr lang="en-US" baseline="0" dirty="0" smtClean="0"/>
+          </a:p>
+          <a:p>
+            <a:r>
+              <a:rPr lang="uk-UA" baseline="0" dirty="0" smtClean="0"/>
+              <a:t>Типизированность</a:t>
+            </a:r>
+          </a:p>
+          <a:p>
+            <a:endParaRPr lang="uk-UA" baseline="0" dirty="0" smtClean="0"/>
+          </a:p>
+          <a:p>
+            <a:r>
+              <a:rPr lang="en-US" sz="1200" b="0" i="0" u="none" strike="noStrike" kern="1200" baseline="0" dirty="0" smtClean="0">
+                <a:solidFill>
+                  <a:schemeClr val="tx1"/>
+                </a:solidFill>
+                <a:latin typeface="+mn-lt"/>
+                <a:ea typeface="+mn-ea"/>
+                <a:cs typeface="+mn-cs"/>
+              </a:rPr>
+              <a:t>Object Expressions</a:t>
+            </a:r>
+            <a:endParaRPr lang="uk-UA" baseline="0" dirty="0" smtClean="0"/>
           </a:p>
         </p:txBody>
       </p:sp>
@@ -2278,7 +2475,7 @@
           <a:p>
             <a:fld id="{327B1D59-D02F-4C0C-9439-7B18C67FCD89}" type="slidenum">
               <a:rPr lang="uk-UA" smtClean="0"/>
-              <a:t>5</a:t>
+              <a:t>6</a:t>
             </a:fld>
             <a:endParaRPr lang="uk-UA"/>
           </a:p>
@@ -2287,7 +2484,7 @@
     </p:spTree>
     <p:extLst>
       <p:ext uri="{BB962C8B-B14F-4D97-AF65-F5344CB8AC3E}">
-        <p14:creationId xmlns:p14="http://schemas.microsoft.com/office/powerpoint/2010/main" val="3345246252"/>
+        <p14:creationId xmlns:p14="http://schemas.microsoft.com/office/powerpoint/2010/main" val="289005074"/>
       </p:ext>
     </p:extLst>
   </p:cSld>
@@ -2342,6 +2539,244 @@
           <a:lstStyle/>
           <a:p>
             <a:r>
+              <a:rPr lang="ru-RU" dirty="0" smtClean="0"/>
+              <a:t>В </a:t>
+            </a:r>
+            <a:r>
+              <a:rPr lang="en-US" dirty="0" smtClean="0"/>
+              <a:t>F#</a:t>
+            </a:r>
+            <a:r>
+              <a:rPr lang="en-US" baseline="0" dirty="0" smtClean="0"/>
+              <a:t> </a:t>
+            </a:r>
+            <a:r>
+              <a:rPr lang="uk-UA" baseline="0" dirty="0" smtClean="0"/>
+              <a:t>большое значние имеет положение файла в проекте. Они компилятся последовательно. Соотвевенно если клас дефайнится позже, его никто не найдет.</a:t>
+            </a:r>
+          </a:p>
+          <a:p>
+            <a:endParaRPr lang="uk-UA" baseline="0" dirty="0" smtClean="0"/>
+          </a:p>
+          <a:p>
+            <a:r>
+              <a:rPr lang="uk-UA" baseline="0" dirty="0" smtClean="0"/>
+              <a:t>Интеграция со студией так себе... Нема рефакторингов. Нема папок.</a:t>
+            </a:r>
+          </a:p>
+          <a:p>
+            <a:endParaRPr lang="uk-UA" baseline="0" dirty="0" smtClean="0"/>
+          </a:p>
+          <a:p>
+            <a:r>
+              <a:rPr lang="uk-UA" baseline="0" dirty="0" smtClean="0"/>
+              <a:t>Нема автоматического приведения типов. </a:t>
+            </a:r>
+            <a:r>
+              <a:rPr lang="en-US" baseline="0" dirty="0" smtClean="0"/>
+              <a:t>let s : </a:t>
+            </a:r>
+            <a:r>
+              <a:rPr lang="en-US" baseline="0" dirty="0" err="1" smtClean="0"/>
+              <a:t>int</a:t>
+            </a:r>
+            <a:r>
+              <a:rPr lang="en-US" baseline="0" dirty="0" smtClean="0"/>
+              <a:t> = 12.5m </a:t>
+            </a:r>
+            <a:r>
+              <a:rPr lang="uk-UA" baseline="0" dirty="0" smtClean="0"/>
+              <a:t>не будет работать.</a:t>
+            </a:r>
+            <a:endParaRPr lang="en-US" baseline="0" dirty="0" smtClean="0"/>
+          </a:p>
+          <a:p>
+            <a:endParaRPr lang="en-US" baseline="0" dirty="0" smtClean="0"/>
+          </a:p>
+          <a:p>
+            <a:r>
+              <a:rPr lang="uk-UA" baseline="0" dirty="0" smtClean="0"/>
+              <a:t>Два костыля. У в</a:t>
+            </a:r>
+            <a:r>
+              <a:rPr lang="ru-RU" baseline="0" dirty="0" smtClean="0"/>
+              <a:t>ывода типов есть маленькая проблемка, это рекурсия. Как можно вывести что-то, чего пока нет? Еще смешнее ситуация когда двойная рекурсия, метод1 вызывает метод2, который в свою очередь вызывает метод 1...</a:t>
+            </a:r>
+          </a:p>
+          <a:p>
+            <a:r>
+              <a:rPr lang="pt-BR" sz="1200" b="0" i="0" u="none" strike="noStrike" kern="1200" baseline="0" dirty="0" smtClean="0">
+                <a:solidFill>
+                  <a:schemeClr val="tx1"/>
+                </a:solidFill>
+                <a:latin typeface="+mn-lt"/>
+                <a:ea typeface="+mn-ea"/>
+                <a:cs typeface="+mn-cs"/>
+              </a:rPr>
+              <a:t>let </a:t>
+            </a:r>
+            <a:r>
+              <a:rPr lang="pt-BR" sz="1200" b="1" i="0" u="none" strike="noStrike" kern="1200" baseline="0" dirty="0" smtClean="0">
+                <a:solidFill>
+                  <a:schemeClr val="tx1"/>
+                </a:solidFill>
+                <a:latin typeface="+mn-lt"/>
+                <a:ea typeface="+mn-ea"/>
+                <a:cs typeface="+mn-cs"/>
+              </a:rPr>
+              <a:t>rec </a:t>
+            </a:r>
+            <a:r>
+              <a:rPr lang="pt-BR" sz="1200" b="0" i="0" u="none" strike="noStrike" kern="1200" baseline="0" dirty="0" smtClean="0">
+                <a:solidFill>
+                  <a:schemeClr val="tx1"/>
+                </a:solidFill>
+                <a:latin typeface="+mn-lt"/>
+                <a:ea typeface="+mn-ea"/>
+                <a:cs typeface="+mn-cs"/>
+              </a:rPr>
+              <a:t>isOdd n = (n = 1) || isEven (n - 1)</a:t>
+            </a:r>
+          </a:p>
+          <a:p>
+            <a:r>
+              <a:rPr lang="pt-BR" sz="1200" b="1" i="0" u="none" strike="noStrike" kern="1200" baseline="0" dirty="0" smtClean="0">
+                <a:solidFill>
+                  <a:schemeClr val="tx1"/>
+                </a:solidFill>
+                <a:latin typeface="+mn-lt"/>
+                <a:ea typeface="+mn-ea"/>
+                <a:cs typeface="+mn-cs"/>
+              </a:rPr>
+              <a:t>and </a:t>
+            </a:r>
+            <a:r>
+              <a:rPr lang="pt-BR" sz="1200" b="0" i="0" u="none" strike="noStrike" kern="1200" baseline="0" dirty="0" smtClean="0">
+                <a:solidFill>
+                  <a:schemeClr val="tx1"/>
+                </a:solidFill>
+                <a:latin typeface="+mn-lt"/>
+                <a:ea typeface="+mn-ea"/>
+                <a:cs typeface="+mn-cs"/>
+              </a:rPr>
+              <a:t>isEven n = (n = 0) || isOdd (n - 1)</a:t>
+            </a:r>
+            <a:endParaRPr lang="ru-RU" sz="1200" b="0" i="0" u="none" strike="noStrike" kern="1200" baseline="0" dirty="0" smtClean="0">
+              <a:solidFill>
+                <a:schemeClr val="tx1"/>
+              </a:solidFill>
+              <a:latin typeface="+mn-lt"/>
+              <a:ea typeface="+mn-ea"/>
+              <a:cs typeface="+mn-cs"/>
+            </a:endParaRPr>
+          </a:p>
+          <a:p>
+            <a:endParaRPr lang="ru-RU" sz="1200" b="0" i="0" u="none" strike="noStrike" kern="1200" baseline="0" dirty="0" smtClean="0">
+              <a:solidFill>
+                <a:schemeClr val="tx1"/>
+              </a:solidFill>
+              <a:latin typeface="+mn-lt"/>
+              <a:ea typeface="+mn-ea"/>
+              <a:cs typeface="+mn-cs"/>
+            </a:endParaRPr>
+          </a:p>
+          <a:p>
+            <a:r>
+              <a:rPr lang="ru-RU" sz="1200" b="0" i="0" u="none" strike="noStrike" kern="1200" baseline="0" smtClean="0">
+                <a:solidFill>
+                  <a:schemeClr val="tx1"/>
+                </a:solidFill>
+                <a:latin typeface="+mn-lt"/>
+                <a:ea typeface="+mn-ea"/>
+                <a:cs typeface="+mn-cs"/>
+              </a:rPr>
+              <a:t>Непонятно где писать с маленькой буквы, где с большой.</a:t>
+            </a:r>
+            <a:endParaRPr lang="uk-UA" dirty="0"/>
+          </a:p>
+        </p:txBody>
+      </p:sp>
+      <p:sp>
+        <p:nvSpPr>
+          <p:cNvPr id="4" name="Slide Number Placeholder 3"/>
+          <p:cNvSpPr>
+            <a:spLocks noGrp="1"/>
+          </p:cNvSpPr>
+          <p:nvPr>
+            <p:ph type="sldNum" sz="quarter" idx="10"/>
+          </p:nvPr>
+        </p:nvSpPr>
+        <p:spPr/>
+        <p:txBody>
+          <a:bodyPr/>
+          <a:lstStyle/>
+          <a:p>
+            <a:fld id="{327B1D59-D02F-4C0C-9439-7B18C67FCD89}" type="slidenum">
+              <a:rPr lang="uk-UA" smtClean="0"/>
+              <a:t>7</a:t>
+            </a:fld>
+            <a:endParaRPr lang="uk-UA"/>
+          </a:p>
+        </p:txBody>
+      </p:sp>
+    </p:spTree>
+    <p:extLst>
+      <p:ext uri="{BB962C8B-B14F-4D97-AF65-F5344CB8AC3E}">
+        <p14:creationId xmlns:p14="http://schemas.microsoft.com/office/powerpoint/2010/main" val="3345246252"/>
+      </p:ext>
+    </p:extLst>
+  </p:cSld>
+  <p:clrMapOvr>
+    <a:masterClrMapping/>
+  </p:clrMapOvr>
+</p:notes>
+</file>
+
+<file path=ppt/notesSlides/notesSlide7.xml><?xml version="1.0" encoding="utf-8"?>
+<p:notes xmlns:a="http://schemas.openxmlformats.org/drawingml/2006/main" xmlns:r="http://schemas.openxmlformats.org/officeDocument/2006/relationships" xmlns:p="http://schemas.openxmlformats.org/presentationml/2006/main">
+  <p:cSld>
+    <p:spTree>
+      <p:nvGrpSpPr>
+        <p:cNvPr id="1" name=""/>
+        <p:cNvGrpSpPr/>
+        <p:nvPr/>
+      </p:nvGrpSpPr>
+      <p:grpSpPr>
+        <a:xfrm>
+          <a:off x="0" y="0"/>
+          <a:ext cx="0" cy="0"/>
+          <a:chOff x="0" y="0"/>
+          <a:chExt cx="0" cy="0"/>
+        </a:xfrm>
+      </p:grpSpPr>
+      <p:sp>
+        <p:nvSpPr>
+          <p:cNvPr id="2" name="Slide Image Placeholder 1"/>
+          <p:cNvSpPr>
+            <a:spLocks noGrp="1" noRot="1" noChangeAspect="1"/>
+          </p:cNvSpPr>
+          <p:nvPr>
+            <p:ph type="sldImg"/>
+          </p:nvPr>
+        </p:nvSpPr>
+        <p:spPr/>
+      </p:sp>
+      <p:sp>
+        <p:nvSpPr>
+          <p:cNvPr id="3" name="Notes Placeholder 2"/>
+          <p:cNvSpPr>
+            <a:spLocks noGrp="1"/>
+          </p:cNvSpPr>
+          <p:nvPr>
+            <p:ph type="body" idx="1"/>
+          </p:nvPr>
+        </p:nvSpPr>
+        <p:spPr/>
+        <p:txBody>
+          <a:bodyPr/>
+          <a:lstStyle/>
+          <a:p>
+            <a:r>
               <a:rPr lang="uk-UA" baseline="0" dirty="0" smtClean="0"/>
               <a:t>Офф, сайт. Ловить там правда нечего. А так это редирект на </a:t>
             </a:r>
@@ -2491,7 +2926,7 @@
           <a:p>
             <a:fld id="{327B1D59-D02F-4C0C-9439-7B18C67FCD89}" type="slidenum">
               <a:rPr lang="uk-UA" smtClean="0"/>
-              <a:t>6</a:t>
+              <a:t>8</a:t>
             </a:fld>
             <a:endParaRPr lang="uk-UA"/>
           </a:p>
@@ -5845,7 +6280,11 @@
           <a:p>
             <a:r>
               <a:rPr lang="ru-RU" dirty="0" smtClean="0"/>
-              <a:t>Мелкие класные фишки</a:t>
+              <a:t>Розма</a:t>
+            </a:r>
+            <a:r>
+              <a:rPr lang="uk-UA" dirty="0" smtClean="0"/>
+              <a:t>їття типів</a:t>
             </a:r>
             <a:endParaRPr lang="en-US" dirty="0"/>
           </a:p>
@@ -5868,91 +6307,41 @@
           <a:p>
             <a:r>
               <a:rPr lang="en-US" dirty="0" smtClean="0"/>
-              <a:t>if</a:t>
-            </a:r>
-            <a:r>
-              <a:rPr lang="uk-UA" dirty="0" smtClean="0"/>
-              <a:t> возвращает результат</a:t>
-            </a:r>
+              <a:t>Record</a:t>
+            </a:r>
+            <a:endParaRPr lang="ru-RU" dirty="0" smtClean="0"/>
           </a:p>
           <a:p>
             <a:r>
               <a:rPr lang="en-US" dirty="0" smtClean="0"/>
-              <a:t>DI </a:t>
-            </a:r>
-            <a:r>
-              <a:rPr lang="uk-UA" dirty="0" smtClean="0"/>
-              <a:t>средствами </a:t>
-            </a:r>
+              <a:t>Tuple</a:t>
+            </a:r>
+          </a:p>
+          <a:p>
             <a:r>
               <a:rPr lang="en-US" dirty="0" smtClean="0"/>
-              <a:t>F#</a:t>
-            </a:r>
-          </a:p>
-          <a:p>
-            <a:r>
-              <a:rPr lang="uk-UA" dirty="0" smtClean="0"/>
-              <a:t>Куча разн</a:t>
-            </a:r>
-            <a:r>
-              <a:rPr lang="ru-RU" dirty="0" smtClean="0"/>
-              <a:t>ых встроенных типов</a:t>
+              <a:t>Discriminated Union</a:t>
+            </a:r>
+          </a:p>
+          <a:p>
+            <a:r>
+              <a:rPr lang="en-US" dirty="0" smtClean="0"/>
+              <a:t>Class</a:t>
+            </a:r>
+          </a:p>
+          <a:p>
+            <a:r>
+              <a:rPr lang="en-US" dirty="0" err="1" smtClean="0"/>
+              <a:t>Struct</a:t>
             </a:r>
             <a:endParaRPr lang="en-US" dirty="0" smtClean="0"/>
-          </a:p>
-          <a:p>
-            <a:r>
-              <a:rPr lang="en-US" dirty="0" err="1"/>
-              <a:t>a</a:t>
-            </a:r>
-            <a:r>
-              <a:rPr lang="en-US" dirty="0" err="1" smtClean="0"/>
-              <a:t>sync</a:t>
-            </a:r>
-            <a:r>
-              <a:rPr lang="en-US" dirty="0" smtClean="0"/>
-              <a:t> </a:t>
-            </a:r>
-            <a:r>
-              <a:rPr lang="uk-UA" dirty="0" smtClean="0"/>
-              <a:t>воркфлоу...</a:t>
-            </a:r>
-          </a:p>
-          <a:p>
-            <a:r>
-              <a:rPr lang="en-US" dirty="0" err="1" smtClean="0"/>
-              <a:t>printfn</a:t>
-            </a:r>
-            <a:endParaRPr lang="ru-RU" dirty="0" smtClean="0"/>
-          </a:p>
-          <a:p>
-            <a:r>
-              <a:rPr lang="en-US" dirty="0" err="1" smtClean="0"/>
-              <a:t>Nullability</a:t>
-            </a:r>
-            <a:r>
-              <a:rPr lang="en-US" dirty="0" smtClean="0"/>
-              <a:t>…</a:t>
-            </a:r>
-            <a:endParaRPr lang="uk-UA" dirty="0" smtClean="0"/>
-          </a:p>
-          <a:p>
-            <a:r>
-              <a:rPr lang="uk-UA" dirty="0" smtClean="0"/>
-              <a:t>Анонимн</a:t>
-            </a:r>
-            <a:r>
-              <a:rPr lang="ru-RU" dirty="0" smtClean="0"/>
-              <a:t>ые реализации..</a:t>
-            </a:r>
-            <a:endParaRPr lang="en-US" dirty="0"/>
           </a:p>
         </p:txBody>
       </p:sp>
     </p:spTree>
     <p:extLst>
       <p:ext uri="{BB962C8B-B14F-4D97-AF65-F5344CB8AC3E}">
-        <p14:creationId xmlns:p14="http://schemas.microsoft.com/office/powerpoint/2010/main" val="248792973"/>
+        <p14:creationId xmlns:p14="http://schemas.microsoft.com/office/powerpoint/2010/main" val="3291161434"/>
       </p:ext>
     </p:extLst>
   </p:cSld>
@@ -5995,6 +6384,263 @@
           <a:lstStyle/>
           <a:p>
             <a:r>
+              <a:rPr lang="ru-RU" dirty="0" smtClean="0"/>
+              <a:t>Структура программы</a:t>
+            </a:r>
+            <a:endParaRPr lang="en-US" dirty="0"/>
+          </a:p>
+        </p:txBody>
+      </p:sp>
+      <p:sp>
+        <p:nvSpPr>
+          <p:cNvPr id="3" name="Content Placeholder 2"/>
+          <p:cNvSpPr>
+            <a:spLocks noGrp="1"/>
+          </p:cNvSpPr>
+          <p:nvPr>
+            <p:ph idx="1"/>
+          </p:nvPr>
+        </p:nvSpPr>
+        <p:spPr/>
+        <p:txBody>
+          <a:bodyPr/>
+          <a:lstStyle/>
+          <a:p>
+            <a:r>
+              <a:rPr lang="en-US" dirty="0" smtClean="0"/>
+              <a:t>module</a:t>
+            </a:r>
+            <a:endParaRPr lang="ru-RU" dirty="0" smtClean="0"/>
+          </a:p>
+          <a:p>
+            <a:r>
+              <a:rPr lang="en-US" dirty="0"/>
+              <a:t>n</a:t>
+            </a:r>
+            <a:r>
+              <a:rPr lang="en-US" dirty="0" smtClean="0"/>
+              <a:t>amespace</a:t>
+            </a:r>
+          </a:p>
+          <a:p>
+            <a:r>
+              <a:rPr lang="en-US" dirty="0"/>
+              <a:t>t</a:t>
+            </a:r>
+            <a:r>
+              <a:rPr lang="en-US" dirty="0" smtClean="0"/>
+              <a:t>ype (class)</a:t>
+            </a:r>
+          </a:p>
+          <a:p>
+            <a:r>
+              <a:rPr lang="en-US" dirty="0" smtClean="0"/>
+              <a:t>static type class</a:t>
+            </a:r>
+            <a:endParaRPr lang="ru-RU" dirty="0" smtClean="0"/>
+          </a:p>
+          <a:p>
+            <a:endParaRPr lang="en-US" dirty="0"/>
+          </a:p>
+        </p:txBody>
+      </p:sp>
+    </p:spTree>
+    <p:extLst>
+      <p:ext uri="{BB962C8B-B14F-4D97-AF65-F5344CB8AC3E}">
+        <p14:creationId xmlns:p14="http://schemas.microsoft.com/office/powerpoint/2010/main" val="3094953017"/>
+      </p:ext>
+    </p:extLst>
+  </p:cSld>
+  <p:clrMapOvr>
+    <a:masterClrMapping/>
+  </p:clrMapOvr>
+</p:sld>
+</file>
+
+<file path=ppt/slides/slide6.xml><?xml version="1.0" encoding="utf-8"?>
+<p:sld xmlns:a="http://schemas.openxmlformats.org/drawingml/2006/main" xmlns:r="http://schemas.openxmlformats.org/officeDocument/2006/relationships" xmlns:p="http://schemas.openxmlformats.org/presentationml/2006/main">
+  <p:cSld>
+    <p:spTree>
+      <p:nvGrpSpPr>
+        <p:cNvPr id="1" name=""/>
+        <p:cNvGrpSpPr/>
+        <p:nvPr/>
+      </p:nvGrpSpPr>
+      <p:grpSpPr>
+        <a:xfrm>
+          <a:off x="0" y="0"/>
+          <a:ext cx="0" cy="0"/>
+          <a:chOff x="0" y="0"/>
+          <a:chExt cx="0" cy="0"/>
+        </a:xfrm>
+      </p:grpSpPr>
+      <p:sp>
+        <p:nvSpPr>
+          <p:cNvPr id="2" name="Title 1"/>
+          <p:cNvSpPr>
+            <a:spLocks noGrp="1"/>
+          </p:cNvSpPr>
+          <p:nvPr>
+            <p:ph type="title"/>
+          </p:nvPr>
+        </p:nvSpPr>
+        <p:spPr/>
+        <p:txBody>
+          <a:bodyPr/>
+          <a:lstStyle/>
+          <a:p>
+            <a:r>
+              <a:rPr lang="ru-RU" dirty="0" smtClean="0"/>
+              <a:t>Мелкие класные фишки</a:t>
+            </a:r>
+            <a:endParaRPr lang="en-US" dirty="0"/>
+          </a:p>
+        </p:txBody>
+      </p:sp>
+      <p:sp>
+        <p:nvSpPr>
+          <p:cNvPr id="3" name="Content Placeholder 2"/>
+          <p:cNvSpPr>
+            <a:spLocks noGrp="1"/>
+          </p:cNvSpPr>
+          <p:nvPr>
+            <p:ph idx="1"/>
+          </p:nvPr>
+        </p:nvSpPr>
+        <p:spPr/>
+        <p:txBody>
+          <a:bodyPr/>
+          <a:lstStyle/>
+          <a:p>
+            <a:r>
+              <a:rPr lang="en-US" dirty="0" smtClean="0"/>
+              <a:t>if</a:t>
+            </a:r>
+            <a:r>
+              <a:rPr lang="uk-UA" dirty="0" smtClean="0"/>
+              <a:t> возвращает результат</a:t>
+            </a:r>
+          </a:p>
+          <a:p>
+            <a:r>
+              <a:rPr lang="en-US" dirty="0" smtClean="0"/>
+              <a:t>DI </a:t>
+            </a:r>
+            <a:r>
+              <a:rPr lang="uk-UA" dirty="0" smtClean="0"/>
+              <a:t>средствами </a:t>
+            </a:r>
+            <a:r>
+              <a:rPr lang="en-US" dirty="0" smtClean="0"/>
+              <a:t>F#</a:t>
+            </a:r>
+          </a:p>
+          <a:p>
+            <a:r>
+              <a:rPr lang="uk-UA" dirty="0" smtClean="0"/>
+              <a:t>Куча разн</a:t>
+            </a:r>
+            <a:r>
+              <a:rPr lang="ru-RU" dirty="0" smtClean="0"/>
+              <a:t>ых встроенных типов</a:t>
+            </a:r>
+            <a:endParaRPr lang="en-US" dirty="0" smtClean="0"/>
+          </a:p>
+          <a:p>
+            <a:r>
+              <a:rPr lang="en-US" dirty="0" err="1"/>
+              <a:t>a</a:t>
+            </a:r>
+            <a:r>
+              <a:rPr lang="en-US" dirty="0" err="1" smtClean="0"/>
+              <a:t>sync</a:t>
+            </a:r>
+            <a:r>
+              <a:rPr lang="en-US" dirty="0" smtClean="0"/>
+              <a:t> </a:t>
+            </a:r>
+            <a:r>
+              <a:rPr lang="uk-UA" dirty="0" smtClean="0"/>
+              <a:t>воркфлоу...</a:t>
+            </a:r>
+          </a:p>
+          <a:p>
+            <a:r>
+              <a:rPr lang="en-US" dirty="0" err="1" smtClean="0"/>
+              <a:t>printfn</a:t>
+            </a:r>
+            <a:endParaRPr lang="ru-RU" dirty="0" smtClean="0"/>
+          </a:p>
+          <a:p>
+            <a:r>
+              <a:rPr lang="en-US" dirty="0" err="1" smtClean="0"/>
+              <a:t>Nullability</a:t>
+            </a:r>
+            <a:r>
+              <a:rPr lang="en-US" dirty="0" smtClean="0"/>
+              <a:t>…</a:t>
+            </a:r>
+            <a:endParaRPr lang="uk-UA" dirty="0" smtClean="0"/>
+          </a:p>
+          <a:p>
+            <a:r>
+              <a:rPr lang="uk-UA" dirty="0" smtClean="0"/>
+              <a:t>Анонимн</a:t>
+            </a:r>
+            <a:r>
+              <a:rPr lang="ru-RU" dirty="0" smtClean="0"/>
+              <a:t>ые реализации..</a:t>
+            </a:r>
+            <a:endParaRPr lang="en-US" dirty="0"/>
+          </a:p>
+        </p:txBody>
+      </p:sp>
+    </p:spTree>
+    <p:extLst>
+      <p:ext uri="{BB962C8B-B14F-4D97-AF65-F5344CB8AC3E}">
+        <p14:creationId xmlns:p14="http://schemas.microsoft.com/office/powerpoint/2010/main" val="248792973"/>
+      </p:ext>
+    </p:extLst>
+  </p:cSld>
+  <p:clrMapOvr>
+    <a:masterClrMapping/>
+  </p:clrMapOvr>
+</p:sld>
+</file>
+
+<file path=ppt/slides/slide7.xml><?xml version="1.0" encoding="utf-8"?>
+<p:sld xmlns:a="http://schemas.openxmlformats.org/drawingml/2006/main" xmlns:r="http://schemas.openxmlformats.org/officeDocument/2006/relationships" xmlns:p="http://schemas.openxmlformats.org/presentationml/2006/main">
+  <p:cSld>
+    <p:spTree>
+      <p:nvGrpSpPr>
+        <p:cNvPr id="1" name=""/>
+        <p:cNvGrpSpPr/>
+        <p:nvPr/>
+      </p:nvGrpSpPr>
+      <p:grpSpPr>
+        <a:xfrm>
+          <a:off x="0" y="0"/>
+          <a:ext cx="0" cy="0"/>
+          <a:chOff x="0" y="0"/>
+          <a:chExt cx="0" cy="0"/>
+        </a:xfrm>
+      </p:grpSpPr>
+      <p:sp>
+        <p:nvSpPr>
+          <p:cNvPr id="2" name="Title 1"/>
+          <p:cNvSpPr>
+            <a:spLocks noGrp="1"/>
+          </p:cNvSpPr>
+          <p:nvPr>
+            <p:ph type="title"/>
+          </p:nvPr>
+        </p:nvSpPr>
+        <p:spPr/>
+        <p:txBody>
+          <a:bodyPr/>
+          <a:lstStyle/>
+          <a:p>
+            <a:r>
               <a:rPr lang="uk-UA" dirty="0" smtClean="0"/>
               <a:t>Проблем</a:t>
             </a:r>
@@ -6088,7 +6734,7 @@
 </p:sld>
 </file>
 
-<file path=ppt/slides/slide6.xml><?xml version="1.0" encoding="utf-8"?>
+<file path=ppt/slides/slide8.xml><?xml version="1.0" encoding="utf-8"?>
 <p:sld xmlns:a="http://schemas.openxmlformats.org/drawingml/2006/main" xmlns:r="http://schemas.openxmlformats.org/officeDocument/2006/relationships" xmlns:p="http://schemas.openxmlformats.org/presentationml/2006/main">
   <p:cSld>
     <p:spTree>

</xml_diff>

<commit_message>
NormalFSharp: added final stuff...
</commit_message>
<xml_diff>
--- a/NormalFSharp/NormalFSharp.pptx
+++ b/NormalFSharp/NormalFSharp.pptx
@@ -5,7 +5,7 @@
     <p:sldMasterId id="2147483648" r:id="rId1"/>
   </p:sldMasterIdLst>
   <p:notesMasterIdLst>
-    <p:notesMasterId r:id="rId12"/>
+    <p:notesMasterId r:id="rId14"/>
   </p:notesMasterIdLst>
   <p:sldIdLst>
     <p:sldId id="256" r:id="rId2"/>
@@ -15,12 +15,14 @@
     <p:sldId id="264" r:id="rId6"/>
     <p:sldId id="263" r:id="rId7"/>
     <p:sldId id="265" r:id="rId8"/>
-    <p:sldId id="258" r:id="rId9"/>
-    <p:sldId id="257" r:id="rId10"/>
-    <p:sldId id="259" r:id="rId11"/>
+    <p:sldId id="267" r:id="rId9"/>
+    <p:sldId id="266" r:id="rId10"/>
+    <p:sldId id="258" r:id="rId11"/>
+    <p:sldId id="257" r:id="rId12"/>
+    <p:sldId id="259" r:id="rId13"/>
   </p:sldIdLst>
   <p:sldSz cx="9144000" cy="6858000" type="screen4x3"/>
-  <p:notesSz cx="6858000" cy="9144000"/>
+  <p:notesSz cx="7315200" cy="9601200"/>
   <p:defaultTextStyle>
     <a:defPPr>
       <a:defRPr lang="uk-UA"/>
@@ -154,17 +156,17 @@
         <p:spPr>
           <a:xfrm>
             <a:off x="0" y="0"/>
-            <a:ext cx="2971800" cy="457200"/>
+            <a:ext cx="3169920" cy="480060"/>
           </a:xfrm>
           <a:prstGeom prst="rect">
             <a:avLst/>
           </a:prstGeom>
         </p:spPr>
         <p:txBody>
-          <a:bodyPr vert="horz" lIns="91440" tIns="45720" rIns="91440" bIns="45720" rtlCol="0"/>
+          <a:bodyPr vert="horz" lIns="96661" tIns="48331" rIns="96661" bIns="48331" rtlCol="0"/>
           <a:lstStyle>
             <a:lvl1pPr algn="l">
-              <a:defRPr sz="1200"/>
+              <a:defRPr sz="1300"/>
             </a:lvl1pPr>
           </a:lstStyle>
           <a:p>
@@ -184,18 +186,18 @@
         </p:nvSpPr>
         <p:spPr>
           <a:xfrm>
-            <a:off x="3884613" y="0"/>
-            <a:ext cx="2971800" cy="457200"/>
+            <a:off x="4143587" y="0"/>
+            <a:ext cx="3169920" cy="480060"/>
           </a:xfrm>
           <a:prstGeom prst="rect">
             <a:avLst/>
           </a:prstGeom>
         </p:spPr>
         <p:txBody>
-          <a:bodyPr vert="horz" lIns="91440" tIns="45720" rIns="91440" bIns="45720" rtlCol="0"/>
+          <a:bodyPr vert="horz" lIns="96661" tIns="48331" rIns="96661" bIns="48331" rtlCol="0"/>
           <a:lstStyle>
             <a:lvl1pPr algn="r">
-              <a:defRPr sz="1200"/>
+              <a:defRPr sz="1300"/>
             </a:lvl1pPr>
           </a:lstStyle>
           <a:p>
@@ -219,8 +221,8 @@
         </p:nvSpPr>
         <p:spPr>
           <a:xfrm>
-            <a:off x="1143000" y="685800"/>
-            <a:ext cx="4572000" cy="3429000"/>
+            <a:off x="1257300" y="720725"/>
+            <a:ext cx="4800600" cy="3600450"/>
           </a:xfrm>
           <a:prstGeom prst="rect">
             <a:avLst/>
@@ -233,7 +235,7 @@
           </a:ln>
         </p:spPr>
         <p:txBody>
-          <a:bodyPr vert="horz" lIns="91440" tIns="45720" rIns="91440" bIns="45720" rtlCol="0" anchor="ctr"/>
+          <a:bodyPr vert="horz" lIns="96661" tIns="48331" rIns="96661" bIns="48331" rtlCol="0" anchor="ctr"/>
           <a:lstStyle/>
           <a:p>
             <a:endParaRPr lang="uk-UA"/>
@@ -252,15 +254,15 @@
         </p:nvSpPr>
         <p:spPr>
           <a:xfrm>
-            <a:off x="685800" y="4343400"/>
-            <a:ext cx="5486400" cy="4114800"/>
+            <a:off x="731520" y="4560570"/>
+            <a:ext cx="5852160" cy="4320540"/>
           </a:xfrm>
           <a:prstGeom prst="rect">
             <a:avLst/>
           </a:prstGeom>
         </p:spPr>
         <p:txBody>
-          <a:bodyPr vert="horz" lIns="91440" tIns="45720" rIns="91440" bIns="45720" rtlCol="0"/>
+          <a:bodyPr vert="horz" lIns="96661" tIns="48331" rIns="96661" bIns="48331" rtlCol="0"/>
           <a:lstStyle/>
           <a:p>
             <a:pPr lvl="0"/>
@@ -312,18 +314,18 @@
         </p:nvSpPr>
         <p:spPr>
           <a:xfrm>
-            <a:off x="0" y="8685213"/>
-            <a:ext cx="2971800" cy="457200"/>
+            <a:off x="0" y="9119474"/>
+            <a:ext cx="3169920" cy="480060"/>
           </a:xfrm>
           <a:prstGeom prst="rect">
             <a:avLst/>
           </a:prstGeom>
         </p:spPr>
         <p:txBody>
-          <a:bodyPr vert="horz" lIns="91440" tIns="45720" rIns="91440" bIns="45720" rtlCol="0" anchor="b"/>
+          <a:bodyPr vert="horz" lIns="96661" tIns="48331" rIns="96661" bIns="48331" rtlCol="0" anchor="b"/>
           <a:lstStyle>
             <a:lvl1pPr algn="l">
-              <a:defRPr sz="1200"/>
+              <a:defRPr sz="1300"/>
             </a:lvl1pPr>
           </a:lstStyle>
           <a:p>
@@ -343,18 +345,18 @@
         </p:nvSpPr>
         <p:spPr>
           <a:xfrm>
-            <a:off x="3884613" y="8685213"/>
-            <a:ext cx="2971800" cy="457200"/>
+            <a:off x="4143587" y="9119474"/>
+            <a:ext cx="3169920" cy="480060"/>
           </a:xfrm>
           <a:prstGeom prst="rect">
             <a:avLst/>
           </a:prstGeom>
         </p:spPr>
         <p:txBody>
-          <a:bodyPr vert="horz" lIns="91440" tIns="45720" rIns="91440" bIns="45720" rtlCol="0" anchor="b"/>
+          <a:bodyPr vert="horz" lIns="96661" tIns="48331" rIns="96661" bIns="48331" rtlCol="0" anchor="b"/>
           <a:lstStyle>
             <a:lvl1pPr algn="r">
-              <a:defRPr sz="1200"/>
+              <a:defRPr sz="1300"/>
             </a:lvl1pPr>
           </a:lstStyle>
           <a:p>
@@ -496,7 +498,12 @@
             <p:ph type="sldImg"/>
           </p:nvPr>
         </p:nvSpPr>
-        <p:spPr/>
+        <p:spPr>
+          <a:xfrm>
+            <a:off x="2752725" y="720725"/>
+            <a:ext cx="1809750" cy="1357313"/>
+          </a:xfrm>
+        </p:spPr>
       </p:sp>
       <p:sp>
         <p:nvSpPr>
@@ -508,26 +515,17 @@
             <p:ph type="body" idx="1"/>
           </p:nvPr>
         </p:nvSpPr>
-        <p:spPr/>
-        <p:txBody>
-          <a:bodyPr/>
-          <a:lstStyle/>
-          <a:p>
-            <a:pPr marL="0" marR="0" indent="0" algn="l" defTabSz="914400" rtl="0" eaLnBrk="1" fontAlgn="auto" latinLnBrk="0" hangingPunct="1">
-              <a:lnSpc>
-                <a:spcPct val="100000"/>
-              </a:lnSpc>
-              <a:spcBef>
-                <a:spcPts val="0"/>
-              </a:spcBef>
-              <a:spcAft>
-                <a:spcPts val="0"/>
-              </a:spcAft>
-              <a:buClrTx/>
-              <a:buSzTx/>
-              <a:buFontTx/>
-              <a:buNone/>
-              <a:tabLst/>
+        <p:spPr>
+          <a:xfrm>
+            <a:off x="731520" y="2456740"/>
+            <a:ext cx="5852160" cy="6424370"/>
+          </a:xfrm>
+        </p:spPr>
+        <p:txBody>
+          <a:bodyPr/>
+          <a:lstStyle/>
+          <a:p>
+            <a:pPr defTabSz="966612">
               <a:defRPr/>
             </a:pPr>
             <a:r>
@@ -540,41 +538,13 @@
             </a:r>
           </a:p>
           <a:p>
-            <a:pPr marL="0" marR="0" indent="0" algn="l" defTabSz="914400" rtl="0" eaLnBrk="1" fontAlgn="auto" latinLnBrk="0" hangingPunct="1">
-              <a:lnSpc>
-                <a:spcPct val="100000"/>
-              </a:lnSpc>
-              <a:spcBef>
-                <a:spcPts val="0"/>
-              </a:spcBef>
-              <a:spcAft>
-                <a:spcPts val="0"/>
-              </a:spcAft>
-              <a:buClrTx/>
-              <a:buSzTx/>
-              <a:buFontTx/>
-              <a:buNone/>
-              <a:tabLst/>
+            <a:pPr defTabSz="966612">
               <a:defRPr/>
             </a:pPr>
             <a:endParaRPr lang="ru-RU" strike="sngStrike" baseline="0" dirty="0" smtClean="0"/>
           </a:p>
           <a:p>
-            <a:pPr marL="0" marR="0" indent="0" algn="l" defTabSz="914400" rtl="0" eaLnBrk="1" fontAlgn="auto" latinLnBrk="0" hangingPunct="1">
-              <a:lnSpc>
-                <a:spcPct val="100000"/>
-              </a:lnSpc>
-              <a:spcBef>
-                <a:spcPts val="0"/>
-              </a:spcBef>
-              <a:spcAft>
-                <a:spcPts val="0"/>
-              </a:spcAft>
-              <a:buClrTx/>
-              <a:buSzTx/>
-              <a:buFontTx/>
-              <a:buNone/>
-              <a:tabLst/>
+            <a:pPr defTabSz="966612">
               <a:defRPr/>
             </a:pPr>
             <a:r>
@@ -583,41 +553,13 @@
             </a:r>
           </a:p>
           <a:p>
-            <a:pPr marL="0" marR="0" indent="0" algn="l" defTabSz="914400" rtl="0" eaLnBrk="1" fontAlgn="auto" latinLnBrk="0" hangingPunct="1">
-              <a:lnSpc>
-                <a:spcPct val="100000"/>
-              </a:lnSpc>
-              <a:spcBef>
-                <a:spcPts val="0"/>
-              </a:spcBef>
-              <a:spcAft>
-                <a:spcPts val="0"/>
-              </a:spcAft>
-              <a:buClrTx/>
-              <a:buSzTx/>
-              <a:buFontTx/>
-              <a:buNone/>
-              <a:tabLst/>
+            <a:pPr defTabSz="966612">
               <a:defRPr/>
             </a:pPr>
             <a:endParaRPr lang="ru-RU" strike="noStrike" baseline="0" dirty="0" smtClean="0"/>
           </a:p>
           <a:p>
-            <a:pPr marL="0" marR="0" indent="0" algn="l" defTabSz="914400" rtl="0" eaLnBrk="1" fontAlgn="auto" latinLnBrk="0" hangingPunct="1">
-              <a:lnSpc>
-                <a:spcPct val="100000"/>
-              </a:lnSpc>
-              <a:spcBef>
-                <a:spcPts val="0"/>
-              </a:spcBef>
-              <a:spcAft>
-                <a:spcPts val="0"/>
-              </a:spcAft>
-              <a:buClrTx/>
-              <a:buSzTx/>
-              <a:buFontTx/>
-              <a:buNone/>
-              <a:tabLst/>
+            <a:pPr defTabSz="966612">
               <a:defRPr/>
             </a:pPr>
             <a:r>
@@ -706,41 +648,13 @@
             </a:r>
           </a:p>
           <a:p>
-            <a:pPr marL="0" marR="0" indent="0" algn="l" defTabSz="914400" rtl="0" eaLnBrk="1" fontAlgn="auto" latinLnBrk="0" hangingPunct="1">
-              <a:lnSpc>
-                <a:spcPct val="100000"/>
-              </a:lnSpc>
-              <a:spcBef>
-                <a:spcPts val="0"/>
-              </a:spcBef>
-              <a:spcAft>
-                <a:spcPts val="0"/>
-              </a:spcAft>
-              <a:buClrTx/>
-              <a:buSzTx/>
-              <a:buFontTx/>
-              <a:buNone/>
-              <a:tabLst/>
+            <a:pPr defTabSz="966612">
               <a:defRPr/>
             </a:pPr>
             <a:endParaRPr lang="ru-RU" strike="noStrike" baseline="0" dirty="0" smtClean="0"/>
           </a:p>
           <a:p>
-            <a:pPr marL="0" marR="0" indent="0" algn="l" defTabSz="914400" rtl="0" eaLnBrk="1" fontAlgn="auto" latinLnBrk="0" hangingPunct="1">
-              <a:lnSpc>
-                <a:spcPct val="100000"/>
-              </a:lnSpc>
-              <a:spcBef>
-                <a:spcPts val="0"/>
-              </a:spcBef>
-              <a:spcAft>
-                <a:spcPts val="0"/>
-              </a:spcAft>
-              <a:buClrTx/>
-              <a:buSzTx/>
-              <a:buFontTx/>
-              <a:buNone/>
-              <a:tabLst/>
+            <a:pPr defTabSz="966612">
               <a:defRPr/>
             </a:pPr>
             <a:r>
@@ -748,104 +662,34 @@
               <a:t>Теперь про нормальных...  Тут сложнее... Надо никого не обидеть ;). Вы наверное знаете чем занимаются 95% программистов? Всякие там сайты, автоматизция бизнеса, десктопный приложухи.. ну и остальной ширнепотреб... Вот собсно это и есть те нормальные люди. Нам мало что говорят слова типа </a:t>
             </a:r>
             <a:r>
-              <a:rPr lang="uk-UA" sz="1200" b="1" i="0" u="none" strike="noStrike" kern="1200" baseline="0" dirty="0" smtClean="0">
-                <a:solidFill>
-                  <a:schemeClr val="tx1"/>
-                </a:solidFill>
-                <a:latin typeface="+mn-lt"/>
-                <a:ea typeface="+mn-ea"/>
-                <a:cs typeface="+mn-cs"/>
-              </a:rPr>
+              <a:rPr lang="uk-UA" sz="1300" b="1" dirty="0"/>
               <a:t>функторы, каррирование, свертка</a:t>
             </a:r>
             <a:r>
-              <a:rPr lang="uk-UA" sz="1200" b="0" i="0" u="none" strike="noStrike" kern="1200" baseline="0" dirty="0" smtClean="0">
-                <a:solidFill>
-                  <a:schemeClr val="tx1"/>
-                </a:solidFill>
-                <a:latin typeface="+mn-lt"/>
-                <a:ea typeface="+mn-ea"/>
-                <a:cs typeface="+mn-cs"/>
-              </a:rPr>
+              <a:rPr lang="uk-UA" sz="1300" dirty="0"/>
               <a:t>... А может быть и говорят, но они никогда не видели такого в своей работе. Собсно не мог же я себя так сразу же назвать не нормальным?</a:t>
             </a:r>
           </a:p>
           <a:p>
-            <a:pPr marL="0" marR="0" indent="0" algn="l" defTabSz="914400" rtl="0" eaLnBrk="1" fontAlgn="auto" latinLnBrk="0" hangingPunct="1">
-              <a:lnSpc>
-                <a:spcPct val="100000"/>
-              </a:lnSpc>
-              <a:spcBef>
-                <a:spcPts val="0"/>
-              </a:spcBef>
-              <a:spcAft>
-                <a:spcPts val="0"/>
-              </a:spcAft>
-              <a:buClrTx/>
-              <a:buSzTx/>
-              <a:buFontTx/>
-              <a:buNone/>
-              <a:tabLst/>
+            <a:pPr defTabSz="966612">
               <a:defRPr/>
             </a:pPr>
-            <a:endParaRPr lang="uk-UA" sz="1200" b="0" i="0" u="none" strike="noStrike" kern="1200" baseline="0" dirty="0" smtClean="0">
-              <a:solidFill>
-                <a:schemeClr val="tx1"/>
-              </a:solidFill>
-              <a:latin typeface="+mn-lt"/>
-              <a:ea typeface="+mn-ea"/>
-              <a:cs typeface="+mn-cs"/>
-            </a:endParaRPr>
-          </a:p>
-          <a:p>
-            <a:pPr marL="0" marR="0" indent="0" algn="l" defTabSz="914400" rtl="0" eaLnBrk="1" fontAlgn="auto" latinLnBrk="0" hangingPunct="1">
-              <a:lnSpc>
-                <a:spcPct val="100000"/>
-              </a:lnSpc>
-              <a:spcBef>
-                <a:spcPts val="0"/>
-              </a:spcBef>
-              <a:spcAft>
-                <a:spcPts val="0"/>
-              </a:spcAft>
-              <a:buClrTx/>
-              <a:buSzTx/>
-              <a:buFontTx/>
-              <a:buNone/>
-              <a:tabLst/>
+            <a:endParaRPr lang="uk-UA" sz="1300" dirty="0"/>
+          </a:p>
+          <a:p>
+            <a:pPr defTabSz="966612">
               <a:defRPr/>
             </a:pPr>
             <a:r>
-              <a:rPr lang="uk-UA" sz="1200" b="0" i="0" u="none" strike="noStrike" kern="1200" baseline="0" dirty="0" smtClean="0">
-                <a:solidFill>
-                  <a:schemeClr val="tx1"/>
-                </a:solidFill>
-                <a:latin typeface="+mn-lt"/>
-                <a:ea typeface="+mn-ea"/>
-                <a:cs typeface="+mn-cs"/>
-              </a:rPr>
+              <a:rPr lang="uk-UA" sz="1300" dirty="0"/>
               <a:t>Именно потому поэтому я и не буду показывать зубодробительный код типа этого (ченить из компилятора </a:t>
             </a:r>
             <a:r>
-              <a:rPr lang="en-US" sz="1200" b="0" i="0" u="none" strike="noStrike" kern="1200" baseline="0" dirty="0" smtClean="0">
-                <a:solidFill>
-                  <a:schemeClr val="tx1"/>
-                </a:solidFill>
-                <a:latin typeface="+mn-lt"/>
-                <a:ea typeface="+mn-ea"/>
-                <a:cs typeface="+mn-cs"/>
-              </a:rPr>
+              <a:rPr lang="en-US" sz="1300" dirty="0"/>
               <a:t>F#)… </a:t>
             </a:r>
             <a:r>
-              <a:rPr lang="uk-UA" sz="1200" b="0" i="0" u="none" strike="noStrike" kern="1200" baseline="0" dirty="0" smtClean="0">
-                <a:solidFill>
-                  <a:schemeClr val="tx1"/>
-                </a:solidFill>
-                <a:latin typeface="+mn-lt"/>
-                <a:ea typeface="+mn-ea"/>
-                <a:cs typeface="+mn-cs"/>
-              </a:rPr>
+              <a:rPr lang="uk-UA" sz="1300" dirty="0"/>
               <a:t>Итак цели.</a:t>
             </a:r>
           </a:p>
@@ -878,6 +722,587 @@
     <p:extLst>
       <p:ext uri="{BB962C8B-B14F-4D97-AF65-F5344CB8AC3E}">
         <p14:creationId xmlns:p14="http://schemas.microsoft.com/office/powerpoint/2010/main" val="3355985474"/>
+      </p:ext>
+    </p:extLst>
+  </p:cSld>
+  <p:clrMapOvr>
+    <a:masterClrMapping/>
+  </p:clrMapOvr>
+</p:notes>
+</file>
+
+<file path=ppt/notesSlides/notesSlide10.xml><?xml version="1.0" encoding="utf-8"?>
+<p:notes xmlns:a="http://schemas.openxmlformats.org/drawingml/2006/main" xmlns:r="http://schemas.openxmlformats.org/officeDocument/2006/relationships" xmlns:p="http://schemas.openxmlformats.org/presentationml/2006/main">
+  <p:cSld>
+    <p:spTree>
+      <p:nvGrpSpPr>
+        <p:cNvPr id="1" name=""/>
+        <p:cNvGrpSpPr/>
+        <p:nvPr/>
+      </p:nvGrpSpPr>
+      <p:grpSpPr>
+        <a:xfrm>
+          <a:off x="0" y="0"/>
+          <a:ext cx="0" cy="0"/>
+          <a:chOff x="0" y="0"/>
+          <a:chExt cx="0" cy="0"/>
+        </a:xfrm>
+      </p:grpSpPr>
+      <p:sp>
+        <p:nvSpPr>
+          <p:cNvPr id="2" name="Slide Image Placeholder 1"/>
+          <p:cNvSpPr>
+            <a:spLocks noGrp="1" noRot="1" noChangeAspect="1"/>
+          </p:cNvSpPr>
+          <p:nvPr>
+            <p:ph type="sldImg"/>
+          </p:nvPr>
+        </p:nvSpPr>
+        <p:spPr/>
+      </p:sp>
+      <p:sp>
+        <p:nvSpPr>
+          <p:cNvPr id="3" name="Notes Placeholder 2"/>
+          <p:cNvSpPr>
+            <a:spLocks noGrp="1"/>
+          </p:cNvSpPr>
+          <p:nvPr>
+            <p:ph type="body" idx="1"/>
+          </p:nvPr>
+        </p:nvSpPr>
+        <p:spPr/>
+        <p:txBody>
+          <a:bodyPr/>
+          <a:lstStyle/>
+          <a:p>
+            <a:r>
+              <a:rPr lang="en-US" sz="1300" dirty="0"/>
+              <a:t>if </a:t>
+            </a:r>
+            <a:r>
+              <a:rPr lang="uk-UA" sz="1300" dirty="0"/>
+              <a:t>возвращает результат...</a:t>
+            </a:r>
+            <a:endParaRPr lang="en-US" sz="1300" dirty="0"/>
+          </a:p>
+          <a:p>
+            <a:r>
+              <a:rPr lang="en-US" sz="1300" dirty="0"/>
+              <a:t>let result =</a:t>
+            </a:r>
+          </a:p>
+          <a:p>
+            <a:r>
+              <a:rPr lang="en-US" sz="1300" dirty="0"/>
+              <a:t>     if x % 2 = 0 then</a:t>
+            </a:r>
+          </a:p>
+          <a:p>
+            <a:r>
+              <a:rPr lang="en-US" sz="1300" dirty="0"/>
+              <a:t>         "Yes it is"</a:t>
+            </a:r>
+          </a:p>
+          <a:p>
+            <a:r>
+              <a:rPr lang="en-US" sz="1300" dirty="0"/>
+              <a:t>     else</a:t>
+            </a:r>
+          </a:p>
+          <a:p>
+            <a:r>
+              <a:rPr lang="en-US" sz="1300" dirty="0"/>
+              <a:t>         "No it is not“</a:t>
+            </a:r>
+          </a:p>
+          <a:p>
+            <a:endParaRPr lang="en-US" sz="1300" dirty="0"/>
+          </a:p>
+          <a:p>
+            <a:r>
+              <a:rPr lang="uk-UA" sz="1300" dirty="0"/>
+              <a:t>Можно юзать конструтор.</a:t>
+            </a:r>
+          </a:p>
+          <a:p>
+            <a:r>
+              <a:rPr lang="en-US" sz="1300" dirty="0"/>
+              <a:t>type </a:t>
+            </a:r>
+            <a:r>
+              <a:rPr lang="en-US" sz="1300" dirty="0" err="1"/>
+              <a:t>SuperService</a:t>
+            </a:r>
+            <a:r>
+              <a:rPr lang="en-US" sz="1300" dirty="0"/>
+              <a:t>(dep1: IDep1) =</a:t>
+            </a:r>
+          </a:p>
+          <a:p>
+            <a:r>
+              <a:rPr lang="en-US" sz="1300" dirty="0"/>
+              <a:t>    let </a:t>
+            </a:r>
+            <a:r>
+              <a:rPr lang="en-US" sz="1300" dirty="0" err="1"/>
+              <a:t>doSometing</a:t>
+            </a:r>
+            <a:r>
+              <a:rPr lang="en-US" sz="1300" dirty="0"/>
+              <a:t> = ()</a:t>
+            </a:r>
+            <a:r>
+              <a:rPr lang="en-US" dirty="0" smtClean="0"/>
+              <a:t>	</a:t>
+            </a:r>
+            <a:endParaRPr lang="ru-RU" dirty="0" smtClean="0"/>
+          </a:p>
+          <a:p>
+            <a:endParaRPr lang="ru-RU" dirty="0" smtClean="0"/>
+          </a:p>
+          <a:p>
+            <a:endParaRPr lang="en-US" baseline="0" dirty="0" smtClean="0"/>
+          </a:p>
+          <a:p>
+            <a:r>
+              <a:rPr lang="uk-UA" baseline="0" dirty="0" smtClean="0"/>
+              <a:t>Типизированность</a:t>
+            </a:r>
+          </a:p>
+          <a:p>
+            <a:endParaRPr lang="uk-UA" baseline="0" dirty="0" smtClean="0"/>
+          </a:p>
+          <a:p>
+            <a:r>
+              <a:rPr lang="en-US" sz="1300" dirty="0"/>
+              <a:t>Object Expressions</a:t>
+            </a:r>
+            <a:endParaRPr lang="uk-UA" baseline="0" dirty="0" smtClean="0"/>
+          </a:p>
+        </p:txBody>
+      </p:sp>
+      <p:sp>
+        <p:nvSpPr>
+          <p:cNvPr id="4" name="Slide Number Placeholder 3"/>
+          <p:cNvSpPr>
+            <a:spLocks noGrp="1"/>
+          </p:cNvSpPr>
+          <p:nvPr>
+            <p:ph type="sldNum" sz="quarter" idx="10"/>
+          </p:nvPr>
+        </p:nvSpPr>
+        <p:spPr/>
+        <p:txBody>
+          <a:bodyPr/>
+          <a:lstStyle/>
+          <a:p>
+            <a:fld id="{327B1D59-D02F-4C0C-9439-7B18C67FCD89}" type="slidenum">
+              <a:rPr lang="uk-UA" smtClean="0"/>
+              <a:t>10</a:t>
+            </a:fld>
+            <a:endParaRPr lang="uk-UA"/>
+          </a:p>
+        </p:txBody>
+      </p:sp>
+    </p:spTree>
+    <p:extLst>
+      <p:ext uri="{BB962C8B-B14F-4D97-AF65-F5344CB8AC3E}">
+        <p14:creationId xmlns:p14="http://schemas.microsoft.com/office/powerpoint/2010/main" val="289005074"/>
+      </p:ext>
+    </p:extLst>
+  </p:cSld>
+  <p:clrMapOvr>
+    <a:masterClrMapping/>
+  </p:clrMapOvr>
+</p:notes>
+</file>
+
+<file path=ppt/notesSlides/notesSlide11.xml><?xml version="1.0" encoding="utf-8"?>
+<p:notes xmlns:a="http://schemas.openxmlformats.org/drawingml/2006/main" xmlns:r="http://schemas.openxmlformats.org/officeDocument/2006/relationships" xmlns:p="http://schemas.openxmlformats.org/presentationml/2006/main">
+  <p:cSld>
+    <p:spTree>
+      <p:nvGrpSpPr>
+        <p:cNvPr id="1" name=""/>
+        <p:cNvGrpSpPr/>
+        <p:nvPr/>
+      </p:nvGrpSpPr>
+      <p:grpSpPr>
+        <a:xfrm>
+          <a:off x="0" y="0"/>
+          <a:ext cx="0" cy="0"/>
+          <a:chOff x="0" y="0"/>
+          <a:chExt cx="0" cy="0"/>
+        </a:xfrm>
+      </p:grpSpPr>
+      <p:sp>
+        <p:nvSpPr>
+          <p:cNvPr id="2" name="Slide Image Placeholder 1"/>
+          <p:cNvSpPr>
+            <a:spLocks noGrp="1" noRot="1" noChangeAspect="1"/>
+          </p:cNvSpPr>
+          <p:nvPr>
+            <p:ph type="sldImg"/>
+          </p:nvPr>
+        </p:nvSpPr>
+        <p:spPr/>
+      </p:sp>
+      <p:sp>
+        <p:nvSpPr>
+          <p:cNvPr id="3" name="Notes Placeholder 2"/>
+          <p:cNvSpPr>
+            <a:spLocks noGrp="1"/>
+          </p:cNvSpPr>
+          <p:nvPr>
+            <p:ph type="body" idx="1"/>
+          </p:nvPr>
+        </p:nvSpPr>
+        <p:spPr/>
+        <p:txBody>
+          <a:bodyPr/>
+          <a:lstStyle/>
+          <a:p>
+            <a:r>
+              <a:rPr lang="ru-RU" dirty="0" smtClean="0"/>
+              <a:t>В </a:t>
+            </a:r>
+            <a:r>
+              <a:rPr lang="en-US" dirty="0" smtClean="0"/>
+              <a:t>F#</a:t>
+            </a:r>
+            <a:r>
+              <a:rPr lang="en-US" baseline="0" dirty="0" smtClean="0"/>
+              <a:t> </a:t>
+            </a:r>
+            <a:r>
+              <a:rPr lang="uk-UA" baseline="0" dirty="0" smtClean="0"/>
+              <a:t>большое значние имеет положение файла в проекте. Они компилятся последовательно. Соотвевенно если клас дефайнится позже, его никто не найдет.</a:t>
+            </a:r>
+          </a:p>
+          <a:p>
+            <a:endParaRPr lang="uk-UA" baseline="0" dirty="0" smtClean="0"/>
+          </a:p>
+          <a:p>
+            <a:r>
+              <a:rPr lang="uk-UA" baseline="0" dirty="0" smtClean="0"/>
+              <a:t>Интеграция со студией так себе... Нема рефакторингов. Нема папок.</a:t>
+            </a:r>
+          </a:p>
+          <a:p>
+            <a:endParaRPr lang="uk-UA" baseline="0" dirty="0" smtClean="0"/>
+          </a:p>
+          <a:p>
+            <a:r>
+              <a:rPr lang="uk-UA" baseline="0" dirty="0" smtClean="0"/>
+              <a:t>Нема автоматического приведения типов. </a:t>
+            </a:r>
+            <a:r>
+              <a:rPr lang="en-US" baseline="0" dirty="0" smtClean="0"/>
+              <a:t>let s : </a:t>
+            </a:r>
+            <a:r>
+              <a:rPr lang="en-US" baseline="0" dirty="0" err="1" smtClean="0"/>
+              <a:t>int</a:t>
+            </a:r>
+            <a:r>
+              <a:rPr lang="en-US" baseline="0" dirty="0" smtClean="0"/>
+              <a:t> = 12.5m </a:t>
+            </a:r>
+            <a:r>
+              <a:rPr lang="uk-UA" baseline="0" dirty="0" smtClean="0"/>
+              <a:t>не будет работать.</a:t>
+            </a:r>
+            <a:endParaRPr lang="en-US" baseline="0" dirty="0" smtClean="0"/>
+          </a:p>
+          <a:p>
+            <a:endParaRPr lang="en-US" baseline="0" dirty="0" smtClean="0"/>
+          </a:p>
+          <a:p>
+            <a:r>
+              <a:rPr lang="uk-UA" baseline="0" dirty="0" smtClean="0"/>
+              <a:t>Два костыля. У в</a:t>
+            </a:r>
+            <a:r>
+              <a:rPr lang="ru-RU" baseline="0" dirty="0" smtClean="0"/>
+              <a:t>ывода типов есть маленькая проблемка, это рекурсия. Как можно вывести что-то, чего пока нет? Еще смешнее ситуация когда двойная рекурсия, метод1 вызывает метод2, который в свою очередь вызывает метод 1...</a:t>
+            </a:r>
+          </a:p>
+          <a:p>
+            <a:r>
+              <a:rPr lang="pt-BR" sz="1300" dirty="0"/>
+              <a:t>let </a:t>
+            </a:r>
+            <a:r>
+              <a:rPr lang="pt-BR" sz="1300" b="1" dirty="0"/>
+              <a:t>rec </a:t>
+            </a:r>
+            <a:r>
+              <a:rPr lang="pt-BR" sz="1300" dirty="0"/>
+              <a:t>isOdd n = (n = 1) || isEven (n - 1)</a:t>
+            </a:r>
+          </a:p>
+          <a:p>
+            <a:r>
+              <a:rPr lang="pt-BR" sz="1300" b="1" dirty="0"/>
+              <a:t>and </a:t>
+            </a:r>
+            <a:r>
+              <a:rPr lang="pt-BR" sz="1300" dirty="0"/>
+              <a:t>isEven n = (n = 0) || isOdd (n - 1)</a:t>
+            </a:r>
+            <a:endParaRPr lang="ru-RU" sz="1300" dirty="0"/>
+          </a:p>
+          <a:p>
+            <a:endParaRPr lang="ru-RU" sz="1300" dirty="0"/>
+          </a:p>
+          <a:p>
+            <a:r>
+              <a:rPr lang="ru-RU" sz="1300"/>
+              <a:t>Непонятно где писать с маленькой буквы, где с большой.</a:t>
+            </a:r>
+            <a:endParaRPr lang="uk-UA" dirty="0"/>
+          </a:p>
+        </p:txBody>
+      </p:sp>
+      <p:sp>
+        <p:nvSpPr>
+          <p:cNvPr id="4" name="Slide Number Placeholder 3"/>
+          <p:cNvSpPr>
+            <a:spLocks noGrp="1"/>
+          </p:cNvSpPr>
+          <p:nvPr>
+            <p:ph type="sldNum" sz="quarter" idx="10"/>
+          </p:nvPr>
+        </p:nvSpPr>
+        <p:spPr/>
+        <p:txBody>
+          <a:bodyPr/>
+          <a:lstStyle/>
+          <a:p>
+            <a:fld id="{327B1D59-D02F-4C0C-9439-7B18C67FCD89}" type="slidenum">
+              <a:rPr lang="uk-UA" smtClean="0"/>
+              <a:t>11</a:t>
+            </a:fld>
+            <a:endParaRPr lang="uk-UA"/>
+          </a:p>
+        </p:txBody>
+      </p:sp>
+    </p:spTree>
+    <p:extLst>
+      <p:ext uri="{BB962C8B-B14F-4D97-AF65-F5344CB8AC3E}">
+        <p14:creationId xmlns:p14="http://schemas.microsoft.com/office/powerpoint/2010/main" val="3345246252"/>
+      </p:ext>
+    </p:extLst>
+  </p:cSld>
+  <p:clrMapOvr>
+    <a:masterClrMapping/>
+  </p:clrMapOvr>
+</p:notes>
+</file>
+
+<file path=ppt/notesSlides/notesSlide12.xml><?xml version="1.0" encoding="utf-8"?>
+<p:notes xmlns:a="http://schemas.openxmlformats.org/drawingml/2006/main" xmlns:r="http://schemas.openxmlformats.org/officeDocument/2006/relationships" xmlns:p="http://schemas.openxmlformats.org/presentationml/2006/main">
+  <p:cSld>
+    <p:spTree>
+      <p:nvGrpSpPr>
+        <p:cNvPr id="1" name=""/>
+        <p:cNvGrpSpPr/>
+        <p:nvPr/>
+      </p:nvGrpSpPr>
+      <p:grpSpPr>
+        <a:xfrm>
+          <a:off x="0" y="0"/>
+          <a:ext cx="0" cy="0"/>
+          <a:chOff x="0" y="0"/>
+          <a:chExt cx="0" cy="0"/>
+        </a:xfrm>
+      </p:grpSpPr>
+      <p:sp>
+        <p:nvSpPr>
+          <p:cNvPr id="2" name="Slide Image Placeholder 1"/>
+          <p:cNvSpPr>
+            <a:spLocks noGrp="1" noRot="1" noChangeAspect="1"/>
+          </p:cNvSpPr>
+          <p:nvPr>
+            <p:ph type="sldImg"/>
+          </p:nvPr>
+        </p:nvSpPr>
+        <p:spPr/>
+      </p:sp>
+      <p:sp>
+        <p:nvSpPr>
+          <p:cNvPr id="3" name="Notes Placeholder 2"/>
+          <p:cNvSpPr>
+            <a:spLocks noGrp="1"/>
+          </p:cNvSpPr>
+          <p:nvPr>
+            <p:ph type="body" idx="1"/>
+          </p:nvPr>
+        </p:nvSpPr>
+        <p:spPr/>
+        <p:txBody>
+          <a:bodyPr/>
+          <a:lstStyle/>
+          <a:p>
+            <a:r>
+              <a:rPr lang="uk-UA" baseline="0" dirty="0" smtClean="0"/>
+              <a:t>Офф, сайт. Ловить там правда нечего. А так это редирект на </a:t>
+            </a:r>
+            <a:r>
+              <a:rPr lang="en-US" baseline="0" dirty="0" smtClean="0"/>
+              <a:t>MSDN </a:t>
+            </a:r>
+            <a:r>
+              <a:rPr lang="uk-UA" baseline="0" dirty="0" smtClean="0"/>
+              <a:t>раздел </a:t>
+            </a:r>
+            <a:r>
+              <a:rPr lang="en-US" baseline="0" dirty="0" smtClean="0"/>
+              <a:t>F#.</a:t>
+            </a:r>
+            <a:endParaRPr lang="uk-UA" baseline="0" dirty="0" smtClean="0"/>
+          </a:p>
+          <a:p>
+            <a:endParaRPr lang="uk-UA" baseline="0" dirty="0" smtClean="0"/>
+          </a:p>
+          <a:p>
+            <a:r>
+              <a:rPr lang="uk-UA" baseline="0" dirty="0" smtClean="0"/>
+              <a:t>Я б</a:t>
+            </a:r>
+            <a:r>
+              <a:rPr lang="ru-RU" baseline="0" dirty="0" smtClean="0"/>
+              <a:t>ы</a:t>
+            </a:r>
+            <a:r>
+              <a:rPr lang="uk-UA" baseline="0" dirty="0" smtClean="0"/>
+              <a:t> начал </a:t>
+            </a:r>
+            <a:r>
+              <a:rPr lang="en-US" baseline="0" dirty="0" err="1" smtClean="0"/>
+              <a:t>hubfs</a:t>
+            </a:r>
+            <a:r>
+              <a:rPr lang="en-US" baseline="0" dirty="0" smtClean="0"/>
+              <a:t>.. </a:t>
+            </a:r>
+            <a:r>
+              <a:rPr lang="uk-UA" baseline="0" dirty="0" smtClean="0"/>
+              <a:t>Кумутити подавала надежд</a:t>
+            </a:r>
+            <a:r>
+              <a:rPr lang="ru-RU" baseline="0" dirty="0" smtClean="0"/>
+              <a:t>ы. К сожалению щас сдохла... По этому </a:t>
+            </a:r>
+            <a:r>
+              <a:rPr lang="en-US" baseline="0" dirty="0" smtClean="0"/>
+              <a:t>stackoverflow.com. </a:t>
+            </a:r>
+            <a:r>
+              <a:rPr lang="uk-UA" baseline="0" dirty="0" smtClean="0"/>
+              <a:t>Многие из тех что могут ответить мониторят оба ресурса.</a:t>
+            </a:r>
+          </a:p>
+          <a:p>
+            <a:endParaRPr lang="uk-UA" baseline="0" dirty="0" smtClean="0"/>
+          </a:p>
+          <a:p>
+            <a:r>
+              <a:rPr lang="uk-UA" baseline="0" dirty="0" smtClean="0"/>
+              <a:t>Более или мение официальн</a:t>
+            </a:r>
+            <a:r>
+              <a:rPr lang="ru-RU" baseline="0" dirty="0" smtClean="0"/>
+              <a:t>ый хештаг...</a:t>
+            </a:r>
+          </a:p>
+          <a:p>
+            <a:endParaRPr lang="ru-RU" baseline="0" dirty="0" smtClean="0"/>
+          </a:p>
+          <a:p>
+            <a:r>
+              <a:rPr lang="ru-RU" baseline="0" dirty="0" smtClean="0"/>
+              <a:t>Книга которую я прочел на этой неделе. Супер. Главное что понравилось, это метафоричное описание. Тоесть например читая про активные паттерны, понимаеш о чем думал разработчик... Главное что не понравилось, это то что написано не тока для </a:t>
+            </a:r>
+            <a:r>
+              <a:rPr lang="en-US" baseline="0" dirty="0" smtClean="0"/>
+              <a:t>.NET</a:t>
+            </a:r>
+            <a:r>
+              <a:rPr lang="uk-UA" baseline="0" dirty="0" smtClean="0"/>
+              <a:t>чиков. Реально много про то что кажд</a:t>
+            </a:r>
+            <a:r>
+              <a:rPr lang="ru-RU" baseline="0" dirty="0" smtClean="0"/>
+              <a:t>ый </a:t>
+            </a:r>
+            <a:r>
+              <a:rPr lang="en-US" baseline="0" dirty="0" smtClean="0"/>
+              <a:t>.Ne</a:t>
+            </a:r>
+            <a:r>
+              <a:rPr lang="uk-UA" baseline="0" dirty="0" smtClean="0"/>
+              <a:t>чик знает.</a:t>
+            </a:r>
+          </a:p>
+          <a:p>
+            <a:endParaRPr lang="uk-UA" baseline="0" dirty="0" smtClean="0"/>
+          </a:p>
+          <a:p>
+            <a:r>
+              <a:rPr lang="uk-UA" baseline="0" dirty="0" smtClean="0"/>
+              <a:t>Три лекции от самого </a:t>
+            </a:r>
+            <a:r>
+              <a:rPr lang="en-US" baseline="0" dirty="0" smtClean="0"/>
+              <a:t>Don </a:t>
+            </a:r>
+            <a:r>
+              <a:rPr lang="en-US" baseline="0" dirty="0" err="1" smtClean="0"/>
+              <a:t>Syme</a:t>
+            </a:r>
+            <a:r>
+              <a:rPr lang="en-US" baseline="0" dirty="0" smtClean="0"/>
+              <a:t>… </a:t>
+            </a:r>
+            <a:r>
+              <a:rPr lang="uk-UA" baseline="0" dirty="0" smtClean="0"/>
+              <a:t>По отз</a:t>
+            </a:r>
+            <a:r>
+              <a:rPr lang="ru-RU" baseline="0" dirty="0" smtClean="0"/>
+              <a:t>ывам скушновато, я же нашел их очень интересными. Короче советую.</a:t>
+            </a:r>
+            <a:endParaRPr lang="en-US" dirty="0"/>
+          </a:p>
+        </p:txBody>
+      </p:sp>
+      <p:sp>
+        <p:nvSpPr>
+          <p:cNvPr id="4" name="Slide Number Placeholder 3"/>
+          <p:cNvSpPr>
+            <a:spLocks noGrp="1"/>
+          </p:cNvSpPr>
+          <p:nvPr>
+            <p:ph type="sldNum" sz="quarter" idx="10"/>
+          </p:nvPr>
+        </p:nvSpPr>
+        <p:spPr/>
+        <p:txBody>
+          <a:bodyPr/>
+          <a:lstStyle/>
+          <a:p>
+            <a:fld id="{327B1D59-D02F-4C0C-9439-7B18C67FCD89}" type="slidenum">
+              <a:rPr lang="uk-UA" smtClean="0"/>
+              <a:t>12</a:t>
+            </a:fld>
+            <a:endParaRPr lang="uk-UA"/>
+          </a:p>
+        </p:txBody>
+      </p:sp>
+    </p:spTree>
+    <p:extLst>
+      <p:ext uri="{BB962C8B-B14F-4D97-AF65-F5344CB8AC3E}">
+        <p14:creationId xmlns:p14="http://schemas.microsoft.com/office/powerpoint/2010/main" val="3149062247"/>
       </p:ext>
     </p:extLst>
   </p:cSld>
@@ -914,7 +1339,12 @@
             <p:ph type="sldImg"/>
           </p:nvPr>
         </p:nvSpPr>
-        <p:spPr/>
+        <p:spPr>
+          <a:xfrm>
+            <a:off x="2852738" y="720725"/>
+            <a:ext cx="1609725" cy="1206500"/>
+          </a:xfrm>
+        </p:spPr>
       </p:sp>
       <p:sp>
         <p:nvSpPr>
@@ -926,7 +1356,12 @@
             <p:ph type="body" idx="1"/>
           </p:nvPr>
         </p:nvSpPr>
-        <p:spPr/>
+        <p:spPr>
+          <a:xfrm>
+            <a:off x="738876" y="2229914"/>
+            <a:ext cx="5852160" cy="6651196"/>
+          </a:xfrm>
+        </p:spPr>
         <p:txBody>
           <a:bodyPr/>
           <a:lstStyle/>
@@ -956,21 +1391,7 @@
             <a:endParaRPr lang="ru-RU" baseline="0" dirty="0" smtClean="0"/>
           </a:p>
           <a:p>
-            <a:pPr marL="0" marR="0" indent="0" algn="l" defTabSz="914400" rtl="0" eaLnBrk="1" fontAlgn="auto" latinLnBrk="0" hangingPunct="1">
-              <a:lnSpc>
-                <a:spcPct val="100000"/>
-              </a:lnSpc>
-              <a:spcBef>
-                <a:spcPts val="0"/>
-              </a:spcBef>
-              <a:spcAft>
-                <a:spcPts val="0"/>
-              </a:spcAft>
-              <a:buClrTx/>
-              <a:buSzTx/>
-              <a:buFontTx/>
-              <a:buNone/>
-              <a:tabLst/>
+            <a:pPr defTabSz="966612">
               <a:defRPr/>
             </a:pPr>
             <a:r>
@@ -1030,137 +1451,46 @@
               <a:t> – “</a:t>
             </a:r>
             <a:r>
-              <a:rPr lang="en-US" sz="1200" kern="1200" dirty="0" smtClean="0">
-                <a:solidFill>
-                  <a:schemeClr val="tx1"/>
-                </a:solidFill>
-                <a:latin typeface="+mn-lt"/>
-                <a:ea typeface="+mn-ea"/>
-                <a:cs typeface="+mn-cs"/>
-              </a:rPr>
+              <a:rPr lang="en-US" sz="1300" dirty="0"/>
               <a:t>exception</a:t>
             </a:r>
             <a:r>
-              <a:rPr lang="en-US" sz="1200" b="1" kern="1200" dirty="0" smtClean="0">
-                <a:solidFill>
-                  <a:schemeClr val="tx1"/>
-                </a:solidFill>
-                <a:latin typeface="+mn-lt"/>
-                <a:ea typeface="+mn-ea"/>
-                <a:cs typeface="+mn-cs"/>
-              </a:rPr>
+              <a:rPr lang="en-US" sz="1300" b="1" dirty="0"/>
               <a:t> </a:t>
             </a:r>
             <a:r>
-              <a:rPr lang="en-US" sz="1200" b="0" kern="1200" dirty="0" err="1" smtClean="0">
-                <a:solidFill>
-                  <a:schemeClr val="tx1"/>
-                </a:solidFill>
-                <a:latin typeface="+mn-lt"/>
-                <a:ea typeface="+mn-ea"/>
-                <a:cs typeface="+mn-cs"/>
-              </a:rPr>
+              <a:rPr lang="en-US" sz="1300" dirty="0" err="1"/>
               <a:t>MyError</a:t>
             </a:r>
             <a:r>
-              <a:rPr lang="en-US" sz="1200" b="1" kern="1200" dirty="0" smtClean="0">
-                <a:solidFill>
-                  <a:schemeClr val="tx1"/>
-                </a:solidFill>
-                <a:latin typeface="+mn-lt"/>
-                <a:ea typeface="+mn-ea"/>
-                <a:cs typeface="+mn-cs"/>
-              </a:rPr>
+              <a:rPr lang="en-US" sz="1300" b="1" dirty="0"/>
               <a:t> </a:t>
             </a:r>
             <a:r>
-              <a:rPr lang="en-US" sz="1200" b="0" kern="1200" dirty="0" smtClean="0">
-                <a:solidFill>
-                  <a:schemeClr val="tx1"/>
-                </a:solidFill>
-                <a:latin typeface="+mn-lt"/>
-                <a:ea typeface="+mn-ea"/>
-                <a:cs typeface="+mn-cs"/>
-              </a:rPr>
+              <a:rPr lang="en-US" sz="1300" dirty="0"/>
               <a:t>of</a:t>
             </a:r>
             <a:r>
-              <a:rPr lang="en-US" sz="1200" b="1" kern="1200" dirty="0" smtClean="0">
-                <a:solidFill>
-                  <a:schemeClr val="tx1"/>
-                </a:solidFill>
-                <a:latin typeface="+mn-lt"/>
-                <a:ea typeface="+mn-ea"/>
-                <a:cs typeface="+mn-cs"/>
-              </a:rPr>
+              <a:rPr lang="en-US" sz="1300" b="1" dirty="0"/>
               <a:t> </a:t>
             </a:r>
             <a:r>
-              <a:rPr lang="en-US" sz="1200" b="0" kern="1200" dirty="0" smtClean="0">
-                <a:solidFill>
-                  <a:schemeClr val="tx1"/>
-                </a:solidFill>
-                <a:latin typeface="+mn-lt"/>
-                <a:ea typeface="+mn-ea"/>
-                <a:cs typeface="+mn-cs"/>
-              </a:rPr>
+              <a:rPr lang="en-US" sz="1300" dirty="0"/>
               <a:t>string”</a:t>
             </a:r>
           </a:p>
           <a:p>
-            <a:pPr marL="0" marR="0" indent="0" algn="l" defTabSz="914400" rtl="0" eaLnBrk="1" fontAlgn="auto" latinLnBrk="0" hangingPunct="1">
-              <a:lnSpc>
-                <a:spcPct val="100000"/>
-              </a:lnSpc>
-              <a:spcBef>
-                <a:spcPts val="0"/>
-              </a:spcBef>
-              <a:spcAft>
-                <a:spcPts val="0"/>
-              </a:spcAft>
-              <a:buClrTx/>
-              <a:buSzTx/>
-              <a:buFontTx/>
-              <a:buNone/>
-              <a:tabLst/>
+            <a:pPr defTabSz="966612">
               <a:defRPr/>
             </a:pPr>
-            <a:endParaRPr lang="en-US" sz="1200" b="0" kern="1200" baseline="0" dirty="0" smtClean="0">
-              <a:solidFill>
-                <a:schemeClr val="tx1"/>
-              </a:solidFill>
-              <a:latin typeface="+mn-lt"/>
-              <a:ea typeface="+mn-ea"/>
-              <a:cs typeface="+mn-cs"/>
-            </a:endParaRPr>
-          </a:p>
-          <a:p>
-            <a:pPr marL="0" marR="0" indent="0" algn="l" defTabSz="914400" rtl="0" eaLnBrk="1" fontAlgn="auto" latinLnBrk="0" hangingPunct="1">
-              <a:lnSpc>
-                <a:spcPct val="100000"/>
-              </a:lnSpc>
-              <a:spcBef>
-                <a:spcPts val="0"/>
-              </a:spcBef>
-              <a:spcAft>
-                <a:spcPts val="0"/>
-              </a:spcAft>
-              <a:buClrTx/>
-              <a:buSzTx/>
-              <a:buFontTx/>
-              <a:buNone/>
-              <a:tabLst/>
+            <a:endParaRPr lang="en-US" sz="1300" dirty="0"/>
+          </a:p>
+          <a:p>
+            <a:pPr defTabSz="966612">
               <a:defRPr/>
             </a:pPr>
             <a:r>
-              <a:rPr lang="ru-RU" sz="1200" b="0" kern="1200" baseline="0" dirty="0" smtClean="0">
-                <a:solidFill>
-                  <a:schemeClr val="tx1"/>
-                </a:solidFill>
-                <a:latin typeface="+mn-lt"/>
-                <a:ea typeface="+mn-ea"/>
-                <a:cs typeface="+mn-cs"/>
-              </a:rPr>
+              <a:rPr lang="ru-RU" sz="1300" dirty="0"/>
               <a:t>В этом всем есть приятная особенность. В </a:t>
             </a:r>
             <a:r>
@@ -1189,41 +1519,13 @@
             </a:r>
           </a:p>
           <a:p>
-            <a:pPr marL="0" marR="0" indent="0" algn="l" defTabSz="914400" rtl="0" eaLnBrk="1" fontAlgn="auto" latinLnBrk="0" hangingPunct="1">
-              <a:lnSpc>
-                <a:spcPct val="100000"/>
-              </a:lnSpc>
-              <a:spcBef>
-                <a:spcPts val="0"/>
-              </a:spcBef>
-              <a:spcAft>
-                <a:spcPts val="0"/>
-              </a:spcAft>
-              <a:buClrTx/>
-              <a:buSzTx/>
-              <a:buFontTx/>
-              <a:buNone/>
-              <a:tabLst/>
+            <a:pPr defTabSz="966612">
               <a:defRPr/>
             </a:pPr>
             <a:endParaRPr lang="ru-RU" baseline="0" dirty="0" smtClean="0"/>
           </a:p>
           <a:p>
-            <a:pPr marL="0" marR="0" indent="0" algn="l" defTabSz="914400" rtl="0" eaLnBrk="1" fontAlgn="auto" latinLnBrk="0" hangingPunct="1">
-              <a:lnSpc>
-                <a:spcPct val="100000"/>
-              </a:lnSpc>
-              <a:spcBef>
-                <a:spcPts val="0"/>
-              </a:spcBef>
-              <a:spcAft>
-                <a:spcPts val="0"/>
-              </a:spcAft>
-              <a:buClrTx/>
-              <a:buSzTx/>
-              <a:buFontTx/>
-              <a:buNone/>
-              <a:tabLst/>
+            <a:pPr defTabSz="966612">
               <a:defRPr/>
             </a:pPr>
             <a:r>
@@ -1232,21 +1534,7 @@
             </a:r>
           </a:p>
           <a:p>
-            <a:pPr marL="0" marR="0" indent="0" algn="l" defTabSz="914400" rtl="0" eaLnBrk="1" fontAlgn="auto" latinLnBrk="0" hangingPunct="1">
-              <a:lnSpc>
-                <a:spcPct val="100000"/>
-              </a:lnSpc>
-              <a:spcBef>
-                <a:spcPts val="0"/>
-              </a:spcBef>
-              <a:spcAft>
-                <a:spcPts val="0"/>
-              </a:spcAft>
-              <a:buClrTx/>
-              <a:buSzTx/>
-              <a:buFontTx/>
-              <a:buNone/>
-              <a:tabLst/>
+            <a:pPr defTabSz="966612">
               <a:defRPr/>
             </a:pPr>
             <a:r>
@@ -1255,41 +1543,13 @@
             </a:r>
           </a:p>
           <a:p>
-            <a:pPr marL="0" marR="0" indent="0" algn="l" defTabSz="914400" rtl="0" eaLnBrk="1" fontAlgn="auto" latinLnBrk="0" hangingPunct="1">
-              <a:lnSpc>
-                <a:spcPct val="100000"/>
-              </a:lnSpc>
-              <a:spcBef>
-                <a:spcPts val="0"/>
-              </a:spcBef>
-              <a:spcAft>
-                <a:spcPts val="0"/>
-              </a:spcAft>
-              <a:buClrTx/>
-              <a:buSzTx/>
-              <a:buFontTx/>
-              <a:buNone/>
-              <a:tabLst/>
+            <a:pPr defTabSz="966612">
               <a:defRPr/>
             </a:pPr>
             <a:endParaRPr lang="ru-RU" baseline="0" dirty="0" smtClean="0"/>
           </a:p>
           <a:p>
-            <a:pPr marL="0" marR="0" indent="0" algn="l" defTabSz="914400" rtl="0" eaLnBrk="1" fontAlgn="auto" latinLnBrk="0" hangingPunct="1">
-              <a:lnSpc>
-                <a:spcPct val="100000"/>
-              </a:lnSpc>
-              <a:spcBef>
-                <a:spcPts val="0"/>
-              </a:spcBef>
-              <a:spcAft>
-                <a:spcPts val="0"/>
-              </a:spcAft>
-              <a:buClrTx/>
-              <a:buSzTx/>
-              <a:buFontTx/>
-              <a:buNone/>
-              <a:tabLst/>
+            <a:pPr defTabSz="966612">
               <a:defRPr/>
             </a:pPr>
             <a:r>
@@ -1432,21 +1692,7 @@
             <a:endParaRPr lang="uk-UA" baseline="0" dirty="0" smtClean="0"/>
           </a:p>
           <a:p>
-            <a:pPr marL="0" marR="0" indent="0" algn="l" defTabSz="914400" rtl="0" eaLnBrk="1" fontAlgn="auto" latinLnBrk="0" hangingPunct="1">
-              <a:lnSpc>
-                <a:spcPct val="100000"/>
-              </a:lnSpc>
-              <a:spcBef>
-                <a:spcPts val="0"/>
-              </a:spcBef>
-              <a:spcAft>
-                <a:spcPts val="0"/>
-              </a:spcAft>
-              <a:buClrTx/>
-              <a:buSzTx/>
-              <a:buFontTx/>
-              <a:buNone/>
-              <a:tabLst/>
+            <a:pPr defTabSz="966612">
               <a:defRPr/>
             </a:pPr>
             <a:r>
@@ -1454,36 +1700,15 @@
               <a:t>(Пример с </a:t>
             </a:r>
             <a:r>
-              <a:rPr lang="en-US" sz="1200" kern="1200" dirty="0" err="1" smtClean="0">
-                <a:solidFill>
-                  <a:schemeClr val="tx1"/>
-                </a:solidFill>
-                <a:latin typeface="+mn-lt"/>
-                <a:ea typeface="+mn-ea"/>
-                <a:cs typeface="+mn-cs"/>
-              </a:rPr>
+              <a:rPr lang="en-US" sz="1300" dirty="0" err="1"/>
               <a:t>TableCreator</a:t>
             </a:r>
             <a:r>
-              <a:rPr lang="uk-UA" sz="1200" kern="1200" baseline="0" dirty="0" smtClean="0">
-                <a:solidFill>
-                  <a:schemeClr val="tx1"/>
-                </a:solidFill>
-                <a:latin typeface="+mn-lt"/>
-                <a:ea typeface="+mn-ea"/>
-                <a:cs typeface="+mn-cs"/>
-              </a:rPr>
+              <a:rPr lang="uk-UA" sz="1300" dirty="0"/>
               <a:t> на </a:t>
             </a:r>
             <a:r>
-              <a:rPr lang="en-US" sz="1200" kern="1200" baseline="0" dirty="0" smtClean="0">
-                <a:solidFill>
-                  <a:schemeClr val="tx1"/>
-                </a:solidFill>
-                <a:latin typeface="+mn-lt"/>
-                <a:ea typeface="+mn-ea"/>
-                <a:cs typeface="+mn-cs"/>
-              </a:rPr>
+              <a:rPr lang="en-US" sz="1300" dirty="0"/>
               <a:t>SMO</a:t>
             </a:r>
             <a:r>
@@ -1587,7 +1812,12 @@
             <p:ph type="sldImg"/>
           </p:nvPr>
         </p:nvSpPr>
-        <p:spPr/>
+        <p:spPr>
+          <a:xfrm>
+            <a:off x="3357563" y="720725"/>
+            <a:ext cx="600075" cy="450850"/>
+          </a:xfrm>
+        </p:spPr>
       </p:sp>
       <p:sp>
         <p:nvSpPr>
@@ -1599,7 +1829,12 @@
             <p:ph type="body" idx="1"/>
           </p:nvPr>
         </p:nvSpPr>
-        <p:spPr/>
+        <p:spPr>
+          <a:xfrm>
+            <a:off x="731520" y="1247005"/>
+            <a:ext cx="5852160" cy="7634105"/>
+          </a:xfrm>
+        </p:spPr>
         <p:txBody>
           <a:bodyPr/>
           <a:lstStyle/>
@@ -1649,267 +1884,69 @@
             <a:endParaRPr lang="uk-UA" baseline="0" dirty="0" smtClean="0"/>
           </a:p>
           <a:p>
-            <a:pPr marL="0" marR="0" indent="0" algn="l" defTabSz="914400" rtl="0" eaLnBrk="1" fontAlgn="auto" latinLnBrk="0" hangingPunct="1">
-              <a:lnSpc>
-                <a:spcPct val="100000"/>
-              </a:lnSpc>
-              <a:spcBef>
-                <a:spcPts val="0"/>
-              </a:spcBef>
-              <a:spcAft>
-                <a:spcPts val="0"/>
-              </a:spcAft>
-              <a:buClrTx/>
-              <a:buSzTx/>
-              <a:buFontTx/>
-              <a:buNone/>
-              <a:tabLst/>
-              <a:defRPr/>
-            </a:pPr>
+            <a:pPr defTabSz="966612"/>
             <a:r>
               <a:rPr lang="uk-UA" baseline="0" dirty="0" smtClean="0"/>
               <a:t>Например очень часто нужны ДТОшки. Типизировання структурка, имя – значение. </a:t>
             </a:r>
             <a:r>
-              <a:rPr lang="ru-RU" sz="1200" kern="1200" dirty="0" smtClean="0">
-                <a:solidFill>
-                  <a:schemeClr val="tx1"/>
-                </a:solidFill>
-                <a:latin typeface="+mn-lt"/>
-                <a:ea typeface="+mn-ea"/>
-                <a:cs typeface="+mn-cs"/>
-              </a:rPr>
+              <a:rPr lang="ru-RU" sz="1300" dirty="0"/>
               <a:t>В </a:t>
             </a:r>
             <a:r>
-              <a:rPr lang="en-US" sz="1200" kern="1200" dirty="0" smtClean="0">
-                <a:solidFill>
-                  <a:schemeClr val="tx1"/>
-                </a:solidFill>
-                <a:latin typeface="+mn-lt"/>
-                <a:ea typeface="+mn-ea"/>
-                <a:cs typeface="+mn-cs"/>
-              </a:rPr>
+              <a:rPr lang="en-US" sz="1300" dirty="0"/>
               <a:t>F# </a:t>
             </a:r>
             <a:r>
-              <a:rPr lang="ru-RU" sz="1200" kern="1200" dirty="0" smtClean="0">
-                <a:solidFill>
-                  <a:schemeClr val="tx1"/>
-                </a:solidFill>
-                <a:latin typeface="+mn-lt"/>
-                <a:ea typeface="+mn-ea"/>
-                <a:cs typeface="+mn-cs"/>
-              </a:rPr>
-              <a:t>это</a:t>
-            </a:r>
-            <a:r>
-              <a:rPr lang="ru-RU" sz="1200" kern="1200" baseline="0" dirty="0" smtClean="0">
-                <a:solidFill>
-                  <a:schemeClr val="tx1"/>
-                </a:solidFill>
-                <a:latin typeface="+mn-lt"/>
-                <a:ea typeface="+mn-ea"/>
-                <a:cs typeface="+mn-cs"/>
-              </a:rPr>
-              <a:t> рекорды.  Если бы не скобочки, то запись была бы вообще минималистична. Реально же это вполне себе класс. С публичным доступом, неизменяемыми полями, конструктором, и переопределенными всякими </a:t>
-            </a:r>
-            <a:r>
-              <a:rPr lang="en-US" sz="1200" kern="1200" baseline="0" dirty="0" smtClean="0">
-                <a:solidFill>
-                  <a:schemeClr val="tx1"/>
-                </a:solidFill>
-                <a:latin typeface="+mn-lt"/>
-                <a:ea typeface="+mn-ea"/>
-                <a:cs typeface="+mn-cs"/>
-              </a:rPr>
+              <a:rPr lang="ru-RU" sz="1300" dirty="0"/>
+              <a:t>это рекорды.  Если бы не скобочки, то запись была бы вообще минималистична. Реально же это вполне себе класс. С публичным доступом, неизменяемыми полями, конструктором, и переопределенными всякими </a:t>
+            </a:r>
+            <a:r>
+              <a:rPr lang="en-US" sz="1300" dirty="0"/>
               <a:t>Equals </a:t>
             </a:r>
             <a:r>
-              <a:rPr lang="uk-UA" sz="1200" kern="1200" baseline="0" dirty="0" smtClean="0">
-                <a:solidFill>
-                  <a:schemeClr val="tx1"/>
-                </a:solidFill>
-                <a:latin typeface="+mn-lt"/>
-                <a:ea typeface="+mn-ea"/>
-                <a:cs typeface="+mn-cs"/>
-              </a:rPr>
+              <a:rPr lang="uk-UA" sz="1300" dirty="0"/>
               <a:t>и </a:t>
             </a:r>
             <a:r>
-              <a:rPr lang="en-US" sz="1200" kern="1200" baseline="0" dirty="0" err="1" smtClean="0">
-                <a:solidFill>
-                  <a:schemeClr val="tx1"/>
-                </a:solidFill>
-                <a:latin typeface="+mn-lt"/>
-                <a:ea typeface="+mn-ea"/>
-                <a:cs typeface="+mn-cs"/>
-              </a:rPr>
+              <a:rPr lang="en-US" sz="1300" dirty="0" err="1"/>
               <a:t>GetHashCode</a:t>
             </a:r>
             <a:r>
-              <a:rPr lang="en-US" sz="1200" kern="1200" baseline="0" dirty="0" smtClean="0">
-                <a:solidFill>
-                  <a:schemeClr val="tx1"/>
-                </a:solidFill>
-                <a:latin typeface="+mn-lt"/>
-                <a:ea typeface="+mn-ea"/>
-                <a:cs typeface="+mn-cs"/>
-              </a:rPr>
+              <a:rPr lang="en-US" sz="1300" dirty="0"/>
               <a:t>.</a:t>
             </a:r>
             <a:r>
-              <a:rPr lang="ru-RU" sz="1200" kern="1200" baseline="0" dirty="0" smtClean="0">
-                <a:solidFill>
-                  <a:schemeClr val="tx1"/>
-                </a:solidFill>
-                <a:latin typeface="+mn-lt"/>
-                <a:ea typeface="+mn-ea"/>
-                <a:cs typeface="+mn-cs"/>
-              </a:rPr>
+              <a:rPr lang="ru-RU" sz="1300" dirty="0"/>
               <a:t> Кроме того что их легко создавать, их еще и легко использовать. Через некторое время большая часть моделей уходит в такие рекорды. При большом желании у рекордов можно описывать и методы.</a:t>
             </a:r>
           </a:p>
           <a:p>
-            <a:pPr marL="0" marR="0" indent="0" algn="l" defTabSz="914400" rtl="0" eaLnBrk="1" fontAlgn="auto" latinLnBrk="0" hangingPunct="1">
-              <a:lnSpc>
-                <a:spcPct val="100000"/>
-              </a:lnSpc>
-              <a:spcBef>
-                <a:spcPts val="0"/>
-              </a:spcBef>
-              <a:spcAft>
-                <a:spcPts val="0"/>
-              </a:spcAft>
-              <a:buClrTx/>
-              <a:buSzTx/>
-              <a:buFontTx/>
-              <a:buNone/>
-              <a:tabLst/>
-              <a:defRPr/>
-            </a:pPr>
-            <a:endParaRPr lang="ru-RU" sz="1200" b="0" kern="1200" baseline="0" dirty="0" smtClean="0">
-              <a:solidFill>
-                <a:schemeClr val="tx1"/>
-              </a:solidFill>
-              <a:latin typeface="+mn-lt"/>
-              <a:ea typeface="+mn-ea"/>
-              <a:cs typeface="+mn-cs"/>
-            </a:endParaRPr>
-          </a:p>
-          <a:p>
-            <a:pPr marL="0" marR="0" indent="0" algn="l" defTabSz="914400" rtl="0" eaLnBrk="1" fontAlgn="auto" latinLnBrk="0" hangingPunct="1">
-              <a:lnSpc>
-                <a:spcPct val="100000"/>
-              </a:lnSpc>
-              <a:spcBef>
-                <a:spcPts val="0"/>
-              </a:spcBef>
-              <a:spcAft>
-                <a:spcPts val="0"/>
-              </a:spcAft>
-              <a:buClrTx/>
-              <a:buSzTx/>
-              <a:buFontTx/>
-              <a:buNone/>
-              <a:tabLst/>
-              <a:defRPr/>
-            </a:pPr>
-            <a:r>
-              <a:rPr lang="ru-RU" sz="1200" b="0" kern="1200" baseline="0" dirty="0" smtClean="0">
-                <a:solidFill>
-                  <a:schemeClr val="tx1"/>
-                </a:solidFill>
-                <a:latin typeface="+mn-lt"/>
-                <a:ea typeface="+mn-ea"/>
-                <a:cs typeface="+mn-cs"/>
-              </a:rPr>
+            <a:pPr defTabSz="966612"/>
+            <a:endParaRPr lang="ru-RU" sz="1300" dirty="0"/>
+          </a:p>
+          <a:p>
+            <a:pPr defTabSz="966612"/>
+            <a:r>
+              <a:rPr lang="ru-RU" sz="1300" dirty="0"/>
               <a:t>Другой пример это Туплы (тупулы, кортежи), это для ситуация когда и названия полей не важны. Очень удобная штука когда надо протаскивать несколько значений за один раз. Ессно оно все типизированное по самое нехочу. И ессно язык поддерживает очень круто. Например декомпозиция на отдельные елементы. Позже я покажу синтаксис для матчинга туплов.</a:t>
             </a:r>
           </a:p>
           <a:p>
-            <a:pPr marL="0" marR="0" indent="0" algn="l" defTabSz="914400" rtl="0" eaLnBrk="1" fontAlgn="auto" latinLnBrk="0" hangingPunct="1">
-              <a:lnSpc>
-                <a:spcPct val="100000"/>
-              </a:lnSpc>
-              <a:spcBef>
-                <a:spcPts val="0"/>
-              </a:spcBef>
-              <a:spcAft>
-                <a:spcPts val="0"/>
-              </a:spcAft>
-              <a:buClrTx/>
-              <a:buSzTx/>
-              <a:buFontTx/>
-              <a:buNone/>
-              <a:tabLst/>
-              <a:defRPr/>
-            </a:pPr>
-            <a:endParaRPr lang="ru-RU" sz="1200" b="0" kern="1200" baseline="0" dirty="0" smtClean="0">
-              <a:solidFill>
-                <a:schemeClr val="tx1"/>
-              </a:solidFill>
-              <a:latin typeface="+mn-lt"/>
-              <a:ea typeface="+mn-ea"/>
-              <a:cs typeface="+mn-cs"/>
-            </a:endParaRPr>
-          </a:p>
-          <a:p>
-            <a:pPr marL="0" marR="0" indent="0" algn="l" defTabSz="914400" rtl="0" eaLnBrk="1" fontAlgn="auto" latinLnBrk="0" hangingPunct="1">
-              <a:lnSpc>
-                <a:spcPct val="100000"/>
-              </a:lnSpc>
-              <a:spcBef>
-                <a:spcPts val="0"/>
-              </a:spcBef>
-              <a:spcAft>
-                <a:spcPts val="0"/>
-              </a:spcAft>
-              <a:buClrTx/>
-              <a:buSzTx/>
-              <a:buFontTx/>
-              <a:buNone/>
-              <a:tabLst/>
-              <a:defRPr/>
-            </a:pPr>
-            <a:r>
-              <a:rPr lang="ru-RU" sz="1200" b="0" kern="1200" baseline="0" dirty="0" smtClean="0">
-                <a:solidFill>
-                  <a:schemeClr val="tx1"/>
-                </a:solidFill>
-                <a:latin typeface="+mn-lt"/>
-                <a:ea typeface="+mn-ea"/>
-                <a:cs typeface="+mn-cs"/>
-              </a:rPr>
+            <a:pPr defTabSz="966612"/>
+            <a:endParaRPr lang="ru-RU" sz="1300" dirty="0"/>
+          </a:p>
+          <a:p>
+            <a:pPr defTabSz="966612"/>
+            <a:r>
+              <a:rPr lang="ru-RU" sz="1300" dirty="0"/>
               <a:t>Следующий пример, проще описать на на картах. (Пример карт). С точки зрения дотНета это можно рассматривать двояко. Вопервых как обычный енум (перечисление). А вот вторых как иерархию. В которой кард явлеяется асбтрактным классом, а все остальное это наслденики. Интересно что это закрытая иерархия. Точно так же как с рекордами можно писать дописывать методы.</a:t>
             </a:r>
           </a:p>
           <a:p>
-            <a:pPr marL="0" marR="0" indent="0" algn="l" defTabSz="914400" rtl="0" eaLnBrk="1" fontAlgn="auto" latinLnBrk="0" hangingPunct="1">
-              <a:lnSpc>
-                <a:spcPct val="100000"/>
-              </a:lnSpc>
-              <a:spcBef>
-                <a:spcPts val="0"/>
-              </a:spcBef>
-              <a:spcAft>
-                <a:spcPts val="0"/>
-              </a:spcAft>
-              <a:buClrTx/>
-              <a:buSzTx/>
-              <a:buFontTx/>
-              <a:buNone/>
-              <a:tabLst/>
-              <a:defRPr/>
-            </a:pPr>
-            <a:endParaRPr lang="ru-RU" sz="1200" b="0" kern="1200" baseline="0" dirty="0" smtClean="0">
-              <a:solidFill>
-                <a:schemeClr val="tx1"/>
-              </a:solidFill>
-              <a:latin typeface="+mn-lt"/>
-              <a:ea typeface="+mn-ea"/>
-              <a:cs typeface="+mn-cs"/>
-            </a:endParaRPr>
+            <a:pPr defTabSz="966612"/>
+            <a:endParaRPr lang="ru-RU" sz="1300" dirty="0"/>
           </a:p>
           <a:p>
             <a:r>
@@ -2023,129 +2060,32 @@
             <a:endParaRPr lang="ru-RU" baseline="0" dirty="0" smtClean="0"/>
           </a:p>
           <a:p>
-            <a:pPr marL="0" marR="0" indent="0" algn="l" defTabSz="914400" rtl="0" eaLnBrk="1" fontAlgn="auto" latinLnBrk="0" hangingPunct="1">
-              <a:lnSpc>
-                <a:spcPct val="100000"/>
-              </a:lnSpc>
-              <a:spcBef>
-                <a:spcPts val="0"/>
-              </a:spcBef>
-              <a:spcAft>
-                <a:spcPts val="0"/>
-              </a:spcAft>
-              <a:buClrTx/>
-              <a:buSzTx/>
-              <a:buFontTx/>
-              <a:buNone/>
-              <a:tabLst/>
-              <a:defRPr/>
-            </a:pPr>
-            <a:endParaRPr lang="ru-RU" sz="1200" b="0" kern="1200" baseline="0" dirty="0" smtClean="0">
-              <a:solidFill>
-                <a:schemeClr val="tx1"/>
-              </a:solidFill>
-              <a:latin typeface="+mn-lt"/>
-              <a:ea typeface="+mn-ea"/>
-              <a:cs typeface="+mn-cs"/>
-            </a:endParaRPr>
-          </a:p>
-          <a:p>
-            <a:pPr marL="0" marR="0" indent="0" algn="l" defTabSz="914400" rtl="0" eaLnBrk="1" fontAlgn="auto" latinLnBrk="0" hangingPunct="1">
-              <a:lnSpc>
-                <a:spcPct val="100000"/>
-              </a:lnSpc>
-              <a:spcBef>
-                <a:spcPts val="0"/>
-              </a:spcBef>
-              <a:spcAft>
-                <a:spcPts val="0"/>
-              </a:spcAft>
-              <a:buClrTx/>
-              <a:buSzTx/>
-              <a:buFontTx/>
-              <a:buNone/>
-              <a:tabLst/>
-              <a:defRPr/>
-            </a:pPr>
-            <a:endParaRPr lang="ru-RU" sz="1200" b="0" kern="1200" baseline="0" dirty="0" smtClean="0">
-              <a:solidFill>
-                <a:schemeClr val="tx1"/>
-              </a:solidFill>
-              <a:latin typeface="+mn-lt"/>
-              <a:ea typeface="+mn-ea"/>
-              <a:cs typeface="+mn-cs"/>
-            </a:endParaRPr>
-          </a:p>
-          <a:p>
-            <a:pPr marL="0" marR="0" indent="0" algn="l" defTabSz="914400" rtl="0" eaLnBrk="1" fontAlgn="auto" latinLnBrk="0" hangingPunct="1">
-              <a:lnSpc>
-                <a:spcPct val="100000"/>
-              </a:lnSpc>
-              <a:spcBef>
-                <a:spcPts val="0"/>
-              </a:spcBef>
-              <a:spcAft>
-                <a:spcPts val="0"/>
-              </a:spcAft>
-              <a:buClrTx/>
-              <a:buSzTx/>
-              <a:buFontTx/>
-              <a:buNone/>
-              <a:tabLst/>
-              <a:defRPr/>
-            </a:pPr>
-            <a:r>
-              <a:rPr lang="ru-RU" sz="1200" b="0" kern="1200" baseline="0" dirty="0" smtClean="0">
-                <a:solidFill>
-                  <a:schemeClr val="tx1"/>
-                </a:solidFill>
-                <a:latin typeface="+mn-lt"/>
-                <a:ea typeface="+mn-ea"/>
-                <a:cs typeface="+mn-cs"/>
-              </a:rPr>
+            <a:pPr defTabSz="966612"/>
+            <a:endParaRPr lang="ru-RU" sz="1300" dirty="0"/>
+          </a:p>
+          <a:p>
+            <a:pPr defTabSz="966612"/>
+            <a:endParaRPr lang="ru-RU" sz="1300" dirty="0"/>
+          </a:p>
+          <a:p>
+            <a:pPr defTabSz="966612"/>
+            <a:r>
+              <a:rPr lang="ru-RU" sz="1300" dirty="0"/>
               <a:t>Ну и обычные .НЕТ классы и структуры... По опыту использования </a:t>
             </a:r>
             <a:r>
-              <a:rPr lang="en-US" sz="1200" b="0" kern="1200" baseline="0" dirty="0" smtClean="0">
-                <a:solidFill>
-                  <a:schemeClr val="tx1"/>
-                </a:solidFill>
-                <a:latin typeface="+mn-lt"/>
-                <a:ea typeface="+mn-ea"/>
-                <a:cs typeface="+mn-cs"/>
-              </a:rPr>
+              <a:rPr lang="en-US" sz="1300" dirty="0"/>
               <a:t>F# </a:t>
             </a:r>
             <a:r>
-              <a:rPr lang="uk-UA" sz="1200" b="0" kern="1200" baseline="0" dirty="0" smtClean="0">
-                <a:solidFill>
-                  <a:schemeClr val="tx1"/>
-                </a:solidFill>
-                <a:latin typeface="+mn-lt"/>
-                <a:ea typeface="+mn-ea"/>
-                <a:cs typeface="+mn-cs"/>
-              </a:rPr>
+              <a:rPr lang="uk-UA" sz="1300" dirty="0"/>
               <a:t>все данн</a:t>
             </a:r>
             <a:r>
-              <a:rPr lang="ru-RU" sz="1200" b="0" kern="1200" baseline="0" dirty="0" smtClean="0">
-                <a:solidFill>
-                  <a:schemeClr val="tx1"/>
-                </a:solidFill>
-                <a:latin typeface="+mn-lt"/>
-                <a:ea typeface="+mn-ea"/>
-                <a:cs typeface="+mn-cs"/>
-              </a:rPr>
+              <a:rPr lang="ru-RU" sz="1300" dirty="0"/>
               <a:t>ые ухоядт в рекорды, туплы и дискриминейтед юнионс, а вот логика в классы и или модули.</a:t>
             </a:r>
-            <a:endParaRPr lang="en-US" sz="1200" b="0" kern="1200" dirty="0" smtClean="0">
-              <a:solidFill>
-                <a:schemeClr val="tx1"/>
-              </a:solidFill>
-              <a:latin typeface="+mn-lt"/>
-              <a:ea typeface="+mn-ea"/>
-              <a:cs typeface="+mn-cs"/>
-            </a:endParaRPr>
+            <a:endParaRPr lang="en-US" sz="1300" dirty="0"/>
           </a:p>
         </p:txBody>
       </p:sp>
@@ -2309,7 +2249,7 @@
             </a:endParaRPr>
           </a:p>
           <a:p>
-            <a:pPr marL="228600" indent="-228600">
+            <a:pPr marL="241653" indent="-241653">
               <a:buAutoNum type="alphaLcParenBoth"/>
             </a:pPr>
             <a:r>
@@ -2332,9 +2272,6 @@
             </a:r>
           </a:p>
           <a:p>
-            <a:pPr marL="0" indent="0">
-              <a:buNone/>
-            </a:pPr>
             <a:r>
               <a:rPr lang="en-US" baseline="0" dirty="0" smtClean="0">
                 <a:sym typeface="Wingdings" pitchFamily="2" charset="2"/>
@@ -2437,399 +2374,7 @@
           <a:bodyPr/>
           <a:lstStyle/>
           <a:p>
-            <a:r>
-              <a:rPr lang="en-US" sz="1200" b="0" i="0" u="none" strike="noStrike" kern="1200" baseline="0" dirty="0" smtClean="0">
-                <a:solidFill>
-                  <a:schemeClr val="tx1"/>
-                </a:solidFill>
-                <a:latin typeface="+mn-lt"/>
-                <a:ea typeface="+mn-ea"/>
-                <a:cs typeface="+mn-cs"/>
-              </a:rPr>
-              <a:t>if </a:t>
-            </a:r>
-            <a:r>
-              <a:rPr lang="uk-UA" sz="1200" b="0" i="0" u="none" strike="noStrike" kern="1200" baseline="0" dirty="0" smtClean="0">
-                <a:solidFill>
-                  <a:schemeClr val="tx1"/>
-                </a:solidFill>
-                <a:latin typeface="+mn-lt"/>
-                <a:ea typeface="+mn-ea"/>
-                <a:cs typeface="+mn-cs"/>
-              </a:rPr>
-              <a:t>возвращает результат...</a:t>
-            </a:r>
-            <a:endParaRPr lang="en-US" sz="1200" b="0" i="0" u="none" strike="noStrike" kern="1200" baseline="0" dirty="0" smtClean="0">
-              <a:solidFill>
-                <a:schemeClr val="tx1"/>
-              </a:solidFill>
-              <a:latin typeface="+mn-lt"/>
-              <a:ea typeface="+mn-ea"/>
-              <a:cs typeface="+mn-cs"/>
-            </a:endParaRPr>
-          </a:p>
-          <a:p>
-            <a:r>
-              <a:rPr lang="en-US" sz="1200" b="0" i="0" u="none" strike="noStrike" kern="1200" baseline="0" dirty="0" smtClean="0">
-                <a:solidFill>
-                  <a:schemeClr val="tx1"/>
-                </a:solidFill>
-                <a:latin typeface="+mn-lt"/>
-                <a:ea typeface="+mn-ea"/>
-                <a:cs typeface="+mn-cs"/>
-              </a:rPr>
-              <a:t>let result =</a:t>
-            </a:r>
-          </a:p>
-          <a:p>
-            <a:r>
-              <a:rPr lang="en-US" sz="1200" b="0" i="0" u="none" strike="noStrike" kern="1200" baseline="0" dirty="0" smtClean="0">
-                <a:solidFill>
-                  <a:schemeClr val="tx1"/>
-                </a:solidFill>
-                <a:latin typeface="+mn-lt"/>
-                <a:ea typeface="+mn-ea"/>
-                <a:cs typeface="+mn-cs"/>
-              </a:rPr>
-              <a:t>     if x % 2 = 0 then</a:t>
-            </a:r>
-          </a:p>
-          <a:p>
-            <a:r>
-              <a:rPr lang="en-US" sz="1200" b="0" i="0" u="none" strike="noStrike" kern="1200" baseline="0" dirty="0" smtClean="0">
-                <a:solidFill>
-                  <a:schemeClr val="tx1"/>
-                </a:solidFill>
-                <a:latin typeface="+mn-lt"/>
-                <a:ea typeface="+mn-ea"/>
-                <a:cs typeface="+mn-cs"/>
-              </a:rPr>
-              <a:t>         "Yes it is"</a:t>
-            </a:r>
-          </a:p>
-          <a:p>
-            <a:r>
-              <a:rPr lang="en-US" sz="1200" b="0" i="0" u="none" strike="noStrike" kern="1200" baseline="0" dirty="0" smtClean="0">
-                <a:solidFill>
-                  <a:schemeClr val="tx1"/>
-                </a:solidFill>
-                <a:latin typeface="+mn-lt"/>
-                <a:ea typeface="+mn-ea"/>
-                <a:cs typeface="+mn-cs"/>
-              </a:rPr>
-              <a:t>     else</a:t>
-            </a:r>
-          </a:p>
-          <a:p>
-            <a:r>
-              <a:rPr lang="en-US" sz="1200" b="0" i="0" u="none" strike="noStrike" kern="1200" baseline="0" dirty="0" smtClean="0">
-                <a:solidFill>
-                  <a:schemeClr val="tx1"/>
-                </a:solidFill>
-                <a:latin typeface="+mn-lt"/>
-                <a:ea typeface="+mn-ea"/>
-                <a:cs typeface="+mn-cs"/>
-              </a:rPr>
-              <a:t>         "No it is not“</a:t>
-            </a:r>
-          </a:p>
-          <a:p>
-            <a:endParaRPr lang="en-US" sz="1200" b="0" i="0" u="none" strike="noStrike" kern="1200" baseline="0" dirty="0" smtClean="0">
-              <a:solidFill>
-                <a:schemeClr val="tx1"/>
-              </a:solidFill>
-              <a:latin typeface="+mn-lt"/>
-              <a:ea typeface="+mn-ea"/>
-              <a:cs typeface="+mn-cs"/>
-            </a:endParaRPr>
-          </a:p>
-          <a:p>
-            <a:r>
-              <a:rPr lang="uk-UA" sz="1200" b="0" i="0" u="none" strike="noStrike" kern="1200" baseline="0" dirty="0" smtClean="0">
-                <a:solidFill>
-                  <a:schemeClr val="tx1"/>
-                </a:solidFill>
-                <a:latin typeface="+mn-lt"/>
-                <a:ea typeface="+mn-ea"/>
-                <a:cs typeface="+mn-cs"/>
-              </a:rPr>
-              <a:t>Можно юзать конструтор.</a:t>
-            </a:r>
-          </a:p>
-          <a:p>
-            <a:r>
-              <a:rPr lang="en-US" sz="1200" b="0" i="0" u="none" strike="noStrike" kern="1200" baseline="0" dirty="0" smtClean="0">
-                <a:solidFill>
-                  <a:schemeClr val="tx1"/>
-                </a:solidFill>
-                <a:latin typeface="+mn-lt"/>
-                <a:ea typeface="+mn-ea"/>
-                <a:cs typeface="+mn-cs"/>
-              </a:rPr>
-              <a:t>type </a:t>
-            </a:r>
-            <a:r>
-              <a:rPr lang="en-US" sz="1200" b="0" i="0" u="none" strike="noStrike" kern="1200" baseline="0" dirty="0" err="1" smtClean="0">
-                <a:solidFill>
-                  <a:schemeClr val="tx1"/>
-                </a:solidFill>
-                <a:latin typeface="+mn-lt"/>
-                <a:ea typeface="+mn-ea"/>
-                <a:cs typeface="+mn-cs"/>
-              </a:rPr>
-              <a:t>SuperService</a:t>
-            </a:r>
-            <a:r>
-              <a:rPr lang="en-US" sz="1200" b="0" i="0" u="none" strike="noStrike" kern="1200" baseline="0" dirty="0" smtClean="0">
-                <a:solidFill>
-                  <a:schemeClr val="tx1"/>
-                </a:solidFill>
-                <a:latin typeface="+mn-lt"/>
-                <a:ea typeface="+mn-ea"/>
-                <a:cs typeface="+mn-cs"/>
-              </a:rPr>
-              <a:t>(dep1: IDep1) =</a:t>
-            </a:r>
-          </a:p>
-          <a:p>
-            <a:r>
-              <a:rPr lang="en-US" sz="1200" b="0" i="0" u="none" strike="noStrike" kern="1200" baseline="0" dirty="0" smtClean="0">
-                <a:solidFill>
-                  <a:schemeClr val="tx1"/>
-                </a:solidFill>
-                <a:latin typeface="+mn-lt"/>
-                <a:ea typeface="+mn-ea"/>
-                <a:cs typeface="+mn-cs"/>
-              </a:rPr>
-              <a:t>    let </a:t>
-            </a:r>
-            <a:r>
-              <a:rPr lang="en-US" sz="1200" b="0" i="0" u="none" strike="noStrike" kern="1200" baseline="0" dirty="0" err="1" smtClean="0">
-                <a:solidFill>
-                  <a:schemeClr val="tx1"/>
-                </a:solidFill>
-                <a:latin typeface="+mn-lt"/>
-                <a:ea typeface="+mn-ea"/>
-                <a:cs typeface="+mn-cs"/>
-              </a:rPr>
-              <a:t>doSometing</a:t>
-            </a:r>
-            <a:r>
-              <a:rPr lang="en-US" sz="1200" b="0" i="0" u="none" strike="noStrike" kern="1200" baseline="0" dirty="0" smtClean="0">
-                <a:solidFill>
-                  <a:schemeClr val="tx1"/>
-                </a:solidFill>
-                <a:latin typeface="+mn-lt"/>
-                <a:ea typeface="+mn-ea"/>
-                <a:cs typeface="+mn-cs"/>
-              </a:rPr>
-              <a:t> = ()</a:t>
-            </a:r>
-            <a:r>
-              <a:rPr lang="en-US" dirty="0" smtClean="0"/>
-              <a:t>	</a:t>
-            </a:r>
-            <a:endParaRPr lang="ru-RU" dirty="0" smtClean="0"/>
-          </a:p>
-          <a:p>
-            <a:endParaRPr lang="ru-RU" dirty="0" smtClean="0"/>
-          </a:p>
-          <a:p>
-            <a:r>
-              <a:rPr lang="ru-RU" dirty="0" smtClean="0"/>
-              <a:t>Например </a:t>
-            </a:r>
-            <a:r>
-              <a:rPr lang="en-US" dirty="0" smtClean="0"/>
-              <a:t>record,</a:t>
-            </a:r>
-            <a:r>
-              <a:rPr lang="en-US" baseline="0" dirty="0" smtClean="0"/>
-              <a:t> option</a:t>
-            </a:r>
-            <a:r>
-              <a:rPr lang="ru-RU" baseline="0" dirty="0" smtClean="0"/>
-              <a:t>, </a:t>
-            </a:r>
-            <a:r>
-              <a:rPr lang="en-US" sz="1200" b="0" i="0" u="none" strike="noStrike" kern="1200" baseline="0" dirty="0" smtClean="0">
-                <a:solidFill>
-                  <a:schemeClr val="tx1"/>
-                </a:solidFill>
-                <a:latin typeface="+mn-lt"/>
-                <a:ea typeface="+mn-ea"/>
-                <a:cs typeface="+mn-cs"/>
-              </a:rPr>
-              <a:t>discriminated unions</a:t>
-            </a:r>
-            <a:endParaRPr lang="ru-RU" baseline="0" dirty="0" smtClean="0"/>
-          </a:p>
-          <a:p>
-            <a:endParaRPr lang="ru-RU" baseline="0" dirty="0" smtClean="0"/>
-          </a:p>
-          <a:p>
-            <a:r>
-              <a:rPr lang="en-US" baseline="0" dirty="0" smtClean="0"/>
-              <a:t>type Person =</a:t>
-            </a:r>
-          </a:p>
-          <a:p>
-            <a:r>
-              <a:rPr lang="en-US" baseline="0" dirty="0" smtClean="0"/>
-              <a:t>| Boy of string</a:t>
-            </a:r>
-          </a:p>
-          <a:p>
-            <a:r>
-              <a:rPr lang="en-US" baseline="0" dirty="0" smtClean="0"/>
-              <a:t>| Girl of string</a:t>
-            </a:r>
-          </a:p>
-          <a:p>
-            <a:r>
-              <a:rPr lang="en-US" baseline="0" dirty="0" smtClean="0"/>
-              <a:t>| Couple of Person * Person</a:t>
-            </a:r>
-          </a:p>
-          <a:p>
-            <a:r>
-              <a:rPr lang="en-US" baseline="0" dirty="0" smtClean="0"/>
-              <a:t>static member (+) (lhs, </a:t>
-            </a:r>
-            <a:r>
-              <a:rPr lang="en-US" baseline="0" dirty="0" err="1" smtClean="0"/>
-              <a:t>rhs</a:t>
-            </a:r>
-            <a:r>
-              <a:rPr lang="en-US" baseline="0" dirty="0" smtClean="0"/>
-              <a:t>) =</a:t>
-            </a:r>
-          </a:p>
-          <a:p>
-            <a:r>
-              <a:rPr lang="en-US" baseline="0" dirty="0" smtClean="0"/>
-              <a:t>	match lhs, </a:t>
-            </a:r>
-            <a:r>
-              <a:rPr lang="en-US" baseline="0" dirty="0" err="1" smtClean="0"/>
-              <a:t>rhs</a:t>
-            </a:r>
-            <a:r>
-              <a:rPr lang="en-US" baseline="0" dirty="0" smtClean="0"/>
-              <a:t> with</a:t>
-            </a:r>
-          </a:p>
-          <a:p>
-            <a:r>
-              <a:rPr lang="en-US" baseline="0" dirty="0" smtClean="0"/>
-              <a:t>	| Couple(_), _ </a:t>
-            </a:r>
-            <a:endParaRPr lang="ru-RU" baseline="0" dirty="0" smtClean="0"/>
-          </a:p>
-          <a:p>
-            <a:r>
-              <a:rPr lang="ru-RU" baseline="0" dirty="0" smtClean="0"/>
-              <a:t>                   </a:t>
-            </a:r>
-            <a:r>
-              <a:rPr lang="en-US" baseline="0" dirty="0" smtClean="0"/>
-              <a:t>| _, Couple(_) </a:t>
-            </a:r>
-            <a:endParaRPr lang="ru-RU" baseline="0" dirty="0" smtClean="0"/>
-          </a:p>
-          <a:p>
-            <a:r>
-              <a:rPr lang="ru-RU" baseline="0" dirty="0" smtClean="0"/>
-              <a:t>		</a:t>
-            </a:r>
-            <a:r>
-              <a:rPr lang="en-US" baseline="0" dirty="0" smtClean="0"/>
-              <a:t>-&gt; </a:t>
-            </a:r>
-            <a:r>
-              <a:rPr lang="en-US" baseline="0" dirty="0" err="1" smtClean="0"/>
-              <a:t>failwith</a:t>
-            </a:r>
-            <a:r>
-              <a:rPr lang="en-US" baseline="0" dirty="0" smtClean="0"/>
-              <a:t> "</a:t>
-            </a:r>
-            <a:r>
-              <a:rPr lang="ru-RU" baseline="0" dirty="0" smtClean="0"/>
-              <a:t>Гм... шведская семья детектед"</a:t>
-            </a:r>
-          </a:p>
-          <a:p>
-            <a:r>
-              <a:rPr lang="ru-RU" baseline="0" dirty="0" smtClean="0"/>
-              <a:t>	| _ -&gt; </a:t>
-            </a:r>
-            <a:r>
-              <a:rPr lang="en-US" baseline="0" dirty="0" smtClean="0"/>
-              <a:t>Couple(lhs, </a:t>
-            </a:r>
-            <a:r>
-              <a:rPr lang="en-US" baseline="0" dirty="0" err="1" smtClean="0"/>
-              <a:t>rhs</a:t>
-            </a:r>
-            <a:r>
-              <a:rPr lang="en-US" baseline="0" dirty="0" smtClean="0"/>
-              <a:t>)</a:t>
-            </a:r>
-            <a:endParaRPr lang="ru-RU" baseline="0" dirty="0" smtClean="0"/>
-          </a:p>
-          <a:p>
-            <a:endParaRPr lang="ru-RU" baseline="0" dirty="0" smtClean="0"/>
-          </a:p>
-          <a:p>
-            <a:pPr marL="0" marR="0" indent="0" algn="l" defTabSz="914400" rtl="0" eaLnBrk="1" fontAlgn="auto" latinLnBrk="0" hangingPunct="1">
-              <a:lnSpc>
-                <a:spcPct val="100000"/>
-              </a:lnSpc>
-              <a:spcBef>
-                <a:spcPts val="0"/>
-              </a:spcBef>
-              <a:spcAft>
-                <a:spcPts val="0"/>
-              </a:spcAft>
-              <a:buClrTx/>
-              <a:buSzTx/>
-              <a:buFontTx/>
-              <a:buNone/>
-              <a:tabLst/>
-              <a:defRPr/>
-            </a:pPr>
-            <a:r>
-              <a:rPr lang="uk-UA" baseline="0" dirty="0" smtClean="0"/>
-              <a:t>Асинхронно скачать, потом чето асинхронно скачать еще раз.</a:t>
-            </a:r>
-            <a:endParaRPr lang="en-US" dirty="0" smtClean="0"/>
-          </a:p>
-          <a:p>
-            <a:endParaRPr lang="en-US" baseline="0" dirty="0" smtClean="0"/>
-          </a:p>
-          <a:p>
-            <a:r>
-              <a:rPr lang="uk-UA" baseline="0" dirty="0" smtClean="0"/>
-              <a:t>Типизированность</a:t>
-            </a:r>
-          </a:p>
-          <a:p>
-            <a:endParaRPr lang="uk-UA" baseline="0" dirty="0" smtClean="0"/>
-          </a:p>
-          <a:p>
-            <a:r>
-              <a:rPr lang="en-US" sz="1200" b="0" i="0" u="none" strike="noStrike" kern="1200" baseline="0" dirty="0" smtClean="0">
-                <a:solidFill>
-                  <a:schemeClr val="tx1"/>
-                </a:solidFill>
-                <a:latin typeface="+mn-lt"/>
-                <a:ea typeface="+mn-ea"/>
-                <a:cs typeface="+mn-cs"/>
-              </a:rPr>
-              <a:t>Object Expressions</a:t>
-            </a:r>
-            <a:endParaRPr lang="uk-UA" baseline="0" dirty="0" smtClean="0"/>
+            <a:endParaRPr lang="en-US"/>
           </a:p>
         </p:txBody>
       </p:sp>
@@ -2850,7 +2395,7 @@
           <a:p>
             <a:fld id="{327B1D59-D02F-4C0C-9439-7B18C67FCD89}" type="slidenum">
               <a:rPr lang="uk-UA" smtClean="0"/>
-              <a:t>8</a:t>
+              <a:t>6</a:t>
             </a:fld>
             <a:endParaRPr lang="uk-UA"/>
           </a:p>
@@ -2859,7 +2404,7 @@
     </p:spTree>
     <p:extLst>
       <p:ext uri="{BB962C8B-B14F-4D97-AF65-F5344CB8AC3E}">
-        <p14:creationId xmlns:p14="http://schemas.microsoft.com/office/powerpoint/2010/main" val="289005074"/>
+        <p14:creationId xmlns:p14="http://schemas.microsoft.com/office/powerpoint/2010/main" val="2637447529"/>
       </p:ext>
     </p:extLst>
   </p:cSld>
@@ -2913,161 +2458,52 @@
           <a:bodyPr/>
           <a:lstStyle/>
           <a:p>
-            <a:r>
-              <a:rPr lang="ru-RU" dirty="0" smtClean="0"/>
-              <a:t>В </a:t>
-            </a:r>
-            <a:r>
-              <a:rPr lang="en-US" dirty="0" smtClean="0"/>
-              <a:t>F#</a:t>
+            <a:pPr defTabSz="966612"/>
+            <a:r>
+              <a:rPr lang="uk-UA" baseline="0" dirty="0" smtClean="0"/>
+              <a:t>Если чесно, я когда продавливал идею написать наш процесинговый сервер на </a:t>
             </a:r>
             <a:r>
               <a:rPr lang="en-US" baseline="0" dirty="0" smtClean="0"/>
+              <a:t>F# </a:t>
+            </a:r>
+            <a:r>
+              <a:rPr lang="uk-UA" baseline="0" dirty="0" smtClean="0"/>
+              <a:t>я б</a:t>
+            </a:r>
+            <a:r>
+              <a:rPr lang="ru-RU" baseline="0" dirty="0" smtClean="0"/>
+              <a:t>ыл уверен что </a:t>
+            </a:r>
+            <a:r>
+              <a:rPr lang="en-US" baseline="0" dirty="0" smtClean="0"/>
+              <a:t>F# </a:t>
+            </a:r>
+            <a:r>
+              <a:rPr lang="uk-UA" baseline="0" dirty="0" smtClean="0"/>
+              <a:t>все сделает за меня. Я </a:t>
+            </a:r>
+            <a:r>
+              <a:rPr lang="ru-RU" baseline="0" dirty="0" smtClean="0"/>
+              <a:t>ожидал чего-то высокоуровневого. Мои ожидания не опрадвлались.</a:t>
+            </a:r>
+            <a:endParaRPr lang="uk-UA" baseline="0" dirty="0" smtClean="0"/>
+          </a:p>
+          <a:p>
+            <a:pPr defTabSz="966612"/>
+            <a:r>
+              <a:rPr lang="uk-UA" baseline="0" dirty="0" smtClean="0"/>
               <a:t> </a:t>
             </a:r>
+            <a:endParaRPr lang="en-US" baseline="0" dirty="0" smtClean="0"/>
+          </a:p>
+          <a:p>
+            <a:pPr defTabSz="966612"/>
             <a:r>
               <a:rPr lang="uk-UA" baseline="0" dirty="0" smtClean="0"/>
-              <a:t>большое значние имеет положение файла в проекте. Они компилятся последовательно. Соотвевенно если клас дефайнится позже, его никто не найдет.</a:t>
-            </a:r>
-          </a:p>
-          <a:p>
-            <a:endParaRPr lang="uk-UA" baseline="0" dirty="0" smtClean="0"/>
-          </a:p>
-          <a:p>
-            <a:r>
-              <a:rPr lang="uk-UA" baseline="0" dirty="0" smtClean="0"/>
-              <a:t>Интеграция со студией так себе... Нема рефакторингов. Нема папок.</a:t>
-            </a:r>
-          </a:p>
-          <a:p>
-            <a:endParaRPr lang="uk-UA" baseline="0" dirty="0" smtClean="0"/>
-          </a:p>
-          <a:p>
-            <a:r>
-              <a:rPr lang="uk-UA" baseline="0" dirty="0" smtClean="0"/>
-              <a:t>Нема автоматического приведения типов. </a:t>
-            </a:r>
-            <a:r>
-              <a:rPr lang="en-US" baseline="0" dirty="0" smtClean="0"/>
-              <a:t>let s : </a:t>
-            </a:r>
-            <a:r>
-              <a:rPr lang="en-US" baseline="0" dirty="0" err="1" smtClean="0"/>
-              <a:t>int</a:t>
-            </a:r>
-            <a:r>
-              <a:rPr lang="en-US" baseline="0" dirty="0" smtClean="0"/>
-              <a:t> = 12.5m </a:t>
-            </a:r>
-            <a:r>
-              <a:rPr lang="uk-UA" baseline="0" dirty="0" smtClean="0"/>
-              <a:t>не будет работать.</a:t>
-            </a:r>
-            <a:endParaRPr lang="en-US" baseline="0" dirty="0" smtClean="0"/>
-          </a:p>
-          <a:p>
-            <a:endParaRPr lang="en-US" baseline="0" dirty="0" smtClean="0"/>
-          </a:p>
-          <a:p>
-            <a:r>
-              <a:rPr lang="uk-UA" baseline="0" dirty="0" smtClean="0"/>
-              <a:t>Два костыля. У в</a:t>
-            </a:r>
-            <a:r>
-              <a:rPr lang="ru-RU" baseline="0" dirty="0" smtClean="0"/>
-              <a:t>ывода типов есть маленькая проблемка, это рекурсия. Как можно вывести что-то, чего пока нет? Еще смешнее ситуация когда двойная рекурсия, метод1 вызывает метод2, который в свою очередь вызывает метод 1...</a:t>
-            </a:r>
-          </a:p>
-          <a:p>
-            <a:r>
-              <a:rPr lang="pt-BR" sz="1200" b="0" i="0" u="none" strike="noStrike" kern="1200" baseline="0" dirty="0" smtClean="0">
-                <a:solidFill>
-                  <a:schemeClr val="tx1"/>
-                </a:solidFill>
-                <a:latin typeface="+mn-lt"/>
-                <a:ea typeface="+mn-ea"/>
-                <a:cs typeface="+mn-cs"/>
-              </a:rPr>
-              <a:t>let </a:t>
-            </a:r>
-            <a:r>
-              <a:rPr lang="pt-BR" sz="1200" b="1" i="0" u="none" strike="noStrike" kern="1200" baseline="0" dirty="0" smtClean="0">
-                <a:solidFill>
-                  <a:schemeClr val="tx1"/>
-                </a:solidFill>
-                <a:latin typeface="+mn-lt"/>
-                <a:ea typeface="+mn-ea"/>
-                <a:cs typeface="+mn-cs"/>
-              </a:rPr>
-              <a:t>rec </a:t>
-            </a:r>
-            <a:r>
-              <a:rPr lang="pt-BR" sz="1200" b="0" i="0" u="none" strike="noStrike" kern="1200" baseline="0" dirty="0" smtClean="0">
-                <a:solidFill>
-                  <a:schemeClr val="tx1"/>
-                </a:solidFill>
-                <a:latin typeface="+mn-lt"/>
-                <a:ea typeface="+mn-ea"/>
-                <a:cs typeface="+mn-cs"/>
-              </a:rPr>
-              <a:t>isOdd n = (n = 1) || isEven (n - 1)</a:t>
-            </a:r>
-          </a:p>
-          <a:p>
-            <a:r>
-              <a:rPr lang="pt-BR" sz="1200" b="1" i="0" u="none" strike="noStrike" kern="1200" baseline="0" dirty="0" smtClean="0">
-                <a:solidFill>
-                  <a:schemeClr val="tx1"/>
-                </a:solidFill>
-                <a:latin typeface="+mn-lt"/>
-                <a:ea typeface="+mn-ea"/>
-                <a:cs typeface="+mn-cs"/>
-              </a:rPr>
-              <a:t>and </a:t>
-            </a:r>
-            <a:r>
-              <a:rPr lang="pt-BR" sz="1200" b="0" i="0" u="none" strike="noStrike" kern="1200" baseline="0" dirty="0" smtClean="0">
-                <a:solidFill>
-                  <a:schemeClr val="tx1"/>
-                </a:solidFill>
-                <a:latin typeface="+mn-lt"/>
-                <a:ea typeface="+mn-ea"/>
-                <a:cs typeface="+mn-cs"/>
-              </a:rPr>
-              <a:t>isEven n = (n = 0) || isOdd (n - 1)</a:t>
-            </a:r>
-            <a:endParaRPr lang="ru-RU" sz="1200" b="0" i="0" u="none" strike="noStrike" kern="1200" baseline="0" dirty="0" smtClean="0">
-              <a:solidFill>
-                <a:schemeClr val="tx1"/>
-              </a:solidFill>
-              <a:latin typeface="+mn-lt"/>
-              <a:ea typeface="+mn-ea"/>
-              <a:cs typeface="+mn-cs"/>
-            </a:endParaRPr>
-          </a:p>
-          <a:p>
-            <a:endParaRPr lang="ru-RU" sz="1200" b="0" i="0" u="none" strike="noStrike" kern="1200" baseline="0" dirty="0" smtClean="0">
-              <a:solidFill>
-                <a:schemeClr val="tx1"/>
-              </a:solidFill>
-              <a:latin typeface="+mn-lt"/>
-              <a:ea typeface="+mn-ea"/>
-              <a:cs typeface="+mn-cs"/>
-            </a:endParaRPr>
-          </a:p>
-          <a:p>
-            <a:r>
-              <a:rPr lang="ru-RU" sz="1200" b="0" i="0" u="none" strike="noStrike" kern="1200" baseline="0" smtClean="0">
-                <a:solidFill>
-                  <a:schemeClr val="tx1"/>
-                </a:solidFill>
-                <a:latin typeface="+mn-lt"/>
-                <a:ea typeface="+mn-ea"/>
-                <a:cs typeface="+mn-cs"/>
-              </a:rPr>
-              <a:t>Непонятно где писать с маленькой буквы, где с большой.</a:t>
-            </a:r>
-            <a:endParaRPr lang="uk-UA" dirty="0"/>
+              <a:t>Асинхронно скачать, потом чето асинхронно скачать еще раз.</a:t>
+            </a:r>
+            <a:endParaRPr lang="en-US" dirty="0" smtClean="0"/>
           </a:p>
         </p:txBody>
       </p:sp>
@@ -3088,7 +2524,7 @@
           <a:p>
             <a:fld id="{327B1D59-D02F-4C0C-9439-7B18C67FCD89}" type="slidenum">
               <a:rPr lang="uk-UA" smtClean="0"/>
-              <a:t>9</a:t>
+              <a:t>7</a:t>
             </a:fld>
             <a:endParaRPr lang="uk-UA"/>
           </a:p>
@@ -3097,7 +2533,7 @@
     </p:spTree>
     <p:extLst>
       <p:ext uri="{BB962C8B-B14F-4D97-AF65-F5344CB8AC3E}">
-        <p14:creationId xmlns:p14="http://schemas.microsoft.com/office/powerpoint/2010/main" val="3345246252"/>
+        <p14:creationId xmlns:p14="http://schemas.microsoft.com/office/powerpoint/2010/main" val="3771026755"/>
       </p:ext>
     </p:extLst>
   </p:cSld>
@@ -3151,135 +2587,6 @@
           <a:bodyPr/>
           <a:lstStyle/>
           <a:p>
-            <a:r>
-              <a:rPr lang="uk-UA" baseline="0" dirty="0" smtClean="0"/>
-              <a:t>Офф, сайт. Ловить там правда нечего. А так это редирект на </a:t>
-            </a:r>
-            <a:r>
-              <a:rPr lang="en-US" baseline="0" dirty="0" smtClean="0"/>
-              <a:t>MSDN </a:t>
-            </a:r>
-            <a:r>
-              <a:rPr lang="uk-UA" baseline="0" dirty="0" smtClean="0"/>
-              <a:t>раздел </a:t>
-            </a:r>
-            <a:r>
-              <a:rPr lang="en-US" baseline="0" dirty="0" smtClean="0"/>
-              <a:t>F#.</a:t>
-            </a:r>
-            <a:endParaRPr lang="uk-UA" baseline="0" dirty="0" smtClean="0"/>
-          </a:p>
-          <a:p>
-            <a:endParaRPr lang="uk-UA" baseline="0" dirty="0" smtClean="0"/>
-          </a:p>
-          <a:p>
-            <a:r>
-              <a:rPr lang="uk-UA" baseline="0" dirty="0" smtClean="0"/>
-              <a:t>Я б</a:t>
-            </a:r>
-            <a:r>
-              <a:rPr lang="ru-RU" baseline="0" dirty="0" smtClean="0"/>
-              <a:t>ы</a:t>
-            </a:r>
-            <a:r>
-              <a:rPr lang="uk-UA" baseline="0" dirty="0" smtClean="0"/>
-              <a:t> начал </a:t>
-            </a:r>
-            <a:r>
-              <a:rPr lang="en-US" baseline="0" dirty="0" err="1" smtClean="0"/>
-              <a:t>hubfs</a:t>
-            </a:r>
-            <a:r>
-              <a:rPr lang="en-US" baseline="0" dirty="0" smtClean="0"/>
-              <a:t>.. </a:t>
-            </a:r>
-            <a:r>
-              <a:rPr lang="uk-UA" baseline="0" dirty="0" smtClean="0"/>
-              <a:t>Кумутити подавала надежд</a:t>
-            </a:r>
-            <a:r>
-              <a:rPr lang="ru-RU" baseline="0" dirty="0" smtClean="0"/>
-              <a:t>ы. К сожалению щас сдохла... По этому </a:t>
-            </a:r>
-            <a:r>
-              <a:rPr lang="en-US" baseline="0" dirty="0" smtClean="0"/>
-              <a:t>stackoverflow.com. </a:t>
-            </a:r>
-            <a:r>
-              <a:rPr lang="uk-UA" baseline="0" dirty="0" smtClean="0"/>
-              <a:t>Многие из тех что могут ответить мониторят оба ресурса.</a:t>
-            </a:r>
-          </a:p>
-          <a:p>
-            <a:endParaRPr lang="uk-UA" baseline="0" dirty="0" smtClean="0"/>
-          </a:p>
-          <a:p>
-            <a:r>
-              <a:rPr lang="uk-UA" baseline="0" dirty="0" smtClean="0"/>
-              <a:t>Более или мение официальн</a:t>
-            </a:r>
-            <a:r>
-              <a:rPr lang="ru-RU" baseline="0" dirty="0" smtClean="0"/>
-              <a:t>ый хештаг...</a:t>
-            </a:r>
-          </a:p>
-          <a:p>
-            <a:endParaRPr lang="ru-RU" baseline="0" dirty="0" smtClean="0"/>
-          </a:p>
-          <a:p>
-            <a:r>
-              <a:rPr lang="ru-RU" baseline="0" dirty="0" smtClean="0"/>
-              <a:t>Книга которую я прочел на этой неделе. Супер. Главное что понравилось, это метафоричное описание. Тоесть например читая про активные паттерны, понимаеш о чем думал разработчик... Главное что не понравилось, это то что написано не тока для </a:t>
-            </a:r>
-            <a:r>
-              <a:rPr lang="en-US" baseline="0" dirty="0" smtClean="0"/>
-              <a:t>.NET</a:t>
-            </a:r>
-            <a:r>
-              <a:rPr lang="uk-UA" baseline="0" dirty="0" smtClean="0"/>
-              <a:t>чиков. Реально много про то что кажд</a:t>
-            </a:r>
-            <a:r>
-              <a:rPr lang="ru-RU" baseline="0" dirty="0" smtClean="0"/>
-              <a:t>ый </a:t>
-            </a:r>
-            <a:r>
-              <a:rPr lang="en-US" baseline="0" dirty="0" smtClean="0"/>
-              <a:t>.Ne</a:t>
-            </a:r>
-            <a:r>
-              <a:rPr lang="uk-UA" baseline="0" dirty="0" smtClean="0"/>
-              <a:t>чик знает.</a:t>
-            </a:r>
-          </a:p>
-          <a:p>
-            <a:endParaRPr lang="uk-UA" baseline="0" dirty="0" smtClean="0"/>
-          </a:p>
-          <a:p>
-            <a:r>
-              <a:rPr lang="uk-UA" baseline="0" dirty="0" smtClean="0"/>
-              <a:t>Три лекции от самого </a:t>
-            </a:r>
-            <a:r>
-              <a:rPr lang="en-US" baseline="0" dirty="0" smtClean="0"/>
-              <a:t>Don </a:t>
-            </a:r>
-            <a:r>
-              <a:rPr lang="en-US" baseline="0" dirty="0" err="1" smtClean="0"/>
-              <a:t>Syme</a:t>
-            </a:r>
-            <a:r>
-              <a:rPr lang="en-US" baseline="0" dirty="0" smtClean="0"/>
-              <a:t>… </a:t>
-            </a:r>
-            <a:r>
-              <a:rPr lang="uk-UA" baseline="0" dirty="0" smtClean="0"/>
-              <a:t>По отз</a:t>
-            </a:r>
-            <a:r>
-              <a:rPr lang="ru-RU" baseline="0" dirty="0" smtClean="0"/>
-              <a:t>ывам скушновато, я же нашел их очень интересными. Короче советую.</a:t>
-            </a:r>
             <a:endParaRPr lang="en-US" dirty="0"/>
           </a:p>
         </p:txBody>
@@ -3301,7 +2608,7 @@
           <a:p>
             <a:fld id="{327B1D59-D02F-4C0C-9439-7B18C67FCD89}" type="slidenum">
               <a:rPr lang="uk-UA" smtClean="0"/>
-              <a:t>10</a:t>
+              <a:t>8</a:t>
             </a:fld>
             <a:endParaRPr lang="uk-UA"/>
           </a:p>
@@ -3310,7 +2617,91 @@
     </p:spTree>
     <p:extLst>
       <p:ext uri="{BB962C8B-B14F-4D97-AF65-F5344CB8AC3E}">
-        <p14:creationId xmlns:p14="http://schemas.microsoft.com/office/powerpoint/2010/main" val="3149062247"/>
+        <p14:creationId xmlns:p14="http://schemas.microsoft.com/office/powerpoint/2010/main" val="1184579685"/>
+      </p:ext>
+    </p:extLst>
+  </p:cSld>
+  <p:clrMapOvr>
+    <a:masterClrMapping/>
+  </p:clrMapOvr>
+</p:notes>
+</file>
+
+<file path=ppt/notesSlides/notesSlide9.xml><?xml version="1.0" encoding="utf-8"?>
+<p:notes xmlns:a="http://schemas.openxmlformats.org/drawingml/2006/main" xmlns:r="http://schemas.openxmlformats.org/officeDocument/2006/relationships" xmlns:p="http://schemas.openxmlformats.org/presentationml/2006/main">
+  <p:cSld>
+    <p:spTree>
+      <p:nvGrpSpPr>
+        <p:cNvPr id="1" name=""/>
+        <p:cNvGrpSpPr/>
+        <p:nvPr/>
+      </p:nvGrpSpPr>
+      <p:grpSpPr>
+        <a:xfrm>
+          <a:off x="0" y="0"/>
+          <a:ext cx="0" cy="0"/>
+          <a:chOff x="0" y="0"/>
+          <a:chExt cx="0" cy="0"/>
+        </a:xfrm>
+      </p:grpSpPr>
+      <p:sp>
+        <p:nvSpPr>
+          <p:cNvPr id="2" name="Slide Image Placeholder 1"/>
+          <p:cNvSpPr>
+            <a:spLocks noGrp="1" noRot="1" noChangeAspect="1"/>
+          </p:cNvSpPr>
+          <p:nvPr>
+            <p:ph type="sldImg"/>
+          </p:nvPr>
+        </p:nvSpPr>
+        <p:spPr/>
+      </p:sp>
+      <p:sp>
+        <p:nvSpPr>
+          <p:cNvPr id="3" name="Notes Placeholder 2"/>
+          <p:cNvSpPr>
+            <a:spLocks noGrp="1"/>
+          </p:cNvSpPr>
+          <p:nvPr>
+            <p:ph type="body" idx="1"/>
+          </p:nvPr>
+        </p:nvSpPr>
+        <p:spPr/>
+        <p:txBody>
+          <a:bodyPr/>
+          <a:lstStyle/>
+          <a:p>
+            <a:endParaRPr lang="en-US"/>
+          </a:p>
+        </p:txBody>
+      </p:sp>
+      <p:sp>
+        <p:nvSpPr>
+          <p:cNvPr id="4" name="Slide Number Placeholder 3"/>
+          <p:cNvSpPr>
+            <a:spLocks noGrp="1"/>
+          </p:cNvSpPr>
+          <p:nvPr>
+            <p:ph type="sldNum" sz="quarter" idx="10"/>
+          </p:nvPr>
+        </p:nvSpPr>
+        <p:spPr/>
+        <p:txBody>
+          <a:bodyPr/>
+          <a:lstStyle/>
+          <a:p>
+            <a:fld id="{327B1D59-D02F-4C0C-9439-7B18C67FCD89}" type="slidenum">
+              <a:rPr lang="uk-UA" smtClean="0"/>
+              <a:t>9</a:t>
+            </a:fld>
+            <a:endParaRPr lang="uk-UA"/>
+          </a:p>
+        </p:txBody>
+      </p:sp>
+    </p:spTree>
+    <p:extLst>
+      <p:ext uri="{BB962C8B-B14F-4D97-AF65-F5344CB8AC3E}">
+        <p14:creationId xmlns:p14="http://schemas.microsoft.com/office/powerpoint/2010/main" val="3672934203"/>
       </p:ext>
     </p:extLst>
   </p:cSld>
@@ -6494,6 +5885,307 @@
           <a:lstStyle/>
           <a:p>
             <a:r>
+              <a:rPr lang="ru-RU" dirty="0" smtClean="0"/>
+              <a:t>Мелкие класные фишки</a:t>
+            </a:r>
+            <a:endParaRPr lang="en-US" dirty="0"/>
+          </a:p>
+        </p:txBody>
+      </p:sp>
+      <p:sp>
+        <p:nvSpPr>
+          <p:cNvPr id="3" name="Content Placeholder 2"/>
+          <p:cNvSpPr>
+            <a:spLocks noGrp="1"/>
+          </p:cNvSpPr>
+          <p:nvPr>
+            <p:ph idx="1"/>
+          </p:nvPr>
+        </p:nvSpPr>
+        <p:spPr/>
+        <p:txBody>
+          <a:bodyPr>
+            <a:normAutofit fontScale="92500" lnSpcReduction="20000"/>
+          </a:bodyPr>
+          <a:lstStyle/>
+          <a:p>
+            <a:r>
+              <a:rPr lang="en-US" dirty="0" smtClean="0"/>
+              <a:t>DI </a:t>
+            </a:r>
+            <a:r>
+              <a:rPr lang="uk-UA" dirty="0" smtClean="0"/>
+              <a:t>средствами </a:t>
+            </a:r>
+            <a:r>
+              <a:rPr lang="en-US" dirty="0" smtClean="0"/>
+              <a:t>F#</a:t>
+            </a:r>
+          </a:p>
+          <a:p>
+            <a:r>
+              <a:rPr lang="en-US" dirty="0" err="1" smtClean="0"/>
+              <a:t>Printfn</a:t>
+            </a:r>
+            <a:endParaRPr lang="en-US" dirty="0" smtClean="0"/>
+          </a:p>
+          <a:p>
+            <a:r>
+              <a:rPr lang="en-US" dirty="0" err="1" smtClean="0"/>
+              <a:t>failwith</a:t>
+            </a:r>
+            <a:endParaRPr lang="ru-RU" dirty="0" smtClean="0"/>
+          </a:p>
+          <a:p>
+            <a:r>
+              <a:rPr lang="en-US" dirty="0" err="1" smtClean="0"/>
+              <a:t>Nullability</a:t>
+            </a:r>
+            <a:r>
+              <a:rPr lang="en-US" dirty="0" smtClean="0"/>
+              <a:t>…</a:t>
+            </a:r>
+          </a:p>
+          <a:p>
+            <a:r>
+              <a:rPr lang="en-US" dirty="0"/>
+              <a:t>m</a:t>
+            </a:r>
+            <a:r>
+              <a:rPr lang="en-US" dirty="0" smtClean="0"/>
+              <a:t>atch Discriminated Union</a:t>
+            </a:r>
+            <a:endParaRPr lang="uk-UA" dirty="0" smtClean="0"/>
+          </a:p>
+          <a:p>
+            <a:r>
+              <a:rPr lang="uk-UA" dirty="0" smtClean="0"/>
+              <a:t>Анонимн</a:t>
+            </a:r>
+            <a:r>
+              <a:rPr lang="ru-RU" dirty="0" smtClean="0"/>
+              <a:t>ые реализации</a:t>
+            </a:r>
+            <a:r>
+              <a:rPr lang="ru-RU" dirty="0" smtClean="0"/>
+              <a:t>..</a:t>
+            </a:r>
+            <a:endParaRPr lang="en-US" dirty="0" smtClean="0"/>
+          </a:p>
+          <a:p>
+            <a:r>
+              <a:rPr lang="en-US" dirty="0"/>
+              <a:t>if</a:t>
+            </a:r>
+            <a:r>
+              <a:rPr lang="uk-UA" dirty="0"/>
+              <a:t> возвращает </a:t>
+            </a:r>
+            <a:r>
+              <a:rPr lang="uk-UA" dirty="0" smtClean="0"/>
+              <a:t>результат</a:t>
+            </a:r>
+            <a:endParaRPr lang="en-US" dirty="0" smtClean="0"/>
+          </a:p>
+          <a:p>
+            <a:r>
+              <a:rPr lang="en-US" dirty="0" smtClean="0"/>
+              <a:t>REPL</a:t>
+            </a:r>
+            <a:endParaRPr lang="uk-UA" dirty="0" smtClean="0"/>
+          </a:p>
+          <a:p>
+            <a:r>
+              <a:rPr lang="uk-UA" dirty="0" smtClean="0"/>
+              <a:t>Евент</a:t>
+            </a:r>
+            <a:r>
+              <a:rPr lang="ru-RU" dirty="0" smtClean="0"/>
+              <a:t>ы и </a:t>
+            </a:r>
+            <a:r>
+              <a:rPr lang="en-US" dirty="0" smtClean="0"/>
+              <a:t>Observable</a:t>
+            </a:r>
+            <a:endParaRPr lang="ru-RU" dirty="0" smtClean="0"/>
+          </a:p>
+          <a:p>
+            <a:endParaRPr lang="en-US" dirty="0"/>
+          </a:p>
+        </p:txBody>
+      </p:sp>
+    </p:spTree>
+    <p:extLst>
+      <p:ext uri="{BB962C8B-B14F-4D97-AF65-F5344CB8AC3E}">
+        <p14:creationId xmlns:p14="http://schemas.microsoft.com/office/powerpoint/2010/main" val="248792973"/>
+      </p:ext>
+    </p:extLst>
+  </p:cSld>
+  <p:clrMapOvr>
+    <a:masterClrMapping/>
+  </p:clrMapOvr>
+</p:sld>
+</file>
+
+<file path=ppt/slides/slide11.xml><?xml version="1.0" encoding="utf-8"?>
+<p:sld xmlns:a="http://schemas.openxmlformats.org/drawingml/2006/main" xmlns:r="http://schemas.openxmlformats.org/officeDocument/2006/relationships" xmlns:p="http://schemas.openxmlformats.org/presentationml/2006/main">
+  <p:cSld>
+    <p:spTree>
+      <p:nvGrpSpPr>
+        <p:cNvPr id="1" name=""/>
+        <p:cNvGrpSpPr/>
+        <p:nvPr/>
+      </p:nvGrpSpPr>
+      <p:grpSpPr>
+        <a:xfrm>
+          <a:off x="0" y="0"/>
+          <a:ext cx="0" cy="0"/>
+          <a:chOff x="0" y="0"/>
+          <a:chExt cx="0" cy="0"/>
+        </a:xfrm>
+      </p:grpSpPr>
+      <p:sp>
+        <p:nvSpPr>
+          <p:cNvPr id="2" name="Title 1"/>
+          <p:cNvSpPr>
+            <a:spLocks noGrp="1"/>
+          </p:cNvSpPr>
+          <p:nvPr>
+            <p:ph type="title"/>
+          </p:nvPr>
+        </p:nvSpPr>
+        <p:spPr/>
+        <p:txBody>
+          <a:bodyPr/>
+          <a:lstStyle/>
+          <a:p>
+            <a:r>
+              <a:rPr lang="uk-UA" dirty="0" smtClean="0"/>
+              <a:t>Проблем</a:t>
+            </a:r>
+            <a:r>
+              <a:rPr lang="ru-RU" dirty="0" smtClean="0"/>
+              <a:t>ы</a:t>
+            </a:r>
+            <a:endParaRPr lang="uk-UA" dirty="0"/>
+          </a:p>
+        </p:txBody>
+      </p:sp>
+      <p:sp>
+        <p:nvSpPr>
+          <p:cNvPr id="3" name="Content Placeholder 2"/>
+          <p:cNvSpPr>
+            <a:spLocks noGrp="1"/>
+          </p:cNvSpPr>
+          <p:nvPr>
+            <p:ph idx="1"/>
+          </p:nvPr>
+        </p:nvSpPr>
+        <p:spPr/>
+        <p:txBody>
+          <a:bodyPr/>
+          <a:lstStyle/>
+          <a:p>
+            <a:r>
+              <a:rPr lang="ru-RU" dirty="0" smtClean="0"/>
+              <a:t>Положение в проекте исходного файла</a:t>
+            </a:r>
+          </a:p>
+          <a:p>
+            <a:r>
+              <a:rPr lang="ru-RU" dirty="0" smtClean="0"/>
+              <a:t>Интеграция в студию</a:t>
+            </a:r>
+            <a:endParaRPr lang="en-US" dirty="0" smtClean="0"/>
+          </a:p>
+          <a:p>
+            <a:r>
+              <a:rPr lang="uk-UA" dirty="0" smtClean="0"/>
+              <a:t>Автоматическое приведение типов</a:t>
+            </a:r>
+            <a:endParaRPr lang="en-US" dirty="0" smtClean="0"/>
+          </a:p>
+          <a:p>
+            <a:r>
+              <a:rPr lang="en-US" dirty="0" smtClean="0"/>
+              <a:t>rec </a:t>
+            </a:r>
+            <a:r>
+              <a:rPr lang="uk-UA" dirty="0" smtClean="0"/>
+              <a:t>и </a:t>
+            </a:r>
+            <a:r>
+              <a:rPr lang="en-US" dirty="0" smtClean="0"/>
+              <a:t>and</a:t>
+            </a:r>
+            <a:endParaRPr lang="uk-UA" dirty="0" smtClean="0"/>
+          </a:p>
+          <a:p>
+            <a:r>
+              <a:rPr lang="uk-UA" dirty="0" smtClean="0"/>
+              <a:t>Код конвеншен</a:t>
+            </a:r>
+            <a:r>
+              <a:rPr lang="ru-RU" dirty="0" smtClean="0"/>
+              <a:t>ы</a:t>
+            </a:r>
+            <a:endParaRPr lang="en-US" dirty="0" smtClean="0"/>
+          </a:p>
+          <a:p>
+            <a:r>
+              <a:rPr lang="uk-UA" dirty="0" smtClean="0"/>
+              <a:t>Приведение типов</a:t>
+            </a:r>
+            <a:endParaRPr lang="uk-UA" dirty="0"/>
+          </a:p>
+        </p:txBody>
+      </p:sp>
+    </p:spTree>
+    <p:extLst>
+      <p:ext uri="{BB962C8B-B14F-4D97-AF65-F5344CB8AC3E}">
+        <p14:creationId xmlns:p14="http://schemas.microsoft.com/office/powerpoint/2010/main" val="4195982294"/>
+      </p:ext>
+    </p:extLst>
+  </p:cSld>
+  <p:clrMapOvr>
+    <a:masterClrMapping/>
+  </p:clrMapOvr>
+</p:sld>
+</file>
+
+<file path=ppt/slides/slide12.xml><?xml version="1.0" encoding="utf-8"?>
+<p:sld xmlns:a="http://schemas.openxmlformats.org/drawingml/2006/main" xmlns:r="http://schemas.openxmlformats.org/officeDocument/2006/relationships" xmlns:p="http://schemas.openxmlformats.org/presentationml/2006/main">
+  <p:cSld>
+    <p:spTree>
+      <p:nvGrpSpPr>
+        <p:cNvPr id="1" name=""/>
+        <p:cNvGrpSpPr/>
+        <p:nvPr/>
+      </p:nvGrpSpPr>
+      <p:grpSpPr>
+        <a:xfrm>
+          <a:off x="0" y="0"/>
+          <a:ext cx="0" cy="0"/>
+          <a:chOff x="0" y="0"/>
+          <a:chExt cx="0" cy="0"/>
+        </a:xfrm>
+      </p:grpSpPr>
+      <p:sp>
+        <p:nvSpPr>
+          <p:cNvPr id="2" name="Title 1"/>
+          <p:cNvSpPr>
+            <a:spLocks noGrp="1"/>
+          </p:cNvSpPr>
+          <p:nvPr>
+            <p:ph type="title"/>
+          </p:nvPr>
+        </p:nvSpPr>
+        <p:spPr/>
+        <p:txBody>
+          <a:bodyPr/>
+          <a:lstStyle/>
+          <a:p>
+            <a:r>
               <a:rPr lang="uk-UA" dirty="0" smtClean="0"/>
               <a:t>Рес</a:t>
             </a:r>
@@ -6586,6 +6278,10 @@
             <a:endParaRPr lang="ru-RU" dirty="0" smtClean="0"/>
           </a:p>
           <a:p>
+            <a:r>
+              <a:rPr lang="en-US" dirty="0" smtClean="0"/>
+              <a:t>F# </a:t>
+            </a:r>
             <a:r>
               <a:rPr lang="en-US" dirty="0" smtClean="0"/>
               <a:t>Spec</a:t>
@@ -6945,16 +6641,12 @@
               <a:t>Лям</a:t>
             </a:r>
             <a:r>
-              <a:rPr lang="uk-UA"/>
+              <a:rPr lang="uk-UA" dirty="0"/>
               <a:t>б</a:t>
             </a:r>
             <a:r>
-              <a:rPr lang="ru-RU" smtClean="0"/>
-              <a:t>да </a:t>
-            </a:r>
-            <a:r>
               <a:rPr lang="ru-RU" dirty="0" smtClean="0"/>
-              <a:t>выражения</a:t>
+              <a:t>да выражения</a:t>
             </a:r>
             <a:endParaRPr lang="en-US" dirty="0"/>
           </a:p>
@@ -7204,8 +6896,8 @@
           <a:lstStyle/>
           <a:p>
             <a:r>
-              <a:rPr lang="ru-RU" dirty="0" smtClean="0"/>
-              <a:t>Мелкие класные фишки</a:t>
+              <a:rPr lang="uk-UA" dirty="0" smtClean="0"/>
+              <a:t>Матчинг</a:t>
             </a:r>
             <a:endParaRPr lang="en-US" dirty="0"/>
           </a:p>
@@ -7228,67 +6920,13 @@
           <a:p>
             <a:r>
               <a:rPr lang="en-US" dirty="0" smtClean="0"/>
-              <a:t>if</a:t>
-            </a:r>
-            <a:r>
-              <a:rPr lang="uk-UA" dirty="0" smtClean="0"/>
-              <a:t> возвращает результат</a:t>
+              <a:t>Pattern matching</a:t>
             </a:r>
           </a:p>
           <a:p>
             <a:r>
               <a:rPr lang="en-US" dirty="0" smtClean="0"/>
-              <a:t>DI </a:t>
-            </a:r>
-            <a:r>
-              <a:rPr lang="uk-UA" dirty="0" smtClean="0"/>
-              <a:t>средствами </a:t>
-            </a:r>
-            <a:r>
-              <a:rPr lang="en-US" dirty="0" smtClean="0"/>
-              <a:t>F#</a:t>
-            </a:r>
-          </a:p>
-          <a:p>
-            <a:r>
-              <a:rPr lang="en-US" dirty="0" err="1" smtClean="0"/>
-              <a:t>async</a:t>
-            </a:r>
-            <a:r>
-              <a:rPr lang="en-US" dirty="0" smtClean="0"/>
-              <a:t> </a:t>
-            </a:r>
-            <a:r>
-              <a:rPr lang="uk-UA" dirty="0" smtClean="0"/>
-              <a:t>воркфлоу...</a:t>
-            </a:r>
-          </a:p>
-          <a:p>
-            <a:r>
-              <a:rPr lang="en-US" dirty="0" err="1" smtClean="0"/>
-              <a:t>printfn</a:t>
-            </a:r>
-            <a:endParaRPr lang="ru-RU" dirty="0" smtClean="0"/>
-          </a:p>
-          <a:p>
-            <a:r>
-              <a:rPr lang="en-US" dirty="0" err="1" smtClean="0"/>
-              <a:t>Nullability</a:t>
-            </a:r>
-            <a:r>
-              <a:rPr lang="en-US" dirty="0" smtClean="0"/>
-              <a:t>…</a:t>
-            </a:r>
-            <a:endParaRPr lang="uk-UA" dirty="0" smtClean="0"/>
-          </a:p>
-          <a:p>
-            <a:r>
-              <a:rPr lang="uk-UA" dirty="0" smtClean="0"/>
-              <a:t>Анонимн</a:t>
-            </a:r>
-            <a:r>
-              <a:rPr lang="ru-RU" dirty="0" smtClean="0"/>
-              <a:t>ые реализации..</a:t>
+              <a:t>Active patterns</a:t>
             </a:r>
             <a:endParaRPr lang="en-US" dirty="0"/>
           </a:p>
@@ -7297,7 +6935,7 @@
     </p:spTree>
     <p:extLst>
       <p:ext uri="{BB962C8B-B14F-4D97-AF65-F5344CB8AC3E}">
-        <p14:creationId xmlns:p14="http://schemas.microsoft.com/office/powerpoint/2010/main" val="248792973"/>
+        <p14:creationId xmlns:p14="http://schemas.microsoft.com/office/powerpoint/2010/main" val="1931102884"/>
       </p:ext>
     </p:extLst>
   </p:cSld>
@@ -7340,90 +6978,64 @@
           <a:lstStyle/>
           <a:p>
             <a:r>
+              <a:rPr lang="en-US" dirty="0" err="1" smtClean="0"/>
+              <a:t>Metaprogramming</a:t>
+            </a:r>
+            <a:endParaRPr lang="en-US" dirty="0"/>
+          </a:p>
+        </p:txBody>
+      </p:sp>
+      <p:sp>
+        <p:nvSpPr>
+          <p:cNvPr id="3" name="Content Placeholder 2"/>
+          <p:cNvSpPr>
+            <a:spLocks noGrp="1"/>
+          </p:cNvSpPr>
+          <p:nvPr>
+            <p:ph idx="1"/>
+          </p:nvPr>
+        </p:nvSpPr>
+        <p:spPr/>
+        <p:txBody>
+          <a:bodyPr/>
+          <a:lstStyle/>
+          <a:p>
+            <a:r>
+              <a:rPr lang="en-US" dirty="0" smtClean="0"/>
+              <a:t>Reflection</a:t>
+            </a:r>
+          </a:p>
+          <a:p>
+            <a:r>
+              <a:rPr lang="en-US" dirty="0" smtClean="0"/>
+              <a:t>Computation expressions (monad, workflow)</a:t>
+            </a:r>
+          </a:p>
+          <a:p>
+            <a:r>
+              <a:rPr lang="en-US" dirty="0" smtClean="0"/>
+              <a:t>Quotations</a:t>
+            </a:r>
+          </a:p>
+          <a:p>
+            <a:r>
               <a:rPr lang="uk-UA" dirty="0" smtClean="0"/>
-              <a:t>Проблем</a:t>
-            </a:r>
-            <a:r>
-              <a:rPr lang="ru-RU" dirty="0" smtClean="0"/>
-              <a:t>ы</a:t>
-            </a:r>
-            <a:endParaRPr lang="uk-UA" dirty="0"/>
-          </a:p>
-        </p:txBody>
-      </p:sp>
-      <p:sp>
-        <p:nvSpPr>
-          <p:cNvPr id="3" name="Content Placeholder 2"/>
-          <p:cNvSpPr>
-            <a:spLocks noGrp="1"/>
-          </p:cNvSpPr>
-          <p:nvPr>
-            <p:ph idx="1"/>
-          </p:nvPr>
-        </p:nvSpPr>
-        <p:spPr/>
-        <p:txBody>
-          <a:bodyPr/>
-          <a:lstStyle/>
-          <a:p>
-            <a:r>
-              <a:rPr lang="ru-RU" dirty="0" smtClean="0"/>
-              <a:t>Положение в проекте исходного файла</a:t>
-            </a:r>
-          </a:p>
-          <a:p>
-            <a:r>
-              <a:rPr lang="ru-RU" dirty="0" smtClean="0"/>
-              <a:t>Интеграция в студию</a:t>
-            </a:r>
-            <a:endParaRPr lang="en-US" dirty="0" smtClean="0"/>
-          </a:p>
-          <a:p>
-            <a:r>
-              <a:rPr lang="uk-UA" dirty="0" smtClean="0"/>
-              <a:t>Автоматическое приведение типов</a:t>
-            </a:r>
-            <a:endParaRPr lang="en-US" dirty="0" smtClean="0"/>
-          </a:p>
-          <a:p>
+              <a:t>Взагалі </a:t>
+            </a:r>
             <a:r>
               <a:rPr lang="en-US" dirty="0" smtClean="0"/>
-              <a:t>rec </a:t>
-            </a:r>
-            <a:r>
-              <a:rPr lang="uk-UA" dirty="0" smtClean="0"/>
-              <a:t>и </a:t>
-            </a:r>
-            <a:r>
-              <a:rPr lang="en-US" dirty="0" smtClean="0"/>
-              <a:t>and</a:t>
-            </a:r>
-            <a:endParaRPr lang="uk-UA" dirty="0" smtClean="0"/>
-          </a:p>
-          <a:p>
-            <a:r>
-              <a:rPr lang="uk-UA" dirty="0" smtClean="0"/>
-              <a:t>Код конвеншен</a:t>
-            </a:r>
-            <a:r>
-              <a:rPr lang="ru-RU" dirty="0" smtClean="0"/>
-              <a:t>ы</a:t>
-            </a:r>
-            <a:endParaRPr lang="en-US" dirty="0" smtClean="0"/>
-          </a:p>
-          <a:p>
-            <a:r>
-              <a:rPr lang="uk-UA" dirty="0" smtClean="0"/>
-              <a:t>Приведение типов</a:t>
-            </a:r>
-            <a:endParaRPr lang="uk-UA" dirty="0"/>
+              <a:t>DSL</a:t>
+            </a:r>
+          </a:p>
+          <a:p>
+            <a:endParaRPr lang="en-US" dirty="0"/>
           </a:p>
         </p:txBody>
       </p:sp>
     </p:spTree>
     <p:extLst>
       <p:ext uri="{BB962C8B-B14F-4D97-AF65-F5344CB8AC3E}">
-        <p14:creationId xmlns:p14="http://schemas.microsoft.com/office/powerpoint/2010/main" val="4195982294"/>
+        <p14:creationId xmlns:p14="http://schemas.microsoft.com/office/powerpoint/2010/main" val="513625473"/>
       </p:ext>
     </p:extLst>
   </p:cSld>

</xml_diff>